<commit_message>
update of the TODO list and of the cheatsheet
</commit_message>
<xml_diff>
--- a/share/techdoc/DRomics_cheat_sheet.pptx
+++ b/share/techdoc/DRomics_cheat_sheet.pptx
@@ -5,11 +5,10 @@
     <p:sldMasterId id="2147483660" r:id="rId1"/>
   </p:sldMasterIdLst>
   <p:notesMasterIdLst>
-    <p:notesMasterId r:id="rId4"/>
+    <p:notesMasterId r:id="rId3"/>
   </p:notesMasterIdLst>
   <p:sldIdLst>
     <p:sldId id="256" r:id="rId2"/>
-    <p:sldId id="257" r:id="rId3"/>
   </p:sldIdLst>
   <p:sldSz cx="9144000" cy="6858000" type="screen4x3"/>
   <p:notesSz cx="6889750" cy="10018713"/>
@@ -6982,428 +6981,6 @@
     <p:extLst>
       <p:ext uri="{BB962C8B-B14F-4D97-AF65-F5344CB8AC3E}">
         <p14:creationId xmlns:p14="http://schemas.microsoft.com/office/powerpoint/2010/main" val="3552036706"/>
-      </p:ext>
-    </p:extLst>
-  </p:cSld>
-  <p:clrMapOvr>
-    <a:masterClrMapping/>
-  </p:clrMapOvr>
-</p:sld>
-</file>
-
-<file path=ppt/slides/slide2.xml><?xml version="1.0" encoding="utf-8"?>
-<p:sld xmlns:a="http://schemas.openxmlformats.org/drawingml/2006/main" xmlns:r="http://schemas.openxmlformats.org/officeDocument/2006/relationships" xmlns:p="http://schemas.openxmlformats.org/presentationml/2006/main">
-  <p:cSld>
-    <p:spTree>
-      <p:nvGrpSpPr>
-        <p:cNvPr id="1" name=""/>
-        <p:cNvGrpSpPr/>
-        <p:nvPr/>
-      </p:nvGrpSpPr>
-      <p:grpSpPr>
-        <a:xfrm>
-          <a:off x="0" y="0"/>
-          <a:ext cx="0" cy="0"/>
-          <a:chOff x="0" y="0"/>
-          <a:chExt cx="0" cy="0"/>
-        </a:xfrm>
-      </p:grpSpPr>
-      <p:pic>
-        <p:nvPicPr>
-          <p:cNvPr id="4" name="Image 3"/>
-          <p:cNvPicPr>
-            <a:picLocks noChangeAspect="1"/>
-          </p:cNvPicPr>
-          <p:nvPr/>
-        </p:nvPicPr>
-        <p:blipFill>
-          <a:blip r:embed="rId2" cstate="print">
-            <a:extLst>
-              <a:ext uri="{28A0092B-C50C-407E-A947-70E740481C1C}">
-                <a14:useLocalDpi xmlns:a14="http://schemas.microsoft.com/office/drawing/2010/main" val="0"/>
-              </a:ext>
-            </a:extLst>
-          </a:blip>
-          <a:stretch>
-            <a:fillRect/>
-          </a:stretch>
-        </p:blipFill>
-        <p:spPr>
-          <a:xfrm>
-            <a:off x="6987184" y="1800065"/>
-            <a:ext cx="2063914" cy="1470223"/>
-          </a:xfrm>
-          <a:prstGeom prst="rect">
-            <a:avLst/>
-          </a:prstGeom>
-        </p:spPr>
-      </p:pic>
-      <p:sp>
-        <p:nvSpPr>
-          <p:cNvPr id="5" name="ZoneTexte 4"/>
-          <p:cNvSpPr txBox="1"/>
-          <p:nvPr/>
-        </p:nvSpPr>
-        <p:spPr>
-          <a:xfrm>
-            <a:off x="5573938" y="1591228"/>
-            <a:ext cx="1647440" cy="332965"/>
-          </a:xfrm>
-          <a:prstGeom prst="rect">
-            <a:avLst/>
-          </a:prstGeom>
-          <a:noFill/>
-        </p:spPr>
-        <p:txBody>
-          <a:bodyPr wrap="square" rtlCol="0">
-            <a:spAutoFit/>
-          </a:bodyPr>
-          <a:lstStyle/>
-          <a:p>
-            <a:r>
-              <a:rPr lang="en-US" sz="750" dirty="0" err="1">
-                <a:latin typeface="Courier New" panose="02070309020205020404" pitchFamily="49" charset="0"/>
-                <a:cs typeface="Courier New" panose="02070309020205020404" pitchFamily="49" charset="0"/>
-              </a:rPr>
-              <a:t>trendplot</a:t>
-            </a:r>
-            <a:r>
-              <a:rPr lang="en-US" sz="750" dirty="0">
-                <a:latin typeface="Courier New" panose="02070309020205020404" pitchFamily="49" charset="0"/>
-                <a:cs typeface="Courier New" panose="02070309020205020404" pitchFamily="49" charset="0"/>
-              </a:rPr>
-              <a:t>(</a:t>
-            </a:r>
-            <a:r>
-              <a:rPr lang="en-US" sz="750" dirty="0" err="1">
-                <a:latin typeface="Courier New" panose="02070309020205020404" pitchFamily="49" charset="0"/>
-                <a:cs typeface="Courier New" panose="02070309020205020404" pitchFamily="49" charset="0"/>
-              </a:rPr>
-              <a:t>extendedres</a:t>
-            </a:r>
-            <a:r>
-              <a:rPr lang="en-US" sz="750" dirty="0">
-                <a:latin typeface="Courier New" panose="02070309020205020404" pitchFamily="49" charset="0"/>
-                <a:cs typeface="Courier New" panose="02070309020205020404" pitchFamily="49" charset="0"/>
-              </a:rPr>
-              <a:t>, group, </a:t>
-            </a:r>
-            <a:r>
-              <a:rPr lang="en-US" sz="750" dirty="0" err="1">
-                <a:latin typeface="Courier New" panose="02070309020205020404" pitchFamily="49" charset="0"/>
-                <a:cs typeface="Courier New" panose="02070309020205020404" pitchFamily="49" charset="0"/>
-              </a:rPr>
-              <a:t>facetby</a:t>
-            </a:r>
-            <a:r>
-              <a:rPr lang="en-US" sz="750" dirty="0">
-                <a:latin typeface="Courier New" panose="02070309020205020404" pitchFamily="49" charset="0"/>
-                <a:cs typeface="Courier New" panose="02070309020205020404" pitchFamily="49" charset="0"/>
-              </a:rPr>
-              <a:t>)</a:t>
-            </a:r>
-            <a:endParaRPr lang="fr-FR" sz="750" dirty="0">
-              <a:latin typeface="Courier New" panose="02070309020205020404" pitchFamily="49" charset="0"/>
-              <a:cs typeface="Courier New" panose="02070309020205020404" pitchFamily="49" charset="0"/>
-            </a:endParaRPr>
-          </a:p>
-        </p:txBody>
-      </p:sp>
-      <p:sp>
-        <p:nvSpPr>
-          <p:cNvPr id="6" name="ZoneTexte 5"/>
-          <p:cNvSpPr txBox="1"/>
-          <p:nvPr/>
-        </p:nvSpPr>
-        <p:spPr>
-          <a:xfrm>
-            <a:off x="5968882" y="1989255"/>
-            <a:ext cx="1587841" cy="900246"/>
-          </a:xfrm>
-          <a:prstGeom prst="rect">
-            <a:avLst/>
-          </a:prstGeom>
-          <a:noFill/>
-        </p:spPr>
-        <p:txBody>
-          <a:bodyPr wrap="square" rtlCol="0">
-            <a:spAutoFit/>
-          </a:bodyPr>
-          <a:lstStyle/>
-          <a:p>
-            <a:r>
-              <a:rPr lang="en-US" sz="750" dirty="0" err="1">
-                <a:latin typeface="Courier New" panose="02070309020205020404" pitchFamily="49" charset="0"/>
-                <a:cs typeface="Courier New" panose="02070309020205020404" pitchFamily="49" charset="0"/>
-              </a:rPr>
-              <a:t>sensitivityplot</a:t>
-            </a:r>
-            <a:r>
-              <a:rPr lang="en-US" sz="750" dirty="0" smtClean="0">
-                <a:latin typeface="Courier New" panose="02070309020205020404" pitchFamily="49" charset="0"/>
-                <a:cs typeface="Courier New" panose="02070309020205020404" pitchFamily="49" charset="0"/>
-              </a:rPr>
-              <a:t>(</a:t>
-            </a:r>
-            <a:br>
-              <a:rPr lang="en-US" sz="750" dirty="0" smtClean="0">
-                <a:latin typeface="Courier New" panose="02070309020205020404" pitchFamily="49" charset="0"/>
-                <a:cs typeface="Courier New" panose="02070309020205020404" pitchFamily="49" charset="0"/>
-              </a:rPr>
-            </a:br>
-            <a:r>
-              <a:rPr lang="en-US" sz="750" dirty="0" err="1" smtClean="0">
-                <a:latin typeface="Courier New" panose="02070309020205020404" pitchFamily="49" charset="0"/>
-                <a:cs typeface="Courier New" panose="02070309020205020404" pitchFamily="49" charset="0"/>
-              </a:rPr>
-              <a:t>extendedres</a:t>
-            </a:r>
-            <a:r>
-              <a:rPr lang="en-US" sz="750" dirty="0">
-                <a:latin typeface="Courier New" panose="02070309020205020404" pitchFamily="49" charset="0"/>
-                <a:cs typeface="Courier New" panose="02070309020205020404" pitchFamily="49" charset="0"/>
-              </a:rPr>
-              <a:t>, group, </a:t>
-            </a:r>
-            <a:r>
-              <a:rPr lang="en-US" sz="750" dirty="0" err="1">
-                <a:latin typeface="Courier New" panose="02070309020205020404" pitchFamily="49" charset="0"/>
-                <a:cs typeface="Courier New" panose="02070309020205020404" pitchFamily="49" charset="0"/>
-              </a:rPr>
-              <a:t>colorby</a:t>
-            </a:r>
-            <a:r>
-              <a:rPr lang="en-US" sz="750" dirty="0">
-                <a:latin typeface="Courier New" panose="02070309020205020404" pitchFamily="49" charset="0"/>
-                <a:cs typeface="Courier New" panose="02070309020205020404" pitchFamily="49" charset="0"/>
-              </a:rPr>
-              <a:t>, </a:t>
-            </a:r>
-            <a:r>
-              <a:rPr lang="en-US" sz="750" dirty="0" err="1">
-                <a:latin typeface="Courier New" panose="02070309020205020404" pitchFamily="49" charset="0"/>
-                <a:cs typeface="Courier New" panose="02070309020205020404" pitchFamily="49" charset="0"/>
-              </a:rPr>
-              <a:t>BMDsummary</a:t>
-            </a:r>
-            <a:r>
-              <a:rPr lang="en-US" sz="750" dirty="0">
-                <a:latin typeface="Courier New" panose="02070309020205020404" pitchFamily="49" charset="0"/>
-                <a:cs typeface="Courier New" panose="02070309020205020404" pitchFamily="49" charset="0"/>
-              </a:rPr>
-              <a:t> = c("</a:t>
-            </a:r>
-            <a:r>
-              <a:rPr lang="en-US" sz="750" dirty="0" err="1">
-                <a:latin typeface="Courier New" panose="02070309020205020404" pitchFamily="49" charset="0"/>
-                <a:cs typeface="Courier New" panose="02070309020205020404" pitchFamily="49" charset="0"/>
-              </a:rPr>
-              <a:t>first.quartile</a:t>
-            </a:r>
-            <a:r>
-              <a:rPr lang="en-US" sz="750" dirty="0">
-                <a:latin typeface="Courier New" panose="02070309020205020404" pitchFamily="49" charset="0"/>
-                <a:cs typeface="Courier New" panose="02070309020205020404" pitchFamily="49" charset="0"/>
-              </a:rPr>
-              <a:t>", "median" , "</a:t>
-            </a:r>
-            <a:r>
-              <a:rPr lang="en-US" sz="750" dirty="0" err="1">
-                <a:latin typeface="Courier New" panose="02070309020205020404" pitchFamily="49" charset="0"/>
-                <a:cs typeface="Courier New" panose="02070309020205020404" pitchFamily="49" charset="0"/>
-              </a:rPr>
-              <a:t>median.and.IQR</a:t>
-            </a:r>
-            <a:r>
-              <a:rPr lang="en-US" sz="750" dirty="0">
-                <a:latin typeface="Courier New" panose="02070309020205020404" pitchFamily="49" charset="0"/>
-                <a:cs typeface="Courier New" panose="02070309020205020404" pitchFamily="49" charset="0"/>
-              </a:rPr>
-              <a:t>"), </a:t>
-            </a:r>
-            <a:r>
-              <a:rPr lang="en-US" sz="750" dirty="0" err="1">
-                <a:latin typeface="Courier New" panose="02070309020205020404" pitchFamily="49" charset="0"/>
-                <a:cs typeface="Courier New" panose="02070309020205020404" pitchFamily="49" charset="0"/>
-              </a:rPr>
-              <a:t>BMD_log_transfo</a:t>
-            </a:r>
-            <a:r>
-              <a:rPr lang="en-US" sz="750" dirty="0">
-                <a:latin typeface="Courier New" panose="02070309020205020404" pitchFamily="49" charset="0"/>
-                <a:cs typeface="Courier New" panose="02070309020205020404" pitchFamily="49" charset="0"/>
-              </a:rPr>
-              <a:t>)</a:t>
-            </a:r>
-            <a:endParaRPr lang="fr-FR" sz="750" dirty="0">
-              <a:latin typeface="Courier New" panose="02070309020205020404" pitchFamily="49" charset="0"/>
-              <a:cs typeface="Courier New" panose="02070309020205020404" pitchFamily="49" charset="0"/>
-            </a:endParaRPr>
-          </a:p>
-        </p:txBody>
-      </p:sp>
-      <p:pic>
-        <p:nvPicPr>
-          <p:cNvPr id="7" name="Image 6"/>
-          <p:cNvPicPr>
-            <a:picLocks noChangeAspect="1"/>
-          </p:cNvPicPr>
-          <p:nvPr/>
-        </p:nvPicPr>
-        <p:blipFill>
-          <a:blip r:embed="rId3" cstate="print">
-            <a:extLst>
-              <a:ext uri="{28A0092B-C50C-407E-A947-70E740481C1C}">
-                <a14:useLocalDpi xmlns:a14="http://schemas.microsoft.com/office/drawing/2010/main" val="0"/>
-              </a:ext>
-            </a:extLst>
-          </a:blip>
-          <a:stretch>
-            <a:fillRect/>
-          </a:stretch>
-        </p:blipFill>
-        <p:spPr>
-          <a:xfrm>
-            <a:off x="3941931" y="1899587"/>
-            <a:ext cx="2036685" cy="1455566"/>
-          </a:xfrm>
-          <a:prstGeom prst="rect">
-            <a:avLst/>
-          </a:prstGeom>
-        </p:spPr>
-      </p:pic>
-      <p:sp>
-        <p:nvSpPr>
-          <p:cNvPr id="8" name="Rectangle à coins arrondis 7"/>
-          <p:cNvSpPr/>
-          <p:nvPr/>
-        </p:nvSpPr>
-        <p:spPr>
-          <a:xfrm>
-            <a:off x="4560355" y="1619554"/>
-            <a:ext cx="985588" cy="208810"/>
-          </a:xfrm>
-          <a:prstGeom prst="roundRect">
-            <a:avLst/>
-          </a:prstGeom>
-          <a:solidFill>
-            <a:schemeClr val="accent2">
-              <a:lumMod val="50000"/>
-            </a:schemeClr>
-          </a:solidFill>
-          <a:ln>
-            <a:noFill/>
-          </a:ln>
-        </p:spPr>
-        <p:style>
-          <a:lnRef idx="2">
-            <a:schemeClr val="accent1">
-              <a:shade val="50000"/>
-            </a:schemeClr>
-          </a:lnRef>
-          <a:fillRef idx="1">
-            <a:schemeClr val="accent1"/>
-          </a:fillRef>
-          <a:effectRef idx="0">
-            <a:schemeClr val="accent1"/>
-          </a:effectRef>
-          <a:fontRef idx="minor">
-            <a:schemeClr val="lt1"/>
-          </a:fontRef>
-        </p:style>
-        <p:txBody>
-          <a:bodyPr rtlCol="0" anchor="ctr"/>
-          <a:lstStyle/>
-          <a:p>
-            <a:pPr algn="ctr"/>
-            <a:r>
-              <a:rPr lang="fr-FR" sz="1000" b="1" dirty="0" smtClean="0">
-                <a:solidFill>
-                  <a:schemeClr val="bg1"/>
-                </a:solidFill>
-              </a:rPr>
-              <a:t>Trend plot</a:t>
-            </a:r>
-            <a:endParaRPr lang="fr-FR" sz="1000" b="1" dirty="0">
-              <a:solidFill>
-                <a:schemeClr val="bg1"/>
-              </a:solidFill>
-            </a:endParaRPr>
-          </a:p>
-        </p:txBody>
-      </p:sp>
-      <p:sp>
-        <p:nvSpPr>
-          <p:cNvPr id="9" name="Rectangle à coins arrondis 8"/>
-          <p:cNvSpPr/>
-          <p:nvPr/>
-        </p:nvSpPr>
-        <p:spPr>
-          <a:xfrm>
-            <a:off x="7545148" y="1543843"/>
-            <a:ext cx="1258799" cy="201853"/>
-          </a:xfrm>
-          <a:prstGeom prst="roundRect">
-            <a:avLst/>
-          </a:prstGeom>
-          <a:solidFill>
-            <a:schemeClr val="accent2">
-              <a:lumMod val="50000"/>
-            </a:schemeClr>
-          </a:solidFill>
-          <a:ln>
-            <a:noFill/>
-          </a:ln>
-        </p:spPr>
-        <p:style>
-          <a:lnRef idx="2">
-            <a:schemeClr val="accent1">
-              <a:shade val="50000"/>
-            </a:schemeClr>
-          </a:lnRef>
-          <a:fillRef idx="1">
-            <a:schemeClr val="accent1"/>
-          </a:fillRef>
-          <a:effectRef idx="0">
-            <a:schemeClr val="accent1"/>
-          </a:effectRef>
-          <a:fontRef idx="minor">
-            <a:schemeClr val="lt1"/>
-          </a:fontRef>
-        </p:style>
-        <p:txBody>
-          <a:bodyPr rtlCol="0" anchor="ctr"/>
-          <a:lstStyle/>
-          <a:p>
-            <a:pPr algn="ctr"/>
-            <a:r>
-              <a:rPr lang="fr-FR" sz="1000" b="1" dirty="0" err="1" smtClean="0">
-                <a:solidFill>
-                  <a:schemeClr val="bg1"/>
-                </a:solidFill>
-              </a:rPr>
-              <a:t>Sensitivity</a:t>
-            </a:r>
-            <a:r>
-              <a:rPr lang="fr-FR" sz="1000" b="1" dirty="0" smtClean="0">
-                <a:solidFill>
-                  <a:schemeClr val="bg1"/>
-                </a:solidFill>
-              </a:rPr>
-              <a:t> plot</a:t>
-            </a:r>
-            <a:endParaRPr lang="fr-FR" sz="1000" b="1" dirty="0">
-              <a:solidFill>
-                <a:schemeClr val="bg1"/>
-              </a:solidFill>
-            </a:endParaRPr>
-          </a:p>
-        </p:txBody>
-      </p:sp>
-    </p:spTree>
-    <p:extLst>
-      <p:ext uri="{BB962C8B-B14F-4D97-AF65-F5344CB8AC3E}">
-        <p14:creationId xmlns:p14="http://schemas.microsoft.com/office/powerpoint/2010/main" val="1952853074"/>
       </p:ext>
     </p:extLst>
   </p:cSld>

</xml_diff>

<commit_message>
review of the cheat sheet
</commit_message>
<xml_diff>
--- a/share/techdoc/DRomics_cheat_sheet.pptx
+++ b/share/techdoc/DRomics_cheat_sheet.pptx
@@ -200,7 +200,7 @@
           <a:p>
             <a:fld id="{B46EB170-A30A-4282-BD97-32DC0F0C86F5}" type="datetimeFigureOut">
               <a:rPr lang="fr-FR" smtClean="0"/>
-              <a:t>28/07/2021</a:t>
+              <a:t>20/09/2021</a:t>
             </a:fld>
             <a:endParaRPr lang="fr-FR"/>
           </a:p>
@@ -683,7 +683,7 @@
           <a:p>
             <a:fld id="{B315C685-8D59-4959-AED8-536804758F6D}" type="datetimeFigureOut">
               <a:rPr lang="fr-FR" smtClean="0"/>
-              <a:t>28/07/2021</a:t>
+              <a:t>20/09/2021</a:t>
             </a:fld>
             <a:endParaRPr lang="fr-FR"/>
           </a:p>
@@ -853,7 +853,7 @@
           <a:p>
             <a:fld id="{B315C685-8D59-4959-AED8-536804758F6D}" type="datetimeFigureOut">
               <a:rPr lang="fr-FR" smtClean="0"/>
-              <a:t>28/07/2021</a:t>
+              <a:t>20/09/2021</a:t>
             </a:fld>
             <a:endParaRPr lang="fr-FR"/>
           </a:p>
@@ -1033,7 +1033,7 @@
           <a:p>
             <a:fld id="{B315C685-8D59-4959-AED8-536804758F6D}" type="datetimeFigureOut">
               <a:rPr lang="fr-FR" smtClean="0"/>
-              <a:t>28/07/2021</a:t>
+              <a:t>20/09/2021</a:t>
             </a:fld>
             <a:endParaRPr lang="fr-FR"/>
           </a:p>
@@ -1203,7 +1203,7 @@
           <a:p>
             <a:fld id="{B315C685-8D59-4959-AED8-536804758F6D}" type="datetimeFigureOut">
               <a:rPr lang="fr-FR" smtClean="0"/>
-              <a:t>28/07/2021</a:t>
+              <a:t>20/09/2021</a:t>
             </a:fld>
             <a:endParaRPr lang="fr-FR"/>
           </a:p>
@@ -1447,7 +1447,7 @@
           <a:p>
             <a:fld id="{B315C685-8D59-4959-AED8-536804758F6D}" type="datetimeFigureOut">
               <a:rPr lang="fr-FR" smtClean="0"/>
-              <a:t>28/07/2021</a:t>
+              <a:t>20/09/2021</a:t>
             </a:fld>
             <a:endParaRPr lang="fr-FR"/>
           </a:p>
@@ -1679,7 +1679,7 @@
           <a:p>
             <a:fld id="{B315C685-8D59-4959-AED8-536804758F6D}" type="datetimeFigureOut">
               <a:rPr lang="fr-FR" smtClean="0"/>
-              <a:t>28/07/2021</a:t>
+              <a:t>20/09/2021</a:t>
             </a:fld>
             <a:endParaRPr lang="fr-FR"/>
           </a:p>
@@ -2046,7 +2046,7 @@
           <a:p>
             <a:fld id="{B315C685-8D59-4959-AED8-536804758F6D}" type="datetimeFigureOut">
               <a:rPr lang="fr-FR" smtClean="0"/>
-              <a:t>28/07/2021</a:t>
+              <a:t>20/09/2021</a:t>
             </a:fld>
             <a:endParaRPr lang="fr-FR"/>
           </a:p>
@@ -2164,7 +2164,7 @@
           <a:p>
             <a:fld id="{B315C685-8D59-4959-AED8-536804758F6D}" type="datetimeFigureOut">
               <a:rPr lang="fr-FR" smtClean="0"/>
-              <a:t>28/07/2021</a:t>
+              <a:t>20/09/2021</a:t>
             </a:fld>
             <a:endParaRPr lang="fr-FR"/>
           </a:p>
@@ -2259,7 +2259,7 @@
           <a:p>
             <a:fld id="{B315C685-8D59-4959-AED8-536804758F6D}" type="datetimeFigureOut">
               <a:rPr lang="fr-FR" smtClean="0"/>
-              <a:t>28/07/2021</a:t>
+              <a:t>20/09/2021</a:t>
             </a:fld>
             <a:endParaRPr lang="fr-FR"/>
           </a:p>
@@ -2536,7 +2536,7 @@
           <a:p>
             <a:fld id="{B315C685-8D59-4959-AED8-536804758F6D}" type="datetimeFigureOut">
               <a:rPr lang="fr-FR" smtClean="0"/>
-              <a:t>28/07/2021</a:t>
+              <a:t>20/09/2021</a:t>
             </a:fld>
             <a:endParaRPr lang="fr-FR"/>
           </a:p>
@@ -2793,7 +2793,7 @@
           <a:p>
             <a:fld id="{B315C685-8D59-4959-AED8-536804758F6D}" type="datetimeFigureOut">
               <a:rPr lang="fr-FR" smtClean="0"/>
-              <a:t>28/07/2021</a:t>
+              <a:t>20/09/2021</a:t>
             </a:fld>
             <a:endParaRPr lang="fr-FR"/>
           </a:p>
@@ -3006,7 +3006,7 @@
           <a:p>
             <a:fld id="{B315C685-8D59-4959-AED8-536804758F6D}" type="datetimeFigureOut">
               <a:rPr lang="fr-FR" smtClean="0"/>
-              <a:t>28/07/2021</a:t>
+              <a:t>20/09/2021</a:t>
             </a:fld>
             <a:endParaRPr lang="fr-FR"/>
           </a:p>
@@ -5207,12 +5207,60 @@
               <a:t> </a:t>
             </a:r>
             <a:r>
+              <a:rPr lang="fr-FR" sz="1200" b="1" dirty="0" err="1" smtClean="0">
+                <a:solidFill>
+                  <a:schemeClr val="bg1"/>
+                </a:solidFill>
+              </a:rPr>
+              <a:t>within</a:t>
+            </a:r>
+            <a:r>
+              <a:rPr lang="fr-FR" sz="1200" b="1" dirty="0" smtClean="0">
+                <a:solidFill>
+                  <a:schemeClr val="bg1"/>
+                </a:solidFill>
+              </a:rPr>
+              <a:t> </a:t>
+            </a:r>
+            <a:r>
+              <a:rPr lang="fr-FR" sz="1200" b="1" dirty="0">
+                <a:solidFill>
+                  <a:schemeClr val="bg1"/>
+                </a:solidFill>
+              </a:rPr>
+              <a:t>a </a:t>
+            </a:r>
+            <a:r>
+              <a:rPr lang="fr-FR" sz="1200" b="1" dirty="0" smtClean="0">
+                <a:solidFill>
+                  <a:schemeClr val="bg1"/>
+                </a:solidFill>
+              </a:rPr>
+              <a:t>multi-</a:t>
+            </a:r>
+            <a:r>
+              <a:rPr lang="fr-FR" sz="1200" b="1" dirty="0" err="1" smtClean="0">
+                <a:solidFill>
+                  <a:schemeClr val="bg1"/>
+                </a:solidFill>
+              </a:rPr>
+              <a:t>omics</a:t>
+            </a:r>
+            <a:r>
+              <a:rPr lang="fr-FR" sz="1200" b="1" dirty="0" smtClean="0">
+                <a:solidFill>
+                  <a:schemeClr val="bg1"/>
+                </a:solidFill>
+              </a:rPr>
+              <a:t> </a:t>
+            </a:r>
+            <a:r>
               <a:rPr lang="fr-FR" sz="1200" b="1" dirty="0" err="1">
                 <a:solidFill>
                   <a:schemeClr val="bg1"/>
                 </a:solidFill>
               </a:rPr>
-              <a:t>winthin</a:t>
+              <a:t>approach</a:t>
             </a:r>
             <a:r>
               <a:rPr lang="fr-FR" sz="1200" b="1" dirty="0">
@@ -5220,6 +5268,22 @@
                   <a:schemeClr val="bg1"/>
                 </a:solidFill>
               </a:rPr>
+              <a:t> </a:t>
+            </a:r>
+            <a:r>
+              <a:rPr lang="fr-FR" sz="1200" b="1" dirty="0" err="1">
+                <a:solidFill>
+                  <a:schemeClr val="bg1"/>
+                </a:solidFill>
+              </a:rPr>
+              <a:t>using</a:t>
+            </a:r>
+            <a:r>
+              <a:rPr lang="fr-FR" sz="1200" b="1" dirty="0">
+                <a:solidFill>
+                  <a:schemeClr val="bg1"/>
+                </a:solidFill>
+              </a:rPr>
               <a:t> a </a:t>
             </a:r>
             <a:r>
@@ -5228,23 +5292,7 @@
                   <a:schemeClr val="bg1"/>
                 </a:solidFill>
               </a:rPr>
-              <a:t>multi-</a:t>
-            </a:r>
-            <a:r>
-              <a:rPr lang="fr-FR" sz="1200" b="1" dirty="0" err="1" smtClean="0">
-                <a:solidFill>
-                  <a:schemeClr val="bg1"/>
-                </a:solidFill>
-              </a:rPr>
-              <a:t>omics</a:t>
-            </a:r>
-            <a:r>
-              <a:rPr lang="fr-FR" sz="1200" b="1" dirty="0" smtClean="0">
-                <a:solidFill>
-                  <a:schemeClr val="bg1"/>
-                </a:solidFill>
-              </a:rPr>
-              <a:t> </a:t>
+              <a:t>unique </a:t>
             </a:r>
             <a:r>
               <a:rPr lang="fr-FR" sz="1200" b="1" dirty="0" err="1">
@@ -5252,7 +5300,7 @@
                   <a:schemeClr val="bg1"/>
                 </a:solidFill>
               </a:rPr>
-              <a:t>approach</a:t>
+              <a:t>biological</a:t>
             </a:r>
             <a:r>
               <a:rPr lang="fr-FR" sz="1200" b="1" dirty="0">
@@ -5260,54 +5308,6 @@
                   <a:schemeClr val="bg1"/>
                 </a:solidFill>
               </a:rPr>
-              <a:t> </a:t>
-            </a:r>
-            <a:r>
-              <a:rPr lang="fr-FR" sz="1200" b="1" dirty="0" err="1">
-                <a:solidFill>
-                  <a:schemeClr val="bg1"/>
-                </a:solidFill>
-              </a:rPr>
-              <a:t>using</a:t>
-            </a:r>
-            <a:r>
-              <a:rPr lang="fr-FR" sz="1200" b="1" dirty="0">
-                <a:solidFill>
-                  <a:schemeClr val="bg1"/>
-                </a:solidFill>
-              </a:rPr>
-              <a:t> a </a:t>
-            </a:r>
-            <a:r>
-              <a:rPr lang="fr-FR" sz="1200" b="1" dirty="0" err="1">
-                <a:solidFill>
-                  <a:schemeClr val="bg1"/>
-                </a:solidFill>
-              </a:rPr>
-              <a:t>same</a:t>
-            </a:r>
-            <a:r>
-              <a:rPr lang="fr-FR" sz="1200" b="1" dirty="0">
-                <a:solidFill>
-                  <a:schemeClr val="bg1"/>
-                </a:solidFill>
-              </a:rPr>
-              <a:t> </a:t>
-            </a:r>
-            <a:r>
-              <a:rPr lang="fr-FR" sz="1200" b="1" dirty="0" err="1">
-                <a:solidFill>
-                  <a:schemeClr val="bg1"/>
-                </a:solidFill>
-              </a:rPr>
-              <a:t>biological</a:t>
-            </a:r>
-            <a:r>
-              <a:rPr lang="fr-FR" sz="1200" b="1" dirty="0">
-                <a:solidFill>
-                  <a:schemeClr val="bg1"/>
-                </a:solidFill>
-              </a:rPr>
               <a:t> annotation</a:t>
             </a:r>
           </a:p>
@@ -5650,8 +5650,8 @@
         </p:nvSpPr>
         <p:spPr>
           <a:xfrm>
-            <a:off x="4682959" y="913483"/>
-            <a:ext cx="4081743" cy="698589"/>
+            <a:off x="4474844" y="886718"/>
+            <a:ext cx="4454557" cy="698589"/>
           </a:xfrm>
           <a:prstGeom prst="rect">
             <a:avLst/>
@@ -5694,11 +5694,39 @@
             </a:r>
             <a:r>
               <a:rPr lang="en-US" sz="788" dirty="0"/>
-              <a:t> with the main workflow results, extended with additional columns coding for example for a biological </a:t>
+              <a:t> with the main workflow </a:t>
             </a:r>
             <a:r>
               <a:rPr lang="en-US" sz="788" dirty="0" smtClean="0"/>
-              <a:t>of items. Some lines of the workflow results </a:t>
+              <a:t>results (optionally gathering results obtained at different </a:t>
+            </a:r>
+            <a:r>
+              <a:rPr lang="en-US" sz="788" dirty="0" err="1" smtClean="0"/>
+              <a:t>modelcular</a:t>
+            </a:r>
+            <a:r>
+              <a:rPr lang="en-US" sz="788" dirty="0" smtClean="0"/>
+              <a:t> levels) extended </a:t>
+            </a:r>
+            <a:r>
+              <a:rPr lang="en-US" sz="788" dirty="0"/>
+              <a:t>with additional columns coding for example for </a:t>
+            </a:r>
+            <a:r>
+              <a:rPr lang="en-US" sz="788" dirty="0" smtClean="0"/>
+              <a:t>the biological annotation </a:t>
+            </a:r>
+            <a:r>
+              <a:rPr lang="en-US" sz="788" dirty="0" smtClean="0"/>
+              <a:t>of </a:t>
+            </a:r>
+            <a:r>
+              <a:rPr lang="en-US" sz="788" dirty="0" smtClean="0"/>
+              <a:t>items (and for the molecular level if needed). </a:t>
+            </a:r>
+            <a:r>
+              <a:rPr lang="en-US" sz="788" dirty="0" smtClean="0"/>
+              <a:t>Some lines of the workflow results </a:t>
             </a:r>
             <a:r>
               <a:rPr lang="en-US" sz="788" dirty="0"/>
@@ -5710,43 +5738,15 @@
             </a:r>
             <a:r>
               <a:rPr lang="en-US" sz="788" dirty="0"/>
-              <a:t>more than one annotation. </a:t>
-            </a:r>
-            <a:r>
-              <a:rPr lang="fr-FR" sz="788" dirty="0"/>
-              <a:t> </a:t>
-            </a:r>
-            <a:r>
-              <a:rPr lang="fr-FR" sz="788" dirty="0" err="1" smtClean="0"/>
-              <a:t>Results</a:t>
+              <a:t>more than one </a:t>
+            </a:r>
+            <a:r>
+              <a:rPr lang="en-US" sz="788" dirty="0" smtClean="0"/>
+              <a:t>annotation </a:t>
             </a:r>
             <a:r>
               <a:rPr lang="fr-FR" sz="788" dirty="0" smtClean="0"/>
-              <a:t> </a:t>
-            </a:r>
-            <a:r>
-              <a:rPr lang="fr-FR" sz="788" dirty="0" err="1" smtClean="0"/>
-              <a:t>obtained</a:t>
-            </a:r>
-            <a:r>
-              <a:rPr lang="fr-FR" sz="788" dirty="0" smtClean="0"/>
-              <a:t> on </a:t>
-            </a:r>
-            <a:r>
-              <a:rPr lang="fr-FR" sz="788" dirty="0" err="1" smtClean="0"/>
-              <a:t>different</a:t>
-            </a:r>
-            <a:r>
-              <a:rPr lang="fr-FR" sz="788" dirty="0" smtClean="0"/>
-              <a:t> </a:t>
-            </a:r>
-            <a:r>
-              <a:rPr lang="fr-FR" sz="788" dirty="0" err="1" smtClean="0"/>
-              <a:t>molecular</a:t>
-            </a:r>
-            <a:r>
-              <a:rPr lang="fr-FR" sz="788" dirty="0" smtClean="0"/>
-              <a:t> (</a:t>
+              <a:t>(</a:t>
             </a:r>
             <a:r>
               <a:rPr lang="fr-FR" sz="788" dirty="0" err="1" smtClean="0"/>
@@ -5901,7 +5901,15 @@
             </a:r>
             <a:r>
               <a:rPr lang="fr-FR" sz="800" dirty="0"/>
-              <a:t>in July 2021</a:t>
+              <a:t>in </a:t>
+            </a:r>
+            <a:r>
+              <a:rPr lang="fr-FR" sz="800" dirty="0" smtClean="0"/>
+              <a:t>Sept. </a:t>
+            </a:r>
+            <a:r>
+              <a:rPr lang="fr-FR" sz="800" dirty="0"/>
+              <a:t>2021</a:t>
             </a:r>
           </a:p>
         </p:txBody>

</xml_diff>

<commit_message>
modifications in the cheat sheet following Floriane's comments
</commit_message>
<xml_diff>
--- a/share/techdoc/DRomics_cheat_sheet.pptx
+++ b/share/techdoc/DRomics_cheat_sheet.pptx
@@ -200,7 +200,7 @@
           <a:p>
             <a:fld id="{B46EB170-A30A-4282-BD97-32DC0F0C86F5}" type="datetimeFigureOut">
               <a:rPr lang="fr-FR" smtClean="0"/>
-              <a:t>20/09/2021</a:t>
+              <a:t>21/09/2021</a:t>
             </a:fld>
             <a:endParaRPr lang="fr-FR"/>
           </a:p>
@@ -683,7 +683,7 @@
           <a:p>
             <a:fld id="{B315C685-8D59-4959-AED8-536804758F6D}" type="datetimeFigureOut">
               <a:rPr lang="fr-FR" smtClean="0"/>
-              <a:t>20/09/2021</a:t>
+              <a:t>21/09/2021</a:t>
             </a:fld>
             <a:endParaRPr lang="fr-FR"/>
           </a:p>
@@ -853,7 +853,7 @@
           <a:p>
             <a:fld id="{B315C685-8D59-4959-AED8-536804758F6D}" type="datetimeFigureOut">
               <a:rPr lang="fr-FR" smtClean="0"/>
-              <a:t>20/09/2021</a:t>
+              <a:t>21/09/2021</a:t>
             </a:fld>
             <a:endParaRPr lang="fr-FR"/>
           </a:p>
@@ -1033,7 +1033,7 @@
           <a:p>
             <a:fld id="{B315C685-8D59-4959-AED8-536804758F6D}" type="datetimeFigureOut">
               <a:rPr lang="fr-FR" smtClean="0"/>
-              <a:t>20/09/2021</a:t>
+              <a:t>21/09/2021</a:t>
             </a:fld>
             <a:endParaRPr lang="fr-FR"/>
           </a:p>
@@ -1203,7 +1203,7 @@
           <a:p>
             <a:fld id="{B315C685-8D59-4959-AED8-536804758F6D}" type="datetimeFigureOut">
               <a:rPr lang="fr-FR" smtClean="0"/>
-              <a:t>20/09/2021</a:t>
+              <a:t>21/09/2021</a:t>
             </a:fld>
             <a:endParaRPr lang="fr-FR"/>
           </a:p>
@@ -1447,7 +1447,7 @@
           <a:p>
             <a:fld id="{B315C685-8D59-4959-AED8-536804758F6D}" type="datetimeFigureOut">
               <a:rPr lang="fr-FR" smtClean="0"/>
-              <a:t>20/09/2021</a:t>
+              <a:t>21/09/2021</a:t>
             </a:fld>
             <a:endParaRPr lang="fr-FR"/>
           </a:p>
@@ -1679,7 +1679,7 @@
           <a:p>
             <a:fld id="{B315C685-8D59-4959-AED8-536804758F6D}" type="datetimeFigureOut">
               <a:rPr lang="fr-FR" smtClean="0"/>
-              <a:t>20/09/2021</a:t>
+              <a:t>21/09/2021</a:t>
             </a:fld>
             <a:endParaRPr lang="fr-FR"/>
           </a:p>
@@ -2046,7 +2046,7 @@
           <a:p>
             <a:fld id="{B315C685-8D59-4959-AED8-536804758F6D}" type="datetimeFigureOut">
               <a:rPr lang="fr-FR" smtClean="0"/>
-              <a:t>20/09/2021</a:t>
+              <a:t>21/09/2021</a:t>
             </a:fld>
             <a:endParaRPr lang="fr-FR"/>
           </a:p>
@@ -2164,7 +2164,7 @@
           <a:p>
             <a:fld id="{B315C685-8D59-4959-AED8-536804758F6D}" type="datetimeFigureOut">
               <a:rPr lang="fr-FR" smtClean="0"/>
-              <a:t>20/09/2021</a:t>
+              <a:t>21/09/2021</a:t>
             </a:fld>
             <a:endParaRPr lang="fr-FR"/>
           </a:p>
@@ -2259,7 +2259,7 @@
           <a:p>
             <a:fld id="{B315C685-8D59-4959-AED8-536804758F6D}" type="datetimeFigureOut">
               <a:rPr lang="fr-FR" smtClean="0"/>
-              <a:t>20/09/2021</a:t>
+              <a:t>21/09/2021</a:t>
             </a:fld>
             <a:endParaRPr lang="fr-FR"/>
           </a:p>
@@ -2536,7 +2536,7 @@
           <a:p>
             <a:fld id="{B315C685-8D59-4959-AED8-536804758F6D}" type="datetimeFigureOut">
               <a:rPr lang="fr-FR" smtClean="0"/>
-              <a:t>20/09/2021</a:t>
+              <a:t>21/09/2021</a:t>
             </a:fld>
             <a:endParaRPr lang="fr-FR"/>
           </a:p>
@@ -2793,7 +2793,7 @@
           <a:p>
             <a:fld id="{B315C685-8D59-4959-AED8-536804758F6D}" type="datetimeFigureOut">
               <a:rPr lang="fr-FR" smtClean="0"/>
-              <a:t>20/09/2021</a:t>
+              <a:t>21/09/2021</a:t>
             </a:fld>
             <a:endParaRPr lang="fr-FR"/>
           </a:p>
@@ -3006,7 +3006,7 @@
           <a:p>
             <a:fld id="{B315C685-8D59-4959-AED8-536804758F6D}" type="datetimeFigureOut">
               <a:rPr lang="fr-FR" smtClean="0"/>
-              <a:t>20/09/2021</a:t>
+              <a:t>21/09/2021</a:t>
             </a:fld>
             <a:endParaRPr lang="fr-FR"/>
           </a:p>
@@ -4173,7 +4173,7 @@
         </p:nvSpPr>
         <p:spPr>
           <a:xfrm>
-            <a:off x="2480626" y="5430006"/>
+            <a:off x="2441111" y="5428681"/>
             <a:ext cx="1654715" cy="900246"/>
           </a:xfrm>
           <a:prstGeom prst="rect">
@@ -4482,7 +4482,7 @@
         </p:nvSpPr>
         <p:spPr>
           <a:xfrm>
-            <a:off x="2417648" y="4979809"/>
+            <a:off x="2284978" y="4970507"/>
             <a:ext cx="1680210" cy="402773"/>
           </a:xfrm>
           <a:prstGeom prst="roundRect">
@@ -4809,10 +4809,14 @@
             </a:r>
             <a:r>
               <a:rPr lang="fr-FR" sz="800" dirty="0"/>
-              <a:t> or </a:t>
-            </a:r>
-            <a:r>
-              <a:rPr lang="fr-FR" sz="800" dirty="0" err="1"/>
+              <a:t> </a:t>
+            </a:r>
+            <a:r>
+              <a:rPr lang="fr-FR" sz="800" dirty="0" smtClean="0"/>
+              <a:t>of </a:t>
+            </a:r>
+            <a:r>
+              <a:rPr lang="fr-FR" sz="800" dirty="0" err="1" smtClean="0"/>
               <a:t>reads</a:t>
             </a:r>
             <a:r>
@@ -4961,7 +4965,7 @@
         </p:nvSpPr>
         <p:spPr>
           <a:xfrm>
-            <a:off x="2490565" y="5411450"/>
+            <a:off x="2434435" y="5411450"/>
             <a:ext cx="1535294" cy="816749"/>
           </a:xfrm>
           <a:prstGeom prst="rect">
@@ -5002,8 +5006,8 @@
         </p:nvSpPr>
         <p:spPr>
           <a:xfrm>
-            <a:off x="2297361" y="6217484"/>
-            <a:ext cx="1858624" cy="461665"/>
+            <a:off x="2441111" y="6263348"/>
+            <a:ext cx="1463934" cy="461665"/>
           </a:xfrm>
           <a:prstGeom prst="rect">
             <a:avLst/>
@@ -5082,12 +5086,24 @@
               <a:t> </a:t>
             </a:r>
             <a:r>
-              <a:rPr lang="fr-FR" sz="800" dirty="0" err="1"/>
+              <a:rPr lang="fr-FR" sz="800" dirty="0" err="1" smtClean="0"/>
+              <a:t>be</a:t>
+            </a:r>
+            <a:r>
+              <a:rPr lang="fr-FR" sz="800" dirty="0" smtClean="0"/>
+              <a:t> </a:t>
+            </a:r>
+            <a:r>
+              <a:rPr lang="fr-FR" sz="800" dirty="0" err="1" smtClean="0"/>
               <a:t>printed</a:t>
             </a:r>
             <a:r>
+              <a:rPr lang="fr-FR" sz="800" dirty="0" smtClean="0"/>
+              <a:t> </a:t>
+            </a:r>
+            <a:r>
               <a:rPr lang="fr-FR" sz="800" dirty="0"/>
-              <a:t> and </a:t>
+              <a:t>and </a:t>
             </a:r>
             <a:r>
               <a:rPr lang="fr-FR" sz="800" dirty="0" err="1"/>
@@ -5650,7 +5666,7 @@
         </p:nvSpPr>
         <p:spPr>
           <a:xfrm>
-            <a:off x="4474844" y="886718"/>
+            <a:off x="4474844" y="858437"/>
             <a:ext cx="4454557" cy="698589"/>
           </a:xfrm>
           <a:prstGeom prst="rect">
@@ -5714,19 +5730,7 @@
             </a:r>
             <a:r>
               <a:rPr lang="en-US" sz="788" dirty="0" smtClean="0"/>
-              <a:t>the biological annotation </a:t>
-            </a:r>
-            <a:r>
-              <a:rPr lang="en-US" sz="788" dirty="0" smtClean="0"/>
-              <a:t>of </a:t>
-            </a:r>
-            <a:r>
-              <a:rPr lang="en-US" sz="788" dirty="0" smtClean="0"/>
-              <a:t>items (and for the molecular level if needed). </a:t>
-            </a:r>
-            <a:r>
-              <a:rPr lang="en-US" sz="788" dirty="0" smtClean="0"/>
-              <a:t>Some lines of the workflow results </a:t>
+              <a:t>the biological annotation of items (and for the molecular level if needed). Some lines of the workflow results </a:t>
             </a:r>
             <a:r>
               <a:rPr lang="en-US" sz="788" dirty="0"/>
@@ -5814,8 +5818,8 @@
         </p:blipFill>
         <p:spPr>
           <a:xfrm>
-            <a:off x="4345423" y="2599221"/>
-            <a:ext cx="2456490" cy="1765183"/>
+            <a:off x="4402240" y="2668992"/>
+            <a:ext cx="2336644" cy="1679064"/>
           </a:xfrm>
           <a:prstGeom prst="rect">
             <a:avLst/>
@@ -5922,7 +5926,7 @@
         </p:nvSpPr>
         <p:spPr>
           <a:xfrm>
-            <a:off x="4692067" y="2323730"/>
+            <a:off x="4644932" y="2370865"/>
             <a:ext cx="1848954" cy="192809"/>
           </a:xfrm>
           <a:prstGeom prst="roundRect">
@@ -6297,7 +6301,7 @@
         </p:nvSpPr>
         <p:spPr>
           <a:xfrm>
-            <a:off x="185370" y="4382395"/>
+            <a:off x="173148" y="4382586"/>
             <a:ext cx="4138565" cy="707886"/>
           </a:xfrm>
           <a:prstGeom prst="rect">
@@ -6555,8 +6559,8 @@
         </p:blipFill>
         <p:spPr>
           <a:xfrm>
-            <a:off x="6694914" y="1480489"/>
-            <a:ext cx="2337769" cy="1663047"/>
+            <a:off x="6667979" y="1594315"/>
+            <a:ext cx="2337769" cy="1531035"/>
           </a:xfrm>
           <a:prstGeom prst="rect">
             <a:avLst/>
@@ -6585,8 +6589,8 @@
         </p:blipFill>
         <p:spPr>
           <a:xfrm>
-            <a:off x="6878859" y="3683849"/>
-            <a:ext cx="2050542" cy="1459519"/>
+            <a:off x="7006808" y="3761061"/>
+            <a:ext cx="1936358" cy="1378246"/>
           </a:xfrm>
           <a:prstGeom prst="rect">
             <a:avLst/>
@@ -6615,7 +6619,7 @@
         </p:blipFill>
         <p:spPr>
           <a:xfrm>
-            <a:off x="7224481" y="5453321"/>
+            <a:off x="7191835" y="5456164"/>
             <a:ext cx="1919519" cy="1367364"/>
           </a:xfrm>
           <a:prstGeom prst="rect">
@@ -6631,7 +6635,7 @@
         </p:nvSpPr>
         <p:spPr>
           <a:xfrm>
-            <a:off x="7603336" y="5162221"/>
+            <a:off x="7554840" y="5180729"/>
             <a:ext cx="1258799" cy="201853"/>
           </a:xfrm>
           <a:prstGeom prst="roundRect">
@@ -6713,7 +6717,7 @@
         </p:blipFill>
         <p:spPr>
           <a:xfrm>
-            <a:off x="4097858" y="5348289"/>
+            <a:off x="4145143" y="5360902"/>
             <a:ext cx="2036685" cy="1455566"/>
           </a:xfrm>
           <a:prstGeom prst="rect">
@@ -6729,7 +6733,7 @@
         </p:nvSpPr>
         <p:spPr>
           <a:xfrm>
-            <a:off x="4716282" y="5068256"/>
+            <a:off x="4711479" y="5130710"/>
             <a:ext cx="985588" cy="208810"/>
           </a:xfrm>
           <a:prstGeom prst="roundRect">
@@ -6982,6 +6986,2496 @@
               <a:latin typeface="Courier New" panose="02070309020205020404" pitchFamily="49" charset="0"/>
               <a:cs typeface="Courier New" panose="02070309020205020404" pitchFamily="49" charset="0"/>
             </a:endParaRPr>
+          </a:p>
+        </p:txBody>
+      </p:sp>
+      <p:sp>
+        <p:nvSpPr>
+          <p:cNvPr id="32" name="Forme libre 31"/>
+          <p:cNvSpPr/>
+          <p:nvPr/>
+        </p:nvSpPr>
+        <p:spPr>
+          <a:xfrm>
+            <a:off x="4328342" y="1585707"/>
+            <a:ext cx="4692992" cy="1595441"/>
+          </a:xfrm>
+          <a:custGeom>
+            <a:avLst/>
+            <a:gdLst>
+              <a:gd name="connsiteX0" fmla="*/ 0 w 4637987"/>
+              <a:gd name="connsiteY0" fmla="*/ 0 h 1583703"/>
+              <a:gd name="connsiteX1" fmla="*/ 4637987 w 4637987"/>
+              <a:gd name="connsiteY1" fmla="*/ 9427 h 1583703"/>
+              <a:gd name="connsiteX2" fmla="*/ 4609707 w 4637987"/>
+              <a:gd name="connsiteY2" fmla="*/ 1583703 h 1583703"/>
+              <a:gd name="connsiteX3" fmla="*/ 2187018 w 4637987"/>
+              <a:gd name="connsiteY3" fmla="*/ 1583703 h 1583703"/>
+              <a:gd name="connsiteX4" fmla="*/ 2187018 w 4637987"/>
+              <a:gd name="connsiteY4" fmla="*/ 716437 h 1583703"/>
+              <a:gd name="connsiteX5" fmla="*/ 0 w 4637987"/>
+              <a:gd name="connsiteY5" fmla="*/ 735290 h 1583703"/>
+              <a:gd name="connsiteX6" fmla="*/ 0 w 4637987"/>
+              <a:gd name="connsiteY6" fmla="*/ 0 h 1583703"/>
+              <a:gd name="connsiteX0" fmla="*/ 0 w 4609707"/>
+              <a:gd name="connsiteY0" fmla="*/ 0 h 1583703"/>
+              <a:gd name="connsiteX1" fmla="*/ 4603579 w 4609707"/>
+              <a:gd name="connsiteY1" fmla="*/ 9427 h 1583703"/>
+              <a:gd name="connsiteX2" fmla="*/ 4609707 w 4609707"/>
+              <a:gd name="connsiteY2" fmla="*/ 1583703 h 1583703"/>
+              <a:gd name="connsiteX3" fmla="*/ 2187018 w 4609707"/>
+              <a:gd name="connsiteY3" fmla="*/ 1583703 h 1583703"/>
+              <a:gd name="connsiteX4" fmla="*/ 2187018 w 4609707"/>
+              <a:gd name="connsiteY4" fmla="*/ 716437 h 1583703"/>
+              <a:gd name="connsiteX5" fmla="*/ 0 w 4609707"/>
+              <a:gd name="connsiteY5" fmla="*/ 735290 h 1583703"/>
+              <a:gd name="connsiteX6" fmla="*/ 0 w 4609707"/>
+              <a:gd name="connsiteY6" fmla="*/ 0 h 1583703"/>
+              <a:gd name="connsiteX0" fmla="*/ 0 w 4621176"/>
+              <a:gd name="connsiteY0" fmla="*/ 0 h 1642686"/>
+              <a:gd name="connsiteX1" fmla="*/ 4603579 w 4621176"/>
+              <a:gd name="connsiteY1" fmla="*/ 9427 h 1642686"/>
+              <a:gd name="connsiteX2" fmla="*/ 4621176 w 4621176"/>
+              <a:gd name="connsiteY2" fmla="*/ 1642686 h 1642686"/>
+              <a:gd name="connsiteX3" fmla="*/ 2187018 w 4621176"/>
+              <a:gd name="connsiteY3" fmla="*/ 1583703 h 1642686"/>
+              <a:gd name="connsiteX4" fmla="*/ 2187018 w 4621176"/>
+              <a:gd name="connsiteY4" fmla="*/ 716437 h 1642686"/>
+              <a:gd name="connsiteX5" fmla="*/ 0 w 4621176"/>
+              <a:gd name="connsiteY5" fmla="*/ 735290 h 1642686"/>
+              <a:gd name="connsiteX6" fmla="*/ 0 w 4621176"/>
+              <a:gd name="connsiteY6" fmla="*/ 0 h 1642686"/>
+              <a:gd name="connsiteX0" fmla="*/ 0 w 4621176"/>
+              <a:gd name="connsiteY0" fmla="*/ 0 h 1646618"/>
+              <a:gd name="connsiteX1" fmla="*/ 4603579 w 4621176"/>
+              <a:gd name="connsiteY1" fmla="*/ 9427 h 1646618"/>
+              <a:gd name="connsiteX2" fmla="*/ 4621176 w 4621176"/>
+              <a:gd name="connsiteY2" fmla="*/ 1642686 h 1646618"/>
+              <a:gd name="connsiteX3" fmla="*/ 2194664 w 4621176"/>
+              <a:gd name="connsiteY3" fmla="*/ 1646618 h 1646618"/>
+              <a:gd name="connsiteX4" fmla="*/ 2187018 w 4621176"/>
+              <a:gd name="connsiteY4" fmla="*/ 716437 h 1646618"/>
+              <a:gd name="connsiteX5" fmla="*/ 0 w 4621176"/>
+              <a:gd name="connsiteY5" fmla="*/ 735290 h 1646618"/>
+              <a:gd name="connsiteX6" fmla="*/ 0 w 4621176"/>
+              <a:gd name="connsiteY6" fmla="*/ 0 h 1646618"/>
+              <a:gd name="connsiteX0" fmla="*/ 87931 w 4709107"/>
+              <a:gd name="connsiteY0" fmla="*/ 0 h 1646618"/>
+              <a:gd name="connsiteX1" fmla="*/ 4691510 w 4709107"/>
+              <a:gd name="connsiteY1" fmla="*/ 9427 h 1646618"/>
+              <a:gd name="connsiteX2" fmla="*/ 4709107 w 4709107"/>
+              <a:gd name="connsiteY2" fmla="*/ 1642686 h 1646618"/>
+              <a:gd name="connsiteX3" fmla="*/ 2282595 w 4709107"/>
+              <a:gd name="connsiteY3" fmla="*/ 1646618 h 1646618"/>
+              <a:gd name="connsiteX4" fmla="*/ 2274949 w 4709107"/>
+              <a:gd name="connsiteY4" fmla="*/ 716437 h 1646618"/>
+              <a:gd name="connsiteX5" fmla="*/ 0 w 4709107"/>
+              <a:gd name="connsiteY5" fmla="*/ 735290 h 1646618"/>
+              <a:gd name="connsiteX6" fmla="*/ 87931 w 4709107"/>
+              <a:gd name="connsiteY6" fmla="*/ 0 h 1646618"/>
+              <a:gd name="connsiteX0" fmla="*/ 3823 w 4709107"/>
+              <a:gd name="connsiteY0" fmla="*/ 0 h 1646618"/>
+              <a:gd name="connsiteX1" fmla="*/ 4691510 w 4709107"/>
+              <a:gd name="connsiteY1" fmla="*/ 9427 h 1646618"/>
+              <a:gd name="connsiteX2" fmla="*/ 4709107 w 4709107"/>
+              <a:gd name="connsiteY2" fmla="*/ 1642686 h 1646618"/>
+              <a:gd name="connsiteX3" fmla="*/ 2282595 w 4709107"/>
+              <a:gd name="connsiteY3" fmla="*/ 1646618 h 1646618"/>
+              <a:gd name="connsiteX4" fmla="*/ 2274949 w 4709107"/>
+              <a:gd name="connsiteY4" fmla="*/ 716437 h 1646618"/>
+              <a:gd name="connsiteX5" fmla="*/ 0 w 4709107"/>
+              <a:gd name="connsiteY5" fmla="*/ 735290 h 1646618"/>
+              <a:gd name="connsiteX6" fmla="*/ 3823 w 4709107"/>
+              <a:gd name="connsiteY6" fmla="*/ 0 h 1646618"/>
+            </a:gdLst>
+            <a:ahLst/>
+            <a:cxnLst>
+              <a:cxn ang="0">
+                <a:pos x="connsiteX0" y="connsiteY0"/>
+              </a:cxn>
+              <a:cxn ang="0">
+                <a:pos x="connsiteX1" y="connsiteY1"/>
+              </a:cxn>
+              <a:cxn ang="0">
+                <a:pos x="connsiteX2" y="connsiteY2"/>
+              </a:cxn>
+              <a:cxn ang="0">
+                <a:pos x="connsiteX3" y="connsiteY3"/>
+              </a:cxn>
+              <a:cxn ang="0">
+                <a:pos x="connsiteX4" y="connsiteY4"/>
+              </a:cxn>
+              <a:cxn ang="0">
+                <a:pos x="connsiteX5" y="connsiteY5"/>
+              </a:cxn>
+              <a:cxn ang="0">
+                <a:pos x="connsiteX6" y="connsiteY6"/>
+              </a:cxn>
+            </a:cxnLst>
+            <a:rect l="l" t="t" r="r" b="b"/>
+            <a:pathLst>
+              <a:path w="4709107" h="1646618">
+                <a:moveTo>
+                  <a:pt x="3823" y="0"/>
+                </a:moveTo>
+                <a:lnTo>
+                  <a:pt x="4691510" y="9427"/>
+                </a:lnTo>
+                <a:cubicBezTo>
+                  <a:pt x="4693553" y="534186"/>
+                  <a:pt x="4707064" y="1117927"/>
+                  <a:pt x="4709107" y="1642686"/>
+                </a:cubicBezTo>
+                <a:lnTo>
+                  <a:pt x="2282595" y="1646618"/>
+                </a:lnTo>
+                <a:cubicBezTo>
+                  <a:pt x="2280046" y="1336558"/>
+                  <a:pt x="2277498" y="1026497"/>
+                  <a:pt x="2274949" y="716437"/>
+                </a:cubicBezTo>
+                <a:lnTo>
+                  <a:pt x="0" y="735290"/>
+                </a:lnTo>
+                <a:cubicBezTo>
+                  <a:pt x="1274" y="490193"/>
+                  <a:pt x="2549" y="245097"/>
+                  <a:pt x="3823" y="0"/>
+                </a:cubicBezTo>
+                <a:close/>
+              </a:path>
+            </a:pathLst>
+          </a:custGeom>
+          <a:noFill/>
+          <a:ln w="19050">
+            <a:solidFill>
+              <a:schemeClr val="accent2">
+                <a:lumMod val="75000"/>
+              </a:schemeClr>
+            </a:solidFill>
+          </a:ln>
+        </p:spPr>
+        <p:style>
+          <a:lnRef idx="2">
+            <a:schemeClr val="accent1">
+              <a:shade val="50000"/>
+            </a:schemeClr>
+          </a:lnRef>
+          <a:fillRef idx="1">
+            <a:schemeClr val="accent1"/>
+          </a:fillRef>
+          <a:effectRef idx="0">
+            <a:schemeClr val="accent1"/>
+          </a:effectRef>
+          <a:fontRef idx="minor">
+            <a:schemeClr val="lt1"/>
+          </a:fontRef>
+        </p:style>
+        <p:txBody>
+          <a:bodyPr rtlCol="0" anchor="ctr"/>
+          <a:lstStyle/>
+          <a:p>
+            <a:pPr algn="ctr"/>
+            <a:endParaRPr lang="fr-FR"/>
+          </a:p>
+        </p:txBody>
+      </p:sp>
+      <p:sp>
+        <p:nvSpPr>
+          <p:cNvPr id="33" name="Forme libre 32"/>
+          <p:cNvSpPr/>
+          <p:nvPr/>
+        </p:nvSpPr>
+        <p:spPr>
+          <a:xfrm>
+            <a:off x="4326492" y="2279515"/>
+            <a:ext cx="4696400" cy="2074486"/>
+          </a:xfrm>
+          <a:custGeom>
+            <a:avLst/>
+            <a:gdLst>
+              <a:gd name="connsiteX0" fmla="*/ 141402 w 4722829"/>
+              <a:gd name="connsiteY0" fmla="*/ 0 h 2036190"/>
+              <a:gd name="connsiteX1" fmla="*/ 2262433 w 4722829"/>
+              <a:gd name="connsiteY1" fmla="*/ 18854 h 2036190"/>
+              <a:gd name="connsiteX2" fmla="*/ 2253006 w 4722829"/>
+              <a:gd name="connsiteY2" fmla="*/ 838986 h 2036190"/>
+              <a:gd name="connsiteX3" fmla="*/ 4722829 w 4722829"/>
+              <a:gd name="connsiteY3" fmla="*/ 848413 h 2036190"/>
+              <a:gd name="connsiteX4" fmla="*/ 4713402 w 4722829"/>
+              <a:gd name="connsiteY4" fmla="*/ 1348033 h 2036190"/>
+              <a:gd name="connsiteX5" fmla="*/ 2564091 w 4722829"/>
+              <a:gd name="connsiteY5" fmla="*/ 1329180 h 2036190"/>
+              <a:gd name="connsiteX6" fmla="*/ 2564091 w 4722829"/>
+              <a:gd name="connsiteY6" fmla="*/ 1517716 h 2036190"/>
+              <a:gd name="connsiteX7" fmla="*/ 2271860 w 4722829"/>
+              <a:gd name="connsiteY7" fmla="*/ 1508289 h 2036190"/>
+              <a:gd name="connsiteX8" fmla="*/ 2281287 w 4722829"/>
+              <a:gd name="connsiteY8" fmla="*/ 2036190 h 2036190"/>
+              <a:gd name="connsiteX9" fmla="*/ 18854 w 4722829"/>
+              <a:gd name="connsiteY9" fmla="*/ 2036190 h 2036190"/>
+              <a:gd name="connsiteX10" fmla="*/ 0 w 4722829"/>
+              <a:gd name="connsiteY10" fmla="*/ 0 h 2036190"/>
+              <a:gd name="connsiteX11" fmla="*/ 197963 w 4722829"/>
+              <a:gd name="connsiteY11" fmla="*/ 9427 h 2036190"/>
+              <a:gd name="connsiteX0" fmla="*/ 122548 w 4703975"/>
+              <a:gd name="connsiteY0" fmla="*/ 18854 h 2055044"/>
+              <a:gd name="connsiteX1" fmla="*/ 2243579 w 4703975"/>
+              <a:gd name="connsiteY1" fmla="*/ 37708 h 2055044"/>
+              <a:gd name="connsiteX2" fmla="*/ 2234152 w 4703975"/>
+              <a:gd name="connsiteY2" fmla="*/ 857840 h 2055044"/>
+              <a:gd name="connsiteX3" fmla="*/ 4703975 w 4703975"/>
+              <a:gd name="connsiteY3" fmla="*/ 867267 h 2055044"/>
+              <a:gd name="connsiteX4" fmla="*/ 4694548 w 4703975"/>
+              <a:gd name="connsiteY4" fmla="*/ 1366887 h 2055044"/>
+              <a:gd name="connsiteX5" fmla="*/ 2545237 w 4703975"/>
+              <a:gd name="connsiteY5" fmla="*/ 1348034 h 2055044"/>
+              <a:gd name="connsiteX6" fmla="*/ 2545237 w 4703975"/>
+              <a:gd name="connsiteY6" fmla="*/ 1536570 h 2055044"/>
+              <a:gd name="connsiteX7" fmla="*/ 2253006 w 4703975"/>
+              <a:gd name="connsiteY7" fmla="*/ 1527143 h 2055044"/>
+              <a:gd name="connsiteX8" fmla="*/ 2262433 w 4703975"/>
+              <a:gd name="connsiteY8" fmla="*/ 2055044 h 2055044"/>
+              <a:gd name="connsiteX9" fmla="*/ 0 w 4703975"/>
+              <a:gd name="connsiteY9" fmla="*/ 2055044 h 2055044"/>
+              <a:gd name="connsiteX10" fmla="*/ 0 w 4703975"/>
+              <a:gd name="connsiteY10" fmla="*/ 0 h 2055044"/>
+              <a:gd name="connsiteX11" fmla="*/ 179109 w 4703975"/>
+              <a:gd name="connsiteY11" fmla="*/ 28281 h 2055044"/>
+              <a:gd name="connsiteX0" fmla="*/ 122548 w 4703975"/>
+              <a:gd name="connsiteY0" fmla="*/ 18854 h 2055044"/>
+              <a:gd name="connsiteX1" fmla="*/ 2243579 w 4703975"/>
+              <a:gd name="connsiteY1" fmla="*/ 37708 h 2055044"/>
+              <a:gd name="connsiteX2" fmla="*/ 2234152 w 4703975"/>
+              <a:gd name="connsiteY2" fmla="*/ 857840 h 2055044"/>
+              <a:gd name="connsiteX3" fmla="*/ 4703975 w 4703975"/>
+              <a:gd name="connsiteY3" fmla="*/ 867267 h 2055044"/>
+              <a:gd name="connsiteX4" fmla="*/ 4694548 w 4703975"/>
+              <a:gd name="connsiteY4" fmla="*/ 1366887 h 2055044"/>
+              <a:gd name="connsiteX5" fmla="*/ 2545237 w 4703975"/>
+              <a:gd name="connsiteY5" fmla="*/ 1348034 h 2055044"/>
+              <a:gd name="connsiteX6" fmla="*/ 2545237 w 4703975"/>
+              <a:gd name="connsiteY6" fmla="*/ 1536570 h 2055044"/>
+              <a:gd name="connsiteX7" fmla="*/ 2262433 w 4703975"/>
+              <a:gd name="connsiteY7" fmla="*/ 1555423 h 2055044"/>
+              <a:gd name="connsiteX8" fmla="*/ 2262433 w 4703975"/>
+              <a:gd name="connsiteY8" fmla="*/ 2055044 h 2055044"/>
+              <a:gd name="connsiteX9" fmla="*/ 0 w 4703975"/>
+              <a:gd name="connsiteY9" fmla="*/ 2055044 h 2055044"/>
+              <a:gd name="connsiteX10" fmla="*/ 0 w 4703975"/>
+              <a:gd name="connsiteY10" fmla="*/ 0 h 2055044"/>
+              <a:gd name="connsiteX11" fmla="*/ 179109 w 4703975"/>
+              <a:gd name="connsiteY11" fmla="*/ 28281 h 2055044"/>
+              <a:gd name="connsiteX0" fmla="*/ 122548 w 4703975"/>
+              <a:gd name="connsiteY0" fmla="*/ 18854 h 2055044"/>
+              <a:gd name="connsiteX1" fmla="*/ 2243579 w 4703975"/>
+              <a:gd name="connsiteY1" fmla="*/ 37708 h 2055044"/>
+              <a:gd name="connsiteX2" fmla="*/ 2234152 w 4703975"/>
+              <a:gd name="connsiteY2" fmla="*/ 857840 h 2055044"/>
+              <a:gd name="connsiteX3" fmla="*/ 4703975 w 4703975"/>
+              <a:gd name="connsiteY3" fmla="*/ 867267 h 2055044"/>
+              <a:gd name="connsiteX4" fmla="*/ 4694548 w 4703975"/>
+              <a:gd name="connsiteY4" fmla="*/ 1366887 h 2055044"/>
+              <a:gd name="connsiteX5" fmla="*/ 2545237 w 4703975"/>
+              <a:gd name="connsiteY5" fmla="*/ 1348034 h 2055044"/>
+              <a:gd name="connsiteX6" fmla="*/ 2545237 w 4703975"/>
+              <a:gd name="connsiteY6" fmla="*/ 1536570 h 2055044"/>
+              <a:gd name="connsiteX7" fmla="*/ 2253007 w 4703975"/>
+              <a:gd name="connsiteY7" fmla="*/ 1527142 h 2055044"/>
+              <a:gd name="connsiteX8" fmla="*/ 2262433 w 4703975"/>
+              <a:gd name="connsiteY8" fmla="*/ 2055044 h 2055044"/>
+              <a:gd name="connsiteX9" fmla="*/ 0 w 4703975"/>
+              <a:gd name="connsiteY9" fmla="*/ 2055044 h 2055044"/>
+              <a:gd name="connsiteX10" fmla="*/ 0 w 4703975"/>
+              <a:gd name="connsiteY10" fmla="*/ 0 h 2055044"/>
+              <a:gd name="connsiteX11" fmla="*/ 179109 w 4703975"/>
+              <a:gd name="connsiteY11" fmla="*/ 28281 h 2055044"/>
+              <a:gd name="connsiteX0" fmla="*/ 122548 w 4703975"/>
+              <a:gd name="connsiteY0" fmla="*/ 18854 h 2055044"/>
+              <a:gd name="connsiteX1" fmla="*/ 2243579 w 4703975"/>
+              <a:gd name="connsiteY1" fmla="*/ 37708 h 2055044"/>
+              <a:gd name="connsiteX2" fmla="*/ 2253005 w 4703975"/>
+              <a:gd name="connsiteY2" fmla="*/ 857840 h 2055044"/>
+              <a:gd name="connsiteX3" fmla="*/ 4703975 w 4703975"/>
+              <a:gd name="connsiteY3" fmla="*/ 867267 h 2055044"/>
+              <a:gd name="connsiteX4" fmla="*/ 4694548 w 4703975"/>
+              <a:gd name="connsiteY4" fmla="*/ 1366887 h 2055044"/>
+              <a:gd name="connsiteX5" fmla="*/ 2545237 w 4703975"/>
+              <a:gd name="connsiteY5" fmla="*/ 1348034 h 2055044"/>
+              <a:gd name="connsiteX6" fmla="*/ 2545237 w 4703975"/>
+              <a:gd name="connsiteY6" fmla="*/ 1536570 h 2055044"/>
+              <a:gd name="connsiteX7" fmla="*/ 2253007 w 4703975"/>
+              <a:gd name="connsiteY7" fmla="*/ 1527142 h 2055044"/>
+              <a:gd name="connsiteX8" fmla="*/ 2262433 w 4703975"/>
+              <a:gd name="connsiteY8" fmla="*/ 2055044 h 2055044"/>
+              <a:gd name="connsiteX9" fmla="*/ 0 w 4703975"/>
+              <a:gd name="connsiteY9" fmla="*/ 2055044 h 2055044"/>
+              <a:gd name="connsiteX10" fmla="*/ 0 w 4703975"/>
+              <a:gd name="connsiteY10" fmla="*/ 0 h 2055044"/>
+              <a:gd name="connsiteX11" fmla="*/ 179109 w 4703975"/>
+              <a:gd name="connsiteY11" fmla="*/ 28281 h 2055044"/>
+              <a:gd name="connsiteX0" fmla="*/ 122548 w 4703975"/>
+              <a:gd name="connsiteY0" fmla="*/ 0 h 2036190"/>
+              <a:gd name="connsiteX1" fmla="*/ 2243579 w 4703975"/>
+              <a:gd name="connsiteY1" fmla="*/ 18854 h 2036190"/>
+              <a:gd name="connsiteX2" fmla="*/ 2253005 w 4703975"/>
+              <a:gd name="connsiteY2" fmla="*/ 838986 h 2036190"/>
+              <a:gd name="connsiteX3" fmla="*/ 4703975 w 4703975"/>
+              <a:gd name="connsiteY3" fmla="*/ 848413 h 2036190"/>
+              <a:gd name="connsiteX4" fmla="*/ 4694548 w 4703975"/>
+              <a:gd name="connsiteY4" fmla="*/ 1348033 h 2036190"/>
+              <a:gd name="connsiteX5" fmla="*/ 2545237 w 4703975"/>
+              <a:gd name="connsiteY5" fmla="*/ 1329180 h 2036190"/>
+              <a:gd name="connsiteX6" fmla="*/ 2545237 w 4703975"/>
+              <a:gd name="connsiteY6" fmla="*/ 1517716 h 2036190"/>
+              <a:gd name="connsiteX7" fmla="*/ 2253007 w 4703975"/>
+              <a:gd name="connsiteY7" fmla="*/ 1508288 h 2036190"/>
+              <a:gd name="connsiteX8" fmla="*/ 2262433 w 4703975"/>
+              <a:gd name="connsiteY8" fmla="*/ 2036190 h 2036190"/>
+              <a:gd name="connsiteX9" fmla="*/ 0 w 4703975"/>
+              <a:gd name="connsiteY9" fmla="*/ 2036190 h 2036190"/>
+              <a:gd name="connsiteX10" fmla="*/ 0 w 4703975"/>
+              <a:gd name="connsiteY10" fmla="*/ 9426 h 2036190"/>
+              <a:gd name="connsiteX11" fmla="*/ 179109 w 4703975"/>
+              <a:gd name="connsiteY11" fmla="*/ 9427 h 2036190"/>
+              <a:gd name="connsiteX0" fmla="*/ 103694 w 4703975"/>
+              <a:gd name="connsiteY0" fmla="*/ 9428 h 2026764"/>
+              <a:gd name="connsiteX1" fmla="*/ 2243579 w 4703975"/>
+              <a:gd name="connsiteY1" fmla="*/ 9428 h 2026764"/>
+              <a:gd name="connsiteX2" fmla="*/ 2253005 w 4703975"/>
+              <a:gd name="connsiteY2" fmla="*/ 829560 h 2026764"/>
+              <a:gd name="connsiteX3" fmla="*/ 4703975 w 4703975"/>
+              <a:gd name="connsiteY3" fmla="*/ 838987 h 2026764"/>
+              <a:gd name="connsiteX4" fmla="*/ 4694548 w 4703975"/>
+              <a:gd name="connsiteY4" fmla="*/ 1338607 h 2026764"/>
+              <a:gd name="connsiteX5" fmla="*/ 2545237 w 4703975"/>
+              <a:gd name="connsiteY5" fmla="*/ 1319754 h 2026764"/>
+              <a:gd name="connsiteX6" fmla="*/ 2545237 w 4703975"/>
+              <a:gd name="connsiteY6" fmla="*/ 1508290 h 2026764"/>
+              <a:gd name="connsiteX7" fmla="*/ 2253007 w 4703975"/>
+              <a:gd name="connsiteY7" fmla="*/ 1498862 h 2026764"/>
+              <a:gd name="connsiteX8" fmla="*/ 2262433 w 4703975"/>
+              <a:gd name="connsiteY8" fmla="*/ 2026764 h 2026764"/>
+              <a:gd name="connsiteX9" fmla="*/ 0 w 4703975"/>
+              <a:gd name="connsiteY9" fmla="*/ 2026764 h 2026764"/>
+              <a:gd name="connsiteX10" fmla="*/ 0 w 4703975"/>
+              <a:gd name="connsiteY10" fmla="*/ 0 h 2026764"/>
+              <a:gd name="connsiteX11" fmla="*/ 179109 w 4703975"/>
+              <a:gd name="connsiteY11" fmla="*/ 1 h 2026764"/>
+              <a:gd name="connsiteX0" fmla="*/ 18853 w 4703975"/>
+              <a:gd name="connsiteY0" fmla="*/ 18855 h 2026764"/>
+              <a:gd name="connsiteX1" fmla="*/ 2243579 w 4703975"/>
+              <a:gd name="connsiteY1" fmla="*/ 9428 h 2026764"/>
+              <a:gd name="connsiteX2" fmla="*/ 2253005 w 4703975"/>
+              <a:gd name="connsiteY2" fmla="*/ 829560 h 2026764"/>
+              <a:gd name="connsiteX3" fmla="*/ 4703975 w 4703975"/>
+              <a:gd name="connsiteY3" fmla="*/ 838987 h 2026764"/>
+              <a:gd name="connsiteX4" fmla="*/ 4694548 w 4703975"/>
+              <a:gd name="connsiteY4" fmla="*/ 1338607 h 2026764"/>
+              <a:gd name="connsiteX5" fmla="*/ 2545237 w 4703975"/>
+              <a:gd name="connsiteY5" fmla="*/ 1319754 h 2026764"/>
+              <a:gd name="connsiteX6" fmla="*/ 2545237 w 4703975"/>
+              <a:gd name="connsiteY6" fmla="*/ 1508290 h 2026764"/>
+              <a:gd name="connsiteX7" fmla="*/ 2253007 w 4703975"/>
+              <a:gd name="connsiteY7" fmla="*/ 1498862 h 2026764"/>
+              <a:gd name="connsiteX8" fmla="*/ 2262433 w 4703975"/>
+              <a:gd name="connsiteY8" fmla="*/ 2026764 h 2026764"/>
+              <a:gd name="connsiteX9" fmla="*/ 0 w 4703975"/>
+              <a:gd name="connsiteY9" fmla="*/ 2026764 h 2026764"/>
+              <a:gd name="connsiteX10" fmla="*/ 0 w 4703975"/>
+              <a:gd name="connsiteY10" fmla="*/ 0 h 2026764"/>
+              <a:gd name="connsiteX11" fmla="*/ 179109 w 4703975"/>
+              <a:gd name="connsiteY11" fmla="*/ 1 h 2026764"/>
+              <a:gd name="connsiteX0" fmla="*/ 18853 w 4703975"/>
+              <a:gd name="connsiteY0" fmla="*/ 18854 h 2026763"/>
+              <a:gd name="connsiteX1" fmla="*/ 2243579 w 4703975"/>
+              <a:gd name="connsiteY1" fmla="*/ 9427 h 2026763"/>
+              <a:gd name="connsiteX2" fmla="*/ 2253005 w 4703975"/>
+              <a:gd name="connsiteY2" fmla="*/ 829559 h 2026763"/>
+              <a:gd name="connsiteX3" fmla="*/ 4703975 w 4703975"/>
+              <a:gd name="connsiteY3" fmla="*/ 838986 h 2026763"/>
+              <a:gd name="connsiteX4" fmla="*/ 4694548 w 4703975"/>
+              <a:gd name="connsiteY4" fmla="*/ 1338606 h 2026763"/>
+              <a:gd name="connsiteX5" fmla="*/ 2545237 w 4703975"/>
+              <a:gd name="connsiteY5" fmla="*/ 1319753 h 2026763"/>
+              <a:gd name="connsiteX6" fmla="*/ 2545237 w 4703975"/>
+              <a:gd name="connsiteY6" fmla="*/ 1508289 h 2026763"/>
+              <a:gd name="connsiteX7" fmla="*/ 2253007 w 4703975"/>
+              <a:gd name="connsiteY7" fmla="*/ 1498861 h 2026763"/>
+              <a:gd name="connsiteX8" fmla="*/ 2262433 w 4703975"/>
+              <a:gd name="connsiteY8" fmla="*/ 2026763 h 2026763"/>
+              <a:gd name="connsiteX9" fmla="*/ 0 w 4703975"/>
+              <a:gd name="connsiteY9" fmla="*/ 2026763 h 2026763"/>
+              <a:gd name="connsiteX10" fmla="*/ 0 w 4703975"/>
+              <a:gd name="connsiteY10" fmla="*/ 28279 h 2026763"/>
+              <a:gd name="connsiteX11" fmla="*/ 179109 w 4703975"/>
+              <a:gd name="connsiteY11" fmla="*/ 0 h 2026763"/>
+              <a:gd name="connsiteX0" fmla="*/ 18853 w 4703975"/>
+              <a:gd name="connsiteY0" fmla="*/ 18854 h 2026763"/>
+              <a:gd name="connsiteX1" fmla="*/ 2243579 w 4703975"/>
+              <a:gd name="connsiteY1" fmla="*/ 9427 h 2026763"/>
+              <a:gd name="connsiteX2" fmla="*/ 2253005 w 4703975"/>
+              <a:gd name="connsiteY2" fmla="*/ 829559 h 2026763"/>
+              <a:gd name="connsiteX3" fmla="*/ 4703975 w 4703975"/>
+              <a:gd name="connsiteY3" fmla="*/ 838986 h 2026763"/>
+              <a:gd name="connsiteX4" fmla="*/ 4694548 w 4703975"/>
+              <a:gd name="connsiteY4" fmla="*/ 1338606 h 2026763"/>
+              <a:gd name="connsiteX5" fmla="*/ 2545237 w 4703975"/>
+              <a:gd name="connsiteY5" fmla="*/ 1319753 h 2026763"/>
+              <a:gd name="connsiteX6" fmla="*/ 2545237 w 4703975"/>
+              <a:gd name="connsiteY6" fmla="*/ 1508289 h 2026763"/>
+              <a:gd name="connsiteX7" fmla="*/ 2253007 w 4703975"/>
+              <a:gd name="connsiteY7" fmla="*/ 1498861 h 2026763"/>
+              <a:gd name="connsiteX8" fmla="*/ 2262433 w 4703975"/>
+              <a:gd name="connsiteY8" fmla="*/ 2026763 h 2026763"/>
+              <a:gd name="connsiteX9" fmla="*/ 0 w 4703975"/>
+              <a:gd name="connsiteY9" fmla="*/ 2026763 h 2026763"/>
+              <a:gd name="connsiteX10" fmla="*/ 0 w 4703975"/>
+              <a:gd name="connsiteY10" fmla="*/ 18852 h 2026763"/>
+              <a:gd name="connsiteX11" fmla="*/ 179109 w 4703975"/>
+              <a:gd name="connsiteY11" fmla="*/ 0 h 2026763"/>
+              <a:gd name="connsiteX0" fmla="*/ 18853 w 4703975"/>
+              <a:gd name="connsiteY0" fmla="*/ 9427 h 2017336"/>
+              <a:gd name="connsiteX1" fmla="*/ 2243579 w 4703975"/>
+              <a:gd name="connsiteY1" fmla="*/ 0 h 2017336"/>
+              <a:gd name="connsiteX2" fmla="*/ 2253005 w 4703975"/>
+              <a:gd name="connsiteY2" fmla="*/ 820132 h 2017336"/>
+              <a:gd name="connsiteX3" fmla="*/ 4703975 w 4703975"/>
+              <a:gd name="connsiteY3" fmla="*/ 829559 h 2017336"/>
+              <a:gd name="connsiteX4" fmla="*/ 4694548 w 4703975"/>
+              <a:gd name="connsiteY4" fmla="*/ 1329179 h 2017336"/>
+              <a:gd name="connsiteX5" fmla="*/ 2545237 w 4703975"/>
+              <a:gd name="connsiteY5" fmla="*/ 1310326 h 2017336"/>
+              <a:gd name="connsiteX6" fmla="*/ 2545237 w 4703975"/>
+              <a:gd name="connsiteY6" fmla="*/ 1498862 h 2017336"/>
+              <a:gd name="connsiteX7" fmla="*/ 2253007 w 4703975"/>
+              <a:gd name="connsiteY7" fmla="*/ 1489434 h 2017336"/>
+              <a:gd name="connsiteX8" fmla="*/ 2262433 w 4703975"/>
+              <a:gd name="connsiteY8" fmla="*/ 2017336 h 2017336"/>
+              <a:gd name="connsiteX9" fmla="*/ 0 w 4703975"/>
+              <a:gd name="connsiteY9" fmla="*/ 2017336 h 2017336"/>
+              <a:gd name="connsiteX10" fmla="*/ 0 w 4703975"/>
+              <a:gd name="connsiteY10" fmla="*/ 9425 h 2017336"/>
+              <a:gd name="connsiteX11" fmla="*/ 197963 w 4703975"/>
+              <a:gd name="connsiteY11" fmla="*/ 18853 h 2017336"/>
+              <a:gd name="connsiteX0" fmla="*/ 18853 w 4703975"/>
+              <a:gd name="connsiteY0" fmla="*/ 9427 h 2017336"/>
+              <a:gd name="connsiteX1" fmla="*/ 2243579 w 4703975"/>
+              <a:gd name="connsiteY1" fmla="*/ 0 h 2017336"/>
+              <a:gd name="connsiteX2" fmla="*/ 2253005 w 4703975"/>
+              <a:gd name="connsiteY2" fmla="*/ 820132 h 2017336"/>
+              <a:gd name="connsiteX3" fmla="*/ 4703975 w 4703975"/>
+              <a:gd name="connsiteY3" fmla="*/ 829559 h 2017336"/>
+              <a:gd name="connsiteX4" fmla="*/ 4694548 w 4703975"/>
+              <a:gd name="connsiteY4" fmla="*/ 1329179 h 2017336"/>
+              <a:gd name="connsiteX5" fmla="*/ 2545237 w 4703975"/>
+              <a:gd name="connsiteY5" fmla="*/ 1310326 h 2017336"/>
+              <a:gd name="connsiteX6" fmla="*/ 2545237 w 4703975"/>
+              <a:gd name="connsiteY6" fmla="*/ 1498862 h 2017336"/>
+              <a:gd name="connsiteX7" fmla="*/ 2281288 w 4703975"/>
+              <a:gd name="connsiteY7" fmla="*/ 1489434 h 2017336"/>
+              <a:gd name="connsiteX8" fmla="*/ 2262433 w 4703975"/>
+              <a:gd name="connsiteY8" fmla="*/ 2017336 h 2017336"/>
+              <a:gd name="connsiteX9" fmla="*/ 0 w 4703975"/>
+              <a:gd name="connsiteY9" fmla="*/ 2017336 h 2017336"/>
+              <a:gd name="connsiteX10" fmla="*/ 0 w 4703975"/>
+              <a:gd name="connsiteY10" fmla="*/ 9425 h 2017336"/>
+              <a:gd name="connsiteX11" fmla="*/ 197963 w 4703975"/>
+              <a:gd name="connsiteY11" fmla="*/ 18853 h 2017336"/>
+              <a:gd name="connsiteX0" fmla="*/ 18853 w 4703975"/>
+              <a:gd name="connsiteY0" fmla="*/ 9427 h 2017336"/>
+              <a:gd name="connsiteX1" fmla="*/ 2243579 w 4703975"/>
+              <a:gd name="connsiteY1" fmla="*/ 0 h 2017336"/>
+              <a:gd name="connsiteX2" fmla="*/ 2253005 w 4703975"/>
+              <a:gd name="connsiteY2" fmla="*/ 820132 h 2017336"/>
+              <a:gd name="connsiteX3" fmla="*/ 4703975 w 4703975"/>
+              <a:gd name="connsiteY3" fmla="*/ 829559 h 2017336"/>
+              <a:gd name="connsiteX4" fmla="*/ 4694548 w 4703975"/>
+              <a:gd name="connsiteY4" fmla="*/ 1329179 h 2017336"/>
+              <a:gd name="connsiteX5" fmla="*/ 2545237 w 4703975"/>
+              <a:gd name="connsiteY5" fmla="*/ 1310326 h 2017336"/>
+              <a:gd name="connsiteX6" fmla="*/ 2552857 w 4703975"/>
+              <a:gd name="connsiteY6" fmla="*/ 1483622 h 2017336"/>
+              <a:gd name="connsiteX7" fmla="*/ 2281288 w 4703975"/>
+              <a:gd name="connsiteY7" fmla="*/ 1489434 h 2017336"/>
+              <a:gd name="connsiteX8" fmla="*/ 2262433 w 4703975"/>
+              <a:gd name="connsiteY8" fmla="*/ 2017336 h 2017336"/>
+              <a:gd name="connsiteX9" fmla="*/ 0 w 4703975"/>
+              <a:gd name="connsiteY9" fmla="*/ 2017336 h 2017336"/>
+              <a:gd name="connsiteX10" fmla="*/ 0 w 4703975"/>
+              <a:gd name="connsiteY10" fmla="*/ 9425 h 2017336"/>
+              <a:gd name="connsiteX11" fmla="*/ 197963 w 4703975"/>
+              <a:gd name="connsiteY11" fmla="*/ 18853 h 2017336"/>
+              <a:gd name="connsiteX0" fmla="*/ 18853 w 4703975"/>
+              <a:gd name="connsiteY0" fmla="*/ 9427 h 2017336"/>
+              <a:gd name="connsiteX1" fmla="*/ 2243579 w 4703975"/>
+              <a:gd name="connsiteY1" fmla="*/ 0 h 2017336"/>
+              <a:gd name="connsiteX2" fmla="*/ 2218715 w 4703975"/>
+              <a:gd name="connsiteY2" fmla="*/ 816322 h 2017336"/>
+              <a:gd name="connsiteX3" fmla="*/ 4703975 w 4703975"/>
+              <a:gd name="connsiteY3" fmla="*/ 829559 h 2017336"/>
+              <a:gd name="connsiteX4" fmla="*/ 4694548 w 4703975"/>
+              <a:gd name="connsiteY4" fmla="*/ 1329179 h 2017336"/>
+              <a:gd name="connsiteX5" fmla="*/ 2545237 w 4703975"/>
+              <a:gd name="connsiteY5" fmla="*/ 1310326 h 2017336"/>
+              <a:gd name="connsiteX6" fmla="*/ 2552857 w 4703975"/>
+              <a:gd name="connsiteY6" fmla="*/ 1483622 h 2017336"/>
+              <a:gd name="connsiteX7" fmla="*/ 2281288 w 4703975"/>
+              <a:gd name="connsiteY7" fmla="*/ 1489434 h 2017336"/>
+              <a:gd name="connsiteX8" fmla="*/ 2262433 w 4703975"/>
+              <a:gd name="connsiteY8" fmla="*/ 2017336 h 2017336"/>
+              <a:gd name="connsiteX9" fmla="*/ 0 w 4703975"/>
+              <a:gd name="connsiteY9" fmla="*/ 2017336 h 2017336"/>
+              <a:gd name="connsiteX10" fmla="*/ 0 w 4703975"/>
+              <a:gd name="connsiteY10" fmla="*/ 9425 h 2017336"/>
+              <a:gd name="connsiteX11" fmla="*/ 197963 w 4703975"/>
+              <a:gd name="connsiteY11" fmla="*/ 18853 h 2017336"/>
+              <a:gd name="connsiteX0" fmla="*/ 18853 w 4703975"/>
+              <a:gd name="connsiteY0" fmla="*/ 2 h 2007911"/>
+              <a:gd name="connsiteX1" fmla="*/ 2209289 w 4703975"/>
+              <a:gd name="connsiteY1" fmla="*/ 5815 h 2007911"/>
+              <a:gd name="connsiteX2" fmla="*/ 2218715 w 4703975"/>
+              <a:gd name="connsiteY2" fmla="*/ 806897 h 2007911"/>
+              <a:gd name="connsiteX3" fmla="*/ 4703975 w 4703975"/>
+              <a:gd name="connsiteY3" fmla="*/ 820134 h 2007911"/>
+              <a:gd name="connsiteX4" fmla="*/ 4694548 w 4703975"/>
+              <a:gd name="connsiteY4" fmla="*/ 1319754 h 2007911"/>
+              <a:gd name="connsiteX5" fmla="*/ 2545237 w 4703975"/>
+              <a:gd name="connsiteY5" fmla="*/ 1300901 h 2007911"/>
+              <a:gd name="connsiteX6" fmla="*/ 2552857 w 4703975"/>
+              <a:gd name="connsiteY6" fmla="*/ 1474197 h 2007911"/>
+              <a:gd name="connsiteX7" fmla="*/ 2281288 w 4703975"/>
+              <a:gd name="connsiteY7" fmla="*/ 1480009 h 2007911"/>
+              <a:gd name="connsiteX8" fmla="*/ 2262433 w 4703975"/>
+              <a:gd name="connsiteY8" fmla="*/ 2007911 h 2007911"/>
+              <a:gd name="connsiteX9" fmla="*/ 0 w 4703975"/>
+              <a:gd name="connsiteY9" fmla="*/ 2007911 h 2007911"/>
+              <a:gd name="connsiteX10" fmla="*/ 0 w 4703975"/>
+              <a:gd name="connsiteY10" fmla="*/ 0 h 2007911"/>
+              <a:gd name="connsiteX11" fmla="*/ 197963 w 4703975"/>
+              <a:gd name="connsiteY11" fmla="*/ 9428 h 2007911"/>
+              <a:gd name="connsiteX0" fmla="*/ 18853 w 4703975"/>
+              <a:gd name="connsiteY0" fmla="*/ 5617 h 2013526"/>
+              <a:gd name="connsiteX1" fmla="*/ 2224529 w 4703975"/>
+              <a:gd name="connsiteY1" fmla="*/ 0 h 2013526"/>
+              <a:gd name="connsiteX2" fmla="*/ 2218715 w 4703975"/>
+              <a:gd name="connsiteY2" fmla="*/ 812512 h 2013526"/>
+              <a:gd name="connsiteX3" fmla="*/ 4703975 w 4703975"/>
+              <a:gd name="connsiteY3" fmla="*/ 825749 h 2013526"/>
+              <a:gd name="connsiteX4" fmla="*/ 4694548 w 4703975"/>
+              <a:gd name="connsiteY4" fmla="*/ 1325369 h 2013526"/>
+              <a:gd name="connsiteX5" fmla="*/ 2545237 w 4703975"/>
+              <a:gd name="connsiteY5" fmla="*/ 1306516 h 2013526"/>
+              <a:gd name="connsiteX6" fmla="*/ 2552857 w 4703975"/>
+              <a:gd name="connsiteY6" fmla="*/ 1479812 h 2013526"/>
+              <a:gd name="connsiteX7" fmla="*/ 2281288 w 4703975"/>
+              <a:gd name="connsiteY7" fmla="*/ 1485624 h 2013526"/>
+              <a:gd name="connsiteX8" fmla="*/ 2262433 w 4703975"/>
+              <a:gd name="connsiteY8" fmla="*/ 2013526 h 2013526"/>
+              <a:gd name="connsiteX9" fmla="*/ 0 w 4703975"/>
+              <a:gd name="connsiteY9" fmla="*/ 2013526 h 2013526"/>
+              <a:gd name="connsiteX10" fmla="*/ 0 w 4703975"/>
+              <a:gd name="connsiteY10" fmla="*/ 5615 h 2013526"/>
+              <a:gd name="connsiteX11" fmla="*/ 197963 w 4703975"/>
+              <a:gd name="connsiteY11" fmla="*/ 15043 h 2013526"/>
+              <a:gd name="connsiteX0" fmla="*/ 18853 w 4703975"/>
+              <a:gd name="connsiteY0" fmla="*/ 5617 h 2013526"/>
+              <a:gd name="connsiteX1" fmla="*/ 2224529 w 4703975"/>
+              <a:gd name="connsiteY1" fmla="*/ 0 h 2013526"/>
+              <a:gd name="connsiteX2" fmla="*/ 2218715 w 4703975"/>
+              <a:gd name="connsiteY2" fmla="*/ 812512 h 2013526"/>
+              <a:gd name="connsiteX3" fmla="*/ 4703975 w 4703975"/>
+              <a:gd name="connsiteY3" fmla="*/ 825749 h 2013526"/>
+              <a:gd name="connsiteX4" fmla="*/ 4694548 w 4703975"/>
+              <a:gd name="connsiteY4" fmla="*/ 1325369 h 2013526"/>
+              <a:gd name="connsiteX5" fmla="*/ 2545237 w 4703975"/>
+              <a:gd name="connsiteY5" fmla="*/ 1306516 h 2013526"/>
+              <a:gd name="connsiteX6" fmla="*/ 2552857 w 4703975"/>
+              <a:gd name="connsiteY6" fmla="*/ 1479812 h 2013526"/>
+              <a:gd name="connsiteX7" fmla="*/ 2281288 w 4703975"/>
+              <a:gd name="connsiteY7" fmla="*/ 1485624 h 2013526"/>
+              <a:gd name="connsiteX8" fmla="*/ 2262433 w 4703975"/>
+              <a:gd name="connsiteY8" fmla="*/ 2013526 h 2013526"/>
+              <a:gd name="connsiteX9" fmla="*/ 0 w 4703975"/>
+              <a:gd name="connsiteY9" fmla="*/ 2013526 h 2013526"/>
+              <a:gd name="connsiteX10" fmla="*/ 0 w 4703975"/>
+              <a:gd name="connsiteY10" fmla="*/ 5615 h 2013526"/>
+              <a:gd name="connsiteX11" fmla="*/ 197963 w 4703975"/>
+              <a:gd name="connsiteY11" fmla="*/ 7423 h 2013526"/>
+              <a:gd name="connsiteX0" fmla="*/ 18853 w 4703975"/>
+              <a:gd name="connsiteY0" fmla="*/ 66577 h 2074486"/>
+              <a:gd name="connsiteX1" fmla="*/ 2258819 w 4703975"/>
+              <a:gd name="connsiteY1" fmla="*/ 0 h 2074486"/>
+              <a:gd name="connsiteX2" fmla="*/ 2218715 w 4703975"/>
+              <a:gd name="connsiteY2" fmla="*/ 873472 h 2074486"/>
+              <a:gd name="connsiteX3" fmla="*/ 4703975 w 4703975"/>
+              <a:gd name="connsiteY3" fmla="*/ 886709 h 2074486"/>
+              <a:gd name="connsiteX4" fmla="*/ 4694548 w 4703975"/>
+              <a:gd name="connsiteY4" fmla="*/ 1386329 h 2074486"/>
+              <a:gd name="connsiteX5" fmla="*/ 2545237 w 4703975"/>
+              <a:gd name="connsiteY5" fmla="*/ 1367476 h 2074486"/>
+              <a:gd name="connsiteX6" fmla="*/ 2552857 w 4703975"/>
+              <a:gd name="connsiteY6" fmla="*/ 1540772 h 2074486"/>
+              <a:gd name="connsiteX7" fmla="*/ 2281288 w 4703975"/>
+              <a:gd name="connsiteY7" fmla="*/ 1546584 h 2074486"/>
+              <a:gd name="connsiteX8" fmla="*/ 2262433 w 4703975"/>
+              <a:gd name="connsiteY8" fmla="*/ 2074486 h 2074486"/>
+              <a:gd name="connsiteX9" fmla="*/ 0 w 4703975"/>
+              <a:gd name="connsiteY9" fmla="*/ 2074486 h 2074486"/>
+              <a:gd name="connsiteX10" fmla="*/ 0 w 4703975"/>
+              <a:gd name="connsiteY10" fmla="*/ 66575 h 2074486"/>
+              <a:gd name="connsiteX11" fmla="*/ 197963 w 4703975"/>
+              <a:gd name="connsiteY11" fmla="*/ 68383 h 2074486"/>
+              <a:gd name="connsiteX0" fmla="*/ 26473 w 4711595"/>
+              <a:gd name="connsiteY0" fmla="*/ 66577 h 2074486"/>
+              <a:gd name="connsiteX1" fmla="*/ 2266439 w 4711595"/>
+              <a:gd name="connsiteY1" fmla="*/ 0 h 2074486"/>
+              <a:gd name="connsiteX2" fmla="*/ 2226335 w 4711595"/>
+              <a:gd name="connsiteY2" fmla="*/ 873472 h 2074486"/>
+              <a:gd name="connsiteX3" fmla="*/ 4711595 w 4711595"/>
+              <a:gd name="connsiteY3" fmla="*/ 886709 h 2074486"/>
+              <a:gd name="connsiteX4" fmla="*/ 4702168 w 4711595"/>
+              <a:gd name="connsiteY4" fmla="*/ 1386329 h 2074486"/>
+              <a:gd name="connsiteX5" fmla="*/ 2552857 w 4711595"/>
+              <a:gd name="connsiteY5" fmla="*/ 1367476 h 2074486"/>
+              <a:gd name="connsiteX6" fmla="*/ 2560477 w 4711595"/>
+              <a:gd name="connsiteY6" fmla="*/ 1540772 h 2074486"/>
+              <a:gd name="connsiteX7" fmla="*/ 2288908 w 4711595"/>
+              <a:gd name="connsiteY7" fmla="*/ 1546584 h 2074486"/>
+              <a:gd name="connsiteX8" fmla="*/ 2270053 w 4711595"/>
+              <a:gd name="connsiteY8" fmla="*/ 2074486 h 2074486"/>
+              <a:gd name="connsiteX9" fmla="*/ 7620 w 4711595"/>
+              <a:gd name="connsiteY9" fmla="*/ 2074486 h 2074486"/>
+              <a:gd name="connsiteX10" fmla="*/ 0 w 4711595"/>
+              <a:gd name="connsiteY10" fmla="*/ 20855 h 2074486"/>
+              <a:gd name="connsiteX11" fmla="*/ 205583 w 4711595"/>
+              <a:gd name="connsiteY11" fmla="*/ 68383 h 2074486"/>
+              <a:gd name="connsiteX0" fmla="*/ 26473 w 4711595"/>
+              <a:gd name="connsiteY0" fmla="*/ 66577 h 2074486"/>
+              <a:gd name="connsiteX1" fmla="*/ 2266439 w 4711595"/>
+              <a:gd name="connsiteY1" fmla="*/ 0 h 2074486"/>
+              <a:gd name="connsiteX2" fmla="*/ 2226335 w 4711595"/>
+              <a:gd name="connsiteY2" fmla="*/ 873472 h 2074486"/>
+              <a:gd name="connsiteX3" fmla="*/ 4711595 w 4711595"/>
+              <a:gd name="connsiteY3" fmla="*/ 886709 h 2074486"/>
+              <a:gd name="connsiteX4" fmla="*/ 4702168 w 4711595"/>
+              <a:gd name="connsiteY4" fmla="*/ 1386329 h 2074486"/>
+              <a:gd name="connsiteX5" fmla="*/ 2552857 w 4711595"/>
+              <a:gd name="connsiteY5" fmla="*/ 1367476 h 2074486"/>
+              <a:gd name="connsiteX6" fmla="*/ 2560477 w 4711595"/>
+              <a:gd name="connsiteY6" fmla="*/ 1540772 h 2074486"/>
+              <a:gd name="connsiteX7" fmla="*/ 2288908 w 4711595"/>
+              <a:gd name="connsiteY7" fmla="*/ 1546584 h 2074486"/>
+              <a:gd name="connsiteX8" fmla="*/ 2270053 w 4711595"/>
+              <a:gd name="connsiteY8" fmla="*/ 2074486 h 2074486"/>
+              <a:gd name="connsiteX9" fmla="*/ 7620 w 4711595"/>
+              <a:gd name="connsiteY9" fmla="*/ 2074486 h 2074486"/>
+              <a:gd name="connsiteX10" fmla="*/ 0 w 4711595"/>
+              <a:gd name="connsiteY10" fmla="*/ 20855 h 2074486"/>
+              <a:gd name="connsiteX11" fmla="*/ 213203 w 4711595"/>
+              <a:gd name="connsiteY11" fmla="*/ 26473 h 2074486"/>
+              <a:gd name="connsiteX0" fmla="*/ 220783 w 4711595"/>
+              <a:gd name="connsiteY0" fmla="*/ 20857 h 2074486"/>
+              <a:gd name="connsiteX1" fmla="*/ 2266439 w 4711595"/>
+              <a:gd name="connsiteY1" fmla="*/ 0 h 2074486"/>
+              <a:gd name="connsiteX2" fmla="*/ 2226335 w 4711595"/>
+              <a:gd name="connsiteY2" fmla="*/ 873472 h 2074486"/>
+              <a:gd name="connsiteX3" fmla="*/ 4711595 w 4711595"/>
+              <a:gd name="connsiteY3" fmla="*/ 886709 h 2074486"/>
+              <a:gd name="connsiteX4" fmla="*/ 4702168 w 4711595"/>
+              <a:gd name="connsiteY4" fmla="*/ 1386329 h 2074486"/>
+              <a:gd name="connsiteX5" fmla="*/ 2552857 w 4711595"/>
+              <a:gd name="connsiteY5" fmla="*/ 1367476 h 2074486"/>
+              <a:gd name="connsiteX6" fmla="*/ 2560477 w 4711595"/>
+              <a:gd name="connsiteY6" fmla="*/ 1540772 h 2074486"/>
+              <a:gd name="connsiteX7" fmla="*/ 2288908 w 4711595"/>
+              <a:gd name="connsiteY7" fmla="*/ 1546584 h 2074486"/>
+              <a:gd name="connsiteX8" fmla="*/ 2270053 w 4711595"/>
+              <a:gd name="connsiteY8" fmla="*/ 2074486 h 2074486"/>
+              <a:gd name="connsiteX9" fmla="*/ 7620 w 4711595"/>
+              <a:gd name="connsiteY9" fmla="*/ 2074486 h 2074486"/>
+              <a:gd name="connsiteX10" fmla="*/ 0 w 4711595"/>
+              <a:gd name="connsiteY10" fmla="*/ 20855 h 2074486"/>
+              <a:gd name="connsiteX11" fmla="*/ 213203 w 4711595"/>
+              <a:gd name="connsiteY11" fmla="*/ 26473 h 2074486"/>
+              <a:gd name="connsiteX0" fmla="*/ 220783 w 4711595"/>
+              <a:gd name="connsiteY0" fmla="*/ 20857 h 2074486"/>
+              <a:gd name="connsiteX1" fmla="*/ 2266439 w 4711595"/>
+              <a:gd name="connsiteY1" fmla="*/ 0 h 2074486"/>
+              <a:gd name="connsiteX2" fmla="*/ 2226335 w 4711595"/>
+              <a:gd name="connsiteY2" fmla="*/ 873472 h 2074486"/>
+              <a:gd name="connsiteX3" fmla="*/ 4711595 w 4711595"/>
+              <a:gd name="connsiteY3" fmla="*/ 886709 h 2074486"/>
+              <a:gd name="connsiteX4" fmla="*/ 4702168 w 4711595"/>
+              <a:gd name="connsiteY4" fmla="*/ 1386329 h 2074486"/>
+              <a:gd name="connsiteX5" fmla="*/ 2552857 w 4711595"/>
+              <a:gd name="connsiteY5" fmla="*/ 1367476 h 2074486"/>
+              <a:gd name="connsiteX6" fmla="*/ 2560477 w 4711595"/>
+              <a:gd name="connsiteY6" fmla="*/ 1540772 h 2074486"/>
+              <a:gd name="connsiteX7" fmla="*/ 2288908 w 4711595"/>
+              <a:gd name="connsiteY7" fmla="*/ 1546584 h 2074486"/>
+              <a:gd name="connsiteX8" fmla="*/ 2270053 w 4711595"/>
+              <a:gd name="connsiteY8" fmla="*/ 2074486 h 2074486"/>
+              <a:gd name="connsiteX9" fmla="*/ 7620 w 4711595"/>
+              <a:gd name="connsiteY9" fmla="*/ 2074486 h 2074486"/>
+              <a:gd name="connsiteX10" fmla="*/ 0 w 4711595"/>
+              <a:gd name="connsiteY10" fmla="*/ 20855 h 2074486"/>
+              <a:gd name="connsiteX11" fmla="*/ 220823 w 4711595"/>
+              <a:gd name="connsiteY11" fmla="*/ 22663 h 2074486"/>
+              <a:gd name="connsiteX0" fmla="*/ 220783 w 4711595"/>
+              <a:gd name="connsiteY0" fmla="*/ 20857 h 2074486"/>
+              <a:gd name="connsiteX1" fmla="*/ 2266439 w 4711595"/>
+              <a:gd name="connsiteY1" fmla="*/ 0 h 2074486"/>
+              <a:gd name="connsiteX2" fmla="*/ 2264435 w 4711595"/>
+              <a:gd name="connsiteY2" fmla="*/ 842992 h 2074486"/>
+              <a:gd name="connsiteX3" fmla="*/ 4711595 w 4711595"/>
+              <a:gd name="connsiteY3" fmla="*/ 886709 h 2074486"/>
+              <a:gd name="connsiteX4" fmla="*/ 4702168 w 4711595"/>
+              <a:gd name="connsiteY4" fmla="*/ 1386329 h 2074486"/>
+              <a:gd name="connsiteX5" fmla="*/ 2552857 w 4711595"/>
+              <a:gd name="connsiteY5" fmla="*/ 1367476 h 2074486"/>
+              <a:gd name="connsiteX6" fmla="*/ 2560477 w 4711595"/>
+              <a:gd name="connsiteY6" fmla="*/ 1540772 h 2074486"/>
+              <a:gd name="connsiteX7" fmla="*/ 2288908 w 4711595"/>
+              <a:gd name="connsiteY7" fmla="*/ 1546584 h 2074486"/>
+              <a:gd name="connsiteX8" fmla="*/ 2270053 w 4711595"/>
+              <a:gd name="connsiteY8" fmla="*/ 2074486 h 2074486"/>
+              <a:gd name="connsiteX9" fmla="*/ 7620 w 4711595"/>
+              <a:gd name="connsiteY9" fmla="*/ 2074486 h 2074486"/>
+              <a:gd name="connsiteX10" fmla="*/ 0 w 4711595"/>
+              <a:gd name="connsiteY10" fmla="*/ 20855 h 2074486"/>
+              <a:gd name="connsiteX11" fmla="*/ 220823 w 4711595"/>
+              <a:gd name="connsiteY11" fmla="*/ 22663 h 2074486"/>
+              <a:gd name="connsiteX0" fmla="*/ 220783 w 4702168"/>
+              <a:gd name="connsiteY0" fmla="*/ 20857 h 2074486"/>
+              <a:gd name="connsiteX1" fmla="*/ 2266439 w 4702168"/>
+              <a:gd name="connsiteY1" fmla="*/ 0 h 2074486"/>
+              <a:gd name="connsiteX2" fmla="*/ 2264435 w 4702168"/>
+              <a:gd name="connsiteY2" fmla="*/ 842992 h 2074486"/>
+              <a:gd name="connsiteX3" fmla="*/ 4688735 w 4702168"/>
+              <a:gd name="connsiteY3" fmla="*/ 844799 h 2074486"/>
+              <a:gd name="connsiteX4" fmla="*/ 4702168 w 4702168"/>
+              <a:gd name="connsiteY4" fmla="*/ 1386329 h 2074486"/>
+              <a:gd name="connsiteX5" fmla="*/ 2552857 w 4702168"/>
+              <a:gd name="connsiteY5" fmla="*/ 1367476 h 2074486"/>
+              <a:gd name="connsiteX6" fmla="*/ 2560477 w 4702168"/>
+              <a:gd name="connsiteY6" fmla="*/ 1540772 h 2074486"/>
+              <a:gd name="connsiteX7" fmla="*/ 2288908 w 4702168"/>
+              <a:gd name="connsiteY7" fmla="*/ 1546584 h 2074486"/>
+              <a:gd name="connsiteX8" fmla="*/ 2270053 w 4702168"/>
+              <a:gd name="connsiteY8" fmla="*/ 2074486 h 2074486"/>
+              <a:gd name="connsiteX9" fmla="*/ 7620 w 4702168"/>
+              <a:gd name="connsiteY9" fmla="*/ 2074486 h 2074486"/>
+              <a:gd name="connsiteX10" fmla="*/ 0 w 4702168"/>
+              <a:gd name="connsiteY10" fmla="*/ 20855 h 2074486"/>
+              <a:gd name="connsiteX11" fmla="*/ 220823 w 4702168"/>
+              <a:gd name="connsiteY11" fmla="*/ 22663 h 2074486"/>
+              <a:gd name="connsiteX0" fmla="*/ 220783 w 4690738"/>
+              <a:gd name="connsiteY0" fmla="*/ 20857 h 2074486"/>
+              <a:gd name="connsiteX1" fmla="*/ 2266439 w 4690738"/>
+              <a:gd name="connsiteY1" fmla="*/ 0 h 2074486"/>
+              <a:gd name="connsiteX2" fmla="*/ 2264435 w 4690738"/>
+              <a:gd name="connsiteY2" fmla="*/ 842992 h 2074486"/>
+              <a:gd name="connsiteX3" fmla="*/ 4688735 w 4690738"/>
+              <a:gd name="connsiteY3" fmla="*/ 844799 h 2074486"/>
+              <a:gd name="connsiteX4" fmla="*/ 4690738 w 4690738"/>
+              <a:gd name="connsiteY4" fmla="*/ 1447289 h 2074486"/>
+              <a:gd name="connsiteX5" fmla="*/ 2552857 w 4690738"/>
+              <a:gd name="connsiteY5" fmla="*/ 1367476 h 2074486"/>
+              <a:gd name="connsiteX6" fmla="*/ 2560477 w 4690738"/>
+              <a:gd name="connsiteY6" fmla="*/ 1540772 h 2074486"/>
+              <a:gd name="connsiteX7" fmla="*/ 2288908 w 4690738"/>
+              <a:gd name="connsiteY7" fmla="*/ 1546584 h 2074486"/>
+              <a:gd name="connsiteX8" fmla="*/ 2270053 w 4690738"/>
+              <a:gd name="connsiteY8" fmla="*/ 2074486 h 2074486"/>
+              <a:gd name="connsiteX9" fmla="*/ 7620 w 4690738"/>
+              <a:gd name="connsiteY9" fmla="*/ 2074486 h 2074486"/>
+              <a:gd name="connsiteX10" fmla="*/ 0 w 4690738"/>
+              <a:gd name="connsiteY10" fmla="*/ 20855 h 2074486"/>
+              <a:gd name="connsiteX11" fmla="*/ 220823 w 4690738"/>
+              <a:gd name="connsiteY11" fmla="*/ 22663 h 2074486"/>
+              <a:gd name="connsiteX0" fmla="*/ 220783 w 4690738"/>
+              <a:gd name="connsiteY0" fmla="*/ 20857 h 2074486"/>
+              <a:gd name="connsiteX1" fmla="*/ 2266439 w 4690738"/>
+              <a:gd name="connsiteY1" fmla="*/ 0 h 2074486"/>
+              <a:gd name="connsiteX2" fmla="*/ 2264435 w 4690738"/>
+              <a:gd name="connsiteY2" fmla="*/ 842992 h 2074486"/>
+              <a:gd name="connsiteX3" fmla="*/ 4688735 w 4690738"/>
+              <a:gd name="connsiteY3" fmla="*/ 844799 h 2074486"/>
+              <a:gd name="connsiteX4" fmla="*/ 4690738 w 4690738"/>
+              <a:gd name="connsiteY4" fmla="*/ 1447289 h 2074486"/>
+              <a:gd name="connsiteX5" fmla="*/ 2606197 w 4690738"/>
+              <a:gd name="connsiteY5" fmla="*/ 1420816 h 2074486"/>
+              <a:gd name="connsiteX6" fmla="*/ 2560477 w 4690738"/>
+              <a:gd name="connsiteY6" fmla="*/ 1540772 h 2074486"/>
+              <a:gd name="connsiteX7" fmla="*/ 2288908 w 4690738"/>
+              <a:gd name="connsiteY7" fmla="*/ 1546584 h 2074486"/>
+              <a:gd name="connsiteX8" fmla="*/ 2270053 w 4690738"/>
+              <a:gd name="connsiteY8" fmla="*/ 2074486 h 2074486"/>
+              <a:gd name="connsiteX9" fmla="*/ 7620 w 4690738"/>
+              <a:gd name="connsiteY9" fmla="*/ 2074486 h 2074486"/>
+              <a:gd name="connsiteX10" fmla="*/ 0 w 4690738"/>
+              <a:gd name="connsiteY10" fmla="*/ 20855 h 2074486"/>
+              <a:gd name="connsiteX11" fmla="*/ 220823 w 4690738"/>
+              <a:gd name="connsiteY11" fmla="*/ 22663 h 2074486"/>
+              <a:gd name="connsiteX0" fmla="*/ 220783 w 4690738"/>
+              <a:gd name="connsiteY0" fmla="*/ 20857 h 2074486"/>
+              <a:gd name="connsiteX1" fmla="*/ 2266439 w 4690738"/>
+              <a:gd name="connsiteY1" fmla="*/ 0 h 2074486"/>
+              <a:gd name="connsiteX2" fmla="*/ 2264435 w 4690738"/>
+              <a:gd name="connsiteY2" fmla="*/ 842992 h 2074486"/>
+              <a:gd name="connsiteX3" fmla="*/ 4688735 w 4690738"/>
+              <a:gd name="connsiteY3" fmla="*/ 844799 h 2074486"/>
+              <a:gd name="connsiteX4" fmla="*/ 4690738 w 4690738"/>
+              <a:gd name="connsiteY4" fmla="*/ 1447289 h 2074486"/>
+              <a:gd name="connsiteX5" fmla="*/ 2606197 w 4690738"/>
+              <a:gd name="connsiteY5" fmla="*/ 1420816 h 2074486"/>
+              <a:gd name="connsiteX6" fmla="*/ 2560477 w 4690738"/>
+              <a:gd name="connsiteY6" fmla="*/ 1540772 h 2074486"/>
+              <a:gd name="connsiteX7" fmla="*/ 2288908 w 4690738"/>
+              <a:gd name="connsiteY7" fmla="*/ 1546584 h 2074486"/>
+              <a:gd name="connsiteX8" fmla="*/ 2270053 w 4690738"/>
+              <a:gd name="connsiteY8" fmla="*/ 2074486 h 2074486"/>
+              <a:gd name="connsiteX9" fmla="*/ 7620 w 4690738"/>
+              <a:gd name="connsiteY9" fmla="*/ 2074486 h 2074486"/>
+              <a:gd name="connsiteX10" fmla="*/ 0 w 4690738"/>
+              <a:gd name="connsiteY10" fmla="*/ 20855 h 2074486"/>
+              <a:gd name="connsiteX11" fmla="*/ 220823 w 4690738"/>
+              <a:gd name="connsiteY11" fmla="*/ 22663 h 2074486"/>
+              <a:gd name="connsiteX0" fmla="*/ 220783 w 4690738"/>
+              <a:gd name="connsiteY0" fmla="*/ 20857 h 2074486"/>
+              <a:gd name="connsiteX1" fmla="*/ 2266439 w 4690738"/>
+              <a:gd name="connsiteY1" fmla="*/ 0 h 2074486"/>
+              <a:gd name="connsiteX2" fmla="*/ 2264435 w 4690738"/>
+              <a:gd name="connsiteY2" fmla="*/ 842992 h 2074486"/>
+              <a:gd name="connsiteX3" fmla="*/ 4688735 w 4690738"/>
+              <a:gd name="connsiteY3" fmla="*/ 844799 h 2074486"/>
+              <a:gd name="connsiteX4" fmla="*/ 4690738 w 4690738"/>
+              <a:gd name="connsiteY4" fmla="*/ 1447289 h 2074486"/>
+              <a:gd name="connsiteX5" fmla="*/ 2606197 w 4690738"/>
+              <a:gd name="connsiteY5" fmla="*/ 1420816 h 2074486"/>
+              <a:gd name="connsiteX6" fmla="*/ 2610007 w 4690738"/>
+              <a:gd name="connsiteY6" fmla="*/ 1536962 h 2074486"/>
+              <a:gd name="connsiteX7" fmla="*/ 2288908 w 4690738"/>
+              <a:gd name="connsiteY7" fmla="*/ 1546584 h 2074486"/>
+              <a:gd name="connsiteX8" fmla="*/ 2270053 w 4690738"/>
+              <a:gd name="connsiteY8" fmla="*/ 2074486 h 2074486"/>
+              <a:gd name="connsiteX9" fmla="*/ 7620 w 4690738"/>
+              <a:gd name="connsiteY9" fmla="*/ 2074486 h 2074486"/>
+              <a:gd name="connsiteX10" fmla="*/ 0 w 4690738"/>
+              <a:gd name="connsiteY10" fmla="*/ 20855 h 2074486"/>
+              <a:gd name="connsiteX11" fmla="*/ 220823 w 4690738"/>
+              <a:gd name="connsiteY11" fmla="*/ 22663 h 2074486"/>
+              <a:gd name="connsiteX0" fmla="*/ 220783 w 4690738"/>
+              <a:gd name="connsiteY0" fmla="*/ 20857 h 2074486"/>
+              <a:gd name="connsiteX1" fmla="*/ 2266439 w 4690738"/>
+              <a:gd name="connsiteY1" fmla="*/ 0 h 2074486"/>
+              <a:gd name="connsiteX2" fmla="*/ 2264435 w 4690738"/>
+              <a:gd name="connsiteY2" fmla="*/ 842992 h 2074486"/>
+              <a:gd name="connsiteX3" fmla="*/ 4688735 w 4690738"/>
+              <a:gd name="connsiteY3" fmla="*/ 844799 h 2074486"/>
+              <a:gd name="connsiteX4" fmla="*/ 4690738 w 4690738"/>
+              <a:gd name="connsiteY4" fmla="*/ 1447289 h 2074486"/>
+              <a:gd name="connsiteX5" fmla="*/ 2606197 w 4690738"/>
+              <a:gd name="connsiteY5" fmla="*/ 1420816 h 2074486"/>
+              <a:gd name="connsiteX6" fmla="*/ 2610007 w 4690738"/>
+              <a:gd name="connsiteY6" fmla="*/ 1536962 h 2074486"/>
+              <a:gd name="connsiteX7" fmla="*/ 2273668 w 4690738"/>
+              <a:gd name="connsiteY7" fmla="*/ 1535154 h 2074486"/>
+              <a:gd name="connsiteX8" fmla="*/ 2270053 w 4690738"/>
+              <a:gd name="connsiteY8" fmla="*/ 2074486 h 2074486"/>
+              <a:gd name="connsiteX9" fmla="*/ 7620 w 4690738"/>
+              <a:gd name="connsiteY9" fmla="*/ 2074486 h 2074486"/>
+              <a:gd name="connsiteX10" fmla="*/ 0 w 4690738"/>
+              <a:gd name="connsiteY10" fmla="*/ 20855 h 2074486"/>
+              <a:gd name="connsiteX11" fmla="*/ 220823 w 4690738"/>
+              <a:gd name="connsiteY11" fmla="*/ 22663 h 2074486"/>
+              <a:gd name="connsiteX0" fmla="*/ 220783 w 4690738"/>
+              <a:gd name="connsiteY0" fmla="*/ 20857 h 2074486"/>
+              <a:gd name="connsiteX1" fmla="*/ 2266439 w 4690738"/>
+              <a:gd name="connsiteY1" fmla="*/ 0 h 2074486"/>
+              <a:gd name="connsiteX2" fmla="*/ 2275865 w 4690738"/>
+              <a:gd name="connsiteY2" fmla="*/ 911572 h 2074486"/>
+              <a:gd name="connsiteX3" fmla="*/ 4688735 w 4690738"/>
+              <a:gd name="connsiteY3" fmla="*/ 844799 h 2074486"/>
+              <a:gd name="connsiteX4" fmla="*/ 4690738 w 4690738"/>
+              <a:gd name="connsiteY4" fmla="*/ 1447289 h 2074486"/>
+              <a:gd name="connsiteX5" fmla="*/ 2606197 w 4690738"/>
+              <a:gd name="connsiteY5" fmla="*/ 1420816 h 2074486"/>
+              <a:gd name="connsiteX6" fmla="*/ 2610007 w 4690738"/>
+              <a:gd name="connsiteY6" fmla="*/ 1536962 h 2074486"/>
+              <a:gd name="connsiteX7" fmla="*/ 2273668 w 4690738"/>
+              <a:gd name="connsiteY7" fmla="*/ 1535154 h 2074486"/>
+              <a:gd name="connsiteX8" fmla="*/ 2270053 w 4690738"/>
+              <a:gd name="connsiteY8" fmla="*/ 2074486 h 2074486"/>
+              <a:gd name="connsiteX9" fmla="*/ 7620 w 4690738"/>
+              <a:gd name="connsiteY9" fmla="*/ 2074486 h 2074486"/>
+              <a:gd name="connsiteX10" fmla="*/ 0 w 4690738"/>
+              <a:gd name="connsiteY10" fmla="*/ 20855 h 2074486"/>
+              <a:gd name="connsiteX11" fmla="*/ 220823 w 4690738"/>
+              <a:gd name="connsiteY11" fmla="*/ 22663 h 2074486"/>
+              <a:gd name="connsiteX0" fmla="*/ 220783 w 4696400"/>
+              <a:gd name="connsiteY0" fmla="*/ 20857 h 2074486"/>
+              <a:gd name="connsiteX1" fmla="*/ 2266439 w 4696400"/>
+              <a:gd name="connsiteY1" fmla="*/ 0 h 2074486"/>
+              <a:gd name="connsiteX2" fmla="*/ 2275865 w 4696400"/>
+              <a:gd name="connsiteY2" fmla="*/ 911572 h 2074486"/>
+              <a:gd name="connsiteX3" fmla="*/ 4696355 w 4696400"/>
+              <a:gd name="connsiteY3" fmla="*/ 901949 h 2074486"/>
+              <a:gd name="connsiteX4" fmla="*/ 4690738 w 4696400"/>
+              <a:gd name="connsiteY4" fmla="*/ 1447289 h 2074486"/>
+              <a:gd name="connsiteX5" fmla="*/ 2606197 w 4696400"/>
+              <a:gd name="connsiteY5" fmla="*/ 1420816 h 2074486"/>
+              <a:gd name="connsiteX6" fmla="*/ 2610007 w 4696400"/>
+              <a:gd name="connsiteY6" fmla="*/ 1536962 h 2074486"/>
+              <a:gd name="connsiteX7" fmla="*/ 2273668 w 4696400"/>
+              <a:gd name="connsiteY7" fmla="*/ 1535154 h 2074486"/>
+              <a:gd name="connsiteX8" fmla="*/ 2270053 w 4696400"/>
+              <a:gd name="connsiteY8" fmla="*/ 2074486 h 2074486"/>
+              <a:gd name="connsiteX9" fmla="*/ 7620 w 4696400"/>
+              <a:gd name="connsiteY9" fmla="*/ 2074486 h 2074486"/>
+              <a:gd name="connsiteX10" fmla="*/ 0 w 4696400"/>
+              <a:gd name="connsiteY10" fmla="*/ 20855 h 2074486"/>
+              <a:gd name="connsiteX11" fmla="*/ 220823 w 4696400"/>
+              <a:gd name="connsiteY11" fmla="*/ 22663 h 2074486"/>
+            </a:gdLst>
+            <a:ahLst/>
+            <a:cxnLst>
+              <a:cxn ang="0">
+                <a:pos x="connsiteX0" y="connsiteY0"/>
+              </a:cxn>
+              <a:cxn ang="0">
+                <a:pos x="connsiteX1" y="connsiteY1"/>
+              </a:cxn>
+              <a:cxn ang="0">
+                <a:pos x="connsiteX2" y="connsiteY2"/>
+              </a:cxn>
+              <a:cxn ang="0">
+                <a:pos x="connsiteX3" y="connsiteY3"/>
+              </a:cxn>
+              <a:cxn ang="0">
+                <a:pos x="connsiteX4" y="connsiteY4"/>
+              </a:cxn>
+              <a:cxn ang="0">
+                <a:pos x="connsiteX5" y="connsiteY5"/>
+              </a:cxn>
+              <a:cxn ang="0">
+                <a:pos x="connsiteX6" y="connsiteY6"/>
+              </a:cxn>
+              <a:cxn ang="0">
+                <a:pos x="connsiteX7" y="connsiteY7"/>
+              </a:cxn>
+              <a:cxn ang="0">
+                <a:pos x="connsiteX8" y="connsiteY8"/>
+              </a:cxn>
+              <a:cxn ang="0">
+                <a:pos x="connsiteX9" y="connsiteY9"/>
+              </a:cxn>
+              <a:cxn ang="0">
+                <a:pos x="connsiteX10" y="connsiteY10"/>
+              </a:cxn>
+              <a:cxn ang="0">
+                <a:pos x="connsiteX11" y="connsiteY11"/>
+              </a:cxn>
+            </a:cxnLst>
+            <a:rect l="l" t="t" r="r" b="b"/>
+            <a:pathLst>
+              <a:path w="4696400" h="2074486">
+                <a:moveTo>
+                  <a:pt x="220783" y="20857"/>
+                </a:moveTo>
+                <a:lnTo>
+                  <a:pt x="2266439" y="0"/>
+                </a:lnTo>
+                <a:lnTo>
+                  <a:pt x="2275865" y="911572"/>
+                </a:lnTo>
+                <a:lnTo>
+                  <a:pt x="4696355" y="901949"/>
+                </a:lnTo>
+                <a:cubicBezTo>
+                  <a:pt x="4697023" y="1102779"/>
+                  <a:pt x="4690070" y="1246459"/>
+                  <a:pt x="4690738" y="1447289"/>
+                </a:cubicBezTo>
+                <a:lnTo>
+                  <a:pt x="2606197" y="1420816"/>
+                </a:lnTo>
+                <a:lnTo>
+                  <a:pt x="2610007" y="1536962"/>
+                </a:lnTo>
+                <a:lnTo>
+                  <a:pt x="2273668" y="1535154"/>
+                </a:lnTo>
+                <a:lnTo>
+                  <a:pt x="2270053" y="2074486"/>
+                </a:lnTo>
+                <a:lnTo>
+                  <a:pt x="7620" y="2074486"/>
+                </a:lnTo>
+                <a:lnTo>
+                  <a:pt x="0" y="20855"/>
+                </a:lnTo>
+                <a:lnTo>
+                  <a:pt x="220823" y="22663"/>
+                </a:lnTo>
+              </a:path>
+            </a:pathLst>
+          </a:custGeom>
+          <a:noFill/>
+          <a:ln w="19050">
+            <a:solidFill>
+              <a:schemeClr val="accent2">
+                <a:lumMod val="75000"/>
+              </a:schemeClr>
+            </a:solidFill>
+          </a:ln>
+        </p:spPr>
+        <p:style>
+          <a:lnRef idx="2">
+            <a:schemeClr val="accent1">
+              <a:shade val="50000"/>
+            </a:schemeClr>
+          </a:lnRef>
+          <a:fillRef idx="1">
+            <a:schemeClr val="accent1"/>
+          </a:fillRef>
+          <a:effectRef idx="0">
+            <a:schemeClr val="accent1"/>
+          </a:effectRef>
+          <a:fontRef idx="minor">
+            <a:schemeClr val="lt1"/>
+          </a:fontRef>
+        </p:style>
+        <p:txBody>
+          <a:bodyPr rtlCol="0" anchor="ctr"/>
+          <a:lstStyle/>
+          <a:p>
+            <a:pPr algn="ctr"/>
+            <a:endParaRPr lang="fr-FR"/>
+          </a:p>
+        </p:txBody>
+      </p:sp>
+      <p:sp>
+        <p:nvSpPr>
+          <p:cNvPr id="39" name="Forme libre 38"/>
+          <p:cNvSpPr/>
+          <p:nvPr/>
+        </p:nvSpPr>
+        <p:spPr>
+          <a:xfrm>
+            <a:off x="4338137" y="3704734"/>
+            <a:ext cx="4683315" cy="1404594"/>
+          </a:xfrm>
+          <a:custGeom>
+            <a:avLst/>
+            <a:gdLst>
+              <a:gd name="connsiteX0" fmla="*/ 0 w 4675695"/>
+              <a:gd name="connsiteY0" fmla="*/ 688157 h 1404594"/>
+              <a:gd name="connsiteX1" fmla="*/ 2309567 w 4675695"/>
+              <a:gd name="connsiteY1" fmla="*/ 707010 h 1404594"/>
+              <a:gd name="connsiteX2" fmla="*/ 2318994 w 4675695"/>
+              <a:gd name="connsiteY2" fmla="*/ 179109 h 1404594"/>
+              <a:gd name="connsiteX3" fmla="*/ 2564090 w 4675695"/>
+              <a:gd name="connsiteY3" fmla="*/ 188536 h 1404594"/>
+              <a:gd name="connsiteX4" fmla="*/ 2601798 w 4675695"/>
+              <a:gd name="connsiteY4" fmla="*/ 188536 h 1404594"/>
+              <a:gd name="connsiteX5" fmla="*/ 2592371 w 4675695"/>
+              <a:gd name="connsiteY5" fmla="*/ 0 h 1404594"/>
+              <a:gd name="connsiteX6" fmla="*/ 4675695 w 4675695"/>
+              <a:gd name="connsiteY6" fmla="*/ 18854 h 1404594"/>
+              <a:gd name="connsiteX7" fmla="*/ 4675695 w 4675695"/>
+              <a:gd name="connsiteY7" fmla="*/ 1404594 h 1404594"/>
+              <a:gd name="connsiteX8" fmla="*/ 2300140 w 4675695"/>
+              <a:gd name="connsiteY8" fmla="*/ 1385740 h 1404594"/>
+              <a:gd name="connsiteX9" fmla="*/ 2318994 w 4675695"/>
+              <a:gd name="connsiteY9" fmla="*/ 1319753 h 1404594"/>
+              <a:gd name="connsiteX10" fmla="*/ 37707 w 4675695"/>
+              <a:gd name="connsiteY10" fmla="*/ 1338606 h 1404594"/>
+              <a:gd name="connsiteX11" fmla="*/ 0 w 4675695"/>
+              <a:gd name="connsiteY11" fmla="*/ 688157 h 1404594"/>
+              <a:gd name="connsiteX0" fmla="*/ 0 w 4675695"/>
+              <a:gd name="connsiteY0" fmla="*/ 688157 h 1404594"/>
+              <a:gd name="connsiteX1" fmla="*/ 2309567 w 4675695"/>
+              <a:gd name="connsiteY1" fmla="*/ 707010 h 1404594"/>
+              <a:gd name="connsiteX2" fmla="*/ 2318994 w 4675695"/>
+              <a:gd name="connsiteY2" fmla="*/ 179109 h 1404594"/>
+              <a:gd name="connsiteX3" fmla="*/ 2564090 w 4675695"/>
+              <a:gd name="connsiteY3" fmla="*/ 188536 h 1404594"/>
+              <a:gd name="connsiteX4" fmla="*/ 2601798 w 4675695"/>
+              <a:gd name="connsiteY4" fmla="*/ 188536 h 1404594"/>
+              <a:gd name="connsiteX5" fmla="*/ 2592371 w 4675695"/>
+              <a:gd name="connsiteY5" fmla="*/ 0 h 1404594"/>
+              <a:gd name="connsiteX6" fmla="*/ 4675695 w 4675695"/>
+              <a:gd name="connsiteY6" fmla="*/ 18854 h 1404594"/>
+              <a:gd name="connsiteX7" fmla="*/ 4675695 w 4675695"/>
+              <a:gd name="connsiteY7" fmla="*/ 1404594 h 1404594"/>
+              <a:gd name="connsiteX8" fmla="*/ 2300140 w 4675695"/>
+              <a:gd name="connsiteY8" fmla="*/ 1385740 h 1404594"/>
+              <a:gd name="connsiteX9" fmla="*/ 2318994 w 4675695"/>
+              <a:gd name="connsiteY9" fmla="*/ 1319753 h 1404594"/>
+              <a:gd name="connsiteX10" fmla="*/ 0 w 4675695"/>
+              <a:gd name="connsiteY10" fmla="*/ 1348033 h 1404594"/>
+              <a:gd name="connsiteX11" fmla="*/ 0 w 4675695"/>
+              <a:gd name="connsiteY11" fmla="*/ 688157 h 1404594"/>
+              <a:gd name="connsiteX0" fmla="*/ 0 w 4675695"/>
+              <a:gd name="connsiteY0" fmla="*/ 688157 h 1404594"/>
+              <a:gd name="connsiteX1" fmla="*/ 2309567 w 4675695"/>
+              <a:gd name="connsiteY1" fmla="*/ 707010 h 1404594"/>
+              <a:gd name="connsiteX2" fmla="*/ 2318994 w 4675695"/>
+              <a:gd name="connsiteY2" fmla="*/ 179109 h 1404594"/>
+              <a:gd name="connsiteX3" fmla="*/ 2564090 w 4675695"/>
+              <a:gd name="connsiteY3" fmla="*/ 188536 h 1404594"/>
+              <a:gd name="connsiteX4" fmla="*/ 2601798 w 4675695"/>
+              <a:gd name="connsiteY4" fmla="*/ 188536 h 1404594"/>
+              <a:gd name="connsiteX5" fmla="*/ 2592371 w 4675695"/>
+              <a:gd name="connsiteY5" fmla="*/ 0 h 1404594"/>
+              <a:gd name="connsiteX6" fmla="*/ 4675695 w 4675695"/>
+              <a:gd name="connsiteY6" fmla="*/ 18854 h 1404594"/>
+              <a:gd name="connsiteX7" fmla="*/ 4675695 w 4675695"/>
+              <a:gd name="connsiteY7" fmla="*/ 1404594 h 1404594"/>
+              <a:gd name="connsiteX8" fmla="*/ 2300140 w 4675695"/>
+              <a:gd name="connsiteY8" fmla="*/ 1385740 h 1404594"/>
+              <a:gd name="connsiteX9" fmla="*/ 2290714 w 4675695"/>
+              <a:gd name="connsiteY9" fmla="*/ 1329180 h 1404594"/>
+              <a:gd name="connsiteX10" fmla="*/ 0 w 4675695"/>
+              <a:gd name="connsiteY10" fmla="*/ 1348033 h 1404594"/>
+              <a:gd name="connsiteX11" fmla="*/ 0 w 4675695"/>
+              <a:gd name="connsiteY11" fmla="*/ 688157 h 1404594"/>
+              <a:gd name="connsiteX0" fmla="*/ 0 w 4675695"/>
+              <a:gd name="connsiteY0" fmla="*/ 688157 h 1404594"/>
+              <a:gd name="connsiteX1" fmla="*/ 2309567 w 4675695"/>
+              <a:gd name="connsiteY1" fmla="*/ 707010 h 1404594"/>
+              <a:gd name="connsiteX2" fmla="*/ 2318994 w 4675695"/>
+              <a:gd name="connsiteY2" fmla="*/ 197963 h 1404594"/>
+              <a:gd name="connsiteX3" fmla="*/ 2564090 w 4675695"/>
+              <a:gd name="connsiteY3" fmla="*/ 188536 h 1404594"/>
+              <a:gd name="connsiteX4" fmla="*/ 2601798 w 4675695"/>
+              <a:gd name="connsiteY4" fmla="*/ 188536 h 1404594"/>
+              <a:gd name="connsiteX5" fmla="*/ 2592371 w 4675695"/>
+              <a:gd name="connsiteY5" fmla="*/ 0 h 1404594"/>
+              <a:gd name="connsiteX6" fmla="*/ 4675695 w 4675695"/>
+              <a:gd name="connsiteY6" fmla="*/ 18854 h 1404594"/>
+              <a:gd name="connsiteX7" fmla="*/ 4675695 w 4675695"/>
+              <a:gd name="connsiteY7" fmla="*/ 1404594 h 1404594"/>
+              <a:gd name="connsiteX8" fmla="*/ 2300140 w 4675695"/>
+              <a:gd name="connsiteY8" fmla="*/ 1385740 h 1404594"/>
+              <a:gd name="connsiteX9" fmla="*/ 2290714 w 4675695"/>
+              <a:gd name="connsiteY9" fmla="*/ 1329180 h 1404594"/>
+              <a:gd name="connsiteX10" fmla="*/ 0 w 4675695"/>
+              <a:gd name="connsiteY10" fmla="*/ 1348033 h 1404594"/>
+              <a:gd name="connsiteX11" fmla="*/ 0 w 4675695"/>
+              <a:gd name="connsiteY11" fmla="*/ 688157 h 1404594"/>
+              <a:gd name="connsiteX0" fmla="*/ 0 w 4675695"/>
+              <a:gd name="connsiteY0" fmla="*/ 688157 h 1404594"/>
+              <a:gd name="connsiteX1" fmla="*/ 2309567 w 4675695"/>
+              <a:gd name="connsiteY1" fmla="*/ 707010 h 1404594"/>
+              <a:gd name="connsiteX2" fmla="*/ 2318994 w 4675695"/>
+              <a:gd name="connsiteY2" fmla="*/ 197963 h 1404594"/>
+              <a:gd name="connsiteX3" fmla="*/ 2564090 w 4675695"/>
+              <a:gd name="connsiteY3" fmla="*/ 188536 h 1404594"/>
+              <a:gd name="connsiteX4" fmla="*/ 2592372 w 4675695"/>
+              <a:gd name="connsiteY4" fmla="*/ 207390 h 1404594"/>
+              <a:gd name="connsiteX5" fmla="*/ 2592371 w 4675695"/>
+              <a:gd name="connsiteY5" fmla="*/ 0 h 1404594"/>
+              <a:gd name="connsiteX6" fmla="*/ 4675695 w 4675695"/>
+              <a:gd name="connsiteY6" fmla="*/ 18854 h 1404594"/>
+              <a:gd name="connsiteX7" fmla="*/ 4675695 w 4675695"/>
+              <a:gd name="connsiteY7" fmla="*/ 1404594 h 1404594"/>
+              <a:gd name="connsiteX8" fmla="*/ 2300140 w 4675695"/>
+              <a:gd name="connsiteY8" fmla="*/ 1385740 h 1404594"/>
+              <a:gd name="connsiteX9" fmla="*/ 2290714 w 4675695"/>
+              <a:gd name="connsiteY9" fmla="*/ 1329180 h 1404594"/>
+              <a:gd name="connsiteX10" fmla="*/ 0 w 4675695"/>
+              <a:gd name="connsiteY10" fmla="*/ 1348033 h 1404594"/>
+              <a:gd name="connsiteX11" fmla="*/ 0 w 4675695"/>
+              <a:gd name="connsiteY11" fmla="*/ 688157 h 1404594"/>
+              <a:gd name="connsiteX0" fmla="*/ 0 w 4675695"/>
+              <a:gd name="connsiteY0" fmla="*/ 688157 h 1404594"/>
+              <a:gd name="connsiteX1" fmla="*/ 2309567 w 4675695"/>
+              <a:gd name="connsiteY1" fmla="*/ 707010 h 1404594"/>
+              <a:gd name="connsiteX2" fmla="*/ 2318994 w 4675695"/>
+              <a:gd name="connsiteY2" fmla="*/ 197963 h 1404594"/>
+              <a:gd name="connsiteX3" fmla="*/ 2564090 w 4675695"/>
+              <a:gd name="connsiteY3" fmla="*/ 188536 h 1404594"/>
+              <a:gd name="connsiteX4" fmla="*/ 2696067 w 4675695"/>
+              <a:gd name="connsiteY4" fmla="*/ 339365 h 1404594"/>
+              <a:gd name="connsiteX5" fmla="*/ 2592371 w 4675695"/>
+              <a:gd name="connsiteY5" fmla="*/ 0 h 1404594"/>
+              <a:gd name="connsiteX6" fmla="*/ 4675695 w 4675695"/>
+              <a:gd name="connsiteY6" fmla="*/ 18854 h 1404594"/>
+              <a:gd name="connsiteX7" fmla="*/ 4675695 w 4675695"/>
+              <a:gd name="connsiteY7" fmla="*/ 1404594 h 1404594"/>
+              <a:gd name="connsiteX8" fmla="*/ 2300140 w 4675695"/>
+              <a:gd name="connsiteY8" fmla="*/ 1385740 h 1404594"/>
+              <a:gd name="connsiteX9" fmla="*/ 2290714 w 4675695"/>
+              <a:gd name="connsiteY9" fmla="*/ 1329180 h 1404594"/>
+              <a:gd name="connsiteX10" fmla="*/ 0 w 4675695"/>
+              <a:gd name="connsiteY10" fmla="*/ 1348033 h 1404594"/>
+              <a:gd name="connsiteX11" fmla="*/ 0 w 4675695"/>
+              <a:gd name="connsiteY11" fmla="*/ 688157 h 1404594"/>
+              <a:gd name="connsiteX0" fmla="*/ 0 w 4675695"/>
+              <a:gd name="connsiteY0" fmla="*/ 688157 h 1404594"/>
+              <a:gd name="connsiteX1" fmla="*/ 2309567 w 4675695"/>
+              <a:gd name="connsiteY1" fmla="*/ 707010 h 1404594"/>
+              <a:gd name="connsiteX2" fmla="*/ 2318994 w 4675695"/>
+              <a:gd name="connsiteY2" fmla="*/ 197963 h 1404594"/>
+              <a:gd name="connsiteX3" fmla="*/ 2403835 w 4675695"/>
+              <a:gd name="connsiteY3" fmla="*/ 197963 h 1404594"/>
+              <a:gd name="connsiteX4" fmla="*/ 2696067 w 4675695"/>
+              <a:gd name="connsiteY4" fmla="*/ 339365 h 1404594"/>
+              <a:gd name="connsiteX5" fmla="*/ 2592371 w 4675695"/>
+              <a:gd name="connsiteY5" fmla="*/ 0 h 1404594"/>
+              <a:gd name="connsiteX6" fmla="*/ 4675695 w 4675695"/>
+              <a:gd name="connsiteY6" fmla="*/ 18854 h 1404594"/>
+              <a:gd name="connsiteX7" fmla="*/ 4675695 w 4675695"/>
+              <a:gd name="connsiteY7" fmla="*/ 1404594 h 1404594"/>
+              <a:gd name="connsiteX8" fmla="*/ 2300140 w 4675695"/>
+              <a:gd name="connsiteY8" fmla="*/ 1385740 h 1404594"/>
+              <a:gd name="connsiteX9" fmla="*/ 2290714 w 4675695"/>
+              <a:gd name="connsiteY9" fmla="*/ 1329180 h 1404594"/>
+              <a:gd name="connsiteX10" fmla="*/ 0 w 4675695"/>
+              <a:gd name="connsiteY10" fmla="*/ 1348033 h 1404594"/>
+              <a:gd name="connsiteX11" fmla="*/ 0 w 4675695"/>
+              <a:gd name="connsiteY11" fmla="*/ 688157 h 1404594"/>
+              <a:gd name="connsiteX0" fmla="*/ 0 w 4675695"/>
+              <a:gd name="connsiteY0" fmla="*/ 688157 h 1404594"/>
+              <a:gd name="connsiteX1" fmla="*/ 2309567 w 4675695"/>
+              <a:gd name="connsiteY1" fmla="*/ 707010 h 1404594"/>
+              <a:gd name="connsiteX2" fmla="*/ 2318994 w 4675695"/>
+              <a:gd name="connsiteY2" fmla="*/ 197963 h 1404594"/>
+              <a:gd name="connsiteX3" fmla="*/ 2403835 w 4675695"/>
+              <a:gd name="connsiteY3" fmla="*/ 197963 h 1404594"/>
+              <a:gd name="connsiteX4" fmla="*/ 2582946 w 4675695"/>
+              <a:gd name="connsiteY4" fmla="*/ 226243 h 1404594"/>
+              <a:gd name="connsiteX5" fmla="*/ 2592371 w 4675695"/>
+              <a:gd name="connsiteY5" fmla="*/ 0 h 1404594"/>
+              <a:gd name="connsiteX6" fmla="*/ 4675695 w 4675695"/>
+              <a:gd name="connsiteY6" fmla="*/ 18854 h 1404594"/>
+              <a:gd name="connsiteX7" fmla="*/ 4675695 w 4675695"/>
+              <a:gd name="connsiteY7" fmla="*/ 1404594 h 1404594"/>
+              <a:gd name="connsiteX8" fmla="*/ 2300140 w 4675695"/>
+              <a:gd name="connsiteY8" fmla="*/ 1385740 h 1404594"/>
+              <a:gd name="connsiteX9" fmla="*/ 2290714 w 4675695"/>
+              <a:gd name="connsiteY9" fmla="*/ 1329180 h 1404594"/>
+              <a:gd name="connsiteX10" fmla="*/ 0 w 4675695"/>
+              <a:gd name="connsiteY10" fmla="*/ 1348033 h 1404594"/>
+              <a:gd name="connsiteX11" fmla="*/ 0 w 4675695"/>
+              <a:gd name="connsiteY11" fmla="*/ 688157 h 1404594"/>
+              <a:gd name="connsiteX0" fmla="*/ 0 w 4675695"/>
+              <a:gd name="connsiteY0" fmla="*/ 688157 h 1404594"/>
+              <a:gd name="connsiteX1" fmla="*/ 2309567 w 4675695"/>
+              <a:gd name="connsiteY1" fmla="*/ 707010 h 1404594"/>
+              <a:gd name="connsiteX2" fmla="*/ 2318994 w 4675695"/>
+              <a:gd name="connsiteY2" fmla="*/ 197963 h 1404594"/>
+              <a:gd name="connsiteX3" fmla="*/ 2403835 w 4675695"/>
+              <a:gd name="connsiteY3" fmla="*/ 197963 h 1404594"/>
+              <a:gd name="connsiteX4" fmla="*/ 2592373 w 4675695"/>
+              <a:gd name="connsiteY4" fmla="*/ 216817 h 1404594"/>
+              <a:gd name="connsiteX5" fmla="*/ 2592371 w 4675695"/>
+              <a:gd name="connsiteY5" fmla="*/ 0 h 1404594"/>
+              <a:gd name="connsiteX6" fmla="*/ 4675695 w 4675695"/>
+              <a:gd name="connsiteY6" fmla="*/ 18854 h 1404594"/>
+              <a:gd name="connsiteX7" fmla="*/ 4675695 w 4675695"/>
+              <a:gd name="connsiteY7" fmla="*/ 1404594 h 1404594"/>
+              <a:gd name="connsiteX8" fmla="*/ 2300140 w 4675695"/>
+              <a:gd name="connsiteY8" fmla="*/ 1385740 h 1404594"/>
+              <a:gd name="connsiteX9" fmla="*/ 2290714 w 4675695"/>
+              <a:gd name="connsiteY9" fmla="*/ 1329180 h 1404594"/>
+              <a:gd name="connsiteX10" fmla="*/ 0 w 4675695"/>
+              <a:gd name="connsiteY10" fmla="*/ 1348033 h 1404594"/>
+              <a:gd name="connsiteX11" fmla="*/ 0 w 4675695"/>
+              <a:gd name="connsiteY11" fmla="*/ 688157 h 1404594"/>
+              <a:gd name="connsiteX0" fmla="*/ 0 w 4675695"/>
+              <a:gd name="connsiteY0" fmla="*/ 688157 h 1404594"/>
+              <a:gd name="connsiteX1" fmla="*/ 2309567 w 4675695"/>
+              <a:gd name="connsiteY1" fmla="*/ 707010 h 1404594"/>
+              <a:gd name="connsiteX2" fmla="*/ 2318994 w 4675695"/>
+              <a:gd name="connsiteY2" fmla="*/ 197963 h 1404594"/>
+              <a:gd name="connsiteX3" fmla="*/ 2403835 w 4675695"/>
+              <a:gd name="connsiteY3" fmla="*/ 197963 h 1404594"/>
+              <a:gd name="connsiteX4" fmla="*/ 2592373 w 4675695"/>
+              <a:gd name="connsiteY4" fmla="*/ 125377 h 1404594"/>
+              <a:gd name="connsiteX5" fmla="*/ 2592371 w 4675695"/>
+              <a:gd name="connsiteY5" fmla="*/ 0 h 1404594"/>
+              <a:gd name="connsiteX6" fmla="*/ 4675695 w 4675695"/>
+              <a:gd name="connsiteY6" fmla="*/ 18854 h 1404594"/>
+              <a:gd name="connsiteX7" fmla="*/ 4675695 w 4675695"/>
+              <a:gd name="connsiteY7" fmla="*/ 1404594 h 1404594"/>
+              <a:gd name="connsiteX8" fmla="*/ 2300140 w 4675695"/>
+              <a:gd name="connsiteY8" fmla="*/ 1385740 h 1404594"/>
+              <a:gd name="connsiteX9" fmla="*/ 2290714 w 4675695"/>
+              <a:gd name="connsiteY9" fmla="*/ 1329180 h 1404594"/>
+              <a:gd name="connsiteX10" fmla="*/ 0 w 4675695"/>
+              <a:gd name="connsiteY10" fmla="*/ 1348033 h 1404594"/>
+              <a:gd name="connsiteX11" fmla="*/ 0 w 4675695"/>
+              <a:gd name="connsiteY11" fmla="*/ 688157 h 1404594"/>
+              <a:gd name="connsiteX0" fmla="*/ 0 w 4675695"/>
+              <a:gd name="connsiteY0" fmla="*/ 688157 h 1404594"/>
+              <a:gd name="connsiteX1" fmla="*/ 2309567 w 4675695"/>
+              <a:gd name="connsiteY1" fmla="*/ 707010 h 1404594"/>
+              <a:gd name="connsiteX2" fmla="*/ 2318994 w 4675695"/>
+              <a:gd name="connsiteY2" fmla="*/ 197963 h 1404594"/>
+              <a:gd name="connsiteX3" fmla="*/ 2403835 w 4675695"/>
+              <a:gd name="connsiteY3" fmla="*/ 117953 h 1404594"/>
+              <a:gd name="connsiteX4" fmla="*/ 2592373 w 4675695"/>
+              <a:gd name="connsiteY4" fmla="*/ 125377 h 1404594"/>
+              <a:gd name="connsiteX5" fmla="*/ 2592371 w 4675695"/>
+              <a:gd name="connsiteY5" fmla="*/ 0 h 1404594"/>
+              <a:gd name="connsiteX6" fmla="*/ 4675695 w 4675695"/>
+              <a:gd name="connsiteY6" fmla="*/ 18854 h 1404594"/>
+              <a:gd name="connsiteX7" fmla="*/ 4675695 w 4675695"/>
+              <a:gd name="connsiteY7" fmla="*/ 1404594 h 1404594"/>
+              <a:gd name="connsiteX8" fmla="*/ 2300140 w 4675695"/>
+              <a:gd name="connsiteY8" fmla="*/ 1385740 h 1404594"/>
+              <a:gd name="connsiteX9" fmla="*/ 2290714 w 4675695"/>
+              <a:gd name="connsiteY9" fmla="*/ 1329180 h 1404594"/>
+              <a:gd name="connsiteX10" fmla="*/ 0 w 4675695"/>
+              <a:gd name="connsiteY10" fmla="*/ 1348033 h 1404594"/>
+              <a:gd name="connsiteX11" fmla="*/ 0 w 4675695"/>
+              <a:gd name="connsiteY11" fmla="*/ 688157 h 1404594"/>
+              <a:gd name="connsiteX0" fmla="*/ 0 w 4675695"/>
+              <a:gd name="connsiteY0" fmla="*/ 688157 h 1404594"/>
+              <a:gd name="connsiteX1" fmla="*/ 2309567 w 4675695"/>
+              <a:gd name="connsiteY1" fmla="*/ 707010 h 1404594"/>
+              <a:gd name="connsiteX2" fmla="*/ 2261844 w 4675695"/>
+              <a:gd name="connsiteY2" fmla="*/ 117953 h 1404594"/>
+              <a:gd name="connsiteX3" fmla="*/ 2403835 w 4675695"/>
+              <a:gd name="connsiteY3" fmla="*/ 117953 h 1404594"/>
+              <a:gd name="connsiteX4" fmla="*/ 2592373 w 4675695"/>
+              <a:gd name="connsiteY4" fmla="*/ 125377 h 1404594"/>
+              <a:gd name="connsiteX5" fmla="*/ 2592371 w 4675695"/>
+              <a:gd name="connsiteY5" fmla="*/ 0 h 1404594"/>
+              <a:gd name="connsiteX6" fmla="*/ 4675695 w 4675695"/>
+              <a:gd name="connsiteY6" fmla="*/ 18854 h 1404594"/>
+              <a:gd name="connsiteX7" fmla="*/ 4675695 w 4675695"/>
+              <a:gd name="connsiteY7" fmla="*/ 1404594 h 1404594"/>
+              <a:gd name="connsiteX8" fmla="*/ 2300140 w 4675695"/>
+              <a:gd name="connsiteY8" fmla="*/ 1385740 h 1404594"/>
+              <a:gd name="connsiteX9" fmla="*/ 2290714 w 4675695"/>
+              <a:gd name="connsiteY9" fmla="*/ 1329180 h 1404594"/>
+              <a:gd name="connsiteX10" fmla="*/ 0 w 4675695"/>
+              <a:gd name="connsiteY10" fmla="*/ 1348033 h 1404594"/>
+              <a:gd name="connsiteX11" fmla="*/ 0 w 4675695"/>
+              <a:gd name="connsiteY11" fmla="*/ 688157 h 1404594"/>
+              <a:gd name="connsiteX0" fmla="*/ 0 w 4675695"/>
+              <a:gd name="connsiteY0" fmla="*/ 688157 h 1404594"/>
+              <a:gd name="connsiteX1" fmla="*/ 2252417 w 4675695"/>
+              <a:gd name="connsiteY1" fmla="*/ 657480 h 1404594"/>
+              <a:gd name="connsiteX2" fmla="*/ 2261844 w 4675695"/>
+              <a:gd name="connsiteY2" fmla="*/ 117953 h 1404594"/>
+              <a:gd name="connsiteX3" fmla="*/ 2403835 w 4675695"/>
+              <a:gd name="connsiteY3" fmla="*/ 117953 h 1404594"/>
+              <a:gd name="connsiteX4" fmla="*/ 2592373 w 4675695"/>
+              <a:gd name="connsiteY4" fmla="*/ 125377 h 1404594"/>
+              <a:gd name="connsiteX5" fmla="*/ 2592371 w 4675695"/>
+              <a:gd name="connsiteY5" fmla="*/ 0 h 1404594"/>
+              <a:gd name="connsiteX6" fmla="*/ 4675695 w 4675695"/>
+              <a:gd name="connsiteY6" fmla="*/ 18854 h 1404594"/>
+              <a:gd name="connsiteX7" fmla="*/ 4675695 w 4675695"/>
+              <a:gd name="connsiteY7" fmla="*/ 1404594 h 1404594"/>
+              <a:gd name="connsiteX8" fmla="*/ 2300140 w 4675695"/>
+              <a:gd name="connsiteY8" fmla="*/ 1385740 h 1404594"/>
+              <a:gd name="connsiteX9" fmla="*/ 2290714 w 4675695"/>
+              <a:gd name="connsiteY9" fmla="*/ 1329180 h 1404594"/>
+              <a:gd name="connsiteX10" fmla="*/ 0 w 4675695"/>
+              <a:gd name="connsiteY10" fmla="*/ 1348033 h 1404594"/>
+              <a:gd name="connsiteX11" fmla="*/ 0 w 4675695"/>
+              <a:gd name="connsiteY11" fmla="*/ 688157 h 1404594"/>
+              <a:gd name="connsiteX0" fmla="*/ 0 w 4683315"/>
+              <a:gd name="connsiteY0" fmla="*/ 653867 h 1404594"/>
+              <a:gd name="connsiteX1" fmla="*/ 2260037 w 4683315"/>
+              <a:gd name="connsiteY1" fmla="*/ 657480 h 1404594"/>
+              <a:gd name="connsiteX2" fmla="*/ 2269464 w 4683315"/>
+              <a:gd name="connsiteY2" fmla="*/ 117953 h 1404594"/>
+              <a:gd name="connsiteX3" fmla="*/ 2411455 w 4683315"/>
+              <a:gd name="connsiteY3" fmla="*/ 117953 h 1404594"/>
+              <a:gd name="connsiteX4" fmla="*/ 2599993 w 4683315"/>
+              <a:gd name="connsiteY4" fmla="*/ 125377 h 1404594"/>
+              <a:gd name="connsiteX5" fmla="*/ 2599991 w 4683315"/>
+              <a:gd name="connsiteY5" fmla="*/ 0 h 1404594"/>
+              <a:gd name="connsiteX6" fmla="*/ 4683315 w 4683315"/>
+              <a:gd name="connsiteY6" fmla="*/ 18854 h 1404594"/>
+              <a:gd name="connsiteX7" fmla="*/ 4683315 w 4683315"/>
+              <a:gd name="connsiteY7" fmla="*/ 1404594 h 1404594"/>
+              <a:gd name="connsiteX8" fmla="*/ 2307760 w 4683315"/>
+              <a:gd name="connsiteY8" fmla="*/ 1385740 h 1404594"/>
+              <a:gd name="connsiteX9" fmla="*/ 2298334 w 4683315"/>
+              <a:gd name="connsiteY9" fmla="*/ 1329180 h 1404594"/>
+              <a:gd name="connsiteX10" fmla="*/ 7620 w 4683315"/>
+              <a:gd name="connsiteY10" fmla="*/ 1348033 h 1404594"/>
+              <a:gd name="connsiteX11" fmla="*/ 0 w 4683315"/>
+              <a:gd name="connsiteY11" fmla="*/ 653867 h 1404594"/>
+              <a:gd name="connsiteX0" fmla="*/ 0 w 4683315"/>
+              <a:gd name="connsiteY0" fmla="*/ 653867 h 1404594"/>
+              <a:gd name="connsiteX1" fmla="*/ 2260037 w 4683315"/>
+              <a:gd name="connsiteY1" fmla="*/ 657480 h 1404594"/>
+              <a:gd name="connsiteX2" fmla="*/ 2269464 w 4683315"/>
+              <a:gd name="connsiteY2" fmla="*/ 117953 h 1404594"/>
+              <a:gd name="connsiteX3" fmla="*/ 2411455 w 4683315"/>
+              <a:gd name="connsiteY3" fmla="*/ 117953 h 1404594"/>
+              <a:gd name="connsiteX4" fmla="*/ 2599993 w 4683315"/>
+              <a:gd name="connsiteY4" fmla="*/ 125377 h 1404594"/>
+              <a:gd name="connsiteX5" fmla="*/ 2599991 w 4683315"/>
+              <a:gd name="connsiteY5" fmla="*/ 0 h 1404594"/>
+              <a:gd name="connsiteX6" fmla="*/ 4683315 w 4683315"/>
+              <a:gd name="connsiteY6" fmla="*/ 18854 h 1404594"/>
+              <a:gd name="connsiteX7" fmla="*/ 4683315 w 4683315"/>
+              <a:gd name="connsiteY7" fmla="*/ 1404594 h 1404594"/>
+              <a:gd name="connsiteX8" fmla="*/ 2307760 w 4683315"/>
+              <a:gd name="connsiteY8" fmla="*/ 1385740 h 1404594"/>
+              <a:gd name="connsiteX9" fmla="*/ 2298334 w 4683315"/>
+              <a:gd name="connsiteY9" fmla="*/ 1329180 h 1404594"/>
+              <a:gd name="connsiteX10" fmla="*/ 3810 w 4683315"/>
+              <a:gd name="connsiteY10" fmla="*/ 1386133 h 1404594"/>
+              <a:gd name="connsiteX11" fmla="*/ 0 w 4683315"/>
+              <a:gd name="connsiteY11" fmla="*/ 653867 h 1404594"/>
+              <a:gd name="connsiteX0" fmla="*/ 0 w 4683315"/>
+              <a:gd name="connsiteY0" fmla="*/ 653867 h 1404594"/>
+              <a:gd name="connsiteX1" fmla="*/ 2260037 w 4683315"/>
+              <a:gd name="connsiteY1" fmla="*/ 657480 h 1404594"/>
+              <a:gd name="connsiteX2" fmla="*/ 2269464 w 4683315"/>
+              <a:gd name="connsiteY2" fmla="*/ 117953 h 1404594"/>
+              <a:gd name="connsiteX3" fmla="*/ 2411455 w 4683315"/>
+              <a:gd name="connsiteY3" fmla="*/ 117953 h 1404594"/>
+              <a:gd name="connsiteX4" fmla="*/ 2599993 w 4683315"/>
+              <a:gd name="connsiteY4" fmla="*/ 125377 h 1404594"/>
+              <a:gd name="connsiteX5" fmla="*/ 2599991 w 4683315"/>
+              <a:gd name="connsiteY5" fmla="*/ 0 h 1404594"/>
+              <a:gd name="connsiteX6" fmla="*/ 4683315 w 4683315"/>
+              <a:gd name="connsiteY6" fmla="*/ 18854 h 1404594"/>
+              <a:gd name="connsiteX7" fmla="*/ 4683315 w 4683315"/>
+              <a:gd name="connsiteY7" fmla="*/ 1404594 h 1404594"/>
+              <a:gd name="connsiteX8" fmla="*/ 2307760 w 4683315"/>
+              <a:gd name="connsiteY8" fmla="*/ 1385740 h 1404594"/>
+              <a:gd name="connsiteX9" fmla="*/ 2305954 w 4683315"/>
+              <a:gd name="connsiteY9" fmla="*/ 1386330 h 1404594"/>
+              <a:gd name="connsiteX10" fmla="*/ 3810 w 4683315"/>
+              <a:gd name="connsiteY10" fmla="*/ 1386133 h 1404594"/>
+              <a:gd name="connsiteX11" fmla="*/ 0 w 4683315"/>
+              <a:gd name="connsiteY11" fmla="*/ 653867 h 1404594"/>
+            </a:gdLst>
+            <a:ahLst/>
+            <a:cxnLst>
+              <a:cxn ang="0">
+                <a:pos x="connsiteX0" y="connsiteY0"/>
+              </a:cxn>
+              <a:cxn ang="0">
+                <a:pos x="connsiteX1" y="connsiteY1"/>
+              </a:cxn>
+              <a:cxn ang="0">
+                <a:pos x="connsiteX2" y="connsiteY2"/>
+              </a:cxn>
+              <a:cxn ang="0">
+                <a:pos x="connsiteX3" y="connsiteY3"/>
+              </a:cxn>
+              <a:cxn ang="0">
+                <a:pos x="connsiteX4" y="connsiteY4"/>
+              </a:cxn>
+              <a:cxn ang="0">
+                <a:pos x="connsiteX5" y="connsiteY5"/>
+              </a:cxn>
+              <a:cxn ang="0">
+                <a:pos x="connsiteX6" y="connsiteY6"/>
+              </a:cxn>
+              <a:cxn ang="0">
+                <a:pos x="connsiteX7" y="connsiteY7"/>
+              </a:cxn>
+              <a:cxn ang="0">
+                <a:pos x="connsiteX8" y="connsiteY8"/>
+              </a:cxn>
+              <a:cxn ang="0">
+                <a:pos x="connsiteX9" y="connsiteY9"/>
+              </a:cxn>
+              <a:cxn ang="0">
+                <a:pos x="connsiteX10" y="connsiteY10"/>
+              </a:cxn>
+              <a:cxn ang="0">
+                <a:pos x="connsiteX11" y="connsiteY11"/>
+              </a:cxn>
+            </a:cxnLst>
+            <a:rect l="l" t="t" r="r" b="b"/>
+            <a:pathLst>
+              <a:path w="4683315" h="1404594">
+                <a:moveTo>
+                  <a:pt x="0" y="653867"/>
+                </a:moveTo>
+                <a:lnTo>
+                  <a:pt x="2260037" y="657480"/>
+                </a:lnTo>
+                <a:lnTo>
+                  <a:pt x="2269464" y="117953"/>
+                </a:lnTo>
+                <a:lnTo>
+                  <a:pt x="2411455" y="117953"/>
+                </a:lnTo>
+                <a:lnTo>
+                  <a:pt x="2599993" y="125377"/>
+                </a:lnTo>
+                <a:cubicBezTo>
+                  <a:pt x="2599993" y="56247"/>
+                  <a:pt x="2599991" y="69130"/>
+                  <a:pt x="2599991" y="0"/>
+                </a:cubicBezTo>
+                <a:lnTo>
+                  <a:pt x="4683315" y="18854"/>
+                </a:lnTo>
+                <a:lnTo>
+                  <a:pt x="4683315" y="1404594"/>
+                </a:lnTo>
+                <a:lnTo>
+                  <a:pt x="2307760" y="1385740"/>
+                </a:lnTo>
+                <a:lnTo>
+                  <a:pt x="2305954" y="1386330"/>
+                </a:lnTo>
+                <a:lnTo>
+                  <a:pt x="3810" y="1386133"/>
+                </a:lnTo>
+                <a:lnTo>
+                  <a:pt x="0" y="653867"/>
+                </a:lnTo>
+                <a:close/>
+              </a:path>
+            </a:pathLst>
+          </a:custGeom>
+          <a:noFill/>
+          <a:ln w="19050">
+            <a:solidFill>
+              <a:schemeClr val="accent2">
+                <a:lumMod val="75000"/>
+              </a:schemeClr>
+            </a:solidFill>
+          </a:ln>
+        </p:spPr>
+        <p:style>
+          <a:lnRef idx="2">
+            <a:schemeClr val="accent1">
+              <a:shade val="50000"/>
+            </a:schemeClr>
+          </a:lnRef>
+          <a:fillRef idx="1">
+            <a:schemeClr val="accent1"/>
+          </a:fillRef>
+          <a:effectRef idx="0">
+            <a:schemeClr val="accent1"/>
+          </a:effectRef>
+          <a:fontRef idx="minor">
+            <a:schemeClr val="lt1"/>
+          </a:fontRef>
+        </p:style>
+        <p:txBody>
+          <a:bodyPr rtlCol="0" anchor="ctr"/>
+          <a:lstStyle/>
+          <a:p>
+            <a:pPr algn="ctr"/>
+            <a:endParaRPr lang="fr-FR"/>
+          </a:p>
+        </p:txBody>
+      </p:sp>
+      <p:sp>
+        <p:nvSpPr>
+          <p:cNvPr id="41" name="Forme libre 40"/>
+          <p:cNvSpPr/>
+          <p:nvPr/>
+        </p:nvSpPr>
+        <p:spPr>
+          <a:xfrm>
+            <a:off x="6243962" y="5093695"/>
+            <a:ext cx="2862331" cy="1740738"/>
+          </a:xfrm>
+          <a:custGeom>
+            <a:avLst/>
+            <a:gdLst>
+              <a:gd name="connsiteX0" fmla="*/ 857840 w 2818615"/>
+              <a:gd name="connsiteY0" fmla="*/ 0 h 1687398"/>
+              <a:gd name="connsiteX1" fmla="*/ 2818615 w 2818615"/>
+              <a:gd name="connsiteY1" fmla="*/ 37707 h 1687398"/>
+              <a:gd name="connsiteX2" fmla="*/ 2809188 w 2818615"/>
+              <a:gd name="connsiteY2" fmla="*/ 1687398 h 1687398"/>
+              <a:gd name="connsiteX3" fmla="*/ 0 w 2818615"/>
+              <a:gd name="connsiteY3" fmla="*/ 1687398 h 1687398"/>
+              <a:gd name="connsiteX4" fmla="*/ 37708 w 2818615"/>
+              <a:gd name="connsiteY4" fmla="*/ 433633 h 1687398"/>
+              <a:gd name="connsiteX5" fmla="*/ 857840 w 2818615"/>
+              <a:gd name="connsiteY5" fmla="*/ 433633 h 1687398"/>
+              <a:gd name="connsiteX6" fmla="*/ 857840 w 2818615"/>
+              <a:gd name="connsiteY6" fmla="*/ 0 h 1687398"/>
+              <a:gd name="connsiteX0" fmla="*/ 867266 w 2828041"/>
+              <a:gd name="connsiteY0" fmla="*/ 0 h 1687398"/>
+              <a:gd name="connsiteX1" fmla="*/ 2828041 w 2828041"/>
+              <a:gd name="connsiteY1" fmla="*/ 37707 h 1687398"/>
+              <a:gd name="connsiteX2" fmla="*/ 2818614 w 2828041"/>
+              <a:gd name="connsiteY2" fmla="*/ 1687398 h 1687398"/>
+              <a:gd name="connsiteX3" fmla="*/ 9426 w 2828041"/>
+              <a:gd name="connsiteY3" fmla="*/ 1687398 h 1687398"/>
+              <a:gd name="connsiteX4" fmla="*/ 0 w 2828041"/>
+              <a:gd name="connsiteY4" fmla="*/ 433633 h 1687398"/>
+              <a:gd name="connsiteX5" fmla="*/ 867266 w 2828041"/>
+              <a:gd name="connsiteY5" fmla="*/ 433633 h 1687398"/>
+              <a:gd name="connsiteX6" fmla="*/ 867266 w 2828041"/>
+              <a:gd name="connsiteY6" fmla="*/ 0 h 1687398"/>
+              <a:gd name="connsiteX0" fmla="*/ 867266 w 2828041"/>
+              <a:gd name="connsiteY0" fmla="*/ 0 h 1687398"/>
+              <a:gd name="connsiteX1" fmla="*/ 2828041 w 2828041"/>
+              <a:gd name="connsiteY1" fmla="*/ 37707 h 1687398"/>
+              <a:gd name="connsiteX2" fmla="*/ 2818614 w 2828041"/>
+              <a:gd name="connsiteY2" fmla="*/ 1687398 h 1687398"/>
+              <a:gd name="connsiteX3" fmla="*/ 9426 w 2828041"/>
+              <a:gd name="connsiteY3" fmla="*/ 1687398 h 1687398"/>
+              <a:gd name="connsiteX4" fmla="*/ 0 w 2828041"/>
+              <a:gd name="connsiteY4" fmla="*/ 433633 h 1687398"/>
+              <a:gd name="connsiteX5" fmla="*/ 867266 w 2828041"/>
+              <a:gd name="connsiteY5" fmla="*/ 433633 h 1687398"/>
+              <a:gd name="connsiteX6" fmla="*/ 867266 w 2828041"/>
+              <a:gd name="connsiteY6" fmla="*/ 0 h 1687398"/>
+              <a:gd name="connsiteX0" fmla="*/ 867266 w 2828041"/>
+              <a:gd name="connsiteY0" fmla="*/ 0 h 1687398"/>
+              <a:gd name="connsiteX1" fmla="*/ 2828041 w 2828041"/>
+              <a:gd name="connsiteY1" fmla="*/ 9427 h 1687398"/>
+              <a:gd name="connsiteX2" fmla="*/ 2818614 w 2828041"/>
+              <a:gd name="connsiteY2" fmla="*/ 1687398 h 1687398"/>
+              <a:gd name="connsiteX3" fmla="*/ 9426 w 2828041"/>
+              <a:gd name="connsiteY3" fmla="*/ 1687398 h 1687398"/>
+              <a:gd name="connsiteX4" fmla="*/ 0 w 2828041"/>
+              <a:gd name="connsiteY4" fmla="*/ 433633 h 1687398"/>
+              <a:gd name="connsiteX5" fmla="*/ 867266 w 2828041"/>
+              <a:gd name="connsiteY5" fmla="*/ 433633 h 1687398"/>
+              <a:gd name="connsiteX6" fmla="*/ 867266 w 2828041"/>
+              <a:gd name="connsiteY6" fmla="*/ 0 h 1687398"/>
+              <a:gd name="connsiteX0" fmla="*/ 829166 w 2828041"/>
+              <a:gd name="connsiteY0" fmla="*/ 0 h 1744548"/>
+              <a:gd name="connsiteX1" fmla="*/ 2828041 w 2828041"/>
+              <a:gd name="connsiteY1" fmla="*/ 66577 h 1744548"/>
+              <a:gd name="connsiteX2" fmla="*/ 2818614 w 2828041"/>
+              <a:gd name="connsiteY2" fmla="*/ 1744548 h 1744548"/>
+              <a:gd name="connsiteX3" fmla="*/ 9426 w 2828041"/>
+              <a:gd name="connsiteY3" fmla="*/ 1744548 h 1744548"/>
+              <a:gd name="connsiteX4" fmla="*/ 0 w 2828041"/>
+              <a:gd name="connsiteY4" fmla="*/ 490783 h 1744548"/>
+              <a:gd name="connsiteX5" fmla="*/ 867266 w 2828041"/>
+              <a:gd name="connsiteY5" fmla="*/ 490783 h 1744548"/>
+              <a:gd name="connsiteX6" fmla="*/ 829166 w 2828041"/>
+              <a:gd name="connsiteY6" fmla="*/ 0 h 1744548"/>
+              <a:gd name="connsiteX0" fmla="*/ 829166 w 2828041"/>
+              <a:gd name="connsiteY0" fmla="*/ 0 h 1744548"/>
+              <a:gd name="connsiteX1" fmla="*/ 2828041 w 2828041"/>
+              <a:gd name="connsiteY1" fmla="*/ 28477 h 1744548"/>
+              <a:gd name="connsiteX2" fmla="*/ 2818614 w 2828041"/>
+              <a:gd name="connsiteY2" fmla="*/ 1744548 h 1744548"/>
+              <a:gd name="connsiteX3" fmla="*/ 9426 w 2828041"/>
+              <a:gd name="connsiteY3" fmla="*/ 1744548 h 1744548"/>
+              <a:gd name="connsiteX4" fmla="*/ 0 w 2828041"/>
+              <a:gd name="connsiteY4" fmla="*/ 490783 h 1744548"/>
+              <a:gd name="connsiteX5" fmla="*/ 867266 w 2828041"/>
+              <a:gd name="connsiteY5" fmla="*/ 490783 h 1744548"/>
+              <a:gd name="connsiteX6" fmla="*/ 829166 w 2828041"/>
+              <a:gd name="connsiteY6" fmla="*/ 0 h 1744548"/>
+              <a:gd name="connsiteX0" fmla="*/ 829166 w 2828041"/>
+              <a:gd name="connsiteY0" fmla="*/ 0 h 1744548"/>
+              <a:gd name="connsiteX1" fmla="*/ 2828041 w 2828041"/>
+              <a:gd name="connsiteY1" fmla="*/ 28477 h 1744548"/>
+              <a:gd name="connsiteX2" fmla="*/ 2818614 w 2828041"/>
+              <a:gd name="connsiteY2" fmla="*/ 1744548 h 1744548"/>
+              <a:gd name="connsiteX3" fmla="*/ 9426 w 2828041"/>
+              <a:gd name="connsiteY3" fmla="*/ 1744548 h 1744548"/>
+              <a:gd name="connsiteX4" fmla="*/ 0 w 2828041"/>
+              <a:gd name="connsiteY4" fmla="*/ 490783 h 1744548"/>
+              <a:gd name="connsiteX5" fmla="*/ 832976 w 2828041"/>
+              <a:gd name="connsiteY5" fmla="*/ 479353 h 1744548"/>
+              <a:gd name="connsiteX6" fmla="*/ 829166 w 2828041"/>
+              <a:gd name="connsiteY6" fmla="*/ 0 h 1744548"/>
+              <a:gd name="connsiteX0" fmla="*/ 863456 w 2862331"/>
+              <a:gd name="connsiteY0" fmla="*/ 0 h 1744548"/>
+              <a:gd name="connsiteX1" fmla="*/ 2862331 w 2862331"/>
+              <a:gd name="connsiteY1" fmla="*/ 28477 h 1744548"/>
+              <a:gd name="connsiteX2" fmla="*/ 2852904 w 2862331"/>
+              <a:gd name="connsiteY2" fmla="*/ 1744548 h 1744548"/>
+              <a:gd name="connsiteX3" fmla="*/ 43716 w 2862331"/>
+              <a:gd name="connsiteY3" fmla="*/ 1744548 h 1744548"/>
+              <a:gd name="connsiteX4" fmla="*/ 0 w 2862331"/>
+              <a:gd name="connsiteY4" fmla="*/ 445063 h 1744548"/>
+              <a:gd name="connsiteX5" fmla="*/ 867266 w 2862331"/>
+              <a:gd name="connsiteY5" fmla="*/ 479353 h 1744548"/>
+              <a:gd name="connsiteX6" fmla="*/ 863456 w 2862331"/>
+              <a:gd name="connsiteY6" fmla="*/ 0 h 1744548"/>
+              <a:gd name="connsiteX0" fmla="*/ 863456 w 2862331"/>
+              <a:gd name="connsiteY0" fmla="*/ 0 h 1744548"/>
+              <a:gd name="connsiteX1" fmla="*/ 2862331 w 2862331"/>
+              <a:gd name="connsiteY1" fmla="*/ 28477 h 1744548"/>
+              <a:gd name="connsiteX2" fmla="*/ 2852904 w 2862331"/>
+              <a:gd name="connsiteY2" fmla="*/ 1744548 h 1744548"/>
+              <a:gd name="connsiteX3" fmla="*/ 43716 w 2862331"/>
+              <a:gd name="connsiteY3" fmla="*/ 1744548 h 1744548"/>
+              <a:gd name="connsiteX4" fmla="*/ 0 w 2862331"/>
+              <a:gd name="connsiteY4" fmla="*/ 445063 h 1744548"/>
+              <a:gd name="connsiteX5" fmla="*/ 890126 w 2862331"/>
+              <a:gd name="connsiteY5" fmla="*/ 452683 h 1744548"/>
+              <a:gd name="connsiteX6" fmla="*/ 863456 w 2862331"/>
+              <a:gd name="connsiteY6" fmla="*/ 0 h 1744548"/>
+              <a:gd name="connsiteX0" fmla="*/ 909176 w 2862331"/>
+              <a:gd name="connsiteY0" fmla="*/ 0 h 1748358"/>
+              <a:gd name="connsiteX1" fmla="*/ 2862331 w 2862331"/>
+              <a:gd name="connsiteY1" fmla="*/ 32287 h 1748358"/>
+              <a:gd name="connsiteX2" fmla="*/ 2852904 w 2862331"/>
+              <a:gd name="connsiteY2" fmla="*/ 1748358 h 1748358"/>
+              <a:gd name="connsiteX3" fmla="*/ 43716 w 2862331"/>
+              <a:gd name="connsiteY3" fmla="*/ 1748358 h 1748358"/>
+              <a:gd name="connsiteX4" fmla="*/ 0 w 2862331"/>
+              <a:gd name="connsiteY4" fmla="*/ 448873 h 1748358"/>
+              <a:gd name="connsiteX5" fmla="*/ 890126 w 2862331"/>
+              <a:gd name="connsiteY5" fmla="*/ 456493 h 1748358"/>
+              <a:gd name="connsiteX6" fmla="*/ 909176 w 2862331"/>
+              <a:gd name="connsiteY6" fmla="*/ 0 h 1748358"/>
+              <a:gd name="connsiteX0" fmla="*/ 890126 w 2862331"/>
+              <a:gd name="connsiteY0" fmla="*/ 0 h 1740738"/>
+              <a:gd name="connsiteX1" fmla="*/ 2862331 w 2862331"/>
+              <a:gd name="connsiteY1" fmla="*/ 24667 h 1740738"/>
+              <a:gd name="connsiteX2" fmla="*/ 2852904 w 2862331"/>
+              <a:gd name="connsiteY2" fmla="*/ 1740738 h 1740738"/>
+              <a:gd name="connsiteX3" fmla="*/ 43716 w 2862331"/>
+              <a:gd name="connsiteY3" fmla="*/ 1740738 h 1740738"/>
+              <a:gd name="connsiteX4" fmla="*/ 0 w 2862331"/>
+              <a:gd name="connsiteY4" fmla="*/ 441253 h 1740738"/>
+              <a:gd name="connsiteX5" fmla="*/ 890126 w 2862331"/>
+              <a:gd name="connsiteY5" fmla="*/ 448873 h 1740738"/>
+              <a:gd name="connsiteX6" fmla="*/ 890126 w 2862331"/>
+              <a:gd name="connsiteY6" fmla="*/ 0 h 1740738"/>
+              <a:gd name="connsiteX0" fmla="*/ 892130 w 2864335"/>
+              <a:gd name="connsiteY0" fmla="*/ 0 h 1752168"/>
+              <a:gd name="connsiteX1" fmla="*/ 2864335 w 2864335"/>
+              <a:gd name="connsiteY1" fmla="*/ 24667 h 1752168"/>
+              <a:gd name="connsiteX2" fmla="*/ 2854908 w 2864335"/>
+              <a:gd name="connsiteY2" fmla="*/ 1740738 h 1752168"/>
+              <a:gd name="connsiteX3" fmla="*/ 0 w 2864335"/>
+              <a:gd name="connsiteY3" fmla="*/ 1752168 h 1752168"/>
+              <a:gd name="connsiteX4" fmla="*/ 2004 w 2864335"/>
+              <a:gd name="connsiteY4" fmla="*/ 441253 h 1752168"/>
+              <a:gd name="connsiteX5" fmla="*/ 892130 w 2864335"/>
+              <a:gd name="connsiteY5" fmla="*/ 448873 h 1752168"/>
+              <a:gd name="connsiteX6" fmla="*/ 892130 w 2864335"/>
+              <a:gd name="connsiteY6" fmla="*/ 0 h 1752168"/>
+              <a:gd name="connsiteX0" fmla="*/ 890126 w 2862331"/>
+              <a:gd name="connsiteY0" fmla="*/ 0 h 1740738"/>
+              <a:gd name="connsiteX1" fmla="*/ 2862331 w 2862331"/>
+              <a:gd name="connsiteY1" fmla="*/ 24667 h 1740738"/>
+              <a:gd name="connsiteX2" fmla="*/ 2852904 w 2862331"/>
+              <a:gd name="connsiteY2" fmla="*/ 1740738 h 1740738"/>
+              <a:gd name="connsiteX3" fmla="*/ 1806 w 2862331"/>
+              <a:gd name="connsiteY3" fmla="*/ 1740738 h 1740738"/>
+              <a:gd name="connsiteX4" fmla="*/ 0 w 2862331"/>
+              <a:gd name="connsiteY4" fmla="*/ 441253 h 1740738"/>
+              <a:gd name="connsiteX5" fmla="*/ 890126 w 2862331"/>
+              <a:gd name="connsiteY5" fmla="*/ 448873 h 1740738"/>
+              <a:gd name="connsiteX6" fmla="*/ 890126 w 2862331"/>
+              <a:gd name="connsiteY6" fmla="*/ 0 h 1740738"/>
+            </a:gdLst>
+            <a:ahLst/>
+            <a:cxnLst>
+              <a:cxn ang="0">
+                <a:pos x="connsiteX0" y="connsiteY0"/>
+              </a:cxn>
+              <a:cxn ang="0">
+                <a:pos x="connsiteX1" y="connsiteY1"/>
+              </a:cxn>
+              <a:cxn ang="0">
+                <a:pos x="connsiteX2" y="connsiteY2"/>
+              </a:cxn>
+              <a:cxn ang="0">
+                <a:pos x="connsiteX3" y="connsiteY3"/>
+              </a:cxn>
+              <a:cxn ang="0">
+                <a:pos x="connsiteX4" y="connsiteY4"/>
+              </a:cxn>
+              <a:cxn ang="0">
+                <a:pos x="connsiteX5" y="connsiteY5"/>
+              </a:cxn>
+              <a:cxn ang="0">
+                <a:pos x="connsiteX6" y="connsiteY6"/>
+              </a:cxn>
+            </a:cxnLst>
+            <a:rect l="l" t="t" r="r" b="b"/>
+            <a:pathLst>
+              <a:path w="2862331" h="1740738">
+                <a:moveTo>
+                  <a:pt x="890126" y="0"/>
+                </a:moveTo>
+                <a:lnTo>
+                  <a:pt x="2862331" y="24667"/>
+                </a:lnTo>
+                <a:cubicBezTo>
+                  <a:pt x="2859189" y="574564"/>
+                  <a:pt x="2856046" y="1190841"/>
+                  <a:pt x="2852904" y="1740738"/>
+                </a:cubicBezTo>
+                <a:lnTo>
+                  <a:pt x="1806" y="1740738"/>
+                </a:lnTo>
+                <a:lnTo>
+                  <a:pt x="0" y="441253"/>
+                </a:lnTo>
+                <a:lnTo>
+                  <a:pt x="890126" y="448873"/>
+                </a:lnTo>
+                <a:lnTo>
+                  <a:pt x="890126" y="0"/>
+                </a:lnTo>
+                <a:close/>
+              </a:path>
+            </a:pathLst>
+          </a:custGeom>
+          <a:noFill/>
+          <a:ln w="19050">
+            <a:solidFill>
+              <a:schemeClr val="accent2">
+                <a:lumMod val="75000"/>
+              </a:schemeClr>
+            </a:solidFill>
+          </a:ln>
+        </p:spPr>
+        <p:style>
+          <a:lnRef idx="2">
+            <a:schemeClr val="accent1">
+              <a:shade val="50000"/>
+            </a:schemeClr>
+          </a:lnRef>
+          <a:fillRef idx="1">
+            <a:schemeClr val="accent1"/>
+          </a:fillRef>
+          <a:effectRef idx="0">
+            <a:schemeClr val="accent1"/>
+          </a:effectRef>
+          <a:fontRef idx="minor">
+            <a:schemeClr val="lt1"/>
+          </a:fontRef>
+        </p:style>
+        <p:txBody>
+          <a:bodyPr rtlCol="0" anchor="ctr"/>
+          <a:lstStyle/>
+          <a:p>
+            <a:pPr algn="ctr"/>
+            <a:endParaRPr lang="fr-FR"/>
+          </a:p>
+        </p:txBody>
+      </p:sp>
+      <p:sp>
+        <p:nvSpPr>
+          <p:cNvPr id="42" name="Forme libre 41"/>
+          <p:cNvSpPr/>
+          <p:nvPr/>
+        </p:nvSpPr>
+        <p:spPr>
+          <a:xfrm>
+            <a:off x="4110088" y="5094283"/>
+            <a:ext cx="3024590" cy="1740149"/>
+          </a:xfrm>
+          <a:custGeom>
+            <a:avLst/>
+            <a:gdLst>
+              <a:gd name="connsiteX0" fmla="*/ 0 w 2912883"/>
+              <a:gd name="connsiteY0" fmla="*/ 9427 h 1734532"/>
+              <a:gd name="connsiteX1" fmla="*/ 2394408 w 2912883"/>
+              <a:gd name="connsiteY1" fmla="*/ 0 h 1734532"/>
+              <a:gd name="connsiteX2" fmla="*/ 2403835 w 2912883"/>
+              <a:gd name="connsiteY2" fmla="*/ 75414 h 1734532"/>
+              <a:gd name="connsiteX3" fmla="*/ 2912883 w 2912883"/>
+              <a:gd name="connsiteY3" fmla="*/ 84841 h 1734532"/>
+              <a:gd name="connsiteX4" fmla="*/ 2903456 w 2912883"/>
+              <a:gd name="connsiteY4" fmla="*/ 405353 h 1734532"/>
+              <a:gd name="connsiteX5" fmla="*/ 1998483 w 2912883"/>
+              <a:gd name="connsiteY5" fmla="*/ 405353 h 1734532"/>
+              <a:gd name="connsiteX6" fmla="*/ 2026763 w 2912883"/>
+              <a:gd name="connsiteY6" fmla="*/ 1734532 h 1734532"/>
+              <a:gd name="connsiteX7" fmla="*/ 84841 w 2912883"/>
+              <a:gd name="connsiteY7" fmla="*/ 1725105 h 1734532"/>
+              <a:gd name="connsiteX8" fmla="*/ 0 w 2912883"/>
+              <a:gd name="connsiteY8" fmla="*/ 9427 h 1734532"/>
+              <a:gd name="connsiteX0" fmla="*/ 75414 w 2988297"/>
+              <a:gd name="connsiteY0" fmla="*/ 9427 h 1734532"/>
+              <a:gd name="connsiteX1" fmla="*/ 2469822 w 2988297"/>
+              <a:gd name="connsiteY1" fmla="*/ 0 h 1734532"/>
+              <a:gd name="connsiteX2" fmla="*/ 2479249 w 2988297"/>
+              <a:gd name="connsiteY2" fmla="*/ 75414 h 1734532"/>
+              <a:gd name="connsiteX3" fmla="*/ 2988297 w 2988297"/>
+              <a:gd name="connsiteY3" fmla="*/ 84841 h 1734532"/>
+              <a:gd name="connsiteX4" fmla="*/ 2978870 w 2988297"/>
+              <a:gd name="connsiteY4" fmla="*/ 405353 h 1734532"/>
+              <a:gd name="connsiteX5" fmla="*/ 2073897 w 2988297"/>
+              <a:gd name="connsiteY5" fmla="*/ 405353 h 1734532"/>
+              <a:gd name="connsiteX6" fmla="*/ 2102177 w 2988297"/>
+              <a:gd name="connsiteY6" fmla="*/ 1734532 h 1734532"/>
+              <a:gd name="connsiteX7" fmla="*/ 0 w 2988297"/>
+              <a:gd name="connsiteY7" fmla="*/ 1725105 h 1734532"/>
+              <a:gd name="connsiteX8" fmla="*/ 75414 w 2988297"/>
+              <a:gd name="connsiteY8" fmla="*/ 9427 h 1734532"/>
+              <a:gd name="connsiteX0" fmla="*/ 18853 w 2988297"/>
+              <a:gd name="connsiteY0" fmla="*/ 0 h 1743959"/>
+              <a:gd name="connsiteX1" fmla="*/ 2469822 w 2988297"/>
+              <a:gd name="connsiteY1" fmla="*/ 9427 h 1743959"/>
+              <a:gd name="connsiteX2" fmla="*/ 2479249 w 2988297"/>
+              <a:gd name="connsiteY2" fmla="*/ 84841 h 1743959"/>
+              <a:gd name="connsiteX3" fmla="*/ 2988297 w 2988297"/>
+              <a:gd name="connsiteY3" fmla="*/ 94268 h 1743959"/>
+              <a:gd name="connsiteX4" fmla="*/ 2978870 w 2988297"/>
+              <a:gd name="connsiteY4" fmla="*/ 414780 h 1743959"/>
+              <a:gd name="connsiteX5" fmla="*/ 2073897 w 2988297"/>
+              <a:gd name="connsiteY5" fmla="*/ 414780 h 1743959"/>
+              <a:gd name="connsiteX6" fmla="*/ 2102177 w 2988297"/>
+              <a:gd name="connsiteY6" fmla="*/ 1743959 h 1743959"/>
+              <a:gd name="connsiteX7" fmla="*/ 0 w 2988297"/>
+              <a:gd name="connsiteY7" fmla="*/ 1734532 h 1743959"/>
+              <a:gd name="connsiteX8" fmla="*/ 18853 w 2988297"/>
+              <a:gd name="connsiteY8" fmla="*/ 0 h 1743959"/>
+              <a:gd name="connsiteX0" fmla="*/ 18853 w 2988297"/>
+              <a:gd name="connsiteY0" fmla="*/ 0 h 1743959"/>
+              <a:gd name="connsiteX1" fmla="*/ 2469822 w 2988297"/>
+              <a:gd name="connsiteY1" fmla="*/ 9427 h 1743959"/>
+              <a:gd name="connsiteX2" fmla="*/ 2479249 w 2988297"/>
+              <a:gd name="connsiteY2" fmla="*/ 84841 h 1743959"/>
+              <a:gd name="connsiteX3" fmla="*/ 2988297 w 2988297"/>
+              <a:gd name="connsiteY3" fmla="*/ 94268 h 1743959"/>
+              <a:gd name="connsiteX4" fmla="*/ 2978870 w 2988297"/>
+              <a:gd name="connsiteY4" fmla="*/ 414780 h 1743959"/>
+              <a:gd name="connsiteX5" fmla="*/ 2130457 w 2988297"/>
+              <a:gd name="connsiteY5" fmla="*/ 424207 h 1743959"/>
+              <a:gd name="connsiteX6" fmla="*/ 2102177 w 2988297"/>
+              <a:gd name="connsiteY6" fmla="*/ 1743959 h 1743959"/>
+              <a:gd name="connsiteX7" fmla="*/ 0 w 2988297"/>
+              <a:gd name="connsiteY7" fmla="*/ 1734532 h 1743959"/>
+              <a:gd name="connsiteX8" fmla="*/ 18853 w 2988297"/>
+              <a:gd name="connsiteY8" fmla="*/ 0 h 1743959"/>
+              <a:gd name="connsiteX0" fmla="*/ 18853 w 2988297"/>
+              <a:gd name="connsiteY0" fmla="*/ 0 h 1743959"/>
+              <a:gd name="connsiteX1" fmla="*/ 2469822 w 2988297"/>
+              <a:gd name="connsiteY1" fmla="*/ 9427 h 1743959"/>
+              <a:gd name="connsiteX2" fmla="*/ 2479249 w 2988297"/>
+              <a:gd name="connsiteY2" fmla="*/ 84841 h 1743959"/>
+              <a:gd name="connsiteX3" fmla="*/ 2988297 w 2988297"/>
+              <a:gd name="connsiteY3" fmla="*/ 94268 h 1743959"/>
+              <a:gd name="connsiteX4" fmla="*/ 2978870 w 2988297"/>
+              <a:gd name="connsiteY4" fmla="*/ 414780 h 1743959"/>
+              <a:gd name="connsiteX5" fmla="*/ 2130457 w 2988297"/>
+              <a:gd name="connsiteY5" fmla="*/ 424207 h 1743959"/>
+              <a:gd name="connsiteX6" fmla="*/ 2130458 w 2988297"/>
+              <a:gd name="connsiteY6" fmla="*/ 1743959 h 1743959"/>
+              <a:gd name="connsiteX7" fmla="*/ 0 w 2988297"/>
+              <a:gd name="connsiteY7" fmla="*/ 1734532 h 1743959"/>
+              <a:gd name="connsiteX8" fmla="*/ 18853 w 2988297"/>
+              <a:gd name="connsiteY8" fmla="*/ 0 h 1743959"/>
+              <a:gd name="connsiteX0" fmla="*/ 18853 w 2988297"/>
+              <a:gd name="connsiteY0" fmla="*/ 0 h 1743959"/>
+              <a:gd name="connsiteX1" fmla="*/ 2469822 w 2988297"/>
+              <a:gd name="connsiteY1" fmla="*/ 9427 h 1743959"/>
+              <a:gd name="connsiteX2" fmla="*/ 2479249 w 2988297"/>
+              <a:gd name="connsiteY2" fmla="*/ 84841 h 1743959"/>
+              <a:gd name="connsiteX3" fmla="*/ 2988297 w 2988297"/>
+              <a:gd name="connsiteY3" fmla="*/ 94268 h 1743959"/>
+              <a:gd name="connsiteX4" fmla="*/ 2988297 w 2988297"/>
+              <a:gd name="connsiteY4" fmla="*/ 443060 h 1743959"/>
+              <a:gd name="connsiteX5" fmla="*/ 2130457 w 2988297"/>
+              <a:gd name="connsiteY5" fmla="*/ 424207 h 1743959"/>
+              <a:gd name="connsiteX6" fmla="*/ 2130458 w 2988297"/>
+              <a:gd name="connsiteY6" fmla="*/ 1743959 h 1743959"/>
+              <a:gd name="connsiteX7" fmla="*/ 0 w 2988297"/>
+              <a:gd name="connsiteY7" fmla="*/ 1734532 h 1743959"/>
+              <a:gd name="connsiteX8" fmla="*/ 18853 w 2988297"/>
+              <a:gd name="connsiteY8" fmla="*/ 0 h 1743959"/>
+              <a:gd name="connsiteX0" fmla="*/ 18853 w 2988297"/>
+              <a:gd name="connsiteY0" fmla="*/ 0 h 1743959"/>
+              <a:gd name="connsiteX1" fmla="*/ 2469822 w 2988297"/>
+              <a:gd name="connsiteY1" fmla="*/ 9427 h 1743959"/>
+              <a:gd name="connsiteX2" fmla="*/ 2479249 w 2988297"/>
+              <a:gd name="connsiteY2" fmla="*/ 84841 h 1743959"/>
+              <a:gd name="connsiteX3" fmla="*/ 2988297 w 2988297"/>
+              <a:gd name="connsiteY3" fmla="*/ 94268 h 1743959"/>
+              <a:gd name="connsiteX4" fmla="*/ 2988297 w 2988297"/>
+              <a:gd name="connsiteY4" fmla="*/ 443060 h 1743959"/>
+              <a:gd name="connsiteX5" fmla="*/ 2130457 w 2988297"/>
+              <a:gd name="connsiteY5" fmla="*/ 433633 h 1743959"/>
+              <a:gd name="connsiteX6" fmla="*/ 2130458 w 2988297"/>
+              <a:gd name="connsiteY6" fmla="*/ 1743959 h 1743959"/>
+              <a:gd name="connsiteX7" fmla="*/ 0 w 2988297"/>
+              <a:gd name="connsiteY7" fmla="*/ 1734532 h 1743959"/>
+              <a:gd name="connsiteX8" fmla="*/ 18853 w 2988297"/>
+              <a:gd name="connsiteY8" fmla="*/ 0 h 1743959"/>
+              <a:gd name="connsiteX0" fmla="*/ 18853 w 2988297"/>
+              <a:gd name="connsiteY0" fmla="*/ 0 h 1743959"/>
+              <a:gd name="connsiteX1" fmla="*/ 2469822 w 2988297"/>
+              <a:gd name="connsiteY1" fmla="*/ 9427 h 1743959"/>
+              <a:gd name="connsiteX2" fmla="*/ 2479249 w 2988297"/>
+              <a:gd name="connsiteY2" fmla="*/ 84841 h 1743959"/>
+              <a:gd name="connsiteX3" fmla="*/ 2978870 w 2988297"/>
+              <a:gd name="connsiteY3" fmla="*/ 75415 h 1743959"/>
+              <a:gd name="connsiteX4" fmla="*/ 2988297 w 2988297"/>
+              <a:gd name="connsiteY4" fmla="*/ 443060 h 1743959"/>
+              <a:gd name="connsiteX5" fmla="*/ 2130457 w 2988297"/>
+              <a:gd name="connsiteY5" fmla="*/ 433633 h 1743959"/>
+              <a:gd name="connsiteX6" fmla="*/ 2130458 w 2988297"/>
+              <a:gd name="connsiteY6" fmla="*/ 1743959 h 1743959"/>
+              <a:gd name="connsiteX7" fmla="*/ 0 w 2988297"/>
+              <a:gd name="connsiteY7" fmla="*/ 1734532 h 1743959"/>
+              <a:gd name="connsiteX8" fmla="*/ 18853 w 2988297"/>
+              <a:gd name="connsiteY8" fmla="*/ 0 h 1743959"/>
+              <a:gd name="connsiteX0" fmla="*/ 18853 w 2988297"/>
+              <a:gd name="connsiteY0" fmla="*/ 0 h 1743959"/>
+              <a:gd name="connsiteX1" fmla="*/ 2469822 w 2988297"/>
+              <a:gd name="connsiteY1" fmla="*/ 9427 h 1743959"/>
+              <a:gd name="connsiteX2" fmla="*/ 2469823 w 2988297"/>
+              <a:gd name="connsiteY2" fmla="*/ 94268 h 1743959"/>
+              <a:gd name="connsiteX3" fmla="*/ 2978870 w 2988297"/>
+              <a:gd name="connsiteY3" fmla="*/ 75415 h 1743959"/>
+              <a:gd name="connsiteX4" fmla="*/ 2988297 w 2988297"/>
+              <a:gd name="connsiteY4" fmla="*/ 443060 h 1743959"/>
+              <a:gd name="connsiteX5" fmla="*/ 2130457 w 2988297"/>
+              <a:gd name="connsiteY5" fmla="*/ 433633 h 1743959"/>
+              <a:gd name="connsiteX6" fmla="*/ 2130458 w 2988297"/>
+              <a:gd name="connsiteY6" fmla="*/ 1743959 h 1743959"/>
+              <a:gd name="connsiteX7" fmla="*/ 0 w 2988297"/>
+              <a:gd name="connsiteY7" fmla="*/ 1734532 h 1743959"/>
+              <a:gd name="connsiteX8" fmla="*/ 18853 w 2988297"/>
+              <a:gd name="connsiteY8" fmla="*/ 0 h 1743959"/>
+              <a:gd name="connsiteX0" fmla="*/ 18853 w 2988297"/>
+              <a:gd name="connsiteY0" fmla="*/ 0 h 1743959"/>
+              <a:gd name="connsiteX1" fmla="*/ 2507529 w 2988297"/>
+              <a:gd name="connsiteY1" fmla="*/ 18854 h 1743959"/>
+              <a:gd name="connsiteX2" fmla="*/ 2469823 w 2988297"/>
+              <a:gd name="connsiteY2" fmla="*/ 94268 h 1743959"/>
+              <a:gd name="connsiteX3" fmla="*/ 2978870 w 2988297"/>
+              <a:gd name="connsiteY3" fmla="*/ 75415 h 1743959"/>
+              <a:gd name="connsiteX4" fmla="*/ 2988297 w 2988297"/>
+              <a:gd name="connsiteY4" fmla="*/ 443060 h 1743959"/>
+              <a:gd name="connsiteX5" fmla="*/ 2130457 w 2988297"/>
+              <a:gd name="connsiteY5" fmla="*/ 433633 h 1743959"/>
+              <a:gd name="connsiteX6" fmla="*/ 2130458 w 2988297"/>
+              <a:gd name="connsiteY6" fmla="*/ 1743959 h 1743959"/>
+              <a:gd name="connsiteX7" fmla="*/ 0 w 2988297"/>
+              <a:gd name="connsiteY7" fmla="*/ 1734532 h 1743959"/>
+              <a:gd name="connsiteX8" fmla="*/ 18853 w 2988297"/>
+              <a:gd name="connsiteY8" fmla="*/ 0 h 1743959"/>
+              <a:gd name="connsiteX0" fmla="*/ 18853 w 2988297"/>
+              <a:gd name="connsiteY0" fmla="*/ 0 h 1743959"/>
+              <a:gd name="connsiteX1" fmla="*/ 2507529 w 2988297"/>
+              <a:gd name="connsiteY1" fmla="*/ 18854 h 1743959"/>
+              <a:gd name="connsiteX2" fmla="*/ 2413262 w 2988297"/>
+              <a:gd name="connsiteY2" fmla="*/ 84841 h 1743959"/>
+              <a:gd name="connsiteX3" fmla="*/ 2978870 w 2988297"/>
+              <a:gd name="connsiteY3" fmla="*/ 75415 h 1743959"/>
+              <a:gd name="connsiteX4" fmla="*/ 2988297 w 2988297"/>
+              <a:gd name="connsiteY4" fmla="*/ 443060 h 1743959"/>
+              <a:gd name="connsiteX5" fmla="*/ 2130457 w 2988297"/>
+              <a:gd name="connsiteY5" fmla="*/ 433633 h 1743959"/>
+              <a:gd name="connsiteX6" fmla="*/ 2130458 w 2988297"/>
+              <a:gd name="connsiteY6" fmla="*/ 1743959 h 1743959"/>
+              <a:gd name="connsiteX7" fmla="*/ 0 w 2988297"/>
+              <a:gd name="connsiteY7" fmla="*/ 1734532 h 1743959"/>
+              <a:gd name="connsiteX8" fmla="*/ 18853 w 2988297"/>
+              <a:gd name="connsiteY8" fmla="*/ 0 h 1743959"/>
+              <a:gd name="connsiteX0" fmla="*/ 18853 w 2988297"/>
+              <a:gd name="connsiteY0" fmla="*/ 0 h 1743959"/>
+              <a:gd name="connsiteX1" fmla="*/ 2403834 w 2988297"/>
+              <a:gd name="connsiteY1" fmla="*/ 0 h 1743959"/>
+              <a:gd name="connsiteX2" fmla="*/ 2413262 w 2988297"/>
+              <a:gd name="connsiteY2" fmla="*/ 84841 h 1743959"/>
+              <a:gd name="connsiteX3" fmla="*/ 2978870 w 2988297"/>
+              <a:gd name="connsiteY3" fmla="*/ 75415 h 1743959"/>
+              <a:gd name="connsiteX4" fmla="*/ 2988297 w 2988297"/>
+              <a:gd name="connsiteY4" fmla="*/ 443060 h 1743959"/>
+              <a:gd name="connsiteX5" fmla="*/ 2130457 w 2988297"/>
+              <a:gd name="connsiteY5" fmla="*/ 433633 h 1743959"/>
+              <a:gd name="connsiteX6" fmla="*/ 2130458 w 2988297"/>
+              <a:gd name="connsiteY6" fmla="*/ 1743959 h 1743959"/>
+              <a:gd name="connsiteX7" fmla="*/ 0 w 2988297"/>
+              <a:gd name="connsiteY7" fmla="*/ 1734532 h 1743959"/>
+              <a:gd name="connsiteX8" fmla="*/ 18853 w 2988297"/>
+              <a:gd name="connsiteY8" fmla="*/ 0 h 1743959"/>
+              <a:gd name="connsiteX0" fmla="*/ 18853 w 2988297"/>
+              <a:gd name="connsiteY0" fmla="*/ 0 h 1743959"/>
+              <a:gd name="connsiteX1" fmla="*/ 2111603 w 2988297"/>
+              <a:gd name="connsiteY1" fmla="*/ 0 h 1743959"/>
+              <a:gd name="connsiteX2" fmla="*/ 2413262 w 2988297"/>
+              <a:gd name="connsiteY2" fmla="*/ 84841 h 1743959"/>
+              <a:gd name="connsiteX3" fmla="*/ 2978870 w 2988297"/>
+              <a:gd name="connsiteY3" fmla="*/ 75415 h 1743959"/>
+              <a:gd name="connsiteX4" fmla="*/ 2988297 w 2988297"/>
+              <a:gd name="connsiteY4" fmla="*/ 443060 h 1743959"/>
+              <a:gd name="connsiteX5" fmla="*/ 2130457 w 2988297"/>
+              <a:gd name="connsiteY5" fmla="*/ 433633 h 1743959"/>
+              <a:gd name="connsiteX6" fmla="*/ 2130458 w 2988297"/>
+              <a:gd name="connsiteY6" fmla="*/ 1743959 h 1743959"/>
+              <a:gd name="connsiteX7" fmla="*/ 0 w 2988297"/>
+              <a:gd name="connsiteY7" fmla="*/ 1734532 h 1743959"/>
+              <a:gd name="connsiteX8" fmla="*/ 18853 w 2988297"/>
+              <a:gd name="connsiteY8" fmla="*/ 0 h 1743959"/>
+              <a:gd name="connsiteX0" fmla="*/ 18853 w 2988297"/>
+              <a:gd name="connsiteY0" fmla="*/ 0 h 1743959"/>
+              <a:gd name="connsiteX1" fmla="*/ 2111603 w 2988297"/>
+              <a:gd name="connsiteY1" fmla="*/ 0 h 1743959"/>
+              <a:gd name="connsiteX2" fmla="*/ 2111605 w 2988297"/>
+              <a:gd name="connsiteY2" fmla="*/ 103695 h 1743959"/>
+              <a:gd name="connsiteX3" fmla="*/ 2978870 w 2988297"/>
+              <a:gd name="connsiteY3" fmla="*/ 75415 h 1743959"/>
+              <a:gd name="connsiteX4" fmla="*/ 2988297 w 2988297"/>
+              <a:gd name="connsiteY4" fmla="*/ 443060 h 1743959"/>
+              <a:gd name="connsiteX5" fmla="*/ 2130457 w 2988297"/>
+              <a:gd name="connsiteY5" fmla="*/ 433633 h 1743959"/>
+              <a:gd name="connsiteX6" fmla="*/ 2130458 w 2988297"/>
+              <a:gd name="connsiteY6" fmla="*/ 1743959 h 1743959"/>
+              <a:gd name="connsiteX7" fmla="*/ 0 w 2988297"/>
+              <a:gd name="connsiteY7" fmla="*/ 1734532 h 1743959"/>
+              <a:gd name="connsiteX8" fmla="*/ 18853 w 2988297"/>
+              <a:gd name="connsiteY8" fmla="*/ 0 h 1743959"/>
+              <a:gd name="connsiteX0" fmla="*/ 18853 w 2988297"/>
+              <a:gd name="connsiteY0" fmla="*/ 0 h 1743959"/>
+              <a:gd name="connsiteX1" fmla="*/ 2111603 w 2988297"/>
+              <a:gd name="connsiteY1" fmla="*/ 0 h 1743959"/>
+              <a:gd name="connsiteX2" fmla="*/ 2111605 w 2988297"/>
+              <a:gd name="connsiteY2" fmla="*/ 94268 h 1743959"/>
+              <a:gd name="connsiteX3" fmla="*/ 2978870 w 2988297"/>
+              <a:gd name="connsiteY3" fmla="*/ 75415 h 1743959"/>
+              <a:gd name="connsiteX4" fmla="*/ 2988297 w 2988297"/>
+              <a:gd name="connsiteY4" fmla="*/ 443060 h 1743959"/>
+              <a:gd name="connsiteX5" fmla="*/ 2130457 w 2988297"/>
+              <a:gd name="connsiteY5" fmla="*/ 433633 h 1743959"/>
+              <a:gd name="connsiteX6" fmla="*/ 2130458 w 2988297"/>
+              <a:gd name="connsiteY6" fmla="*/ 1743959 h 1743959"/>
+              <a:gd name="connsiteX7" fmla="*/ 0 w 2988297"/>
+              <a:gd name="connsiteY7" fmla="*/ 1734532 h 1743959"/>
+              <a:gd name="connsiteX8" fmla="*/ 18853 w 2988297"/>
+              <a:gd name="connsiteY8" fmla="*/ 0 h 1743959"/>
+              <a:gd name="connsiteX0" fmla="*/ 0 w 3016578"/>
+              <a:gd name="connsiteY0" fmla="*/ 9427 h 1743959"/>
+              <a:gd name="connsiteX1" fmla="*/ 2139884 w 3016578"/>
+              <a:gd name="connsiteY1" fmla="*/ 0 h 1743959"/>
+              <a:gd name="connsiteX2" fmla="*/ 2139886 w 3016578"/>
+              <a:gd name="connsiteY2" fmla="*/ 94268 h 1743959"/>
+              <a:gd name="connsiteX3" fmla="*/ 3007151 w 3016578"/>
+              <a:gd name="connsiteY3" fmla="*/ 75415 h 1743959"/>
+              <a:gd name="connsiteX4" fmla="*/ 3016578 w 3016578"/>
+              <a:gd name="connsiteY4" fmla="*/ 443060 h 1743959"/>
+              <a:gd name="connsiteX5" fmla="*/ 2158738 w 3016578"/>
+              <a:gd name="connsiteY5" fmla="*/ 433633 h 1743959"/>
+              <a:gd name="connsiteX6" fmla="*/ 2158739 w 3016578"/>
+              <a:gd name="connsiteY6" fmla="*/ 1743959 h 1743959"/>
+              <a:gd name="connsiteX7" fmla="*/ 28281 w 3016578"/>
+              <a:gd name="connsiteY7" fmla="*/ 1734532 h 1743959"/>
+              <a:gd name="connsiteX8" fmla="*/ 0 w 3016578"/>
+              <a:gd name="connsiteY8" fmla="*/ 9427 h 1743959"/>
+              <a:gd name="connsiteX0" fmla="*/ 0 w 2988297"/>
+              <a:gd name="connsiteY0" fmla="*/ 9427 h 1743959"/>
+              <a:gd name="connsiteX1" fmla="*/ 2111603 w 2988297"/>
+              <a:gd name="connsiteY1" fmla="*/ 0 h 1743959"/>
+              <a:gd name="connsiteX2" fmla="*/ 2111605 w 2988297"/>
+              <a:gd name="connsiteY2" fmla="*/ 94268 h 1743959"/>
+              <a:gd name="connsiteX3" fmla="*/ 2978870 w 2988297"/>
+              <a:gd name="connsiteY3" fmla="*/ 75415 h 1743959"/>
+              <a:gd name="connsiteX4" fmla="*/ 2988297 w 2988297"/>
+              <a:gd name="connsiteY4" fmla="*/ 443060 h 1743959"/>
+              <a:gd name="connsiteX5" fmla="*/ 2130457 w 2988297"/>
+              <a:gd name="connsiteY5" fmla="*/ 433633 h 1743959"/>
+              <a:gd name="connsiteX6" fmla="*/ 2130458 w 2988297"/>
+              <a:gd name="connsiteY6" fmla="*/ 1743959 h 1743959"/>
+              <a:gd name="connsiteX7" fmla="*/ 0 w 2988297"/>
+              <a:gd name="connsiteY7" fmla="*/ 1734532 h 1743959"/>
+              <a:gd name="connsiteX8" fmla="*/ 0 w 2988297"/>
+              <a:gd name="connsiteY8" fmla="*/ 9427 h 1743959"/>
+              <a:gd name="connsiteX0" fmla="*/ 0 w 2988297"/>
+              <a:gd name="connsiteY0" fmla="*/ 9427 h 1743959"/>
+              <a:gd name="connsiteX1" fmla="*/ 2111603 w 2988297"/>
+              <a:gd name="connsiteY1" fmla="*/ 0 h 1743959"/>
+              <a:gd name="connsiteX2" fmla="*/ 2161135 w 2988297"/>
+              <a:gd name="connsiteY2" fmla="*/ 10448 h 1743959"/>
+              <a:gd name="connsiteX3" fmla="*/ 2978870 w 2988297"/>
+              <a:gd name="connsiteY3" fmla="*/ 75415 h 1743959"/>
+              <a:gd name="connsiteX4" fmla="*/ 2988297 w 2988297"/>
+              <a:gd name="connsiteY4" fmla="*/ 443060 h 1743959"/>
+              <a:gd name="connsiteX5" fmla="*/ 2130457 w 2988297"/>
+              <a:gd name="connsiteY5" fmla="*/ 433633 h 1743959"/>
+              <a:gd name="connsiteX6" fmla="*/ 2130458 w 2988297"/>
+              <a:gd name="connsiteY6" fmla="*/ 1743959 h 1743959"/>
+              <a:gd name="connsiteX7" fmla="*/ 0 w 2988297"/>
+              <a:gd name="connsiteY7" fmla="*/ 1734532 h 1743959"/>
+              <a:gd name="connsiteX8" fmla="*/ 0 w 2988297"/>
+              <a:gd name="connsiteY8" fmla="*/ 9427 h 1743959"/>
+              <a:gd name="connsiteX0" fmla="*/ 0 w 3024590"/>
+              <a:gd name="connsiteY0" fmla="*/ 9427 h 1743959"/>
+              <a:gd name="connsiteX1" fmla="*/ 2111603 w 3024590"/>
+              <a:gd name="connsiteY1" fmla="*/ 0 h 1743959"/>
+              <a:gd name="connsiteX2" fmla="*/ 2161135 w 3024590"/>
+              <a:gd name="connsiteY2" fmla="*/ 10448 h 1743959"/>
+              <a:gd name="connsiteX3" fmla="*/ 3024590 w 3024590"/>
+              <a:gd name="connsiteY3" fmla="*/ 10645 h 1743959"/>
+              <a:gd name="connsiteX4" fmla="*/ 2988297 w 3024590"/>
+              <a:gd name="connsiteY4" fmla="*/ 443060 h 1743959"/>
+              <a:gd name="connsiteX5" fmla="*/ 2130457 w 3024590"/>
+              <a:gd name="connsiteY5" fmla="*/ 433633 h 1743959"/>
+              <a:gd name="connsiteX6" fmla="*/ 2130458 w 3024590"/>
+              <a:gd name="connsiteY6" fmla="*/ 1743959 h 1743959"/>
+              <a:gd name="connsiteX7" fmla="*/ 0 w 3024590"/>
+              <a:gd name="connsiteY7" fmla="*/ 1734532 h 1743959"/>
+              <a:gd name="connsiteX8" fmla="*/ 0 w 3024590"/>
+              <a:gd name="connsiteY8" fmla="*/ 9427 h 1743959"/>
+              <a:gd name="connsiteX0" fmla="*/ 0 w 3024590"/>
+              <a:gd name="connsiteY0" fmla="*/ 9427 h 1743959"/>
+              <a:gd name="connsiteX1" fmla="*/ 2111603 w 3024590"/>
+              <a:gd name="connsiteY1" fmla="*/ 0 h 1743959"/>
+              <a:gd name="connsiteX2" fmla="*/ 2161135 w 3024590"/>
+              <a:gd name="connsiteY2" fmla="*/ 10448 h 1743959"/>
+              <a:gd name="connsiteX3" fmla="*/ 3024590 w 3024590"/>
+              <a:gd name="connsiteY3" fmla="*/ 10645 h 1743959"/>
+              <a:gd name="connsiteX4" fmla="*/ 3022587 w 3024590"/>
+              <a:gd name="connsiteY4" fmla="*/ 446870 h 1743959"/>
+              <a:gd name="connsiteX5" fmla="*/ 2130457 w 3024590"/>
+              <a:gd name="connsiteY5" fmla="*/ 433633 h 1743959"/>
+              <a:gd name="connsiteX6" fmla="*/ 2130458 w 3024590"/>
+              <a:gd name="connsiteY6" fmla="*/ 1743959 h 1743959"/>
+              <a:gd name="connsiteX7" fmla="*/ 0 w 3024590"/>
+              <a:gd name="connsiteY7" fmla="*/ 1734532 h 1743959"/>
+              <a:gd name="connsiteX8" fmla="*/ 0 w 3024590"/>
+              <a:gd name="connsiteY8" fmla="*/ 9427 h 1743959"/>
+              <a:gd name="connsiteX0" fmla="*/ 0 w 3024590"/>
+              <a:gd name="connsiteY0" fmla="*/ 9427 h 1743959"/>
+              <a:gd name="connsiteX1" fmla="*/ 2111603 w 3024590"/>
+              <a:gd name="connsiteY1" fmla="*/ 0 h 1743959"/>
+              <a:gd name="connsiteX2" fmla="*/ 2164945 w 3024590"/>
+              <a:gd name="connsiteY2" fmla="*/ 14258 h 1743959"/>
+              <a:gd name="connsiteX3" fmla="*/ 3024590 w 3024590"/>
+              <a:gd name="connsiteY3" fmla="*/ 10645 h 1743959"/>
+              <a:gd name="connsiteX4" fmla="*/ 3022587 w 3024590"/>
+              <a:gd name="connsiteY4" fmla="*/ 446870 h 1743959"/>
+              <a:gd name="connsiteX5" fmla="*/ 2130457 w 3024590"/>
+              <a:gd name="connsiteY5" fmla="*/ 433633 h 1743959"/>
+              <a:gd name="connsiteX6" fmla="*/ 2130458 w 3024590"/>
+              <a:gd name="connsiteY6" fmla="*/ 1743959 h 1743959"/>
+              <a:gd name="connsiteX7" fmla="*/ 0 w 3024590"/>
+              <a:gd name="connsiteY7" fmla="*/ 1734532 h 1743959"/>
+              <a:gd name="connsiteX8" fmla="*/ 0 w 3024590"/>
+              <a:gd name="connsiteY8" fmla="*/ 9427 h 1743959"/>
+              <a:gd name="connsiteX0" fmla="*/ 0 w 3024590"/>
+              <a:gd name="connsiteY0" fmla="*/ 9427 h 1743959"/>
+              <a:gd name="connsiteX1" fmla="*/ 2111603 w 3024590"/>
+              <a:gd name="connsiteY1" fmla="*/ 0 h 1743959"/>
+              <a:gd name="connsiteX2" fmla="*/ 2157325 w 3024590"/>
+              <a:gd name="connsiteY2" fmla="*/ 10448 h 1743959"/>
+              <a:gd name="connsiteX3" fmla="*/ 3024590 w 3024590"/>
+              <a:gd name="connsiteY3" fmla="*/ 10645 h 1743959"/>
+              <a:gd name="connsiteX4" fmla="*/ 3022587 w 3024590"/>
+              <a:gd name="connsiteY4" fmla="*/ 446870 h 1743959"/>
+              <a:gd name="connsiteX5" fmla="*/ 2130457 w 3024590"/>
+              <a:gd name="connsiteY5" fmla="*/ 433633 h 1743959"/>
+              <a:gd name="connsiteX6" fmla="*/ 2130458 w 3024590"/>
+              <a:gd name="connsiteY6" fmla="*/ 1743959 h 1743959"/>
+              <a:gd name="connsiteX7" fmla="*/ 0 w 3024590"/>
+              <a:gd name="connsiteY7" fmla="*/ 1734532 h 1743959"/>
+              <a:gd name="connsiteX8" fmla="*/ 0 w 3024590"/>
+              <a:gd name="connsiteY8" fmla="*/ 9427 h 1743959"/>
+              <a:gd name="connsiteX0" fmla="*/ 0 w 3024590"/>
+              <a:gd name="connsiteY0" fmla="*/ 15102 h 1749634"/>
+              <a:gd name="connsiteX1" fmla="*/ 2111603 w 3024590"/>
+              <a:gd name="connsiteY1" fmla="*/ 5675 h 1749634"/>
+              <a:gd name="connsiteX2" fmla="*/ 2214475 w 3024590"/>
+              <a:gd name="connsiteY2" fmla="*/ 8503 h 1749634"/>
+              <a:gd name="connsiteX3" fmla="*/ 3024590 w 3024590"/>
+              <a:gd name="connsiteY3" fmla="*/ 16320 h 1749634"/>
+              <a:gd name="connsiteX4" fmla="*/ 3022587 w 3024590"/>
+              <a:gd name="connsiteY4" fmla="*/ 452545 h 1749634"/>
+              <a:gd name="connsiteX5" fmla="*/ 2130457 w 3024590"/>
+              <a:gd name="connsiteY5" fmla="*/ 439308 h 1749634"/>
+              <a:gd name="connsiteX6" fmla="*/ 2130458 w 3024590"/>
+              <a:gd name="connsiteY6" fmla="*/ 1749634 h 1749634"/>
+              <a:gd name="connsiteX7" fmla="*/ 0 w 3024590"/>
+              <a:gd name="connsiteY7" fmla="*/ 1740207 h 1749634"/>
+              <a:gd name="connsiteX8" fmla="*/ 0 w 3024590"/>
+              <a:gd name="connsiteY8" fmla="*/ 15102 h 1749634"/>
+              <a:gd name="connsiteX0" fmla="*/ 0 w 3024590"/>
+              <a:gd name="connsiteY0" fmla="*/ 15102 h 1749634"/>
+              <a:gd name="connsiteX1" fmla="*/ 2027783 w 3024590"/>
+              <a:gd name="connsiteY1" fmla="*/ 5675 h 1749634"/>
+              <a:gd name="connsiteX2" fmla="*/ 2214475 w 3024590"/>
+              <a:gd name="connsiteY2" fmla="*/ 8503 h 1749634"/>
+              <a:gd name="connsiteX3" fmla="*/ 3024590 w 3024590"/>
+              <a:gd name="connsiteY3" fmla="*/ 16320 h 1749634"/>
+              <a:gd name="connsiteX4" fmla="*/ 3022587 w 3024590"/>
+              <a:gd name="connsiteY4" fmla="*/ 452545 h 1749634"/>
+              <a:gd name="connsiteX5" fmla="*/ 2130457 w 3024590"/>
+              <a:gd name="connsiteY5" fmla="*/ 439308 h 1749634"/>
+              <a:gd name="connsiteX6" fmla="*/ 2130458 w 3024590"/>
+              <a:gd name="connsiteY6" fmla="*/ 1749634 h 1749634"/>
+              <a:gd name="connsiteX7" fmla="*/ 0 w 3024590"/>
+              <a:gd name="connsiteY7" fmla="*/ 1740207 h 1749634"/>
+              <a:gd name="connsiteX8" fmla="*/ 0 w 3024590"/>
+              <a:gd name="connsiteY8" fmla="*/ 15102 h 1749634"/>
+              <a:gd name="connsiteX0" fmla="*/ 0 w 3024590"/>
+              <a:gd name="connsiteY0" fmla="*/ 14652 h 1749184"/>
+              <a:gd name="connsiteX1" fmla="*/ 2031593 w 3024590"/>
+              <a:gd name="connsiteY1" fmla="*/ 9035 h 1749184"/>
+              <a:gd name="connsiteX2" fmla="*/ 2214475 w 3024590"/>
+              <a:gd name="connsiteY2" fmla="*/ 8053 h 1749184"/>
+              <a:gd name="connsiteX3" fmla="*/ 3024590 w 3024590"/>
+              <a:gd name="connsiteY3" fmla="*/ 15870 h 1749184"/>
+              <a:gd name="connsiteX4" fmla="*/ 3022587 w 3024590"/>
+              <a:gd name="connsiteY4" fmla="*/ 452095 h 1749184"/>
+              <a:gd name="connsiteX5" fmla="*/ 2130457 w 3024590"/>
+              <a:gd name="connsiteY5" fmla="*/ 438858 h 1749184"/>
+              <a:gd name="connsiteX6" fmla="*/ 2130458 w 3024590"/>
+              <a:gd name="connsiteY6" fmla="*/ 1749184 h 1749184"/>
+              <a:gd name="connsiteX7" fmla="*/ 0 w 3024590"/>
+              <a:gd name="connsiteY7" fmla="*/ 1739757 h 1749184"/>
+              <a:gd name="connsiteX8" fmla="*/ 0 w 3024590"/>
+              <a:gd name="connsiteY8" fmla="*/ 14652 h 1749184"/>
+              <a:gd name="connsiteX0" fmla="*/ 0 w 3024590"/>
+              <a:gd name="connsiteY0" fmla="*/ 19404 h 1753936"/>
+              <a:gd name="connsiteX1" fmla="*/ 2031593 w 3024590"/>
+              <a:gd name="connsiteY1" fmla="*/ 13787 h 1753936"/>
+              <a:gd name="connsiteX2" fmla="*/ 2214475 w 3024590"/>
+              <a:gd name="connsiteY2" fmla="*/ 12805 h 1753936"/>
+              <a:gd name="connsiteX3" fmla="*/ 3024590 w 3024590"/>
+              <a:gd name="connsiteY3" fmla="*/ 20622 h 1753936"/>
+              <a:gd name="connsiteX4" fmla="*/ 3022587 w 3024590"/>
+              <a:gd name="connsiteY4" fmla="*/ 456847 h 1753936"/>
+              <a:gd name="connsiteX5" fmla="*/ 2130457 w 3024590"/>
+              <a:gd name="connsiteY5" fmla="*/ 443610 h 1753936"/>
+              <a:gd name="connsiteX6" fmla="*/ 2130458 w 3024590"/>
+              <a:gd name="connsiteY6" fmla="*/ 1753936 h 1753936"/>
+              <a:gd name="connsiteX7" fmla="*/ 0 w 3024590"/>
+              <a:gd name="connsiteY7" fmla="*/ 1744509 h 1753936"/>
+              <a:gd name="connsiteX8" fmla="*/ 0 w 3024590"/>
+              <a:gd name="connsiteY8" fmla="*/ 19404 h 1753936"/>
+              <a:gd name="connsiteX0" fmla="*/ 0 w 3024590"/>
+              <a:gd name="connsiteY0" fmla="*/ 5617 h 1740149"/>
+              <a:gd name="connsiteX1" fmla="*/ 2031593 w 3024590"/>
+              <a:gd name="connsiteY1" fmla="*/ 0 h 1740149"/>
+              <a:gd name="connsiteX2" fmla="*/ 2241145 w 3024590"/>
+              <a:gd name="connsiteY2" fmla="*/ 14258 h 1740149"/>
+              <a:gd name="connsiteX3" fmla="*/ 3024590 w 3024590"/>
+              <a:gd name="connsiteY3" fmla="*/ 6835 h 1740149"/>
+              <a:gd name="connsiteX4" fmla="*/ 3022587 w 3024590"/>
+              <a:gd name="connsiteY4" fmla="*/ 443060 h 1740149"/>
+              <a:gd name="connsiteX5" fmla="*/ 2130457 w 3024590"/>
+              <a:gd name="connsiteY5" fmla="*/ 429823 h 1740149"/>
+              <a:gd name="connsiteX6" fmla="*/ 2130458 w 3024590"/>
+              <a:gd name="connsiteY6" fmla="*/ 1740149 h 1740149"/>
+              <a:gd name="connsiteX7" fmla="*/ 0 w 3024590"/>
+              <a:gd name="connsiteY7" fmla="*/ 1730722 h 1740149"/>
+              <a:gd name="connsiteX8" fmla="*/ 0 w 3024590"/>
+              <a:gd name="connsiteY8" fmla="*/ 5617 h 1740149"/>
+              <a:gd name="connsiteX0" fmla="*/ 0 w 3024590"/>
+              <a:gd name="connsiteY0" fmla="*/ 5617 h 1740149"/>
+              <a:gd name="connsiteX1" fmla="*/ 2031593 w 3024590"/>
+              <a:gd name="connsiteY1" fmla="*/ 0 h 1740149"/>
+              <a:gd name="connsiteX2" fmla="*/ 2229715 w 3024590"/>
+              <a:gd name="connsiteY2" fmla="*/ 6638 h 1740149"/>
+              <a:gd name="connsiteX3" fmla="*/ 3024590 w 3024590"/>
+              <a:gd name="connsiteY3" fmla="*/ 6835 h 1740149"/>
+              <a:gd name="connsiteX4" fmla="*/ 3022587 w 3024590"/>
+              <a:gd name="connsiteY4" fmla="*/ 443060 h 1740149"/>
+              <a:gd name="connsiteX5" fmla="*/ 2130457 w 3024590"/>
+              <a:gd name="connsiteY5" fmla="*/ 429823 h 1740149"/>
+              <a:gd name="connsiteX6" fmla="*/ 2130458 w 3024590"/>
+              <a:gd name="connsiteY6" fmla="*/ 1740149 h 1740149"/>
+              <a:gd name="connsiteX7" fmla="*/ 0 w 3024590"/>
+              <a:gd name="connsiteY7" fmla="*/ 1730722 h 1740149"/>
+              <a:gd name="connsiteX8" fmla="*/ 0 w 3024590"/>
+              <a:gd name="connsiteY8" fmla="*/ 5617 h 1740149"/>
+            </a:gdLst>
+            <a:ahLst/>
+            <a:cxnLst>
+              <a:cxn ang="0">
+                <a:pos x="connsiteX0" y="connsiteY0"/>
+              </a:cxn>
+              <a:cxn ang="0">
+                <a:pos x="connsiteX1" y="connsiteY1"/>
+              </a:cxn>
+              <a:cxn ang="0">
+                <a:pos x="connsiteX2" y="connsiteY2"/>
+              </a:cxn>
+              <a:cxn ang="0">
+                <a:pos x="connsiteX3" y="connsiteY3"/>
+              </a:cxn>
+              <a:cxn ang="0">
+                <a:pos x="connsiteX4" y="connsiteY4"/>
+              </a:cxn>
+              <a:cxn ang="0">
+                <a:pos x="connsiteX5" y="connsiteY5"/>
+              </a:cxn>
+              <a:cxn ang="0">
+                <a:pos x="connsiteX6" y="connsiteY6"/>
+              </a:cxn>
+              <a:cxn ang="0">
+                <a:pos x="connsiteX7" y="connsiteY7"/>
+              </a:cxn>
+              <a:cxn ang="0">
+                <a:pos x="connsiteX8" y="connsiteY8"/>
+              </a:cxn>
+            </a:cxnLst>
+            <a:rect l="l" t="t" r="r" b="b"/>
+            <a:pathLst>
+              <a:path w="3024590" h="1740149">
+                <a:moveTo>
+                  <a:pt x="0" y="5617"/>
+                </a:moveTo>
+                <a:lnTo>
+                  <a:pt x="2031593" y="0"/>
+                </a:lnTo>
+                <a:lnTo>
+                  <a:pt x="2229715" y="6638"/>
+                </a:lnTo>
+                <a:lnTo>
+                  <a:pt x="3024590" y="6835"/>
+                </a:lnTo>
+                <a:cubicBezTo>
+                  <a:pt x="3023922" y="152243"/>
+                  <a:pt x="3023255" y="297652"/>
+                  <a:pt x="3022587" y="443060"/>
+                </a:cubicBezTo>
+                <a:lnTo>
+                  <a:pt x="2130457" y="429823"/>
+                </a:lnTo>
+                <a:cubicBezTo>
+                  <a:pt x="2130457" y="869740"/>
+                  <a:pt x="2130458" y="1300232"/>
+                  <a:pt x="2130458" y="1740149"/>
+                </a:cubicBezTo>
+                <a:lnTo>
+                  <a:pt x="0" y="1730722"/>
+                </a:lnTo>
+                <a:lnTo>
+                  <a:pt x="0" y="5617"/>
+                </a:lnTo>
+                <a:close/>
+              </a:path>
+            </a:pathLst>
+          </a:custGeom>
+          <a:noFill/>
+          <a:ln w="19050">
+            <a:solidFill>
+              <a:schemeClr val="accent2">
+                <a:lumMod val="75000"/>
+              </a:schemeClr>
+            </a:solidFill>
+          </a:ln>
+        </p:spPr>
+        <p:style>
+          <a:lnRef idx="2">
+            <a:schemeClr val="accent1">
+              <a:shade val="50000"/>
+            </a:schemeClr>
+          </a:lnRef>
+          <a:fillRef idx="1">
+            <a:schemeClr val="accent1"/>
+          </a:fillRef>
+          <a:effectRef idx="0">
+            <a:schemeClr val="accent1"/>
+          </a:effectRef>
+          <a:fontRef idx="minor">
+            <a:schemeClr val="lt1"/>
+          </a:fontRef>
+        </p:style>
+        <p:txBody>
+          <a:bodyPr rtlCol="0" anchor="ctr"/>
+          <a:lstStyle/>
+          <a:p>
+            <a:pPr algn="ctr"/>
+            <a:endParaRPr lang="fr-FR"/>
           </a:p>
         </p:txBody>
       </p:sp>

</xml_diff>

<commit_message>
improvement of the cheat sheet
</commit_message>
<xml_diff>
--- a/share/techdoc/DRomics_cheat_sheet.pptx
+++ b/share/techdoc/DRomics_cheat_sheet.pptx
@@ -200,7 +200,7 @@
           <a:p>
             <a:fld id="{B46EB170-A30A-4282-BD97-32DC0F0C86F5}" type="datetimeFigureOut">
               <a:rPr lang="fr-FR" smtClean="0"/>
-              <a:t>21/09/2021</a:t>
+              <a:t>22/09/2021</a:t>
             </a:fld>
             <a:endParaRPr lang="fr-FR"/>
           </a:p>
@@ -683,7 +683,7 @@
           <a:p>
             <a:fld id="{B315C685-8D59-4959-AED8-536804758F6D}" type="datetimeFigureOut">
               <a:rPr lang="fr-FR" smtClean="0"/>
-              <a:t>21/09/2021</a:t>
+              <a:t>22/09/2021</a:t>
             </a:fld>
             <a:endParaRPr lang="fr-FR"/>
           </a:p>
@@ -853,7 +853,7 @@
           <a:p>
             <a:fld id="{B315C685-8D59-4959-AED8-536804758F6D}" type="datetimeFigureOut">
               <a:rPr lang="fr-FR" smtClean="0"/>
-              <a:t>21/09/2021</a:t>
+              <a:t>22/09/2021</a:t>
             </a:fld>
             <a:endParaRPr lang="fr-FR"/>
           </a:p>
@@ -1033,7 +1033,7 @@
           <a:p>
             <a:fld id="{B315C685-8D59-4959-AED8-536804758F6D}" type="datetimeFigureOut">
               <a:rPr lang="fr-FR" smtClean="0"/>
-              <a:t>21/09/2021</a:t>
+              <a:t>22/09/2021</a:t>
             </a:fld>
             <a:endParaRPr lang="fr-FR"/>
           </a:p>
@@ -1203,7 +1203,7 @@
           <a:p>
             <a:fld id="{B315C685-8D59-4959-AED8-536804758F6D}" type="datetimeFigureOut">
               <a:rPr lang="fr-FR" smtClean="0"/>
-              <a:t>21/09/2021</a:t>
+              <a:t>22/09/2021</a:t>
             </a:fld>
             <a:endParaRPr lang="fr-FR"/>
           </a:p>
@@ -1447,7 +1447,7 @@
           <a:p>
             <a:fld id="{B315C685-8D59-4959-AED8-536804758F6D}" type="datetimeFigureOut">
               <a:rPr lang="fr-FR" smtClean="0"/>
-              <a:t>21/09/2021</a:t>
+              <a:t>22/09/2021</a:t>
             </a:fld>
             <a:endParaRPr lang="fr-FR"/>
           </a:p>
@@ -1679,7 +1679,7 @@
           <a:p>
             <a:fld id="{B315C685-8D59-4959-AED8-536804758F6D}" type="datetimeFigureOut">
               <a:rPr lang="fr-FR" smtClean="0"/>
-              <a:t>21/09/2021</a:t>
+              <a:t>22/09/2021</a:t>
             </a:fld>
             <a:endParaRPr lang="fr-FR"/>
           </a:p>
@@ -2046,7 +2046,7 @@
           <a:p>
             <a:fld id="{B315C685-8D59-4959-AED8-536804758F6D}" type="datetimeFigureOut">
               <a:rPr lang="fr-FR" smtClean="0"/>
-              <a:t>21/09/2021</a:t>
+              <a:t>22/09/2021</a:t>
             </a:fld>
             <a:endParaRPr lang="fr-FR"/>
           </a:p>
@@ -2164,7 +2164,7 @@
           <a:p>
             <a:fld id="{B315C685-8D59-4959-AED8-536804758F6D}" type="datetimeFigureOut">
               <a:rPr lang="fr-FR" smtClean="0"/>
-              <a:t>21/09/2021</a:t>
+              <a:t>22/09/2021</a:t>
             </a:fld>
             <a:endParaRPr lang="fr-FR"/>
           </a:p>
@@ -2259,7 +2259,7 @@
           <a:p>
             <a:fld id="{B315C685-8D59-4959-AED8-536804758F6D}" type="datetimeFigureOut">
               <a:rPr lang="fr-FR" smtClean="0"/>
-              <a:t>21/09/2021</a:t>
+              <a:t>22/09/2021</a:t>
             </a:fld>
             <a:endParaRPr lang="fr-FR"/>
           </a:p>
@@ -2536,7 +2536,7 @@
           <a:p>
             <a:fld id="{B315C685-8D59-4959-AED8-536804758F6D}" type="datetimeFigureOut">
               <a:rPr lang="fr-FR" smtClean="0"/>
-              <a:t>21/09/2021</a:t>
+              <a:t>22/09/2021</a:t>
             </a:fld>
             <a:endParaRPr lang="fr-FR"/>
           </a:p>
@@ -2793,7 +2793,7 @@
           <a:p>
             <a:fld id="{B315C685-8D59-4959-AED8-536804758F6D}" type="datetimeFigureOut">
               <a:rPr lang="fr-FR" smtClean="0"/>
-              <a:t>21/09/2021</a:t>
+              <a:t>22/09/2021</a:t>
             </a:fld>
             <a:endParaRPr lang="fr-FR"/>
           </a:p>
@@ -3006,7 +3006,7 @@
           <a:p>
             <a:fld id="{B315C685-8D59-4959-AED8-536804758F6D}" type="datetimeFigureOut">
               <a:rPr lang="fr-FR" smtClean="0"/>
-              <a:t>21/09/2021</a:t>
+              <a:t>22/09/2021</a:t>
             </a:fld>
             <a:endParaRPr lang="fr-FR"/>
           </a:p>
@@ -3493,14 +3493,14 @@
       </p:sp>
       <p:sp>
         <p:nvSpPr>
-          <p:cNvPr id="10" name="ZoneTexte 9"/>
+          <p:cNvPr id="19" name="ZoneTexte 18"/>
           <p:cNvSpPr txBox="1"/>
           <p:nvPr/>
         </p:nvSpPr>
         <p:spPr>
           <a:xfrm>
-            <a:off x="351473" y="1440146"/>
-            <a:ext cx="3223260" cy="253916"/>
+            <a:off x="367651" y="6033562"/>
+            <a:ext cx="1654715" cy="784830"/>
           </a:xfrm>
           <a:prstGeom prst="rect">
             <a:avLst/>
@@ -3514,680 +3514,6 @@
           <a:lstStyle/>
           <a:p>
             <a:r>
-              <a:rPr lang="fr-FR" sz="1050" b="1" dirty="0" err="1">
-                <a:solidFill>
-                  <a:schemeClr val="accent2">
-                    <a:lumMod val="50000"/>
-                  </a:schemeClr>
-                </a:solidFill>
-              </a:rPr>
-              <a:t>Step</a:t>
-            </a:r>
-            <a:r>
-              <a:rPr lang="fr-FR" sz="1050" b="1" dirty="0">
-                <a:solidFill>
-                  <a:schemeClr val="accent2">
-                    <a:lumMod val="50000"/>
-                  </a:schemeClr>
-                </a:solidFill>
-              </a:rPr>
-              <a:t> 1: import, check and </a:t>
-            </a:r>
-            <a:r>
-              <a:rPr lang="fr-FR" sz="1050" b="1" dirty="0" err="1">
-                <a:solidFill>
-                  <a:schemeClr val="accent2">
-                    <a:lumMod val="50000"/>
-                  </a:schemeClr>
-                </a:solidFill>
-              </a:rPr>
-              <a:t>pretreatment</a:t>
-            </a:r>
-            <a:endParaRPr lang="fr-FR" sz="1050" b="1" dirty="0">
-              <a:solidFill>
-                <a:schemeClr val="accent2">
-                  <a:lumMod val="50000"/>
-                </a:schemeClr>
-              </a:solidFill>
-            </a:endParaRPr>
-          </a:p>
-        </p:txBody>
-      </p:sp>
-      <p:sp>
-        <p:nvSpPr>
-          <p:cNvPr id="11" name="ZoneTexte 10"/>
-          <p:cNvSpPr txBox="1"/>
-          <p:nvPr/>
-        </p:nvSpPr>
-        <p:spPr>
-          <a:xfrm>
-            <a:off x="117790" y="2491192"/>
-            <a:ext cx="4108514" cy="338554"/>
-          </a:xfrm>
-          <a:prstGeom prst="rect">
-            <a:avLst/>
-          </a:prstGeom>
-          <a:noFill/>
-        </p:spPr>
-        <p:txBody>
-          <a:bodyPr wrap="square" rtlCol="0">
-            <a:spAutoFit/>
-          </a:bodyPr>
-          <a:lstStyle/>
-          <a:p>
-            <a:r>
-              <a:rPr lang="fr-FR" sz="800" dirty="0" err="1">
-                <a:latin typeface="Courier New" panose="02070309020205020404" pitchFamily="49" charset="0"/>
-                <a:cs typeface="Courier New" panose="02070309020205020404" pitchFamily="49" charset="0"/>
-              </a:rPr>
-              <a:t>itemselect</a:t>
-            </a:r>
-            <a:r>
-              <a:rPr lang="fr-FR" sz="800" dirty="0">
-                <a:latin typeface="Courier New" panose="02070309020205020404" pitchFamily="49" charset="0"/>
-                <a:cs typeface="Courier New" panose="02070309020205020404" pitchFamily="49" charset="0"/>
-              </a:rPr>
-              <a:t>(</a:t>
-            </a:r>
-            <a:r>
-              <a:rPr lang="fr-FR" sz="800" dirty="0" err="1">
-                <a:latin typeface="Courier New" panose="02070309020205020404" pitchFamily="49" charset="0"/>
-                <a:cs typeface="Courier New" panose="02070309020205020404" pitchFamily="49" charset="0"/>
-              </a:rPr>
-              <a:t>omicdata</a:t>
-            </a:r>
-            <a:r>
-              <a:rPr lang="fr-FR" sz="800" dirty="0">
-                <a:latin typeface="Courier New" panose="02070309020205020404" pitchFamily="49" charset="0"/>
-                <a:cs typeface="Courier New" panose="02070309020205020404" pitchFamily="49" charset="0"/>
-              </a:rPr>
-              <a:t>, </a:t>
-            </a:r>
-          </a:p>
-          <a:p>
-            <a:r>
-              <a:rPr lang="fr-FR" sz="800" dirty="0">
-                <a:latin typeface="Courier New" panose="02070309020205020404" pitchFamily="49" charset="0"/>
-                <a:cs typeface="Courier New" panose="02070309020205020404" pitchFamily="49" charset="0"/>
-              </a:rPr>
-              <a:t>   </a:t>
-            </a:r>
-            <a:r>
-              <a:rPr lang="fr-FR" sz="800" dirty="0" err="1">
-                <a:latin typeface="Courier New" panose="02070309020205020404" pitchFamily="49" charset="0"/>
-                <a:cs typeface="Courier New" panose="02070309020205020404" pitchFamily="49" charset="0"/>
-              </a:rPr>
-              <a:t>select.method</a:t>
-            </a:r>
-            <a:r>
-              <a:rPr lang="fr-FR" sz="800" dirty="0">
-                <a:latin typeface="Courier New" panose="02070309020205020404" pitchFamily="49" charset="0"/>
-                <a:cs typeface="Courier New" panose="02070309020205020404" pitchFamily="49" charset="0"/>
-              </a:rPr>
-              <a:t> = c("</a:t>
-            </a:r>
-            <a:r>
-              <a:rPr lang="fr-FR" sz="800" dirty="0" err="1">
-                <a:latin typeface="Courier New" panose="02070309020205020404" pitchFamily="49" charset="0"/>
-                <a:cs typeface="Courier New" panose="02070309020205020404" pitchFamily="49" charset="0"/>
-              </a:rPr>
-              <a:t>quadratic</a:t>
-            </a:r>
-            <a:r>
-              <a:rPr lang="fr-FR" sz="800" dirty="0">
-                <a:latin typeface="Courier New" panose="02070309020205020404" pitchFamily="49" charset="0"/>
-                <a:cs typeface="Courier New" panose="02070309020205020404" pitchFamily="49" charset="0"/>
-              </a:rPr>
-              <a:t>", "</a:t>
-            </a:r>
-            <a:r>
-              <a:rPr lang="fr-FR" sz="800" dirty="0" err="1">
-                <a:latin typeface="Courier New" panose="02070309020205020404" pitchFamily="49" charset="0"/>
-                <a:cs typeface="Courier New" panose="02070309020205020404" pitchFamily="49" charset="0"/>
-              </a:rPr>
-              <a:t>linear</a:t>
-            </a:r>
-            <a:r>
-              <a:rPr lang="fr-FR" sz="800" dirty="0">
-                <a:latin typeface="Courier New" panose="02070309020205020404" pitchFamily="49" charset="0"/>
-                <a:cs typeface="Courier New" panose="02070309020205020404" pitchFamily="49" charset="0"/>
-              </a:rPr>
-              <a:t>", "ANOVA"), FDR)</a:t>
-            </a:r>
-          </a:p>
-        </p:txBody>
-      </p:sp>
-      <p:sp>
-        <p:nvSpPr>
-          <p:cNvPr id="12" name="ZoneTexte 11"/>
-          <p:cNvSpPr txBox="1"/>
-          <p:nvPr/>
-        </p:nvSpPr>
-        <p:spPr>
-          <a:xfrm>
-            <a:off x="356045" y="2306234"/>
-            <a:ext cx="3223260" cy="253916"/>
-          </a:xfrm>
-          <a:prstGeom prst="rect">
-            <a:avLst/>
-          </a:prstGeom>
-          <a:noFill/>
-        </p:spPr>
-        <p:txBody>
-          <a:bodyPr wrap="square" rtlCol="0">
-            <a:spAutoFit/>
-          </a:bodyPr>
-          <a:lstStyle/>
-          <a:p>
-            <a:r>
-              <a:rPr lang="fr-FR" sz="1050" b="1" dirty="0" err="1">
-                <a:solidFill>
-                  <a:schemeClr val="accent2">
-                    <a:lumMod val="50000"/>
-                  </a:schemeClr>
-                </a:solidFill>
-              </a:rPr>
-              <a:t>Step</a:t>
-            </a:r>
-            <a:r>
-              <a:rPr lang="fr-FR" sz="1050" b="1" dirty="0">
-                <a:solidFill>
-                  <a:schemeClr val="accent2">
-                    <a:lumMod val="50000"/>
-                  </a:schemeClr>
-                </a:solidFill>
-              </a:rPr>
-              <a:t> 2: </a:t>
-            </a:r>
-            <a:r>
-              <a:rPr lang="fr-FR" sz="1050" b="1" dirty="0" err="1">
-                <a:solidFill>
-                  <a:schemeClr val="accent2">
-                    <a:lumMod val="50000"/>
-                  </a:schemeClr>
-                </a:solidFill>
-              </a:rPr>
-              <a:t>selection</a:t>
-            </a:r>
-            <a:r>
-              <a:rPr lang="fr-FR" sz="1050" b="1" dirty="0">
-                <a:solidFill>
-                  <a:schemeClr val="accent2">
-                    <a:lumMod val="50000"/>
-                  </a:schemeClr>
-                </a:solidFill>
-              </a:rPr>
-              <a:t> of </a:t>
-            </a:r>
-            <a:r>
-              <a:rPr lang="fr-FR" sz="1050" b="1" dirty="0" err="1">
-                <a:solidFill>
-                  <a:schemeClr val="accent2">
-                    <a:lumMod val="50000"/>
-                  </a:schemeClr>
-                </a:solidFill>
-              </a:rPr>
-              <a:t>significantly</a:t>
-            </a:r>
-            <a:r>
-              <a:rPr lang="fr-FR" sz="1050" b="1" dirty="0">
-                <a:solidFill>
-                  <a:schemeClr val="accent2">
-                    <a:lumMod val="50000"/>
-                  </a:schemeClr>
-                </a:solidFill>
-              </a:rPr>
-              <a:t> responsive items</a:t>
-            </a:r>
-          </a:p>
-        </p:txBody>
-      </p:sp>
-      <p:sp>
-        <p:nvSpPr>
-          <p:cNvPr id="13" name="ZoneTexte 12"/>
-          <p:cNvSpPr txBox="1"/>
-          <p:nvPr/>
-        </p:nvSpPr>
-        <p:spPr>
-          <a:xfrm>
-            <a:off x="157938" y="3029033"/>
-            <a:ext cx="4303003" cy="215444"/>
-          </a:xfrm>
-          <a:prstGeom prst="rect">
-            <a:avLst/>
-          </a:prstGeom>
-          <a:noFill/>
-        </p:spPr>
-        <p:txBody>
-          <a:bodyPr wrap="square" rtlCol="0">
-            <a:spAutoFit/>
-          </a:bodyPr>
-          <a:lstStyle/>
-          <a:p>
-            <a:r>
-              <a:rPr lang="fr-FR" sz="800" dirty="0" err="1">
-                <a:latin typeface="Courier New" panose="02070309020205020404" pitchFamily="49" charset="0"/>
-                <a:cs typeface="Courier New" panose="02070309020205020404" pitchFamily="49" charset="0"/>
-              </a:rPr>
-              <a:t>drcfit</a:t>
-            </a:r>
-            <a:r>
-              <a:rPr lang="fr-FR" sz="800" dirty="0">
-                <a:latin typeface="Courier New" panose="02070309020205020404" pitchFamily="49" charset="0"/>
-                <a:cs typeface="Courier New" panose="02070309020205020404" pitchFamily="49" charset="0"/>
-              </a:rPr>
-              <a:t>(</a:t>
-            </a:r>
-            <a:r>
-              <a:rPr lang="fr-FR" sz="800" dirty="0" err="1">
-                <a:latin typeface="Courier New" panose="02070309020205020404" pitchFamily="49" charset="0"/>
-                <a:cs typeface="Courier New" panose="02070309020205020404" pitchFamily="49" charset="0"/>
-              </a:rPr>
-              <a:t>itemselect</a:t>
-            </a:r>
-            <a:r>
-              <a:rPr lang="fr-FR" sz="800" dirty="0">
-                <a:latin typeface="Courier New" panose="02070309020205020404" pitchFamily="49" charset="0"/>
-                <a:cs typeface="Courier New" panose="02070309020205020404" pitchFamily="49" charset="0"/>
-              </a:rPr>
-              <a:t>, </a:t>
-            </a:r>
-            <a:r>
-              <a:rPr lang="fr-FR" sz="800" dirty="0" err="1">
-                <a:latin typeface="Courier New" panose="02070309020205020404" pitchFamily="49" charset="0"/>
-                <a:cs typeface="Courier New" panose="02070309020205020404" pitchFamily="49" charset="0"/>
-              </a:rPr>
-              <a:t>information.criterion</a:t>
-            </a:r>
-            <a:r>
-              <a:rPr lang="fr-FR" sz="800" dirty="0">
-                <a:latin typeface="Courier New" panose="02070309020205020404" pitchFamily="49" charset="0"/>
-                <a:cs typeface="Courier New" panose="02070309020205020404" pitchFamily="49" charset="0"/>
-              </a:rPr>
-              <a:t> = c("</a:t>
-            </a:r>
-            <a:r>
-              <a:rPr lang="fr-FR" sz="800" dirty="0" err="1">
-                <a:latin typeface="Courier New" panose="02070309020205020404" pitchFamily="49" charset="0"/>
-                <a:cs typeface="Courier New" panose="02070309020205020404" pitchFamily="49" charset="0"/>
-              </a:rPr>
-              <a:t>AICc</a:t>
-            </a:r>
-            <a:r>
-              <a:rPr lang="fr-FR" sz="800" dirty="0">
-                <a:latin typeface="Courier New" panose="02070309020205020404" pitchFamily="49" charset="0"/>
-                <a:cs typeface="Courier New" panose="02070309020205020404" pitchFamily="49" charset="0"/>
-              </a:rPr>
-              <a:t>", "BIC", "AIC"))</a:t>
-            </a:r>
-          </a:p>
-        </p:txBody>
-      </p:sp>
-      <p:sp>
-        <p:nvSpPr>
-          <p:cNvPr id="14" name="ZoneTexte 13"/>
-          <p:cNvSpPr txBox="1"/>
-          <p:nvPr/>
-        </p:nvSpPr>
-        <p:spPr>
-          <a:xfrm>
-            <a:off x="360617" y="2824284"/>
-            <a:ext cx="3223260" cy="253916"/>
-          </a:xfrm>
-          <a:prstGeom prst="rect">
-            <a:avLst/>
-          </a:prstGeom>
-          <a:noFill/>
-        </p:spPr>
-        <p:txBody>
-          <a:bodyPr wrap="square" rtlCol="0">
-            <a:spAutoFit/>
-          </a:bodyPr>
-          <a:lstStyle/>
-          <a:p>
-            <a:r>
-              <a:rPr lang="fr-FR" sz="1050" b="1" dirty="0" err="1">
-                <a:solidFill>
-                  <a:schemeClr val="accent2">
-                    <a:lumMod val="50000"/>
-                  </a:schemeClr>
-                </a:solidFill>
-              </a:rPr>
-              <a:t>Step</a:t>
-            </a:r>
-            <a:r>
-              <a:rPr lang="fr-FR" sz="1050" b="1" dirty="0">
-                <a:solidFill>
-                  <a:schemeClr val="accent2">
-                    <a:lumMod val="50000"/>
-                  </a:schemeClr>
-                </a:solidFill>
-              </a:rPr>
-              <a:t> 3: dose-</a:t>
-            </a:r>
-            <a:r>
-              <a:rPr lang="fr-FR" sz="1050" b="1" dirty="0" err="1">
-                <a:solidFill>
-                  <a:schemeClr val="accent2">
-                    <a:lumMod val="50000"/>
-                  </a:schemeClr>
-                </a:solidFill>
-              </a:rPr>
-              <a:t>response</a:t>
-            </a:r>
-            <a:r>
-              <a:rPr lang="fr-FR" sz="1050" b="1" dirty="0">
-                <a:solidFill>
-                  <a:schemeClr val="accent2">
-                    <a:lumMod val="50000"/>
-                  </a:schemeClr>
-                </a:solidFill>
-              </a:rPr>
-              <a:t> </a:t>
-            </a:r>
-            <a:r>
-              <a:rPr lang="fr-FR" sz="1050" b="1" dirty="0" err="1">
-                <a:solidFill>
-                  <a:schemeClr val="accent2">
-                    <a:lumMod val="50000"/>
-                  </a:schemeClr>
-                </a:solidFill>
-              </a:rPr>
-              <a:t>modelling</a:t>
-            </a:r>
-            <a:r>
-              <a:rPr lang="fr-FR" sz="1050" b="1" dirty="0">
-                <a:solidFill>
-                  <a:schemeClr val="accent2">
-                    <a:lumMod val="50000"/>
-                  </a:schemeClr>
-                </a:solidFill>
-              </a:rPr>
-              <a:t> for responsive items</a:t>
-            </a:r>
-          </a:p>
-        </p:txBody>
-      </p:sp>
-      <p:sp>
-        <p:nvSpPr>
-          <p:cNvPr id="15" name="ZoneTexte 14"/>
-          <p:cNvSpPr txBox="1"/>
-          <p:nvPr/>
-        </p:nvSpPr>
-        <p:spPr>
-          <a:xfrm>
-            <a:off x="164592" y="3411743"/>
-            <a:ext cx="3729038" cy="215444"/>
-          </a:xfrm>
-          <a:prstGeom prst="rect">
-            <a:avLst/>
-          </a:prstGeom>
-          <a:noFill/>
-        </p:spPr>
-        <p:txBody>
-          <a:bodyPr wrap="square" rtlCol="0">
-            <a:spAutoFit/>
-          </a:bodyPr>
-          <a:lstStyle/>
-          <a:p>
-            <a:r>
-              <a:rPr lang="fr-FR" sz="800" dirty="0" err="1">
-                <a:latin typeface="Courier New" panose="02070309020205020404" pitchFamily="49" charset="0"/>
-                <a:cs typeface="Courier New" panose="02070309020205020404" pitchFamily="49" charset="0"/>
-              </a:rPr>
-              <a:t>bmdcalc</a:t>
-            </a:r>
-            <a:r>
-              <a:rPr lang="fr-FR" sz="800" dirty="0">
-                <a:latin typeface="Courier New" panose="02070309020205020404" pitchFamily="49" charset="0"/>
-                <a:cs typeface="Courier New" panose="02070309020205020404" pitchFamily="49" charset="0"/>
-              </a:rPr>
-              <a:t>(f, z = 1, x = 10, </a:t>
-            </a:r>
-            <a:r>
-              <a:rPr lang="fr-FR" sz="800" dirty="0" err="1">
-                <a:latin typeface="Courier New" panose="02070309020205020404" pitchFamily="49" charset="0"/>
-                <a:cs typeface="Courier New" panose="02070309020205020404" pitchFamily="49" charset="0"/>
-              </a:rPr>
-              <a:t>minBMD</a:t>
-            </a:r>
-            <a:r>
-              <a:rPr lang="fr-FR" sz="800" dirty="0">
-                <a:latin typeface="Courier New" panose="02070309020205020404" pitchFamily="49" charset="0"/>
-                <a:cs typeface="Courier New" panose="02070309020205020404" pitchFamily="49" charset="0"/>
-              </a:rPr>
-              <a:t>)</a:t>
-            </a:r>
-          </a:p>
-        </p:txBody>
-      </p:sp>
-      <p:sp>
-        <p:nvSpPr>
-          <p:cNvPr id="16" name="ZoneTexte 15"/>
-          <p:cNvSpPr txBox="1"/>
-          <p:nvPr/>
-        </p:nvSpPr>
-        <p:spPr>
-          <a:xfrm>
-            <a:off x="358331" y="3240311"/>
-            <a:ext cx="3223260" cy="253916"/>
-          </a:xfrm>
-          <a:prstGeom prst="rect">
-            <a:avLst/>
-          </a:prstGeom>
-          <a:noFill/>
-        </p:spPr>
-        <p:txBody>
-          <a:bodyPr wrap="square" rtlCol="0">
-            <a:spAutoFit/>
-          </a:bodyPr>
-          <a:lstStyle/>
-          <a:p>
-            <a:r>
-              <a:rPr lang="fr-FR" sz="1050" b="1" dirty="0" err="1">
-                <a:solidFill>
-                  <a:schemeClr val="accent2">
-                    <a:lumMod val="50000"/>
-                  </a:schemeClr>
-                </a:solidFill>
-              </a:rPr>
-              <a:t>Step</a:t>
-            </a:r>
-            <a:r>
-              <a:rPr lang="fr-FR" sz="1050" b="1" dirty="0">
-                <a:solidFill>
-                  <a:schemeClr val="accent2">
-                    <a:lumMod val="50000"/>
-                  </a:schemeClr>
-                </a:solidFill>
-              </a:rPr>
-              <a:t> 4: Computation of benchmark doses</a:t>
-            </a:r>
-          </a:p>
-        </p:txBody>
-      </p:sp>
-      <p:sp>
-        <p:nvSpPr>
-          <p:cNvPr id="17" name="ZoneTexte 16"/>
-          <p:cNvSpPr txBox="1"/>
-          <p:nvPr/>
-        </p:nvSpPr>
-        <p:spPr>
-          <a:xfrm>
-            <a:off x="173148" y="3883952"/>
-            <a:ext cx="3729038" cy="215444"/>
-          </a:xfrm>
-          <a:prstGeom prst="rect">
-            <a:avLst/>
-          </a:prstGeom>
-          <a:noFill/>
-        </p:spPr>
-        <p:txBody>
-          <a:bodyPr wrap="square" rtlCol="0">
-            <a:spAutoFit/>
-          </a:bodyPr>
-          <a:lstStyle/>
-          <a:p>
-            <a:r>
-              <a:rPr lang="en-US" sz="800" dirty="0" err="1">
-                <a:latin typeface="Courier New" panose="02070309020205020404" pitchFamily="49" charset="0"/>
-                <a:cs typeface="Courier New" panose="02070309020205020404" pitchFamily="49" charset="0"/>
-              </a:rPr>
-              <a:t>bmdboot</a:t>
-            </a:r>
-            <a:r>
-              <a:rPr lang="en-US" sz="800" dirty="0">
-                <a:latin typeface="Courier New" panose="02070309020205020404" pitchFamily="49" charset="0"/>
-                <a:cs typeface="Courier New" panose="02070309020205020404" pitchFamily="49" charset="0"/>
-              </a:rPr>
-              <a:t>(r, niter = 1000, </a:t>
-            </a:r>
-            <a:r>
-              <a:rPr lang="en-US" sz="800" dirty="0" err="1">
-                <a:latin typeface="Courier New" panose="02070309020205020404" pitchFamily="49" charset="0"/>
-                <a:cs typeface="Courier New" panose="02070309020205020404" pitchFamily="49" charset="0"/>
-              </a:rPr>
-              <a:t>conf.level</a:t>
-            </a:r>
-            <a:r>
-              <a:rPr lang="en-US" sz="800" dirty="0">
-                <a:latin typeface="Courier New" panose="02070309020205020404" pitchFamily="49" charset="0"/>
-                <a:cs typeface="Courier New" panose="02070309020205020404" pitchFamily="49" charset="0"/>
-              </a:rPr>
-              <a:t> = 0.95)</a:t>
-            </a:r>
-            <a:endParaRPr lang="fr-FR" sz="800" dirty="0">
-              <a:latin typeface="Courier New" panose="02070309020205020404" pitchFamily="49" charset="0"/>
-              <a:cs typeface="Courier New" panose="02070309020205020404" pitchFamily="49" charset="0"/>
-            </a:endParaRPr>
-          </a:p>
-        </p:txBody>
-      </p:sp>
-      <p:sp>
-        <p:nvSpPr>
-          <p:cNvPr id="18" name="ZoneTexte 17"/>
-          <p:cNvSpPr txBox="1"/>
-          <p:nvPr/>
-        </p:nvSpPr>
-        <p:spPr>
-          <a:xfrm>
-            <a:off x="314039" y="3664443"/>
-            <a:ext cx="3447256" cy="253916"/>
-          </a:xfrm>
-          <a:prstGeom prst="rect">
-            <a:avLst/>
-          </a:prstGeom>
-          <a:noFill/>
-        </p:spPr>
-        <p:txBody>
-          <a:bodyPr wrap="square" rtlCol="0">
-            <a:spAutoFit/>
-          </a:bodyPr>
-          <a:lstStyle/>
-          <a:p>
-            <a:r>
-              <a:rPr lang="fr-FR" sz="1050" b="1" dirty="0" err="1">
-                <a:solidFill>
-                  <a:schemeClr val="accent2">
-                    <a:lumMod val="50000"/>
-                  </a:schemeClr>
-                </a:solidFill>
-              </a:rPr>
-              <a:t>Step</a:t>
-            </a:r>
-            <a:r>
-              <a:rPr lang="fr-FR" sz="1050" b="1" dirty="0">
-                <a:solidFill>
-                  <a:schemeClr val="accent2">
-                    <a:lumMod val="50000"/>
-                  </a:schemeClr>
-                </a:solidFill>
-              </a:rPr>
-              <a:t> 5: </a:t>
-            </a:r>
-            <a:r>
-              <a:rPr lang="fr-FR" sz="1050" b="1" dirty="0" err="1">
-                <a:solidFill>
-                  <a:schemeClr val="accent2">
-                    <a:lumMod val="50000"/>
-                  </a:schemeClr>
-                </a:solidFill>
-              </a:rPr>
-              <a:t>Bootstrap</a:t>
-            </a:r>
-            <a:r>
-              <a:rPr lang="fr-FR" sz="1050" b="1" dirty="0">
-                <a:solidFill>
-                  <a:schemeClr val="accent2">
-                    <a:lumMod val="50000"/>
-                  </a:schemeClr>
-                </a:solidFill>
-              </a:rPr>
-              <a:t> to </a:t>
-            </a:r>
-            <a:r>
-              <a:rPr lang="fr-FR" sz="1050" b="1" dirty="0" err="1">
-                <a:solidFill>
-                  <a:schemeClr val="accent2">
-                    <a:lumMod val="50000"/>
-                  </a:schemeClr>
-                </a:solidFill>
-              </a:rPr>
-              <a:t>compute</a:t>
-            </a:r>
-            <a:r>
-              <a:rPr lang="fr-FR" sz="1050" b="1" dirty="0">
-                <a:solidFill>
-                  <a:schemeClr val="accent2">
-                    <a:lumMod val="50000"/>
-                  </a:schemeClr>
-                </a:solidFill>
-              </a:rPr>
-              <a:t> BMD confidence </a:t>
-            </a:r>
-            <a:r>
-              <a:rPr lang="fr-FR" sz="1050" b="1" dirty="0" err="1">
-                <a:solidFill>
-                  <a:schemeClr val="accent2">
-                    <a:lumMod val="50000"/>
-                  </a:schemeClr>
-                </a:solidFill>
-              </a:rPr>
-              <a:t>intervals</a:t>
-            </a:r>
-            <a:endParaRPr lang="fr-FR" sz="1050" b="1" dirty="0">
-              <a:solidFill>
-                <a:schemeClr val="accent2">
-                  <a:lumMod val="50000"/>
-                </a:schemeClr>
-              </a:solidFill>
-            </a:endParaRPr>
-          </a:p>
-        </p:txBody>
-      </p:sp>
-      <p:sp>
-        <p:nvSpPr>
-          <p:cNvPr id="19" name="ZoneTexte 18"/>
-          <p:cNvSpPr txBox="1"/>
-          <p:nvPr/>
-        </p:nvSpPr>
-        <p:spPr>
-          <a:xfrm>
-            <a:off x="2441111" y="5428681"/>
-            <a:ext cx="1654715" cy="900246"/>
-          </a:xfrm>
-          <a:prstGeom prst="rect">
-            <a:avLst/>
-          </a:prstGeom>
-          <a:noFill/>
-        </p:spPr>
-        <p:txBody>
-          <a:bodyPr wrap="square" rtlCol="0">
-            <a:spAutoFit/>
-          </a:bodyPr>
-          <a:lstStyle/>
-          <a:p>
-            <a:r>
               <a:rPr lang="en-US" sz="750" dirty="0">
                 <a:latin typeface="Courier New" panose="02070309020205020404" pitchFamily="49" charset="0"/>
                 <a:cs typeface="Courier New" panose="02070309020205020404" pitchFamily="49" charset="0"/>
@@ -4317,7 +3643,7 @@
           </a:p>
           <a:p>
             <a:r>
-              <a:rPr lang="en-US" sz="750" dirty="0" err="1">
+              <a:rPr lang="en-US" sz="750" dirty="0" err="1" smtClean="0">
                 <a:latin typeface="Courier New" panose="02070309020205020404" pitchFamily="49" charset="0"/>
                 <a:cs typeface="Courier New" panose="02070309020205020404" pitchFamily="49" charset="0"/>
               </a:rPr>
@@ -4327,97 +3653,6 @@
               <a:latin typeface="Courier New" panose="02070309020205020404" pitchFamily="49" charset="0"/>
               <a:cs typeface="Courier New" panose="02070309020205020404" pitchFamily="49" charset="0"/>
             </a:endParaRPr>
-          </a:p>
-          <a:p>
-            <a:endParaRPr lang="fr-FR" sz="750" dirty="0">
-              <a:latin typeface="Courier New" panose="02070309020205020404" pitchFamily="49" charset="0"/>
-              <a:cs typeface="Courier New" panose="02070309020205020404" pitchFamily="49" charset="0"/>
-            </a:endParaRPr>
-          </a:p>
-        </p:txBody>
-      </p:sp>
-      <p:sp>
-        <p:nvSpPr>
-          <p:cNvPr id="23" name="Rectangle à coins arrondis 22"/>
-          <p:cNvSpPr/>
-          <p:nvPr/>
-        </p:nvSpPr>
-        <p:spPr>
-          <a:xfrm>
-            <a:off x="314039" y="920776"/>
-            <a:ext cx="3813048" cy="262713"/>
-          </a:xfrm>
-          <a:prstGeom prst="roundRect">
-            <a:avLst/>
-          </a:prstGeom>
-          <a:solidFill>
-            <a:schemeClr val="accent2"/>
-          </a:solidFill>
-          <a:ln>
-            <a:noFill/>
-          </a:ln>
-        </p:spPr>
-        <p:style>
-          <a:lnRef idx="2">
-            <a:schemeClr val="accent1">
-              <a:shade val="50000"/>
-            </a:schemeClr>
-          </a:lnRef>
-          <a:fillRef idx="1">
-            <a:schemeClr val="accent1"/>
-          </a:fillRef>
-          <a:effectRef idx="0">
-            <a:schemeClr val="accent1"/>
-          </a:effectRef>
-          <a:fontRef idx="minor">
-            <a:schemeClr val="lt1"/>
-          </a:fontRef>
-        </p:style>
-        <p:txBody>
-          <a:bodyPr rtlCol="0" anchor="ctr"/>
-          <a:lstStyle/>
-          <a:p>
-            <a:pPr algn="ctr"/>
-            <a:r>
-              <a:rPr lang="fr-FR" sz="1200" b="1" dirty="0">
-                <a:solidFill>
-                  <a:schemeClr val="bg1"/>
-                </a:solidFill>
-              </a:rPr>
-              <a:t>Workflow for </a:t>
-            </a:r>
-            <a:r>
-              <a:rPr lang="fr-FR" sz="1200" b="1" dirty="0" err="1">
-                <a:solidFill>
-                  <a:schemeClr val="bg1"/>
-                </a:solidFill>
-              </a:rPr>
-              <a:t>analysis</a:t>
-            </a:r>
-            <a:r>
-              <a:rPr lang="fr-FR" sz="1200" b="1" dirty="0">
-                <a:solidFill>
-                  <a:schemeClr val="bg1"/>
-                </a:solidFill>
-              </a:rPr>
-              <a:t> of </a:t>
-            </a:r>
-            <a:r>
-              <a:rPr lang="fr-FR" sz="1200" b="1" dirty="0" err="1">
-                <a:solidFill>
-                  <a:schemeClr val="bg1"/>
-                </a:solidFill>
-              </a:rPr>
-              <a:t>raw</a:t>
-            </a:r>
-            <a:r>
-              <a:rPr lang="fr-FR" sz="1200" b="1" dirty="0">
-                <a:solidFill>
-                  <a:schemeClr val="bg1"/>
-                </a:solidFill>
-              </a:rPr>
-              <a:t> data</a:t>
-            </a:r>
           </a:p>
         </p:txBody>
       </p:sp>
@@ -4429,7 +3664,7 @@
         </p:nvSpPr>
         <p:spPr>
           <a:xfrm>
-            <a:off x="265247" y="4156208"/>
+            <a:off x="129613" y="859438"/>
             <a:ext cx="1715072" cy="242552"/>
           </a:xfrm>
           <a:prstGeom prst="roundRect">
@@ -4469,8 +3704,21 @@
                   <a:schemeClr val="bg1"/>
                 </a:solidFill>
               </a:rPr>
-              <a:t>Format of data in input</a:t>
-            </a:r>
+              <a:t>Format of </a:t>
+            </a:r>
+            <a:r>
+              <a:rPr lang="fr-FR" sz="1200" b="1" dirty="0" smtClean="0">
+                <a:solidFill>
+                  <a:schemeClr val="bg1"/>
+                </a:solidFill>
+              </a:rPr>
+              <a:t>data</a:t>
+            </a:r>
+            <a:endParaRPr lang="fr-FR" sz="1200" b="1" dirty="0">
+              <a:solidFill>
+                <a:schemeClr val="bg1"/>
+              </a:solidFill>
+            </a:endParaRPr>
           </a:p>
         </p:txBody>
       </p:sp>
@@ -4482,8 +3730,8 @@
         </p:nvSpPr>
         <p:spPr>
           <a:xfrm>
-            <a:off x="2284978" y="4970507"/>
-            <a:ext cx="1680210" cy="402773"/>
+            <a:off x="87020" y="5745387"/>
+            <a:ext cx="2647387" cy="246074"/>
           </a:xfrm>
           <a:prstGeom prst="roundRect">
             <a:avLst/>
@@ -4532,308 +3780,6 @@
           </a:p>
         </p:txBody>
       </p:sp>
-      <p:pic>
-        <p:nvPicPr>
-          <p:cNvPr id="27" name="Image 26"/>
-          <p:cNvPicPr>
-            <a:picLocks noChangeAspect="1"/>
-          </p:cNvPicPr>
-          <p:nvPr/>
-        </p:nvPicPr>
-        <p:blipFill rotWithShape="1">
-          <a:blip r:embed="rId4" cstate="print">
-            <a:extLst>
-              <a:ext uri="{28A0092B-C50C-407E-A947-70E740481C1C}">
-                <a14:useLocalDpi xmlns:a14="http://schemas.microsoft.com/office/drawing/2010/main" val="0"/>
-              </a:ext>
-            </a:extLst>
-          </a:blip>
-          <a:srcRect r="44092" b="8065"/>
-          <a:stretch/>
-        </p:blipFill>
-        <p:spPr>
-          <a:xfrm>
-            <a:off x="120802" y="5658516"/>
-            <a:ext cx="1326237" cy="954318"/>
-          </a:xfrm>
-          <a:prstGeom prst="rect">
-            <a:avLst/>
-          </a:prstGeom>
-        </p:spPr>
-      </p:pic>
-      <p:cxnSp>
-        <p:nvCxnSpPr>
-          <p:cNvPr id="29" name="Connecteur droit avec flèche 28"/>
-          <p:cNvCxnSpPr>
-            <a:stCxn id="34" idx="1"/>
-          </p:cNvCxnSpPr>
-          <p:nvPr/>
-        </p:nvCxnSpPr>
-        <p:spPr>
-          <a:xfrm flipH="1" flipV="1">
-            <a:off x="1564486" y="5697886"/>
-            <a:ext cx="294032" cy="14425"/>
-          </a:xfrm>
-          <a:prstGeom prst="straightConnector1">
-            <a:avLst/>
-          </a:prstGeom>
-          <a:ln>
-            <a:solidFill>
-              <a:schemeClr val="tx1"/>
-            </a:solidFill>
-            <a:tailEnd type="triangle"/>
-          </a:ln>
-        </p:spPr>
-        <p:style>
-          <a:lnRef idx="1">
-            <a:schemeClr val="accent1"/>
-          </a:lnRef>
-          <a:fillRef idx="0">
-            <a:schemeClr val="accent1"/>
-          </a:fillRef>
-          <a:effectRef idx="0">
-            <a:schemeClr val="accent1"/>
-          </a:effectRef>
-          <a:fontRef idx="minor">
-            <a:schemeClr val="tx1"/>
-          </a:fontRef>
-        </p:style>
-      </p:cxnSp>
-      <p:sp>
-        <p:nvSpPr>
-          <p:cNvPr id="34" name="ZoneTexte 33"/>
-          <p:cNvSpPr txBox="1"/>
-          <p:nvPr/>
-        </p:nvSpPr>
-        <p:spPr>
-          <a:xfrm>
-            <a:off x="1858518" y="5481478"/>
-            <a:ext cx="559130" cy="461665"/>
-          </a:xfrm>
-          <a:prstGeom prst="rect">
-            <a:avLst/>
-          </a:prstGeom>
-          <a:noFill/>
-        </p:spPr>
-        <p:txBody>
-          <a:bodyPr wrap="square" rtlCol="0">
-            <a:spAutoFit/>
-          </a:bodyPr>
-          <a:lstStyle/>
-          <a:p>
-            <a:r>
-              <a:rPr lang="fr-FR" sz="800" dirty="0" err="1"/>
-              <a:t>Tested</a:t>
-            </a:r>
-            <a:r>
-              <a:rPr lang="fr-FR" sz="800" dirty="0"/>
-              <a:t> doses or </a:t>
-            </a:r>
-            <a:r>
-              <a:rPr lang="fr-FR" sz="800" dirty="0" err="1" smtClean="0"/>
-              <a:t>conc</a:t>
-            </a:r>
-            <a:r>
-              <a:rPr lang="fr-FR" sz="800" dirty="0" smtClean="0"/>
-              <a:t>.</a:t>
-            </a:r>
-            <a:endParaRPr lang="fr-FR" sz="800" dirty="0"/>
-          </a:p>
-        </p:txBody>
-      </p:sp>
-      <p:sp>
-        <p:nvSpPr>
-          <p:cNvPr id="36" name="ZoneTexte 35"/>
-          <p:cNvSpPr txBox="1"/>
-          <p:nvPr/>
-        </p:nvSpPr>
-        <p:spPr>
-          <a:xfrm>
-            <a:off x="683373" y="5288642"/>
-            <a:ext cx="1457896" cy="338554"/>
-          </a:xfrm>
-          <a:prstGeom prst="rect">
-            <a:avLst/>
-          </a:prstGeom>
-          <a:noFill/>
-        </p:spPr>
-        <p:txBody>
-          <a:bodyPr wrap="square" rtlCol="0">
-            <a:spAutoFit/>
-          </a:bodyPr>
-          <a:lstStyle/>
-          <a:p>
-            <a:r>
-              <a:rPr lang="fr-FR" sz="800" dirty="0" err="1"/>
-              <a:t>Identifiers</a:t>
-            </a:r>
-            <a:r>
-              <a:rPr lang="fr-FR" sz="800" dirty="0"/>
-              <a:t> of items </a:t>
-            </a:r>
-            <a:r>
-              <a:rPr lang="fr-FR" sz="800" dirty="0" smtClean="0"/>
-              <a:t>(</a:t>
-            </a:r>
-            <a:r>
-              <a:rPr lang="fr-FR" sz="800" dirty="0"/>
-              <a:t>contigs, probes, </a:t>
-            </a:r>
-            <a:r>
-              <a:rPr lang="fr-FR" sz="800" dirty="0" err="1"/>
-              <a:t>metabolites</a:t>
-            </a:r>
-            <a:r>
-              <a:rPr lang="fr-FR" sz="800" dirty="0"/>
-              <a:t>, …)</a:t>
-            </a:r>
-          </a:p>
-        </p:txBody>
-      </p:sp>
-      <p:cxnSp>
-        <p:nvCxnSpPr>
-          <p:cNvPr id="38" name="Connecteur en angle 37"/>
-          <p:cNvCxnSpPr/>
-          <p:nvPr/>
-        </p:nvCxnSpPr>
-        <p:spPr>
-          <a:xfrm rot="10800000" flipV="1">
-            <a:off x="265247" y="5418443"/>
-            <a:ext cx="389837" cy="188655"/>
-          </a:xfrm>
-          <a:prstGeom prst="bentConnector3">
-            <a:avLst>
-              <a:gd name="adj1" fmla="val 99258"/>
-            </a:avLst>
-          </a:prstGeom>
-          <a:ln>
-            <a:solidFill>
-              <a:schemeClr val="tx1"/>
-            </a:solidFill>
-            <a:tailEnd type="triangle"/>
-          </a:ln>
-        </p:spPr>
-        <p:style>
-          <a:lnRef idx="1">
-            <a:schemeClr val="accent1"/>
-          </a:lnRef>
-          <a:fillRef idx="0">
-            <a:schemeClr val="accent1"/>
-          </a:fillRef>
-          <a:effectRef idx="0">
-            <a:schemeClr val="accent1"/>
-          </a:effectRef>
-          <a:fontRef idx="minor">
-            <a:schemeClr val="tx1"/>
-          </a:fontRef>
-        </p:style>
-      </p:cxnSp>
-      <p:cxnSp>
-        <p:nvCxnSpPr>
-          <p:cNvPr id="54" name="Connecteur droit avec flèche 53"/>
-          <p:cNvCxnSpPr>
-            <a:stCxn id="55" idx="1"/>
-          </p:cNvCxnSpPr>
-          <p:nvPr/>
-        </p:nvCxnSpPr>
-        <p:spPr>
-          <a:xfrm flipH="1" flipV="1">
-            <a:off x="1540398" y="6163805"/>
-            <a:ext cx="294034" cy="199087"/>
-          </a:xfrm>
-          <a:prstGeom prst="straightConnector1">
-            <a:avLst/>
-          </a:prstGeom>
-          <a:ln>
-            <a:solidFill>
-              <a:schemeClr val="tx1"/>
-            </a:solidFill>
-            <a:tailEnd type="triangle"/>
-          </a:ln>
-        </p:spPr>
-        <p:style>
-          <a:lnRef idx="1">
-            <a:schemeClr val="accent1"/>
-          </a:lnRef>
-          <a:fillRef idx="0">
-            <a:schemeClr val="accent1"/>
-          </a:fillRef>
-          <a:effectRef idx="0">
-            <a:schemeClr val="accent1"/>
-          </a:effectRef>
-          <a:fontRef idx="minor">
-            <a:schemeClr val="tx1"/>
-          </a:fontRef>
-        </p:style>
-      </p:cxnSp>
-      <p:sp>
-        <p:nvSpPr>
-          <p:cNvPr id="55" name="ZoneTexte 54"/>
-          <p:cNvSpPr txBox="1"/>
-          <p:nvPr/>
-        </p:nvSpPr>
-        <p:spPr>
-          <a:xfrm>
-            <a:off x="1834432" y="5947393"/>
-            <a:ext cx="793528" cy="830997"/>
-          </a:xfrm>
-          <a:prstGeom prst="rect">
-            <a:avLst/>
-          </a:prstGeom>
-          <a:noFill/>
-        </p:spPr>
-        <p:txBody>
-          <a:bodyPr wrap="square" rtlCol="0">
-            <a:spAutoFit/>
-          </a:bodyPr>
-          <a:lstStyle/>
-          <a:p>
-            <a:r>
-              <a:rPr lang="fr-FR" sz="800" dirty="0"/>
-              <a:t>Signal </a:t>
-            </a:r>
-            <a:r>
-              <a:rPr lang="fr-FR" sz="800" dirty="0" smtClean="0"/>
-              <a:t/>
-            </a:r>
-            <a:br>
-              <a:rPr lang="fr-FR" sz="800" dirty="0" smtClean="0"/>
-            </a:br>
-            <a:r>
-              <a:rPr lang="fr-FR" sz="800" dirty="0" smtClean="0"/>
-              <a:t>(</a:t>
-            </a:r>
-            <a:r>
-              <a:rPr lang="fr-FR" sz="800" dirty="0" err="1"/>
-              <a:t>counts</a:t>
-            </a:r>
-            <a:r>
-              <a:rPr lang="fr-FR" sz="800" dirty="0"/>
-              <a:t> </a:t>
-            </a:r>
-            <a:r>
-              <a:rPr lang="fr-FR" sz="800" dirty="0" smtClean="0"/>
-              <a:t>of </a:t>
-            </a:r>
-            <a:r>
-              <a:rPr lang="fr-FR" sz="800" dirty="0" err="1" smtClean="0"/>
-              <a:t>reads</a:t>
-            </a:r>
-            <a:r>
-              <a:rPr lang="fr-FR" sz="800" dirty="0"/>
-              <a:t>, </a:t>
-            </a:r>
-            <a:r>
-              <a:rPr lang="fr-FR" sz="800" dirty="0" err="1"/>
-              <a:t>continuous</a:t>
-            </a:r>
-            <a:r>
-              <a:rPr lang="fr-FR" sz="800" dirty="0"/>
-              <a:t> signal in log2, …)</a:t>
-            </a:r>
-          </a:p>
-        </p:txBody>
-      </p:sp>
       <p:sp>
         <p:nvSpPr>
           <p:cNvPr id="58" name="Rectangle 57"/>
@@ -4842,13 +3788,18 @@
         </p:nvSpPr>
         <p:spPr>
           <a:xfrm>
-            <a:off x="480060" y="5644799"/>
+            <a:off x="2168482" y="1359705"/>
             <a:ext cx="1062990" cy="100541"/>
           </a:xfrm>
           <a:prstGeom prst="rect">
             <a:avLst/>
           </a:prstGeom>
           <a:noFill/>
+          <a:ln w="19050">
+            <a:solidFill>
+              <a:schemeClr val="accent2"/>
+            </a:solidFill>
+          </a:ln>
         </p:spPr>
         <p:style>
           <a:lnRef idx="2">
@@ -4883,13 +3834,18 @@
         </p:nvSpPr>
         <p:spPr>
           <a:xfrm>
-            <a:off x="120802" y="5644799"/>
+            <a:off x="1800312" y="1360760"/>
             <a:ext cx="359258" cy="1009451"/>
           </a:xfrm>
           <a:prstGeom prst="rect">
             <a:avLst/>
           </a:prstGeom>
           <a:noFill/>
+          <a:ln w="19050">
+            <a:solidFill>
+              <a:schemeClr val="accent2"/>
+            </a:solidFill>
+          </a:ln>
         </p:spPr>
         <p:style>
           <a:lnRef idx="2">
@@ -4916,6 +3872,323 @@
           </a:p>
         </p:txBody>
       </p:sp>
+      <p:grpSp>
+        <p:nvGrpSpPr>
+          <p:cNvPr id="6" name="Groupe 5"/>
+          <p:cNvGrpSpPr/>
+          <p:nvPr/>
+        </p:nvGrpSpPr>
+        <p:grpSpPr>
+          <a:xfrm>
+            <a:off x="1815423" y="1009723"/>
+            <a:ext cx="2415058" cy="1489749"/>
+            <a:chOff x="120802" y="5288642"/>
+            <a:chExt cx="2415058" cy="1489749"/>
+          </a:xfrm>
+        </p:grpSpPr>
+        <p:pic>
+          <p:nvPicPr>
+            <p:cNvPr id="27" name="Image 26"/>
+            <p:cNvPicPr>
+              <a:picLocks noChangeAspect="1"/>
+            </p:cNvPicPr>
+            <p:nvPr/>
+          </p:nvPicPr>
+          <p:blipFill rotWithShape="1">
+            <a:blip r:embed="rId4" cstate="print">
+              <a:extLst>
+                <a:ext uri="{28A0092B-C50C-407E-A947-70E740481C1C}">
+                  <a14:useLocalDpi xmlns:a14="http://schemas.microsoft.com/office/drawing/2010/main" val="0"/>
+                </a:ext>
+              </a:extLst>
+            </a:blip>
+            <a:srcRect r="44092" b="8065"/>
+            <a:stretch/>
+          </p:blipFill>
+          <p:spPr>
+            <a:xfrm>
+              <a:off x="120802" y="5658516"/>
+              <a:ext cx="1326237" cy="954318"/>
+            </a:xfrm>
+            <a:prstGeom prst="rect">
+              <a:avLst/>
+            </a:prstGeom>
+          </p:spPr>
+        </p:pic>
+        <p:cxnSp>
+          <p:nvCxnSpPr>
+            <p:cNvPr id="29" name="Connecteur droit avec flèche 28"/>
+            <p:cNvCxnSpPr>
+              <a:stCxn id="34" idx="1"/>
+            </p:cNvCxnSpPr>
+            <p:nvPr/>
+          </p:nvCxnSpPr>
+          <p:spPr>
+            <a:xfrm flipH="1" flipV="1">
+              <a:off x="1564486" y="5697886"/>
+              <a:ext cx="294032" cy="14425"/>
+            </a:xfrm>
+            <a:prstGeom prst="straightConnector1">
+              <a:avLst/>
+            </a:prstGeom>
+            <a:ln>
+              <a:solidFill>
+                <a:schemeClr val="accent2"/>
+              </a:solidFill>
+              <a:tailEnd type="triangle"/>
+            </a:ln>
+          </p:spPr>
+          <p:style>
+            <a:lnRef idx="1">
+              <a:schemeClr val="accent1"/>
+            </a:lnRef>
+            <a:fillRef idx="0">
+              <a:schemeClr val="accent1"/>
+            </a:fillRef>
+            <a:effectRef idx="0">
+              <a:schemeClr val="accent1"/>
+            </a:effectRef>
+            <a:fontRef idx="minor">
+              <a:schemeClr val="tx1"/>
+            </a:fontRef>
+          </p:style>
+        </p:cxnSp>
+        <p:sp>
+          <p:nvSpPr>
+            <p:cNvPr id="34" name="ZoneTexte 33"/>
+            <p:cNvSpPr txBox="1"/>
+            <p:nvPr/>
+          </p:nvSpPr>
+          <p:spPr>
+            <a:xfrm>
+              <a:off x="1858518" y="5481478"/>
+              <a:ext cx="559130" cy="461665"/>
+            </a:xfrm>
+            <a:prstGeom prst="rect">
+              <a:avLst/>
+            </a:prstGeom>
+            <a:noFill/>
+          </p:spPr>
+          <p:txBody>
+            <a:bodyPr wrap="square" rtlCol="0">
+              <a:spAutoFit/>
+            </a:bodyPr>
+            <a:lstStyle/>
+            <a:p>
+              <a:r>
+                <a:rPr lang="fr-FR" sz="800" dirty="0" err="1"/>
+                <a:t>Tested</a:t>
+              </a:r>
+              <a:r>
+                <a:rPr lang="fr-FR" sz="800" dirty="0"/>
+                <a:t> doses or </a:t>
+              </a:r>
+              <a:r>
+                <a:rPr lang="fr-FR" sz="800" dirty="0" err="1" smtClean="0"/>
+                <a:t>conc</a:t>
+              </a:r>
+              <a:r>
+                <a:rPr lang="fr-FR" sz="800" dirty="0" smtClean="0"/>
+                <a:t>.</a:t>
+              </a:r>
+              <a:endParaRPr lang="fr-FR" sz="800" dirty="0"/>
+            </a:p>
+          </p:txBody>
+        </p:sp>
+        <p:sp>
+          <p:nvSpPr>
+            <p:cNvPr id="36" name="ZoneTexte 35"/>
+            <p:cNvSpPr txBox="1"/>
+            <p:nvPr/>
+          </p:nvSpPr>
+          <p:spPr>
+            <a:xfrm>
+              <a:off x="683373" y="5288642"/>
+              <a:ext cx="1457896" cy="338554"/>
+            </a:xfrm>
+            <a:prstGeom prst="rect">
+              <a:avLst/>
+            </a:prstGeom>
+            <a:noFill/>
+          </p:spPr>
+          <p:txBody>
+            <a:bodyPr wrap="square" rtlCol="0">
+              <a:spAutoFit/>
+            </a:bodyPr>
+            <a:lstStyle/>
+            <a:p>
+              <a:r>
+                <a:rPr lang="fr-FR" sz="800" dirty="0" err="1"/>
+                <a:t>Identifiers</a:t>
+              </a:r>
+              <a:r>
+                <a:rPr lang="fr-FR" sz="800" dirty="0"/>
+                <a:t> of items </a:t>
+              </a:r>
+              <a:r>
+                <a:rPr lang="fr-FR" sz="800" dirty="0" smtClean="0"/>
+                <a:t>(</a:t>
+              </a:r>
+              <a:r>
+                <a:rPr lang="fr-FR" sz="800" dirty="0"/>
+                <a:t>contigs, probes, </a:t>
+              </a:r>
+              <a:r>
+                <a:rPr lang="fr-FR" sz="800" dirty="0" err="1"/>
+                <a:t>metabolites</a:t>
+              </a:r>
+              <a:r>
+                <a:rPr lang="fr-FR" sz="800" dirty="0"/>
+                <a:t>, …)</a:t>
+              </a:r>
+            </a:p>
+          </p:txBody>
+        </p:sp>
+        <p:cxnSp>
+          <p:nvCxnSpPr>
+            <p:cNvPr id="38" name="Connecteur en angle 37"/>
+            <p:cNvCxnSpPr/>
+            <p:nvPr/>
+          </p:nvCxnSpPr>
+          <p:spPr>
+            <a:xfrm rot="10800000" flipV="1">
+              <a:off x="265247" y="5418443"/>
+              <a:ext cx="389837" cy="188655"/>
+            </a:xfrm>
+            <a:prstGeom prst="bentConnector3">
+              <a:avLst>
+                <a:gd name="adj1" fmla="val 99258"/>
+              </a:avLst>
+            </a:prstGeom>
+            <a:ln>
+              <a:solidFill>
+                <a:schemeClr val="accent2"/>
+              </a:solidFill>
+              <a:tailEnd type="triangle"/>
+            </a:ln>
+          </p:spPr>
+          <p:style>
+            <a:lnRef idx="1">
+              <a:schemeClr val="accent1"/>
+            </a:lnRef>
+            <a:fillRef idx="0">
+              <a:schemeClr val="accent1"/>
+            </a:fillRef>
+            <a:effectRef idx="0">
+              <a:schemeClr val="accent1"/>
+            </a:effectRef>
+            <a:fontRef idx="minor">
+              <a:schemeClr val="tx1"/>
+            </a:fontRef>
+          </p:style>
+        </p:cxnSp>
+        <p:cxnSp>
+          <p:nvCxnSpPr>
+            <p:cNvPr id="54" name="Connecteur droit avec flèche 53"/>
+            <p:cNvCxnSpPr>
+              <a:stCxn id="55" idx="1"/>
+            </p:cNvCxnSpPr>
+            <p:nvPr/>
+          </p:nvCxnSpPr>
+          <p:spPr>
+            <a:xfrm flipH="1" flipV="1">
+              <a:off x="1540398" y="6163806"/>
+              <a:ext cx="294034" cy="199087"/>
+            </a:xfrm>
+            <a:prstGeom prst="straightConnector1">
+              <a:avLst/>
+            </a:prstGeom>
+            <a:ln>
+              <a:solidFill>
+                <a:schemeClr val="accent2"/>
+              </a:solidFill>
+              <a:tailEnd type="triangle"/>
+            </a:ln>
+          </p:spPr>
+          <p:style>
+            <a:lnRef idx="1">
+              <a:schemeClr val="accent1"/>
+            </a:lnRef>
+            <a:fillRef idx="0">
+              <a:schemeClr val="accent1"/>
+            </a:fillRef>
+            <a:effectRef idx="0">
+              <a:schemeClr val="accent1"/>
+            </a:effectRef>
+            <a:fontRef idx="minor">
+              <a:schemeClr val="tx1"/>
+            </a:fontRef>
+          </p:style>
+        </p:cxnSp>
+        <p:sp>
+          <p:nvSpPr>
+            <p:cNvPr id="55" name="ZoneTexte 54"/>
+            <p:cNvSpPr txBox="1"/>
+            <p:nvPr/>
+          </p:nvSpPr>
+          <p:spPr>
+            <a:xfrm>
+              <a:off x="1834432" y="5947394"/>
+              <a:ext cx="701428" cy="830997"/>
+            </a:xfrm>
+            <a:prstGeom prst="rect">
+              <a:avLst/>
+            </a:prstGeom>
+            <a:noFill/>
+          </p:spPr>
+          <p:txBody>
+            <a:bodyPr wrap="square" rtlCol="0">
+              <a:spAutoFit/>
+            </a:bodyPr>
+            <a:lstStyle/>
+            <a:p>
+              <a:r>
+                <a:rPr lang="fr-FR" sz="800" dirty="0"/>
+                <a:t>Signal </a:t>
+              </a:r>
+              <a:r>
+                <a:rPr lang="fr-FR" sz="800" dirty="0" smtClean="0"/>
+                <a:t/>
+              </a:r>
+              <a:br>
+                <a:rPr lang="fr-FR" sz="800" dirty="0" smtClean="0"/>
+              </a:br>
+              <a:r>
+                <a:rPr lang="fr-FR" sz="800" dirty="0" smtClean="0"/>
+                <a:t>(</a:t>
+              </a:r>
+              <a:r>
+                <a:rPr lang="fr-FR" sz="800" dirty="0" err="1"/>
+                <a:t>counts</a:t>
+              </a:r>
+              <a:r>
+                <a:rPr lang="fr-FR" sz="800" dirty="0"/>
+                <a:t> </a:t>
+              </a:r>
+              <a:r>
+                <a:rPr lang="fr-FR" sz="800" dirty="0" smtClean="0"/>
+                <a:t>of </a:t>
+              </a:r>
+              <a:r>
+                <a:rPr lang="fr-FR" sz="800" dirty="0" err="1" smtClean="0"/>
+                <a:t>reads</a:t>
+              </a:r>
+              <a:r>
+                <a:rPr lang="fr-FR" sz="800" dirty="0"/>
+                <a:t>, </a:t>
+              </a:r>
+              <a:r>
+                <a:rPr lang="fr-FR" sz="800" dirty="0" err="1"/>
+                <a:t>continuous</a:t>
+              </a:r>
+              <a:r>
+                <a:rPr lang="fr-FR" sz="800" dirty="0"/>
+                <a:t> signal in log2, …)</a:t>
+              </a:r>
+            </a:p>
+          </p:txBody>
+        </p:sp>
+      </p:grpSp>
       <p:sp>
         <p:nvSpPr>
           <p:cNvPr id="60" name="Rectangle 59"/>
@@ -4924,13 +4197,18 @@
         </p:nvSpPr>
         <p:spPr>
           <a:xfrm>
-            <a:off x="480060" y="5745341"/>
+            <a:off x="2174681" y="1466422"/>
             <a:ext cx="1062990" cy="908909"/>
           </a:xfrm>
           <a:prstGeom prst="rect">
             <a:avLst/>
           </a:prstGeom>
           <a:noFill/>
+          <a:ln w="19050">
+            <a:solidFill>
+              <a:schemeClr val="accent2"/>
+            </a:solidFill>
+          </a:ln>
         </p:spPr>
         <p:style>
           <a:lnRef idx="2">
@@ -4959,54 +4237,13 @@
       </p:sp>
       <p:sp>
         <p:nvSpPr>
-          <p:cNvPr id="62" name="Rectangle 61"/>
-          <p:cNvSpPr/>
-          <p:nvPr/>
-        </p:nvSpPr>
-        <p:spPr>
-          <a:xfrm>
-            <a:off x="2434435" y="5411450"/>
-            <a:ext cx="1535294" cy="816749"/>
-          </a:xfrm>
-          <a:prstGeom prst="rect">
-            <a:avLst/>
-          </a:prstGeom>
-          <a:noFill/>
-        </p:spPr>
-        <p:style>
-          <a:lnRef idx="2">
-            <a:schemeClr val="accent1">
-              <a:shade val="50000"/>
-            </a:schemeClr>
-          </a:lnRef>
-          <a:fillRef idx="1">
-            <a:schemeClr val="accent1"/>
-          </a:fillRef>
-          <a:effectRef idx="0">
-            <a:schemeClr val="accent1"/>
-          </a:effectRef>
-          <a:fontRef idx="minor">
-            <a:schemeClr val="lt1"/>
-          </a:fontRef>
-        </p:style>
-        <p:txBody>
-          <a:bodyPr rtlCol="0" anchor="ctr"/>
-          <a:lstStyle/>
-          <a:p>
-            <a:pPr algn="ctr"/>
-            <a:endParaRPr lang="fr-FR" sz="1350"/>
-          </a:p>
-        </p:txBody>
-      </p:sp>
-      <p:sp>
-        <p:nvSpPr>
           <p:cNvPr id="64" name="ZoneTexte 63"/>
           <p:cNvSpPr txBox="1"/>
           <p:nvPr/>
         </p:nvSpPr>
         <p:spPr>
           <a:xfrm>
-            <a:off x="2441111" y="6263348"/>
+            <a:off x="1997378" y="6311995"/>
             <a:ext cx="1463934" cy="461665"/>
           </a:xfrm>
           <a:prstGeom prst="rect">
@@ -5020,7 +4257,6 @@
           </a:bodyPr>
           <a:lstStyle/>
           <a:p>
-            <a:pPr algn="r"/>
             <a:r>
               <a:rPr lang="fr-FR" sz="800" dirty="0" err="1"/>
               <a:t>Each</a:t>
@@ -5462,71 +4698,6 @@
                 <a:cs typeface="Courier New" panose="02070309020205020404" pitchFamily="49" charset="0"/>
               </a:rPr>
               <a:t>)</a:t>
-            </a:r>
-          </a:p>
-        </p:txBody>
-      </p:sp>
-      <p:sp>
-        <p:nvSpPr>
-          <p:cNvPr id="72" name="ZoneTexte 71"/>
-          <p:cNvSpPr txBox="1"/>
-          <p:nvPr/>
-        </p:nvSpPr>
-        <p:spPr>
-          <a:xfrm>
-            <a:off x="295983" y="1179074"/>
-            <a:ext cx="3849160" cy="215444"/>
-          </a:xfrm>
-          <a:prstGeom prst="rect">
-            <a:avLst/>
-          </a:prstGeom>
-          <a:noFill/>
-        </p:spPr>
-        <p:txBody>
-          <a:bodyPr wrap="square" rtlCol="0">
-            <a:spAutoFit/>
-          </a:bodyPr>
-          <a:lstStyle/>
-          <a:p>
-            <a:r>
-              <a:rPr lang="fr-FR" sz="800" dirty="0" err="1"/>
-              <a:t>Functions</a:t>
-            </a:r>
-            <a:r>
-              <a:rPr lang="fr-FR" sz="800" dirty="0"/>
-              <a:t> </a:t>
-            </a:r>
-            <a:r>
-              <a:rPr lang="fr-FR" sz="800" dirty="0" err="1"/>
-              <a:t>with</a:t>
-            </a:r>
-            <a:r>
-              <a:rPr lang="fr-FR" sz="800" dirty="0"/>
-              <a:t> </a:t>
-            </a:r>
-            <a:r>
-              <a:rPr lang="fr-FR" sz="800" dirty="0" err="1"/>
-              <a:t>their</a:t>
-            </a:r>
-            <a:r>
-              <a:rPr lang="fr-FR" sz="800" dirty="0"/>
-              <a:t> main arguments (</a:t>
-            </a:r>
-            <a:r>
-              <a:rPr lang="fr-FR" sz="800" dirty="0" err="1"/>
-              <a:t>see</a:t>
-            </a:r>
-            <a:r>
-              <a:rPr lang="fr-FR" sz="800" dirty="0"/>
-              <a:t> help pages for a </a:t>
-            </a:r>
-            <a:r>
-              <a:rPr lang="fr-FR" sz="800" dirty="0" err="1"/>
-              <a:t>complete</a:t>
-            </a:r>
-            <a:r>
-              <a:rPr lang="fr-FR" sz="800" dirty="0"/>
-              <a:t> description)</a:t>
             </a:r>
           </a:p>
         </p:txBody>
@@ -6301,8 +5472,8 @@
         </p:nvSpPr>
         <p:spPr>
           <a:xfrm>
-            <a:off x="173148" y="4382586"/>
-            <a:ext cx="4138565" cy="707886"/>
+            <a:off x="37515" y="1085815"/>
+            <a:ext cx="1825962" cy="1569660"/>
           </a:xfrm>
           <a:prstGeom prst="rect">
             <a:avLst/>
@@ -6354,186 +5525,6 @@
               <a:t>(file, header = FALSE) on a file described as above.</a:t>
             </a:r>
             <a:endParaRPr lang="fr-FR" sz="800" dirty="0"/>
-          </a:p>
-        </p:txBody>
-      </p:sp>
-      <p:sp>
-        <p:nvSpPr>
-          <p:cNvPr id="9" name="ZoneTexte 8"/>
-          <p:cNvSpPr txBox="1"/>
-          <p:nvPr/>
-        </p:nvSpPr>
-        <p:spPr>
-          <a:xfrm>
-            <a:off x="127796" y="1628130"/>
-            <a:ext cx="3987069" cy="707886"/>
-          </a:xfrm>
-          <a:prstGeom prst="rect">
-            <a:avLst/>
-          </a:prstGeom>
-          <a:noFill/>
-        </p:spPr>
-        <p:txBody>
-          <a:bodyPr wrap="square" rtlCol="0">
-            <a:spAutoFit/>
-          </a:bodyPr>
-          <a:lstStyle/>
-          <a:p>
-            <a:r>
-              <a:rPr lang="fr-FR" sz="800" dirty="0" err="1">
-                <a:latin typeface="Courier New" panose="02070309020205020404" pitchFamily="49" charset="0"/>
-                <a:cs typeface="Courier New" panose="02070309020205020404" pitchFamily="49" charset="0"/>
-              </a:rPr>
-              <a:t>microarraydata</a:t>
-            </a:r>
-            <a:r>
-              <a:rPr lang="fr-FR" sz="800" dirty="0">
-                <a:latin typeface="Courier New" panose="02070309020205020404" pitchFamily="49" charset="0"/>
-                <a:cs typeface="Courier New" panose="02070309020205020404" pitchFamily="49" charset="0"/>
-              </a:rPr>
-              <a:t>(file, </a:t>
-            </a:r>
-          </a:p>
-          <a:p>
-            <a:r>
-              <a:rPr lang="fr-FR" sz="800" dirty="0">
-                <a:latin typeface="Courier New" panose="02070309020205020404" pitchFamily="49" charset="0"/>
-                <a:cs typeface="Courier New" panose="02070309020205020404" pitchFamily="49" charset="0"/>
-              </a:rPr>
-              <a:t>   </a:t>
-            </a:r>
-            <a:r>
-              <a:rPr lang="fr-FR" sz="800" dirty="0" err="1">
-                <a:latin typeface="Courier New" panose="02070309020205020404" pitchFamily="49" charset="0"/>
-                <a:cs typeface="Courier New" panose="02070309020205020404" pitchFamily="49" charset="0"/>
-              </a:rPr>
-              <a:t>norm.method</a:t>
-            </a:r>
-            <a:r>
-              <a:rPr lang="fr-FR" sz="800" dirty="0">
-                <a:latin typeface="Courier New" panose="02070309020205020404" pitchFamily="49" charset="0"/>
-                <a:cs typeface="Courier New" panose="02070309020205020404" pitchFamily="49" charset="0"/>
-              </a:rPr>
-              <a:t> = c("</a:t>
-            </a:r>
-            <a:r>
-              <a:rPr lang="fr-FR" sz="800" dirty="0" err="1">
-                <a:latin typeface="Courier New" panose="02070309020205020404" pitchFamily="49" charset="0"/>
-                <a:cs typeface="Courier New" panose="02070309020205020404" pitchFamily="49" charset="0"/>
-              </a:rPr>
-              <a:t>cyclicloess</a:t>
-            </a:r>
-            <a:r>
-              <a:rPr lang="fr-FR" sz="800" dirty="0">
-                <a:latin typeface="Courier New" panose="02070309020205020404" pitchFamily="49" charset="0"/>
-                <a:cs typeface="Courier New" panose="02070309020205020404" pitchFamily="49" charset="0"/>
-              </a:rPr>
-              <a:t>", "quantile", "</a:t>
-            </a:r>
-            <a:r>
-              <a:rPr lang="fr-FR" sz="800" dirty="0" err="1">
-                <a:latin typeface="Courier New" panose="02070309020205020404" pitchFamily="49" charset="0"/>
-                <a:cs typeface="Courier New" panose="02070309020205020404" pitchFamily="49" charset="0"/>
-              </a:rPr>
-              <a:t>scale</a:t>
-            </a:r>
-            <a:r>
-              <a:rPr lang="fr-FR" sz="800" dirty="0">
-                <a:latin typeface="Courier New" panose="02070309020205020404" pitchFamily="49" charset="0"/>
-                <a:cs typeface="Courier New" panose="02070309020205020404" pitchFamily="49" charset="0"/>
-              </a:rPr>
-              <a:t>", "none"))</a:t>
-            </a:r>
-          </a:p>
-          <a:p>
-            <a:r>
-              <a:rPr lang="fr-FR" sz="800" dirty="0" err="1">
-                <a:latin typeface="Courier New" panose="02070309020205020404" pitchFamily="49" charset="0"/>
-                <a:cs typeface="Courier New" panose="02070309020205020404" pitchFamily="49" charset="0"/>
-              </a:rPr>
-              <a:t>RNAseqdata</a:t>
-            </a:r>
-            <a:r>
-              <a:rPr lang="fr-FR" sz="800" dirty="0">
-                <a:latin typeface="Courier New" panose="02070309020205020404" pitchFamily="49" charset="0"/>
-                <a:cs typeface="Courier New" panose="02070309020205020404" pitchFamily="49" charset="0"/>
-              </a:rPr>
-              <a:t>(file, </a:t>
-            </a:r>
-            <a:r>
-              <a:rPr lang="fr-FR" sz="800" dirty="0" err="1">
-                <a:latin typeface="Courier New" panose="02070309020205020404" pitchFamily="49" charset="0"/>
-                <a:cs typeface="Courier New" panose="02070309020205020404" pitchFamily="49" charset="0"/>
-              </a:rPr>
-              <a:t>transfo.method</a:t>
-            </a:r>
-            <a:r>
-              <a:rPr lang="fr-FR" sz="800" dirty="0">
-                <a:latin typeface="Courier New" panose="02070309020205020404" pitchFamily="49" charset="0"/>
-                <a:cs typeface="Courier New" panose="02070309020205020404" pitchFamily="49" charset="0"/>
-              </a:rPr>
-              <a:t> = c("</a:t>
-            </a:r>
-            <a:r>
-              <a:rPr lang="fr-FR" sz="800" dirty="0" err="1">
-                <a:latin typeface="Courier New" panose="02070309020205020404" pitchFamily="49" charset="0"/>
-                <a:cs typeface="Courier New" panose="02070309020205020404" pitchFamily="49" charset="0"/>
-              </a:rPr>
-              <a:t>rlog</a:t>
-            </a:r>
-            <a:r>
-              <a:rPr lang="fr-FR" sz="800" dirty="0">
-                <a:latin typeface="Courier New" panose="02070309020205020404" pitchFamily="49" charset="0"/>
-                <a:cs typeface="Courier New" panose="02070309020205020404" pitchFamily="49" charset="0"/>
-              </a:rPr>
-              <a:t>", "</a:t>
-            </a:r>
-            <a:r>
-              <a:rPr lang="fr-FR" sz="800" dirty="0" err="1">
-                <a:latin typeface="Courier New" panose="02070309020205020404" pitchFamily="49" charset="0"/>
-                <a:cs typeface="Courier New" panose="02070309020205020404" pitchFamily="49" charset="0"/>
-              </a:rPr>
-              <a:t>vst</a:t>
-            </a:r>
-            <a:r>
-              <a:rPr lang="fr-FR" sz="800" dirty="0">
-                <a:latin typeface="Courier New" panose="02070309020205020404" pitchFamily="49" charset="0"/>
-                <a:cs typeface="Courier New" panose="02070309020205020404" pitchFamily="49" charset="0"/>
-              </a:rPr>
-              <a:t>"))</a:t>
-            </a:r>
-          </a:p>
-          <a:p>
-            <a:r>
-              <a:rPr lang="fr-FR" sz="800" dirty="0" err="1">
-                <a:latin typeface="Courier New" panose="02070309020205020404" pitchFamily="49" charset="0"/>
-                <a:cs typeface="Courier New" panose="02070309020205020404" pitchFamily="49" charset="0"/>
-              </a:rPr>
-              <a:t>continuousomicdata</a:t>
-            </a:r>
-            <a:r>
-              <a:rPr lang="fr-FR" sz="800" dirty="0">
-                <a:latin typeface="Courier New" panose="02070309020205020404" pitchFamily="49" charset="0"/>
-                <a:cs typeface="Courier New" panose="02070309020205020404" pitchFamily="49" charset="0"/>
-              </a:rPr>
-              <a:t>(file)</a:t>
-            </a:r>
-          </a:p>
-          <a:p>
-            <a:r>
-              <a:rPr lang="fr-FR" sz="800" dirty="0" err="1">
-                <a:latin typeface="Courier New" panose="02070309020205020404" pitchFamily="49" charset="0"/>
-                <a:cs typeface="Courier New" panose="02070309020205020404" pitchFamily="49" charset="0"/>
-              </a:rPr>
-              <a:t>continuousanchoringdata</a:t>
-            </a:r>
-            <a:r>
-              <a:rPr lang="fr-FR" sz="800" dirty="0">
-                <a:latin typeface="Courier New" panose="02070309020205020404" pitchFamily="49" charset="0"/>
-                <a:cs typeface="Courier New" panose="02070309020205020404" pitchFamily="49" charset="0"/>
-              </a:rPr>
-              <a:t>(file)</a:t>
-            </a:r>
           </a:p>
         </p:txBody>
       </p:sp>
@@ -6559,7 +5550,7 @@
         </p:blipFill>
         <p:spPr>
           <a:xfrm>
-            <a:off x="6667979" y="1594315"/>
+            <a:off x="6624418" y="1628130"/>
             <a:ext cx="2337769" cy="1531035"/>
           </a:xfrm>
           <a:prstGeom prst="rect">
@@ -6619,7 +5610,7 @@
         </p:blipFill>
         <p:spPr>
           <a:xfrm>
-            <a:off x="7191835" y="5456164"/>
+            <a:off x="7101814" y="5456164"/>
             <a:ext cx="1919519" cy="1367364"/>
           </a:xfrm>
           <a:prstGeom prst="rect">
@@ -6864,8 +5855,8 @@
         </p:nvSpPr>
         <p:spPr>
           <a:xfrm>
-            <a:off x="6249023" y="5658516"/>
-            <a:ext cx="1587841" cy="900246"/>
+            <a:off x="6231838" y="5584640"/>
+            <a:ext cx="1365019" cy="1015663"/>
           </a:xfrm>
           <a:prstGeom prst="rect">
             <a:avLst/>
@@ -6910,14 +5901,20 @@
                 <a:latin typeface="Courier New" panose="02070309020205020404" pitchFamily="49" charset="0"/>
                 <a:cs typeface="Courier New" panose="02070309020205020404" pitchFamily="49" charset="0"/>
               </a:rPr>
-              <a:t>, group, </a:t>
-            </a:r>
-            <a:r>
-              <a:rPr lang="en-US" sz="750" dirty="0" err="1">
+              <a:t>, </a:t>
+            </a:r>
+            <a:endParaRPr lang="en-US" sz="750" dirty="0" smtClean="0">
+              <a:latin typeface="Courier New" panose="02070309020205020404" pitchFamily="49" charset="0"/>
+              <a:cs typeface="Courier New" panose="02070309020205020404" pitchFamily="49" charset="0"/>
+            </a:endParaRPr>
+          </a:p>
+          <a:p>
+            <a:r>
+              <a:rPr lang="en-US" sz="750" dirty="0" smtClean="0">
                 <a:latin typeface="Courier New" panose="02070309020205020404" pitchFamily="49" charset="0"/>
                 <a:cs typeface="Courier New" panose="02070309020205020404" pitchFamily="49" charset="0"/>
               </a:rPr>
-              <a:t>colorby</a:t>
+              <a:t>group</a:t>
             </a:r>
             <a:r>
               <a:rPr lang="en-US" sz="750" dirty="0">
@@ -6927,18 +5924,45 @@
               <a:t>, </a:t>
             </a:r>
             <a:r>
-              <a:rPr lang="en-US" sz="750" dirty="0" err="1">
+              <a:rPr lang="en-US" sz="750" dirty="0" err="1" smtClean="0">
                 <a:latin typeface="Courier New" panose="02070309020205020404" pitchFamily="49" charset="0"/>
                 <a:cs typeface="Courier New" panose="02070309020205020404" pitchFamily="49" charset="0"/>
               </a:rPr>
-              <a:t>BMDsummary</a:t>
+              <a:t>colorby</a:t>
             </a:r>
             <a:r>
               <a:rPr lang="en-US" sz="750" dirty="0">
                 <a:latin typeface="Courier New" panose="02070309020205020404" pitchFamily="49" charset="0"/>
                 <a:cs typeface="Courier New" panose="02070309020205020404" pitchFamily="49" charset="0"/>
               </a:rPr>
-              <a:t> = c("</a:t>
+              <a:t>, </a:t>
+            </a:r>
+            <a:endParaRPr lang="en-US" sz="750" dirty="0" smtClean="0">
+              <a:latin typeface="Courier New" panose="02070309020205020404" pitchFamily="49" charset="0"/>
+              <a:cs typeface="Courier New" panose="02070309020205020404" pitchFamily="49" charset="0"/>
+            </a:endParaRPr>
+          </a:p>
+          <a:p>
+            <a:r>
+              <a:rPr lang="en-US" sz="750" dirty="0" err="1" smtClean="0">
+                <a:latin typeface="Courier New" panose="02070309020205020404" pitchFamily="49" charset="0"/>
+                <a:cs typeface="Courier New" panose="02070309020205020404" pitchFamily="49" charset="0"/>
+              </a:rPr>
+              <a:t>BMDsummary</a:t>
+            </a:r>
+            <a:r>
+              <a:rPr lang="en-US" sz="750" dirty="0" smtClean="0">
+                <a:latin typeface="Courier New" panose="02070309020205020404" pitchFamily="49" charset="0"/>
+                <a:cs typeface="Courier New" panose="02070309020205020404" pitchFamily="49" charset="0"/>
+              </a:rPr>
+              <a:t> </a:t>
+            </a:r>
+            <a:r>
+              <a:rPr lang="en-US" sz="750" dirty="0">
+                <a:latin typeface="Courier New" panose="02070309020205020404" pitchFamily="49" charset="0"/>
+                <a:cs typeface="Courier New" panose="02070309020205020404" pitchFamily="49" charset="0"/>
+              </a:rPr>
+              <a:t>= c("</a:t>
             </a:r>
             <a:r>
               <a:rPr lang="en-US" sz="750" dirty="0" err="1">
@@ -6997,8 +6021,8 @@
         </p:nvSpPr>
         <p:spPr>
           <a:xfrm>
-            <a:off x="4328342" y="1585707"/>
-            <a:ext cx="4692992" cy="1595441"/>
+            <a:off x="4164083" y="1594501"/>
+            <a:ext cx="4857249" cy="1586648"/>
           </a:xfrm>
           <a:custGeom>
             <a:avLst/>
@@ -7087,6 +6111,118 @@
               <a:gd name="connsiteY5" fmla="*/ 735290 h 1646618"/>
               <a:gd name="connsiteX6" fmla="*/ 3823 w 4709107"/>
               <a:gd name="connsiteY6" fmla="*/ 0 h 1646618"/>
+              <a:gd name="connsiteX0" fmla="*/ 127339 w 4832623"/>
+              <a:gd name="connsiteY0" fmla="*/ 0 h 1646618"/>
+              <a:gd name="connsiteX1" fmla="*/ 4815026 w 4832623"/>
+              <a:gd name="connsiteY1" fmla="*/ 9427 h 1646618"/>
+              <a:gd name="connsiteX2" fmla="*/ 4832623 w 4832623"/>
+              <a:gd name="connsiteY2" fmla="*/ 1642686 h 1646618"/>
+              <a:gd name="connsiteX3" fmla="*/ 2406111 w 4832623"/>
+              <a:gd name="connsiteY3" fmla="*/ 1646618 h 1646618"/>
+              <a:gd name="connsiteX4" fmla="*/ 2398465 w 4832623"/>
+              <a:gd name="connsiteY4" fmla="*/ 716437 h 1646618"/>
+              <a:gd name="connsiteX5" fmla="*/ 0 w 4832623"/>
+              <a:gd name="connsiteY5" fmla="*/ 735290 h 1646618"/>
+              <a:gd name="connsiteX6" fmla="*/ 127339 w 4832623"/>
+              <a:gd name="connsiteY6" fmla="*/ 0 h 1646618"/>
+              <a:gd name="connsiteX0" fmla="*/ 145 w 4837766"/>
+              <a:gd name="connsiteY0" fmla="*/ 0 h 1646618"/>
+              <a:gd name="connsiteX1" fmla="*/ 4820169 w 4837766"/>
+              <a:gd name="connsiteY1" fmla="*/ 9427 h 1646618"/>
+              <a:gd name="connsiteX2" fmla="*/ 4837766 w 4837766"/>
+              <a:gd name="connsiteY2" fmla="*/ 1642686 h 1646618"/>
+              <a:gd name="connsiteX3" fmla="*/ 2411254 w 4837766"/>
+              <a:gd name="connsiteY3" fmla="*/ 1646618 h 1646618"/>
+              <a:gd name="connsiteX4" fmla="*/ 2403608 w 4837766"/>
+              <a:gd name="connsiteY4" fmla="*/ 716437 h 1646618"/>
+              <a:gd name="connsiteX5" fmla="*/ 5143 w 4837766"/>
+              <a:gd name="connsiteY5" fmla="*/ 735290 h 1646618"/>
+              <a:gd name="connsiteX6" fmla="*/ 145 w 4837766"/>
+              <a:gd name="connsiteY6" fmla="*/ 0 h 1646618"/>
+              <a:gd name="connsiteX0" fmla="*/ 30292 w 4867913"/>
+              <a:gd name="connsiteY0" fmla="*/ 0 h 1646618"/>
+              <a:gd name="connsiteX1" fmla="*/ 4850316 w 4867913"/>
+              <a:gd name="connsiteY1" fmla="*/ 9427 h 1646618"/>
+              <a:gd name="connsiteX2" fmla="*/ 4867913 w 4867913"/>
+              <a:gd name="connsiteY2" fmla="*/ 1642686 h 1646618"/>
+              <a:gd name="connsiteX3" fmla="*/ 2441401 w 4867913"/>
+              <a:gd name="connsiteY3" fmla="*/ 1646618 h 1646618"/>
+              <a:gd name="connsiteX4" fmla="*/ 2433755 w 4867913"/>
+              <a:gd name="connsiteY4" fmla="*/ 716437 h 1646618"/>
+              <a:gd name="connsiteX5" fmla="*/ 0 w 4867913"/>
+              <a:gd name="connsiteY5" fmla="*/ 744364 h 1646618"/>
+              <a:gd name="connsiteX6" fmla="*/ 30292 w 4867913"/>
+              <a:gd name="connsiteY6" fmla="*/ 0 h 1646618"/>
+              <a:gd name="connsiteX0" fmla="*/ 46 w 4890602"/>
+              <a:gd name="connsiteY0" fmla="*/ 0 h 1637543"/>
+              <a:gd name="connsiteX1" fmla="*/ 4873005 w 4890602"/>
+              <a:gd name="connsiteY1" fmla="*/ 352 h 1637543"/>
+              <a:gd name="connsiteX2" fmla="*/ 4890602 w 4890602"/>
+              <a:gd name="connsiteY2" fmla="*/ 1633611 h 1637543"/>
+              <a:gd name="connsiteX3" fmla="*/ 2464090 w 4890602"/>
+              <a:gd name="connsiteY3" fmla="*/ 1637543 h 1637543"/>
+              <a:gd name="connsiteX4" fmla="*/ 2456444 w 4890602"/>
+              <a:gd name="connsiteY4" fmla="*/ 707362 h 1637543"/>
+              <a:gd name="connsiteX5" fmla="*/ 22689 w 4890602"/>
+              <a:gd name="connsiteY5" fmla="*/ 735289 h 1637543"/>
+              <a:gd name="connsiteX6" fmla="*/ 46 w 4890602"/>
+              <a:gd name="connsiteY6" fmla="*/ 0 h 1637543"/>
+              <a:gd name="connsiteX0" fmla="*/ 3825 w 4867913"/>
+              <a:gd name="connsiteY0" fmla="*/ 0 h 1637543"/>
+              <a:gd name="connsiteX1" fmla="*/ 4850316 w 4867913"/>
+              <a:gd name="connsiteY1" fmla="*/ 352 h 1637543"/>
+              <a:gd name="connsiteX2" fmla="*/ 4867913 w 4867913"/>
+              <a:gd name="connsiteY2" fmla="*/ 1633611 h 1637543"/>
+              <a:gd name="connsiteX3" fmla="*/ 2441401 w 4867913"/>
+              <a:gd name="connsiteY3" fmla="*/ 1637543 h 1637543"/>
+              <a:gd name="connsiteX4" fmla="*/ 2433755 w 4867913"/>
+              <a:gd name="connsiteY4" fmla="*/ 707362 h 1637543"/>
+              <a:gd name="connsiteX5" fmla="*/ 0 w 4867913"/>
+              <a:gd name="connsiteY5" fmla="*/ 735289 h 1637543"/>
+              <a:gd name="connsiteX6" fmla="*/ 3825 w 4867913"/>
+              <a:gd name="connsiteY6" fmla="*/ 0 h 1637543"/>
+              <a:gd name="connsiteX0" fmla="*/ 284 w 4864372"/>
+              <a:gd name="connsiteY0" fmla="*/ 0 h 1637543"/>
+              <a:gd name="connsiteX1" fmla="*/ 4846775 w 4864372"/>
+              <a:gd name="connsiteY1" fmla="*/ 352 h 1637543"/>
+              <a:gd name="connsiteX2" fmla="*/ 4864372 w 4864372"/>
+              <a:gd name="connsiteY2" fmla="*/ 1633611 h 1637543"/>
+              <a:gd name="connsiteX3" fmla="*/ 2437860 w 4864372"/>
+              <a:gd name="connsiteY3" fmla="*/ 1637543 h 1637543"/>
+              <a:gd name="connsiteX4" fmla="*/ 2430214 w 4864372"/>
+              <a:gd name="connsiteY4" fmla="*/ 707362 h 1637543"/>
+              <a:gd name="connsiteX5" fmla="*/ 1238 w 4864372"/>
+              <a:gd name="connsiteY5" fmla="*/ 725458 h 1637543"/>
+              <a:gd name="connsiteX6" fmla="*/ 284 w 4864372"/>
+              <a:gd name="connsiteY6" fmla="*/ 0 h 1637543"/>
+              <a:gd name="connsiteX0" fmla="*/ 87 w 4873733"/>
+              <a:gd name="connsiteY0" fmla="*/ 0 h 1637543"/>
+              <a:gd name="connsiteX1" fmla="*/ 4856136 w 4873733"/>
+              <a:gd name="connsiteY1" fmla="*/ 352 h 1637543"/>
+              <a:gd name="connsiteX2" fmla="*/ 4873733 w 4873733"/>
+              <a:gd name="connsiteY2" fmla="*/ 1633611 h 1637543"/>
+              <a:gd name="connsiteX3" fmla="*/ 2447221 w 4873733"/>
+              <a:gd name="connsiteY3" fmla="*/ 1637543 h 1637543"/>
+              <a:gd name="connsiteX4" fmla="*/ 2439575 w 4873733"/>
+              <a:gd name="connsiteY4" fmla="*/ 707362 h 1637543"/>
+              <a:gd name="connsiteX5" fmla="*/ 10599 w 4873733"/>
+              <a:gd name="connsiteY5" fmla="*/ 725458 h 1637543"/>
+              <a:gd name="connsiteX6" fmla="*/ 87 w 4873733"/>
+              <a:gd name="connsiteY6" fmla="*/ 0 h 1637543"/>
+              <a:gd name="connsiteX0" fmla="*/ 283 w 4873929"/>
+              <a:gd name="connsiteY0" fmla="*/ 0 h 1637543"/>
+              <a:gd name="connsiteX1" fmla="*/ 4856332 w 4873929"/>
+              <a:gd name="connsiteY1" fmla="*/ 352 h 1637543"/>
+              <a:gd name="connsiteX2" fmla="*/ 4873929 w 4873929"/>
+              <a:gd name="connsiteY2" fmla="*/ 1633611 h 1637543"/>
+              <a:gd name="connsiteX3" fmla="*/ 2447417 w 4873929"/>
+              <a:gd name="connsiteY3" fmla="*/ 1637543 h 1637543"/>
+              <a:gd name="connsiteX4" fmla="*/ 2439771 w 4873929"/>
+              <a:gd name="connsiteY4" fmla="*/ 707362 h 1637543"/>
+              <a:gd name="connsiteX5" fmla="*/ 1238 w 4873929"/>
+              <a:gd name="connsiteY5" fmla="*/ 725458 h 1637543"/>
+              <a:gd name="connsiteX6" fmla="*/ 283 w 4873929"/>
+              <a:gd name="connsiteY6" fmla="*/ 0 h 1637543"/>
             </a:gdLst>
             <a:ahLst/>
             <a:cxnLst>
@@ -7114,33 +6250,33 @@
             </a:cxnLst>
             <a:rect l="l" t="t" r="r" b="b"/>
             <a:pathLst>
-              <a:path w="4709107" h="1646618">
+              <a:path w="4873929" h="1637543">
                 <a:moveTo>
-                  <a:pt x="3823" y="0"/>
+                  <a:pt x="283" y="0"/>
                 </a:moveTo>
                 <a:lnTo>
-                  <a:pt x="4691510" y="9427"/>
+                  <a:pt x="4856332" y="352"/>
                 </a:lnTo>
                 <a:cubicBezTo>
-                  <a:pt x="4693553" y="534186"/>
-                  <a:pt x="4707064" y="1117927"/>
-                  <a:pt x="4709107" y="1642686"/>
+                  <a:pt x="4858375" y="525111"/>
+                  <a:pt x="4871886" y="1108852"/>
+                  <a:pt x="4873929" y="1633611"/>
                 </a:cubicBezTo>
                 <a:lnTo>
-                  <a:pt x="2282595" y="1646618"/>
+                  <a:pt x="2447417" y="1637543"/>
                 </a:lnTo>
                 <a:cubicBezTo>
-                  <a:pt x="2280046" y="1336558"/>
-                  <a:pt x="2277498" y="1026497"/>
-                  <a:pt x="2274949" y="716437"/>
+                  <a:pt x="2444868" y="1327483"/>
+                  <a:pt x="2442320" y="1017422"/>
+                  <a:pt x="2439771" y="707362"/>
                 </a:cubicBezTo>
                 <a:lnTo>
-                  <a:pt x="0" y="735290"/>
+                  <a:pt x="1238" y="725458"/>
                 </a:lnTo>
                 <a:cubicBezTo>
-                  <a:pt x="1274" y="490193"/>
-                  <a:pt x="2549" y="245097"/>
-                  <a:pt x="3823" y="0"/>
+                  <a:pt x="2512" y="480361"/>
+                  <a:pt x="-991" y="245097"/>
+                  <a:pt x="283" y="0"/>
                 </a:cubicBezTo>
                 <a:close/>
               </a:path>
@@ -7188,8 +6324,8 @@
         </p:nvSpPr>
         <p:spPr>
           <a:xfrm>
-            <a:off x="4326492" y="2279515"/>
-            <a:ext cx="4696400" cy="2074486"/>
+            <a:off x="4158266" y="2279515"/>
+            <a:ext cx="4864626" cy="2074486"/>
           </a:xfrm>
           <a:custGeom>
             <a:avLst/>
@@ -7938,6 +7074,126 @@
               <a:gd name="connsiteY10" fmla="*/ 20855 h 2074486"/>
               <a:gd name="connsiteX11" fmla="*/ 220823 w 4696400"/>
               <a:gd name="connsiteY11" fmla="*/ 22663 h 2074486"/>
+              <a:gd name="connsiteX0" fmla="*/ 326291 w 4801908"/>
+              <a:gd name="connsiteY0" fmla="*/ 20857 h 2074486"/>
+              <a:gd name="connsiteX1" fmla="*/ 2371947 w 4801908"/>
+              <a:gd name="connsiteY1" fmla="*/ 0 h 2074486"/>
+              <a:gd name="connsiteX2" fmla="*/ 2381373 w 4801908"/>
+              <a:gd name="connsiteY2" fmla="*/ 911572 h 2074486"/>
+              <a:gd name="connsiteX3" fmla="*/ 4801863 w 4801908"/>
+              <a:gd name="connsiteY3" fmla="*/ 901949 h 2074486"/>
+              <a:gd name="connsiteX4" fmla="*/ 4796246 w 4801908"/>
+              <a:gd name="connsiteY4" fmla="*/ 1447289 h 2074486"/>
+              <a:gd name="connsiteX5" fmla="*/ 2711705 w 4801908"/>
+              <a:gd name="connsiteY5" fmla="*/ 1420816 h 2074486"/>
+              <a:gd name="connsiteX6" fmla="*/ 2715515 w 4801908"/>
+              <a:gd name="connsiteY6" fmla="*/ 1536962 h 2074486"/>
+              <a:gd name="connsiteX7" fmla="*/ 2379176 w 4801908"/>
+              <a:gd name="connsiteY7" fmla="*/ 1535154 h 2074486"/>
+              <a:gd name="connsiteX8" fmla="*/ 2375561 w 4801908"/>
+              <a:gd name="connsiteY8" fmla="*/ 2074486 h 2074486"/>
+              <a:gd name="connsiteX9" fmla="*/ 113128 w 4801908"/>
+              <a:gd name="connsiteY9" fmla="*/ 2074486 h 2074486"/>
+              <a:gd name="connsiteX10" fmla="*/ 0 w 4801908"/>
+              <a:gd name="connsiteY10" fmla="*/ 20855 h 2074486"/>
+              <a:gd name="connsiteX11" fmla="*/ 326331 w 4801908"/>
+              <a:gd name="connsiteY11" fmla="*/ 22663 h 2074486"/>
+              <a:gd name="connsiteX0" fmla="*/ 389009 w 4864626"/>
+              <a:gd name="connsiteY0" fmla="*/ 20857 h 2074486"/>
+              <a:gd name="connsiteX1" fmla="*/ 2434665 w 4864626"/>
+              <a:gd name="connsiteY1" fmla="*/ 0 h 2074486"/>
+              <a:gd name="connsiteX2" fmla="*/ 2444091 w 4864626"/>
+              <a:gd name="connsiteY2" fmla="*/ 911572 h 2074486"/>
+              <a:gd name="connsiteX3" fmla="*/ 4864581 w 4864626"/>
+              <a:gd name="connsiteY3" fmla="*/ 901949 h 2074486"/>
+              <a:gd name="connsiteX4" fmla="*/ 4858964 w 4864626"/>
+              <a:gd name="connsiteY4" fmla="*/ 1447289 h 2074486"/>
+              <a:gd name="connsiteX5" fmla="*/ 2774423 w 4864626"/>
+              <a:gd name="connsiteY5" fmla="*/ 1420816 h 2074486"/>
+              <a:gd name="connsiteX6" fmla="*/ 2778233 w 4864626"/>
+              <a:gd name="connsiteY6" fmla="*/ 1536962 h 2074486"/>
+              <a:gd name="connsiteX7" fmla="*/ 2441894 w 4864626"/>
+              <a:gd name="connsiteY7" fmla="*/ 1535154 h 2074486"/>
+              <a:gd name="connsiteX8" fmla="*/ 2438279 w 4864626"/>
+              <a:gd name="connsiteY8" fmla="*/ 2074486 h 2074486"/>
+              <a:gd name="connsiteX9" fmla="*/ 0 w 4864626"/>
+              <a:gd name="connsiteY9" fmla="*/ 2074486 h 2074486"/>
+              <a:gd name="connsiteX10" fmla="*/ 62718 w 4864626"/>
+              <a:gd name="connsiteY10" fmla="*/ 20855 h 2074486"/>
+              <a:gd name="connsiteX11" fmla="*/ 389049 w 4864626"/>
+              <a:gd name="connsiteY11" fmla="*/ 22663 h 2074486"/>
+              <a:gd name="connsiteX0" fmla="*/ 405422 w 4881039"/>
+              <a:gd name="connsiteY0" fmla="*/ 20857 h 2074486"/>
+              <a:gd name="connsiteX1" fmla="*/ 2451078 w 4881039"/>
+              <a:gd name="connsiteY1" fmla="*/ 0 h 2074486"/>
+              <a:gd name="connsiteX2" fmla="*/ 2460504 w 4881039"/>
+              <a:gd name="connsiteY2" fmla="*/ 911572 h 2074486"/>
+              <a:gd name="connsiteX3" fmla="*/ 4880994 w 4881039"/>
+              <a:gd name="connsiteY3" fmla="*/ 901949 h 2074486"/>
+              <a:gd name="connsiteX4" fmla="*/ 4875377 w 4881039"/>
+              <a:gd name="connsiteY4" fmla="*/ 1447289 h 2074486"/>
+              <a:gd name="connsiteX5" fmla="*/ 2790836 w 4881039"/>
+              <a:gd name="connsiteY5" fmla="*/ 1420816 h 2074486"/>
+              <a:gd name="connsiteX6" fmla="*/ 2794646 w 4881039"/>
+              <a:gd name="connsiteY6" fmla="*/ 1536962 h 2074486"/>
+              <a:gd name="connsiteX7" fmla="*/ 2458307 w 4881039"/>
+              <a:gd name="connsiteY7" fmla="*/ 1535154 h 2074486"/>
+              <a:gd name="connsiteX8" fmla="*/ 2454692 w 4881039"/>
+              <a:gd name="connsiteY8" fmla="*/ 2074486 h 2074486"/>
+              <a:gd name="connsiteX9" fmla="*/ 16413 w 4881039"/>
+              <a:gd name="connsiteY9" fmla="*/ 2074486 h 2074486"/>
+              <a:gd name="connsiteX10" fmla="*/ 0 w 4881039"/>
+              <a:gd name="connsiteY10" fmla="*/ 12063 h 2074486"/>
+              <a:gd name="connsiteX11" fmla="*/ 405462 w 4881039"/>
+              <a:gd name="connsiteY11" fmla="*/ 22663 h 2074486"/>
+              <a:gd name="connsiteX0" fmla="*/ 389009 w 4864626"/>
+              <a:gd name="connsiteY0" fmla="*/ 26379 h 2080008"/>
+              <a:gd name="connsiteX1" fmla="*/ 2434665 w 4864626"/>
+              <a:gd name="connsiteY1" fmla="*/ 5522 h 2080008"/>
+              <a:gd name="connsiteX2" fmla="*/ 2444091 w 4864626"/>
+              <a:gd name="connsiteY2" fmla="*/ 917094 h 2080008"/>
+              <a:gd name="connsiteX3" fmla="*/ 4864581 w 4864626"/>
+              <a:gd name="connsiteY3" fmla="*/ 907471 h 2080008"/>
+              <a:gd name="connsiteX4" fmla="*/ 4858964 w 4864626"/>
+              <a:gd name="connsiteY4" fmla="*/ 1452811 h 2080008"/>
+              <a:gd name="connsiteX5" fmla="*/ 2774423 w 4864626"/>
+              <a:gd name="connsiteY5" fmla="*/ 1426338 h 2080008"/>
+              <a:gd name="connsiteX6" fmla="*/ 2778233 w 4864626"/>
+              <a:gd name="connsiteY6" fmla="*/ 1542484 h 2080008"/>
+              <a:gd name="connsiteX7" fmla="*/ 2441894 w 4864626"/>
+              <a:gd name="connsiteY7" fmla="*/ 1540676 h 2080008"/>
+              <a:gd name="connsiteX8" fmla="*/ 2438279 w 4864626"/>
+              <a:gd name="connsiteY8" fmla="*/ 2080008 h 2080008"/>
+              <a:gd name="connsiteX9" fmla="*/ 0 w 4864626"/>
+              <a:gd name="connsiteY9" fmla="*/ 2080008 h 2080008"/>
+              <a:gd name="connsiteX10" fmla="*/ 9964 w 4864626"/>
+              <a:gd name="connsiteY10" fmla="*/ 0 h 2080008"/>
+              <a:gd name="connsiteX11" fmla="*/ 389049 w 4864626"/>
+              <a:gd name="connsiteY11" fmla="*/ 28185 h 2080008"/>
+              <a:gd name="connsiteX0" fmla="*/ 389009 w 4864626"/>
+              <a:gd name="connsiteY0" fmla="*/ 20857 h 2074486"/>
+              <a:gd name="connsiteX1" fmla="*/ 2434665 w 4864626"/>
+              <a:gd name="connsiteY1" fmla="*/ 0 h 2074486"/>
+              <a:gd name="connsiteX2" fmla="*/ 2444091 w 4864626"/>
+              <a:gd name="connsiteY2" fmla="*/ 911572 h 2074486"/>
+              <a:gd name="connsiteX3" fmla="*/ 4864581 w 4864626"/>
+              <a:gd name="connsiteY3" fmla="*/ 901949 h 2074486"/>
+              <a:gd name="connsiteX4" fmla="*/ 4858964 w 4864626"/>
+              <a:gd name="connsiteY4" fmla="*/ 1447289 h 2074486"/>
+              <a:gd name="connsiteX5" fmla="*/ 2774423 w 4864626"/>
+              <a:gd name="connsiteY5" fmla="*/ 1420816 h 2074486"/>
+              <a:gd name="connsiteX6" fmla="*/ 2778233 w 4864626"/>
+              <a:gd name="connsiteY6" fmla="*/ 1536962 h 2074486"/>
+              <a:gd name="connsiteX7" fmla="*/ 2441894 w 4864626"/>
+              <a:gd name="connsiteY7" fmla="*/ 1535154 h 2074486"/>
+              <a:gd name="connsiteX8" fmla="*/ 2438279 w 4864626"/>
+              <a:gd name="connsiteY8" fmla="*/ 2074486 h 2074486"/>
+              <a:gd name="connsiteX9" fmla="*/ 0 w 4864626"/>
+              <a:gd name="connsiteY9" fmla="*/ 2074486 h 2074486"/>
+              <a:gd name="connsiteX10" fmla="*/ 9964 w 4864626"/>
+              <a:gd name="connsiteY10" fmla="*/ 18290 h 2074486"/>
+              <a:gd name="connsiteX11" fmla="*/ 389049 w 4864626"/>
+              <a:gd name="connsiteY11" fmla="*/ 22663 h 2074486"/>
             </a:gdLst>
             <a:ahLst/>
             <a:cxnLst>
@@ -7980,44 +7236,46 @@
             </a:cxnLst>
             <a:rect l="l" t="t" r="r" b="b"/>
             <a:pathLst>
-              <a:path w="4696400" h="2074486">
+              <a:path w="4864626" h="2074486">
                 <a:moveTo>
-                  <a:pt x="220783" y="20857"/>
+                  <a:pt x="389009" y="20857"/>
                 </a:moveTo>
                 <a:lnTo>
-                  <a:pt x="2266439" y="0"/>
+                  <a:pt x="2434665" y="0"/>
                 </a:lnTo>
                 <a:lnTo>
-                  <a:pt x="2275865" y="911572"/>
+                  <a:pt x="2444091" y="911572"/>
                 </a:lnTo>
                 <a:lnTo>
-                  <a:pt x="4696355" y="901949"/>
+                  <a:pt x="4864581" y="901949"/>
                 </a:lnTo>
                 <a:cubicBezTo>
-                  <a:pt x="4697023" y="1102779"/>
-                  <a:pt x="4690070" y="1246459"/>
-                  <a:pt x="4690738" y="1447289"/>
+                  <a:pt x="4865249" y="1102779"/>
+                  <a:pt x="4858296" y="1246459"/>
+                  <a:pt x="4858964" y="1447289"/>
                 </a:cubicBezTo>
                 <a:lnTo>
-                  <a:pt x="2606197" y="1420816"/>
+                  <a:pt x="2774423" y="1420816"/>
                 </a:lnTo>
                 <a:lnTo>
-                  <a:pt x="2610007" y="1536962"/>
+                  <a:pt x="2778233" y="1536962"/>
                 </a:lnTo>
                 <a:lnTo>
-                  <a:pt x="2273668" y="1535154"/>
+                  <a:pt x="2441894" y="1535154"/>
                 </a:lnTo>
                 <a:lnTo>
-                  <a:pt x="2270053" y="2074486"/>
+                  <a:pt x="2438279" y="2074486"/>
                 </a:lnTo>
                 <a:lnTo>
-                  <a:pt x="7620" y="2074486"/>
+                  <a:pt x="0" y="2074486"/>
                 </a:lnTo>
+                <a:cubicBezTo>
+                  <a:pt x="3321" y="1381150"/>
+                  <a:pt x="6643" y="711626"/>
+                  <a:pt x="9964" y="18290"/>
+                </a:cubicBezTo>
                 <a:lnTo>
-                  <a:pt x="0" y="20855"/>
-                </a:lnTo>
-                <a:lnTo>
-                  <a:pt x="220823" y="22663"/>
+                  <a:pt x="389049" y="22663"/>
                 </a:lnTo>
               </a:path>
             </a:pathLst>
@@ -8064,8 +7322,8 @@
         </p:nvSpPr>
         <p:spPr>
           <a:xfrm>
-            <a:off x="4338137" y="3704734"/>
-            <a:ext cx="4683315" cy="1404594"/>
+            <a:off x="4150348" y="3704734"/>
+            <a:ext cx="4871104" cy="1404594"/>
           </a:xfrm>
           <a:custGeom>
             <a:avLst/>
@@ -8454,6 +7712,150 @@
               <a:gd name="connsiteY10" fmla="*/ 1386133 h 1404594"/>
               <a:gd name="connsiteX11" fmla="*/ 0 w 4683315"/>
               <a:gd name="connsiteY11" fmla="*/ 653867 h 1404594"/>
+              <a:gd name="connsiteX0" fmla="*/ 0 w 4850369"/>
+              <a:gd name="connsiteY0" fmla="*/ 636282 h 1404594"/>
+              <a:gd name="connsiteX1" fmla="*/ 2427091 w 4850369"/>
+              <a:gd name="connsiteY1" fmla="*/ 657480 h 1404594"/>
+              <a:gd name="connsiteX2" fmla="*/ 2436518 w 4850369"/>
+              <a:gd name="connsiteY2" fmla="*/ 117953 h 1404594"/>
+              <a:gd name="connsiteX3" fmla="*/ 2578509 w 4850369"/>
+              <a:gd name="connsiteY3" fmla="*/ 117953 h 1404594"/>
+              <a:gd name="connsiteX4" fmla="*/ 2767047 w 4850369"/>
+              <a:gd name="connsiteY4" fmla="*/ 125377 h 1404594"/>
+              <a:gd name="connsiteX5" fmla="*/ 2767045 w 4850369"/>
+              <a:gd name="connsiteY5" fmla="*/ 0 h 1404594"/>
+              <a:gd name="connsiteX6" fmla="*/ 4850369 w 4850369"/>
+              <a:gd name="connsiteY6" fmla="*/ 18854 h 1404594"/>
+              <a:gd name="connsiteX7" fmla="*/ 4850369 w 4850369"/>
+              <a:gd name="connsiteY7" fmla="*/ 1404594 h 1404594"/>
+              <a:gd name="connsiteX8" fmla="*/ 2474814 w 4850369"/>
+              <a:gd name="connsiteY8" fmla="*/ 1385740 h 1404594"/>
+              <a:gd name="connsiteX9" fmla="*/ 2473008 w 4850369"/>
+              <a:gd name="connsiteY9" fmla="*/ 1386330 h 1404594"/>
+              <a:gd name="connsiteX10" fmla="*/ 170864 w 4850369"/>
+              <a:gd name="connsiteY10" fmla="*/ 1386133 h 1404594"/>
+              <a:gd name="connsiteX11" fmla="*/ 0 w 4850369"/>
+              <a:gd name="connsiteY11" fmla="*/ 636282 h 1404594"/>
+              <a:gd name="connsiteX0" fmla="*/ 0 w 4850369"/>
+              <a:gd name="connsiteY0" fmla="*/ 636282 h 1404594"/>
+              <a:gd name="connsiteX1" fmla="*/ 2427091 w 4850369"/>
+              <a:gd name="connsiteY1" fmla="*/ 657480 h 1404594"/>
+              <a:gd name="connsiteX2" fmla="*/ 2436518 w 4850369"/>
+              <a:gd name="connsiteY2" fmla="*/ 117953 h 1404594"/>
+              <a:gd name="connsiteX3" fmla="*/ 2578509 w 4850369"/>
+              <a:gd name="connsiteY3" fmla="*/ 117953 h 1404594"/>
+              <a:gd name="connsiteX4" fmla="*/ 2767047 w 4850369"/>
+              <a:gd name="connsiteY4" fmla="*/ 125377 h 1404594"/>
+              <a:gd name="connsiteX5" fmla="*/ 2767045 w 4850369"/>
+              <a:gd name="connsiteY5" fmla="*/ 0 h 1404594"/>
+              <a:gd name="connsiteX6" fmla="*/ 4850369 w 4850369"/>
+              <a:gd name="connsiteY6" fmla="*/ 18854 h 1404594"/>
+              <a:gd name="connsiteX7" fmla="*/ 4850369 w 4850369"/>
+              <a:gd name="connsiteY7" fmla="*/ 1404594 h 1404594"/>
+              <a:gd name="connsiteX8" fmla="*/ 2474814 w 4850369"/>
+              <a:gd name="connsiteY8" fmla="*/ 1385740 h 1404594"/>
+              <a:gd name="connsiteX9" fmla="*/ 2473008 w 4850369"/>
+              <a:gd name="connsiteY9" fmla="*/ 1386330 h 1404594"/>
+              <a:gd name="connsiteX10" fmla="*/ 38980 w 4850369"/>
+              <a:gd name="connsiteY10" fmla="*/ 1386133 h 1404594"/>
+              <a:gd name="connsiteX11" fmla="*/ 0 w 4850369"/>
+              <a:gd name="connsiteY11" fmla="*/ 636282 h 1404594"/>
+              <a:gd name="connsiteX0" fmla="*/ 0 w 4850369"/>
+              <a:gd name="connsiteY0" fmla="*/ 636282 h 1404594"/>
+              <a:gd name="connsiteX1" fmla="*/ 2427091 w 4850369"/>
+              <a:gd name="connsiteY1" fmla="*/ 657480 h 1404594"/>
+              <a:gd name="connsiteX2" fmla="*/ 2436518 w 4850369"/>
+              <a:gd name="connsiteY2" fmla="*/ 117953 h 1404594"/>
+              <a:gd name="connsiteX3" fmla="*/ 2578509 w 4850369"/>
+              <a:gd name="connsiteY3" fmla="*/ 117953 h 1404594"/>
+              <a:gd name="connsiteX4" fmla="*/ 2767047 w 4850369"/>
+              <a:gd name="connsiteY4" fmla="*/ 125377 h 1404594"/>
+              <a:gd name="connsiteX5" fmla="*/ 2767045 w 4850369"/>
+              <a:gd name="connsiteY5" fmla="*/ 0 h 1404594"/>
+              <a:gd name="connsiteX6" fmla="*/ 4850369 w 4850369"/>
+              <a:gd name="connsiteY6" fmla="*/ 18854 h 1404594"/>
+              <a:gd name="connsiteX7" fmla="*/ 4850369 w 4850369"/>
+              <a:gd name="connsiteY7" fmla="*/ 1404594 h 1404594"/>
+              <a:gd name="connsiteX8" fmla="*/ 2474814 w 4850369"/>
+              <a:gd name="connsiteY8" fmla="*/ 1385740 h 1404594"/>
+              <a:gd name="connsiteX9" fmla="*/ 2473008 w 4850369"/>
+              <a:gd name="connsiteY9" fmla="*/ 1386330 h 1404594"/>
+              <a:gd name="connsiteX10" fmla="*/ 12603 w 4850369"/>
+              <a:gd name="connsiteY10" fmla="*/ 1386133 h 1404594"/>
+              <a:gd name="connsiteX11" fmla="*/ 0 w 4850369"/>
+              <a:gd name="connsiteY11" fmla="*/ 636282 h 1404594"/>
+              <a:gd name="connsiteX0" fmla="*/ 0 w 4855132"/>
+              <a:gd name="connsiteY0" fmla="*/ 636282 h 1404594"/>
+              <a:gd name="connsiteX1" fmla="*/ 2431854 w 4855132"/>
+              <a:gd name="connsiteY1" fmla="*/ 657480 h 1404594"/>
+              <a:gd name="connsiteX2" fmla="*/ 2441281 w 4855132"/>
+              <a:gd name="connsiteY2" fmla="*/ 117953 h 1404594"/>
+              <a:gd name="connsiteX3" fmla="*/ 2583272 w 4855132"/>
+              <a:gd name="connsiteY3" fmla="*/ 117953 h 1404594"/>
+              <a:gd name="connsiteX4" fmla="*/ 2771810 w 4855132"/>
+              <a:gd name="connsiteY4" fmla="*/ 125377 h 1404594"/>
+              <a:gd name="connsiteX5" fmla="*/ 2771808 w 4855132"/>
+              <a:gd name="connsiteY5" fmla="*/ 0 h 1404594"/>
+              <a:gd name="connsiteX6" fmla="*/ 4855132 w 4855132"/>
+              <a:gd name="connsiteY6" fmla="*/ 18854 h 1404594"/>
+              <a:gd name="connsiteX7" fmla="*/ 4855132 w 4855132"/>
+              <a:gd name="connsiteY7" fmla="*/ 1404594 h 1404594"/>
+              <a:gd name="connsiteX8" fmla="*/ 2479577 w 4855132"/>
+              <a:gd name="connsiteY8" fmla="*/ 1385740 h 1404594"/>
+              <a:gd name="connsiteX9" fmla="*/ 2477771 w 4855132"/>
+              <a:gd name="connsiteY9" fmla="*/ 1386330 h 1404594"/>
+              <a:gd name="connsiteX10" fmla="*/ 17366 w 4855132"/>
+              <a:gd name="connsiteY10" fmla="*/ 1386133 h 1404594"/>
+              <a:gd name="connsiteX11" fmla="*/ 0 w 4855132"/>
+              <a:gd name="connsiteY11" fmla="*/ 636282 h 1404594"/>
+              <a:gd name="connsiteX0" fmla="*/ 15972 w 4871104"/>
+              <a:gd name="connsiteY0" fmla="*/ 636282 h 1404594"/>
+              <a:gd name="connsiteX1" fmla="*/ 2447826 w 4871104"/>
+              <a:gd name="connsiteY1" fmla="*/ 657480 h 1404594"/>
+              <a:gd name="connsiteX2" fmla="*/ 2457253 w 4871104"/>
+              <a:gd name="connsiteY2" fmla="*/ 117953 h 1404594"/>
+              <a:gd name="connsiteX3" fmla="*/ 2599244 w 4871104"/>
+              <a:gd name="connsiteY3" fmla="*/ 117953 h 1404594"/>
+              <a:gd name="connsiteX4" fmla="*/ 2787782 w 4871104"/>
+              <a:gd name="connsiteY4" fmla="*/ 125377 h 1404594"/>
+              <a:gd name="connsiteX5" fmla="*/ 2787780 w 4871104"/>
+              <a:gd name="connsiteY5" fmla="*/ 0 h 1404594"/>
+              <a:gd name="connsiteX6" fmla="*/ 4871104 w 4871104"/>
+              <a:gd name="connsiteY6" fmla="*/ 18854 h 1404594"/>
+              <a:gd name="connsiteX7" fmla="*/ 4871104 w 4871104"/>
+              <a:gd name="connsiteY7" fmla="*/ 1404594 h 1404594"/>
+              <a:gd name="connsiteX8" fmla="*/ 2495549 w 4871104"/>
+              <a:gd name="connsiteY8" fmla="*/ 1385740 h 1404594"/>
+              <a:gd name="connsiteX9" fmla="*/ 2493743 w 4871104"/>
+              <a:gd name="connsiteY9" fmla="*/ 1386330 h 1404594"/>
+              <a:gd name="connsiteX10" fmla="*/ 0 w 4871104"/>
+              <a:gd name="connsiteY10" fmla="*/ 1390895 h 1404594"/>
+              <a:gd name="connsiteX11" fmla="*/ 15972 w 4871104"/>
+              <a:gd name="connsiteY11" fmla="*/ 636282 h 1404594"/>
+              <a:gd name="connsiteX0" fmla="*/ 6447 w 4871104"/>
+              <a:gd name="connsiteY0" fmla="*/ 645807 h 1404594"/>
+              <a:gd name="connsiteX1" fmla="*/ 2447826 w 4871104"/>
+              <a:gd name="connsiteY1" fmla="*/ 657480 h 1404594"/>
+              <a:gd name="connsiteX2" fmla="*/ 2457253 w 4871104"/>
+              <a:gd name="connsiteY2" fmla="*/ 117953 h 1404594"/>
+              <a:gd name="connsiteX3" fmla="*/ 2599244 w 4871104"/>
+              <a:gd name="connsiteY3" fmla="*/ 117953 h 1404594"/>
+              <a:gd name="connsiteX4" fmla="*/ 2787782 w 4871104"/>
+              <a:gd name="connsiteY4" fmla="*/ 125377 h 1404594"/>
+              <a:gd name="connsiteX5" fmla="*/ 2787780 w 4871104"/>
+              <a:gd name="connsiteY5" fmla="*/ 0 h 1404594"/>
+              <a:gd name="connsiteX6" fmla="*/ 4871104 w 4871104"/>
+              <a:gd name="connsiteY6" fmla="*/ 18854 h 1404594"/>
+              <a:gd name="connsiteX7" fmla="*/ 4871104 w 4871104"/>
+              <a:gd name="connsiteY7" fmla="*/ 1404594 h 1404594"/>
+              <a:gd name="connsiteX8" fmla="*/ 2495549 w 4871104"/>
+              <a:gd name="connsiteY8" fmla="*/ 1385740 h 1404594"/>
+              <a:gd name="connsiteX9" fmla="*/ 2493743 w 4871104"/>
+              <a:gd name="connsiteY9" fmla="*/ 1386330 h 1404594"/>
+              <a:gd name="connsiteX10" fmla="*/ 0 w 4871104"/>
+              <a:gd name="connsiteY10" fmla="*/ 1390895 h 1404594"/>
+              <a:gd name="connsiteX11" fmla="*/ 6447 w 4871104"/>
+              <a:gd name="connsiteY11" fmla="*/ 645807 h 1404594"/>
             </a:gdLst>
             <a:ahLst/>
             <a:cxnLst>
@@ -8496,44 +7898,44 @@
             </a:cxnLst>
             <a:rect l="l" t="t" r="r" b="b"/>
             <a:pathLst>
-              <a:path w="4683315" h="1404594">
+              <a:path w="4871104" h="1404594">
                 <a:moveTo>
-                  <a:pt x="0" y="653867"/>
+                  <a:pt x="6447" y="645807"/>
                 </a:moveTo>
                 <a:lnTo>
-                  <a:pt x="2260037" y="657480"/>
+                  <a:pt x="2447826" y="657480"/>
                 </a:lnTo>
                 <a:lnTo>
-                  <a:pt x="2269464" y="117953"/>
+                  <a:pt x="2457253" y="117953"/>
                 </a:lnTo>
                 <a:lnTo>
-                  <a:pt x="2411455" y="117953"/>
+                  <a:pt x="2599244" y="117953"/>
                 </a:lnTo>
                 <a:lnTo>
-                  <a:pt x="2599993" y="125377"/>
+                  <a:pt x="2787782" y="125377"/>
                 </a:lnTo>
                 <a:cubicBezTo>
-                  <a:pt x="2599993" y="56247"/>
-                  <a:pt x="2599991" y="69130"/>
-                  <a:pt x="2599991" y="0"/>
+                  <a:pt x="2787782" y="56247"/>
+                  <a:pt x="2787780" y="69130"/>
+                  <a:pt x="2787780" y="0"/>
                 </a:cubicBezTo>
                 <a:lnTo>
-                  <a:pt x="4683315" y="18854"/>
+                  <a:pt x="4871104" y="18854"/>
                 </a:lnTo>
                 <a:lnTo>
-                  <a:pt x="4683315" y="1404594"/>
+                  <a:pt x="4871104" y="1404594"/>
                 </a:lnTo>
                 <a:lnTo>
-                  <a:pt x="2307760" y="1385740"/>
+                  <a:pt x="2495549" y="1385740"/>
                 </a:lnTo>
                 <a:lnTo>
-                  <a:pt x="2305954" y="1386330"/>
+                  <a:pt x="2493743" y="1386330"/>
                 </a:lnTo>
                 <a:lnTo>
-                  <a:pt x="3810" y="1386133"/>
+                  <a:pt x="0" y="1390895"/>
                 </a:lnTo>
                 <a:lnTo>
-                  <a:pt x="0" y="653867"/>
+                  <a:pt x="6447" y="645807"/>
                 </a:lnTo>
                 <a:close/>
               </a:path>
@@ -8582,7 +7984,7 @@
         <p:spPr>
           <a:xfrm>
             <a:off x="6243962" y="5093695"/>
-            <a:ext cx="2862331" cy="1740738"/>
+            <a:ext cx="2776606" cy="1740738"/>
           </a:xfrm>
           <a:custGeom>
             <a:avLst/>
@@ -8769,6 +8171,34 @@
               <a:gd name="connsiteY5" fmla="*/ 448873 h 1740738"/>
               <a:gd name="connsiteX6" fmla="*/ 890126 w 2862331"/>
               <a:gd name="connsiteY6" fmla="*/ 0 h 1740738"/>
+              <a:gd name="connsiteX0" fmla="*/ 890126 w 2852991"/>
+              <a:gd name="connsiteY0" fmla="*/ 0 h 1740738"/>
+              <a:gd name="connsiteX1" fmla="*/ 2776606 w 2852991"/>
+              <a:gd name="connsiteY1" fmla="*/ 24667 h 1740738"/>
+              <a:gd name="connsiteX2" fmla="*/ 2852904 w 2852991"/>
+              <a:gd name="connsiteY2" fmla="*/ 1740738 h 1740738"/>
+              <a:gd name="connsiteX3" fmla="*/ 1806 w 2852991"/>
+              <a:gd name="connsiteY3" fmla="*/ 1740738 h 1740738"/>
+              <a:gd name="connsiteX4" fmla="*/ 0 w 2852991"/>
+              <a:gd name="connsiteY4" fmla="*/ 441253 h 1740738"/>
+              <a:gd name="connsiteX5" fmla="*/ 890126 w 2852991"/>
+              <a:gd name="connsiteY5" fmla="*/ 448873 h 1740738"/>
+              <a:gd name="connsiteX6" fmla="*/ 890126 w 2852991"/>
+              <a:gd name="connsiteY6" fmla="*/ 0 h 1740738"/>
+              <a:gd name="connsiteX0" fmla="*/ 890126 w 2776606"/>
+              <a:gd name="connsiteY0" fmla="*/ 0 h 1740738"/>
+              <a:gd name="connsiteX1" fmla="*/ 2776606 w 2776606"/>
+              <a:gd name="connsiteY1" fmla="*/ 24667 h 1740738"/>
+              <a:gd name="connsiteX2" fmla="*/ 2767179 w 2776606"/>
+              <a:gd name="connsiteY2" fmla="*/ 1735975 h 1740738"/>
+              <a:gd name="connsiteX3" fmla="*/ 1806 w 2776606"/>
+              <a:gd name="connsiteY3" fmla="*/ 1740738 h 1740738"/>
+              <a:gd name="connsiteX4" fmla="*/ 0 w 2776606"/>
+              <a:gd name="connsiteY4" fmla="*/ 441253 h 1740738"/>
+              <a:gd name="connsiteX5" fmla="*/ 890126 w 2776606"/>
+              <a:gd name="connsiteY5" fmla="*/ 448873 h 1740738"/>
+              <a:gd name="connsiteX6" fmla="*/ 890126 w 2776606"/>
+              <a:gd name="connsiteY6" fmla="*/ 0 h 1740738"/>
             </a:gdLst>
             <a:ahLst/>
             <a:cxnLst>
@@ -8796,17 +8226,17 @@
             </a:cxnLst>
             <a:rect l="l" t="t" r="r" b="b"/>
             <a:pathLst>
-              <a:path w="2862331" h="1740738">
+              <a:path w="2776606" h="1740738">
                 <a:moveTo>
                   <a:pt x="890126" y="0"/>
                 </a:moveTo>
                 <a:lnTo>
-                  <a:pt x="2862331" y="24667"/>
+                  <a:pt x="2776606" y="24667"/>
                 </a:lnTo>
                 <a:cubicBezTo>
-                  <a:pt x="2859189" y="574564"/>
-                  <a:pt x="2856046" y="1190841"/>
-                  <a:pt x="2852904" y="1740738"/>
+                  <a:pt x="2773464" y="574564"/>
+                  <a:pt x="2770321" y="1186078"/>
+                  <a:pt x="2767179" y="1735975"/>
                 </a:cubicBezTo>
                 <a:lnTo>
                   <a:pt x="1806" y="1740738"/>
@@ -8866,8 +8296,8 @@
         </p:nvSpPr>
         <p:spPr>
           <a:xfrm>
-            <a:off x="4110088" y="5094283"/>
-            <a:ext cx="3024590" cy="1740149"/>
+            <a:off x="4138297" y="5094283"/>
+            <a:ext cx="2996381" cy="1740149"/>
           </a:xfrm>
           <a:custGeom>
             <a:avLst/>
@@ -9376,6 +8806,78 @@
               <a:gd name="connsiteY7" fmla="*/ 1730722 h 1740149"/>
               <a:gd name="connsiteX8" fmla="*/ 0 w 3024590"/>
               <a:gd name="connsiteY8" fmla="*/ 5617 h 1740149"/>
+              <a:gd name="connsiteX0" fmla="*/ 79131 w 3024590"/>
+              <a:gd name="connsiteY0" fmla="*/ 5617 h 1740149"/>
+              <a:gd name="connsiteX1" fmla="*/ 2031593 w 3024590"/>
+              <a:gd name="connsiteY1" fmla="*/ 0 h 1740149"/>
+              <a:gd name="connsiteX2" fmla="*/ 2229715 w 3024590"/>
+              <a:gd name="connsiteY2" fmla="*/ 6638 h 1740149"/>
+              <a:gd name="connsiteX3" fmla="*/ 3024590 w 3024590"/>
+              <a:gd name="connsiteY3" fmla="*/ 6835 h 1740149"/>
+              <a:gd name="connsiteX4" fmla="*/ 3022587 w 3024590"/>
+              <a:gd name="connsiteY4" fmla="*/ 443060 h 1740149"/>
+              <a:gd name="connsiteX5" fmla="*/ 2130457 w 3024590"/>
+              <a:gd name="connsiteY5" fmla="*/ 429823 h 1740149"/>
+              <a:gd name="connsiteX6" fmla="*/ 2130458 w 3024590"/>
+              <a:gd name="connsiteY6" fmla="*/ 1740149 h 1740149"/>
+              <a:gd name="connsiteX7" fmla="*/ 0 w 3024590"/>
+              <a:gd name="connsiteY7" fmla="*/ 1730722 h 1740149"/>
+              <a:gd name="connsiteX8" fmla="*/ 79131 w 3024590"/>
+              <a:gd name="connsiteY8" fmla="*/ 5617 h 1740149"/>
+              <a:gd name="connsiteX0" fmla="*/ 17584 w 2963043"/>
+              <a:gd name="connsiteY0" fmla="*/ 5617 h 1740149"/>
+              <a:gd name="connsiteX1" fmla="*/ 1970046 w 2963043"/>
+              <a:gd name="connsiteY1" fmla="*/ 0 h 1740149"/>
+              <a:gd name="connsiteX2" fmla="*/ 2168168 w 2963043"/>
+              <a:gd name="connsiteY2" fmla="*/ 6638 h 1740149"/>
+              <a:gd name="connsiteX3" fmla="*/ 2963043 w 2963043"/>
+              <a:gd name="connsiteY3" fmla="*/ 6835 h 1740149"/>
+              <a:gd name="connsiteX4" fmla="*/ 2961040 w 2963043"/>
+              <a:gd name="connsiteY4" fmla="*/ 443060 h 1740149"/>
+              <a:gd name="connsiteX5" fmla="*/ 2068910 w 2963043"/>
+              <a:gd name="connsiteY5" fmla="*/ 429823 h 1740149"/>
+              <a:gd name="connsiteX6" fmla="*/ 2068911 w 2963043"/>
+              <a:gd name="connsiteY6" fmla="*/ 1740149 h 1740149"/>
+              <a:gd name="connsiteX7" fmla="*/ 0 w 2963043"/>
+              <a:gd name="connsiteY7" fmla="*/ 1730722 h 1740149"/>
+              <a:gd name="connsiteX8" fmla="*/ 17584 w 2963043"/>
+              <a:gd name="connsiteY8" fmla="*/ 5617 h 1740149"/>
+              <a:gd name="connsiteX0" fmla="*/ 0 w 2988321"/>
+              <a:gd name="connsiteY0" fmla="*/ 5617 h 1740149"/>
+              <a:gd name="connsiteX1" fmla="*/ 1995324 w 2988321"/>
+              <a:gd name="connsiteY1" fmla="*/ 0 h 1740149"/>
+              <a:gd name="connsiteX2" fmla="*/ 2193446 w 2988321"/>
+              <a:gd name="connsiteY2" fmla="*/ 6638 h 1740149"/>
+              <a:gd name="connsiteX3" fmla="*/ 2988321 w 2988321"/>
+              <a:gd name="connsiteY3" fmla="*/ 6835 h 1740149"/>
+              <a:gd name="connsiteX4" fmla="*/ 2986318 w 2988321"/>
+              <a:gd name="connsiteY4" fmla="*/ 443060 h 1740149"/>
+              <a:gd name="connsiteX5" fmla="*/ 2094188 w 2988321"/>
+              <a:gd name="connsiteY5" fmla="*/ 429823 h 1740149"/>
+              <a:gd name="connsiteX6" fmla="*/ 2094189 w 2988321"/>
+              <a:gd name="connsiteY6" fmla="*/ 1740149 h 1740149"/>
+              <a:gd name="connsiteX7" fmla="*/ 25278 w 2988321"/>
+              <a:gd name="connsiteY7" fmla="*/ 1730722 h 1740149"/>
+              <a:gd name="connsiteX8" fmla="*/ 0 w 2988321"/>
+              <a:gd name="connsiteY8" fmla="*/ 5617 h 1740149"/>
+              <a:gd name="connsiteX0" fmla="*/ 8060 w 2996381"/>
+              <a:gd name="connsiteY0" fmla="*/ 5617 h 1740149"/>
+              <a:gd name="connsiteX1" fmla="*/ 2003384 w 2996381"/>
+              <a:gd name="connsiteY1" fmla="*/ 0 h 1740149"/>
+              <a:gd name="connsiteX2" fmla="*/ 2201506 w 2996381"/>
+              <a:gd name="connsiteY2" fmla="*/ 6638 h 1740149"/>
+              <a:gd name="connsiteX3" fmla="*/ 2996381 w 2996381"/>
+              <a:gd name="connsiteY3" fmla="*/ 6835 h 1740149"/>
+              <a:gd name="connsiteX4" fmla="*/ 2994378 w 2996381"/>
+              <a:gd name="connsiteY4" fmla="*/ 443060 h 1740149"/>
+              <a:gd name="connsiteX5" fmla="*/ 2102248 w 2996381"/>
+              <a:gd name="connsiteY5" fmla="*/ 429823 h 1740149"/>
+              <a:gd name="connsiteX6" fmla="*/ 2102249 w 2996381"/>
+              <a:gd name="connsiteY6" fmla="*/ 1740149 h 1740149"/>
+              <a:gd name="connsiteX7" fmla="*/ 0 w 2996381"/>
+              <a:gd name="connsiteY7" fmla="*/ 1735485 h 1740149"/>
+              <a:gd name="connsiteX8" fmla="*/ 8060 w 2996381"/>
+              <a:gd name="connsiteY8" fmla="*/ 5617 h 1740149"/>
             </a:gdLst>
             <a:ahLst/>
             <a:cxnLst>
@@ -9409,38 +8911,40 @@
             </a:cxnLst>
             <a:rect l="l" t="t" r="r" b="b"/>
             <a:pathLst>
-              <a:path w="3024590" h="1740149">
+              <a:path w="2996381" h="1740149">
                 <a:moveTo>
-                  <a:pt x="0" y="5617"/>
+                  <a:pt x="8060" y="5617"/>
                 </a:moveTo>
                 <a:lnTo>
-                  <a:pt x="2031593" y="0"/>
+                  <a:pt x="2003384" y="0"/>
                 </a:lnTo>
                 <a:lnTo>
-                  <a:pt x="2229715" y="6638"/>
+                  <a:pt x="2201506" y="6638"/>
                 </a:lnTo>
                 <a:lnTo>
-                  <a:pt x="3024590" y="6835"/>
+                  <a:pt x="2996381" y="6835"/>
                 </a:lnTo>
                 <a:cubicBezTo>
-                  <a:pt x="3023922" y="152243"/>
-                  <a:pt x="3023255" y="297652"/>
-                  <a:pt x="3022587" y="443060"/>
+                  <a:pt x="2995713" y="152243"/>
+                  <a:pt x="2995046" y="297652"/>
+                  <a:pt x="2994378" y="443060"/>
                 </a:cubicBezTo>
                 <a:lnTo>
-                  <a:pt x="2130457" y="429823"/>
+                  <a:pt x="2102248" y="429823"/>
                 </a:lnTo>
                 <a:cubicBezTo>
-                  <a:pt x="2130457" y="869740"/>
-                  <a:pt x="2130458" y="1300232"/>
-                  <a:pt x="2130458" y="1740149"/>
+                  <a:pt x="2102248" y="869740"/>
+                  <a:pt x="2102249" y="1300232"/>
+                  <a:pt x="2102249" y="1740149"/>
                 </a:cubicBezTo>
                 <a:lnTo>
-                  <a:pt x="0" y="1730722"/>
+                  <a:pt x="0" y="1735485"/>
                 </a:lnTo>
-                <a:lnTo>
-                  <a:pt x="0" y="5617"/>
-                </a:lnTo>
+                <a:cubicBezTo>
+                  <a:pt x="2687" y="1158862"/>
+                  <a:pt x="5373" y="582240"/>
+                  <a:pt x="8060" y="5617"/>
+                </a:cubicBezTo>
                 <a:close/>
               </a:path>
             </a:pathLst>
@@ -9451,6 +8955,1068 @@
               <a:schemeClr val="accent2">
                 <a:lumMod val="75000"/>
               </a:schemeClr>
+            </a:solidFill>
+          </a:ln>
+        </p:spPr>
+        <p:style>
+          <a:lnRef idx="2">
+            <a:schemeClr val="accent1">
+              <a:shade val="50000"/>
+            </a:schemeClr>
+          </a:lnRef>
+          <a:fillRef idx="1">
+            <a:schemeClr val="accent1"/>
+          </a:fillRef>
+          <a:effectRef idx="0">
+            <a:schemeClr val="accent1"/>
+          </a:effectRef>
+          <a:fontRef idx="minor">
+            <a:schemeClr val="lt1"/>
+          </a:fontRef>
+        </p:style>
+        <p:txBody>
+          <a:bodyPr rtlCol="0" anchor="ctr"/>
+          <a:lstStyle/>
+          <a:p>
+            <a:pPr algn="ctr"/>
+            <a:endParaRPr lang="fr-FR"/>
+          </a:p>
+        </p:txBody>
+      </p:sp>
+      <p:grpSp>
+        <p:nvGrpSpPr>
+          <p:cNvPr id="67" name="Groupe 66"/>
+          <p:cNvGrpSpPr/>
+          <p:nvPr/>
+        </p:nvGrpSpPr>
+        <p:grpSpPr>
+          <a:xfrm>
+            <a:off x="-32109" y="3093029"/>
+            <a:ext cx="4343151" cy="2659250"/>
+            <a:chOff x="117790" y="1440146"/>
+            <a:chExt cx="4343151" cy="2659250"/>
+          </a:xfrm>
+        </p:grpSpPr>
+        <p:sp>
+          <p:nvSpPr>
+            <p:cNvPr id="71" name="ZoneTexte 70"/>
+            <p:cNvSpPr txBox="1"/>
+            <p:nvPr/>
+          </p:nvSpPr>
+          <p:spPr>
+            <a:xfrm>
+              <a:off x="351473" y="1440146"/>
+              <a:ext cx="3223260" cy="253916"/>
+            </a:xfrm>
+            <a:prstGeom prst="rect">
+              <a:avLst/>
+            </a:prstGeom>
+            <a:noFill/>
+          </p:spPr>
+          <p:txBody>
+            <a:bodyPr wrap="square" rtlCol="0">
+              <a:spAutoFit/>
+            </a:bodyPr>
+            <a:lstStyle/>
+            <a:p>
+              <a:r>
+                <a:rPr lang="fr-FR" sz="1050" b="1" dirty="0" err="1">
+                  <a:solidFill>
+                    <a:schemeClr val="accent2">
+                      <a:lumMod val="50000"/>
+                    </a:schemeClr>
+                  </a:solidFill>
+                </a:rPr>
+                <a:t>Step</a:t>
+              </a:r>
+              <a:r>
+                <a:rPr lang="fr-FR" sz="1050" b="1" dirty="0">
+                  <a:solidFill>
+                    <a:schemeClr val="accent2">
+                      <a:lumMod val="50000"/>
+                    </a:schemeClr>
+                  </a:solidFill>
+                </a:rPr>
+                <a:t> 1: import, check and </a:t>
+              </a:r>
+              <a:r>
+                <a:rPr lang="fr-FR" sz="1050" b="1" dirty="0" err="1">
+                  <a:solidFill>
+                    <a:schemeClr val="accent2">
+                      <a:lumMod val="50000"/>
+                    </a:schemeClr>
+                  </a:solidFill>
+                </a:rPr>
+                <a:t>pretreatment</a:t>
+              </a:r>
+              <a:endParaRPr lang="fr-FR" sz="1050" b="1" dirty="0">
+                <a:solidFill>
+                  <a:schemeClr val="accent2">
+                    <a:lumMod val="50000"/>
+                  </a:schemeClr>
+                </a:solidFill>
+              </a:endParaRPr>
+            </a:p>
+          </p:txBody>
+        </p:sp>
+        <p:sp>
+          <p:nvSpPr>
+            <p:cNvPr id="73" name="ZoneTexte 72"/>
+            <p:cNvSpPr txBox="1"/>
+            <p:nvPr/>
+          </p:nvSpPr>
+          <p:spPr>
+            <a:xfrm>
+              <a:off x="117790" y="2491192"/>
+              <a:ext cx="4108514" cy="338554"/>
+            </a:xfrm>
+            <a:prstGeom prst="rect">
+              <a:avLst/>
+            </a:prstGeom>
+            <a:noFill/>
+          </p:spPr>
+          <p:txBody>
+            <a:bodyPr wrap="square" rtlCol="0">
+              <a:spAutoFit/>
+            </a:bodyPr>
+            <a:lstStyle/>
+            <a:p>
+              <a:r>
+                <a:rPr lang="fr-FR" sz="800" dirty="0" err="1">
+                  <a:latin typeface="Courier New" panose="02070309020205020404" pitchFamily="49" charset="0"/>
+                  <a:cs typeface="Courier New" panose="02070309020205020404" pitchFamily="49" charset="0"/>
+                </a:rPr>
+                <a:t>itemselect</a:t>
+              </a:r>
+              <a:r>
+                <a:rPr lang="fr-FR" sz="800" dirty="0">
+                  <a:latin typeface="Courier New" panose="02070309020205020404" pitchFamily="49" charset="0"/>
+                  <a:cs typeface="Courier New" panose="02070309020205020404" pitchFamily="49" charset="0"/>
+                </a:rPr>
+                <a:t>(</a:t>
+              </a:r>
+              <a:r>
+                <a:rPr lang="fr-FR" sz="800" dirty="0" err="1">
+                  <a:latin typeface="Courier New" panose="02070309020205020404" pitchFamily="49" charset="0"/>
+                  <a:cs typeface="Courier New" panose="02070309020205020404" pitchFamily="49" charset="0"/>
+                </a:rPr>
+                <a:t>omicdata</a:t>
+              </a:r>
+              <a:r>
+                <a:rPr lang="fr-FR" sz="800" dirty="0">
+                  <a:latin typeface="Courier New" panose="02070309020205020404" pitchFamily="49" charset="0"/>
+                  <a:cs typeface="Courier New" panose="02070309020205020404" pitchFamily="49" charset="0"/>
+                </a:rPr>
+                <a:t>, </a:t>
+              </a:r>
+            </a:p>
+            <a:p>
+              <a:r>
+                <a:rPr lang="fr-FR" sz="800" dirty="0">
+                  <a:latin typeface="Courier New" panose="02070309020205020404" pitchFamily="49" charset="0"/>
+                  <a:cs typeface="Courier New" panose="02070309020205020404" pitchFamily="49" charset="0"/>
+                </a:rPr>
+                <a:t>   </a:t>
+              </a:r>
+              <a:r>
+                <a:rPr lang="fr-FR" sz="800" dirty="0" err="1">
+                  <a:latin typeface="Courier New" panose="02070309020205020404" pitchFamily="49" charset="0"/>
+                  <a:cs typeface="Courier New" panose="02070309020205020404" pitchFamily="49" charset="0"/>
+                </a:rPr>
+                <a:t>select.method</a:t>
+              </a:r>
+              <a:r>
+                <a:rPr lang="fr-FR" sz="800" dirty="0">
+                  <a:latin typeface="Courier New" panose="02070309020205020404" pitchFamily="49" charset="0"/>
+                  <a:cs typeface="Courier New" panose="02070309020205020404" pitchFamily="49" charset="0"/>
+                </a:rPr>
+                <a:t> = c("</a:t>
+              </a:r>
+              <a:r>
+                <a:rPr lang="fr-FR" sz="800" dirty="0" err="1">
+                  <a:latin typeface="Courier New" panose="02070309020205020404" pitchFamily="49" charset="0"/>
+                  <a:cs typeface="Courier New" panose="02070309020205020404" pitchFamily="49" charset="0"/>
+                </a:rPr>
+                <a:t>quadratic</a:t>
+              </a:r>
+              <a:r>
+                <a:rPr lang="fr-FR" sz="800" dirty="0">
+                  <a:latin typeface="Courier New" panose="02070309020205020404" pitchFamily="49" charset="0"/>
+                  <a:cs typeface="Courier New" panose="02070309020205020404" pitchFamily="49" charset="0"/>
+                </a:rPr>
+                <a:t>", "</a:t>
+              </a:r>
+              <a:r>
+                <a:rPr lang="fr-FR" sz="800" dirty="0" err="1">
+                  <a:latin typeface="Courier New" panose="02070309020205020404" pitchFamily="49" charset="0"/>
+                  <a:cs typeface="Courier New" panose="02070309020205020404" pitchFamily="49" charset="0"/>
+                </a:rPr>
+                <a:t>linear</a:t>
+              </a:r>
+              <a:r>
+                <a:rPr lang="fr-FR" sz="800" dirty="0">
+                  <a:latin typeface="Courier New" panose="02070309020205020404" pitchFamily="49" charset="0"/>
+                  <a:cs typeface="Courier New" panose="02070309020205020404" pitchFamily="49" charset="0"/>
+                </a:rPr>
+                <a:t>", "ANOVA"), FDR)</a:t>
+              </a:r>
+            </a:p>
+          </p:txBody>
+        </p:sp>
+        <p:sp>
+          <p:nvSpPr>
+            <p:cNvPr id="74" name="ZoneTexte 73"/>
+            <p:cNvSpPr txBox="1"/>
+            <p:nvPr/>
+          </p:nvSpPr>
+          <p:spPr>
+            <a:xfrm>
+              <a:off x="356045" y="2306234"/>
+              <a:ext cx="3223260" cy="253916"/>
+            </a:xfrm>
+            <a:prstGeom prst="rect">
+              <a:avLst/>
+            </a:prstGeom>
+            <a:noFill/>
+          </p:spPr>
+          <p:txBody>
+            <a:bodyPr wrap="square" rtlCol="0">
+              <a:spAutoFit/>
+            </a:bodyPr>
+            <a:lstStyle/>
+            <a:p>
+              <a:r>
+                <a:rPr lang="fr-FR" sz="1050" b="1" dirty="0" err="1">
+                  <a:solidFill>
+                    <a:schemeClr val="accent2">
+                      <a:lumMod val="50000"/>
+                    </a:schemeClr>
+                  </a:solidFill>
+                </a:rPr>
+                <a:t>Step</a:t>
+              </a:r>
+              <a:r>
+                <a:rPr lang="fr-FR" sz="1050" b="1" dirty="0">
+                  <a:solidFill>
+                    <a:schemeClr val="accent2">
+                      <a:lumMod val="50000"/>
+                    </a:schemeClr>
+                  </a:solidFill>
+                </a:rPr>
+                <a:t> 2: </a:t>
+              </a:r>
+              <a:r>
+                <a:rPr lang="fr-FR" sz="1050" b="1" dirty="0" err="1">
+                  <a:solidFill>
+                    <a:schemeClr val="accent2">
+                      <a:lumMod val="50000"/>
+                    </a:schemeClr>
+                  </a:solidFill>
+                </a:rPr>
+                <a:t>selection</a:t>
+              </a:r>
+              <a:r>
+                <a:rPr lang="fr-FR" sz="1050" b="1" dirty="0">
+                  <a:solidFill>
+                    <a:schemeClr val="accent2">
+                      <a:lumMod val="50000"/>
+                    </a:schemeClr>
+                  </a:solidFill>
+                </a:rPr>
+                <a:t> of </a:t>
+              </a:r>
+              <a:r>
+                <a:rPr lang="fr-FR" sz="1050" b="1" dirty="0" err="1">
+                  <a:solidFill>
+                    <a:schemeClr val="accent2">
+                      <a:lumMod val="50000"/>
+                    </a:schemeClr>
+                  </a:solidFill>
+                </a:rPr>
+                <a:t>significantly</a:t>
+              </a:r>
+              <a:r>
+                <a:rPr lang="fr-FR" sz="1050" b="1" dirty="0">
+                  <a:solidFill>
+                    <a:schemeClr val="accent2">
+                      <a:lumMod val="50000"/>
+                    </a:schemeClr>
+                  </a:solidFill>
+                </a:rPr>
+                <a:t> responsive items</a:t>
+              </a:r>
+            </a:p>
+          </p:txBody>
+        </p:sp>
+        <p:sp>
+          <p:nvSpPr>
+            <p:cNvPr id="75" name="ZoneTexte 74"/>
+            <p:cNvSpPr txBox="1"/>
+            <p:nvPr/>
+          </p:nvSpPr>
+          <p:spPr>
+            <a:xfrm>
+              <a:off x="157938" y="3029033"/>
+              <a:ext cx="4303003" cy="215444"/>
+            </a:xfrm>
+            <a:prstGeom prst="rect">
+              <a:avLst/>
+            </a:prstGeom>
+            <a:noFill/>
+          </p:spPr>
+          <p:txBody>
+            <a:bodyPr wrap="square" rtlCol="0">
+              <a:spAutoFit/>
+            </a:bodyPr>
+            <a:lstStyle/>
+            <a:p>
+              <a:r>
+                <a:rPr lang="fr-FR" sz="800" dirty="0" err="1">
+                  <a:latin typeface="Courier New" panose="02070309020205020404" pitchFamily="49" charset="0"/>
+                  <a:cs typeface="Courier New" panose="02070309020205020404" pitchFamily="49" charset="0"/>
+                </a:rPr>
+                <a:t>drcfit</a:t>
+              </a:r>
+              <a:r>
+                <a:rPr lang="fr-FR" sz="800" dirty="0">
+                  <a:latin typeface="Courier New" panose="02070309020205020404" pitchFamily="49" charset="0"/>
+                  <a:cs typeface="Courier New" panose="02070309020205020404" pitchFamily="49" charset="0"/>
+                </a:rPr>
+                <a:t>(</a:t>
+              </a:r>
+              <a:r>
+                <a:rPr lang="fr-FR" sz="800" dirty="0" err="1">
+                  <a:latin typeface="Courier New" panose="02070309020205020404" pitchFamily="49" charset="0"/>
+                  <a:cs typeface="Courier New" panose="02070309020205020404" pitchFamily="49" charset="0"/>
+                </a:rPr>
+                <a:t>itemselect</a:t>
+              </a:r>
+              <a:r>
+                <a:rPr lang="fr-FR" sz="800" dirty="0">
+                  <a:latin typeface="Courier New" panose="02070309020205020404" pitchFamily="49" charset="0"/>
+                  <a:cs typeface="Courier New" panose="02070309020205020404" pitchFamily="49" charset="0"/>
+                </a:rPr>
+                <a:t>, </a:t>
+              </a:r>
+              <a:r>
+                <a:rPr lang="fr-FR" sz="800" dirty="0" err="1">
+                  <a:latin typeface="Courier New" panose="02070309020205020404" pitchFamily="49" charset="0"/>
+                  <a:cs typeface="Courier New" panose="02070309020205020404" pitchFamily="49" charset="0"/>
+                </a:rPr>
+                <a:t>information.criterion</a:t>
+              </a:r>
+              <a:r>
+                <a:rPr lang="fr-FR" sz="800" dirty="0">
+                  <a:latin typeface="Courier New" panose="02070309020205020404" pitchFamily="49" charset="0"/>
+                  <a:cs typeface="Courier New" panose="02070309020205020404" pitchFamily="49" charset="0"/>
+                </a:rPr>
+                <a:t> = c("</a:t>
+              </a:r>
+              <a:r>
+                <a:rPr lang="fr-FR" sz="800" dirty="0" err="1">
+                  <a:latin typeface="Courier New" panose="02070309020205020404" pitchFamily="49" charset="0"/>
+                  <a:cs typeface="Courier New" panose="02070309020205020404" pitchFamily="49" charset="0"/>
+                </a:rPr>
+                <a:t>AICc</a:t>
+              </a:r>
+              <a:r>
+                <a:rPr lang="fr-FR" sz="800" dirty="0">
+                  <a:latin typeface="Courier New" panose="02070309020205020404" pitchFamily="49" charset="0"/>
+                  <a:cs typeface="Courier New" panose="02070309020205020404" pitchFamily="49" charset="0"/>
+                </a:rPr>
+                <a:t>", "BIC", "AIC"))</a:t>
+              </a:r>
+            </a:p>
+          </p:txBody>
+        </p:sp>
+        <p:sp>
+          <p:nvSpPr>
+            <p:cNvPr id="82" name="ZoneTexte 81"/>
+            <p:cNvSpPr txBox="1"/>
+            <p:nvPr/>
+          </p:nvSpPr>
+          <p:spPr>
+            <a:xfrm>
+              <a:off x="360617" y="2824284"/>
+              <a:ext cx="3223260" cy="253916"/>
+            </a:xfrm>
+            <a:prstGeom prst="rect">
+              <a:avLst/>
+            </a:prstGeom>
+            <a:noFill/>
+          </p:spPr>
+          <p:txBody>
+            <a:bodyPr wrap="square" rtlCol="0">
+              <a:spAutoFit/>
+            </a:bodyPr>
+            <a:lstStyle/>
+            <a:p>
+              <a:r>
+                <a:rPr lang="fr-FR" sz="1050" b="1" dirty="0" err="1">
+                  <a:solidFill>
+                    <a:schemeClr val="accent2">
+                      <a:lumMod val="50000"/>
+                    </a:schemeClr>
+                  </a:solidFill>
+                </a:rPr>
+                <a:t>Step</a:t>
+              </a:r>
+              <a:r>
+                <a:rPr lang="fr-FR" sz="1050" b="1" dirty="0">
+                  <a:solidFill>
+                    <a:schemeClr val="accent2">
+                      <a:lumMod val="50000"/>
+                    </a:schemeClr>
+                  </a:solidFill>
+                </a:rPr>
+                <a:t> 3: dose-</a:t>
+              </a:r>
+              <a:r>
+                <a:rPr lang="fr-FR" sz="1050" b="1" dirty="0" err="1">
+                  <a:solidFill>
+                    <a:schemeClr val="accent2">
+                      <a:lumMod val="50000"/>
+                    </a:schemeClr>
+                  </a:solidFill>
+                </a:rPr>
+                <a:t>response</a:t>
+              </a:r>
+              <a:r>
+                <a:rPr lang="fr-FR" sz="1050" b="1" dirty="0">
+                  <a:solidFill>
+                    <a:schemeClr val="accent2">
+                      <a:lumMod val="50000"/>
+                    </a:schemeClr>
+                  </a:solidFill>
+                </a:rPr>
+                <a:t> </a:t>
+              </a:r>
+              <a:r>
+                <a:rPr lang="fr-FR" sz="1050" b="1" dirty="0" err="1">
+                  <a:solidFill>
+                    <a:schemeClr val="accent2">
+                      <a:lumMod val="50000"/>
+                    </a:schemeClr>
+                  </a:solidFill>
+                </a:rPr>
+                <a:t>modelling</a:t>
+              </a:r>
+              <a:r>
+                <a:rPr lang="fr-FR" sz="1050" b="1" dirty="0">
+                  <a:solidFill>
+                    <a:schemeClr val="accent2">
+                      <a:lumMod val="50000"/>
+                    </a:schemeClr>
+                  </a:solidFill>
+                </a:rPr>
+                <a:t> for responsive items</a:t>
+              </a:r>
+            </a:p>
+          </p:txBody>
+        </p:sp>
+        <p:sp>
+          <p:nvSpPr>
+            <p:cNvPr id="83" name="ZoneTexte 82"/>
+            <p:cNvSpPr txBox="1"/>
+            <p:nvPr/>
+          </p:nvSpPr>
+          <p:spPr>
+            <a:xfrm>
+              <a:off x="164592" y="3411743"/>
+              <a:ext cx="3729038" cy="215444"/>
+            </a:xfrm>
+            <a:prstGeom prst="rect">
+              <a:avLst/>
+            </a:prstGeom>
+            <a:noFill/>
+          </p:spPr>
+          <p:txBody>
+            <a:bodyPr wrap="square" rtlCol="0">
+              <a:spAutoFit/>
+            </a:bodyPr>
+            <a:lstStyle/>
+            <a:p>
+              <a:r>
+                <a:rPr lang="fr-FR" sz="800" dirty="0" err="1">
+                  <a:latin typeface="Courier New" panose="02070309020205020404" pitchFamily="49" charset="0"/>
+                  <a:cs typeface="Courier New" panose="02070309020205020404" pitchFamily="49" charset="0"/>
+                </a:rPr>
+                <a:t>bmdcalc</a:t>
+              </a:r>
+              <a:r>
+                <a:rPr lang="fr-FR" sz="800" dirty="0">
+                  <a:latin typeface="Courier New" panose="02070309020205020404" pitchFamily="49" charset="0"/>
+                  <a:cs typeface="Courier New" panose="02070309020205020404" pitchFamily="49" charset="0"/>
+                </a:rPr>
+                <a:t>(f, z = 1, x = 10, </a:t>
+              </a:r>
+              <a:r>
+                <a:rPr lang="fr-FR" sz="800" dirty="0" err="1">
+                  <a:latin typeface="Courier New" panose="02070309020205020404" pitchFamily="49" charset="0"/>
+                  <a:cs typeface="Courier New" panose="02070309020205020404" pitchFamily="49" charset="0"/>
+                </a:rPr>
+                <a:t>minBMD</a:t>
+              </a:r>
+              <a:r>
+                <a:rPr lang="fr-FR" sz="800" dirty="0">
+                  <a:latin typeface="Courier New" panose="02070309020205020404" pitchFamily="49" charset="0"/>
+                  <a:cs typeface="Courier New" panose="02070309020205020404" pitchFamily="49" charset="0"/>
+                </a:rPr>
+                <a:t>)</a:t>
+              </a:r>
+            </a:p>
+          </p:txBody>
+        </p:sp>
+        <p:sp>
+          <p:nvSpPr>
+            <p:cNvPr id="84" name="ZoneTexte 83"/>
+            <p:cNvSpPr txBox="1"/>
+            <p:nvPr/>
+          </p:nvSpPr>
+          <p:spPr>
+            <a:xfrm>
+              <a:off x="358331" y="3240311"/>
+              <a:ext cx="3223260" cy="253916"/>
+            </a:xfrm>
+            <a:prstGeom prst="rect">
+              <a:avLst/>
+            </a:prstGeom>
+            <a:noFill/>
+          </p:spPr>
+          <p:txBody>
+            <a:bodyPr wrap="square" rtlCol="0">
+              <a:spAutoFit/>
+            </a:bodyPr>
+            <a:lstStyle/>
+            <a:p>
+              <a:r>
+                <a:rPr lang="fr-FR" sz="1050" b="1" dirty="0" err="1">
+                  <a:solidFill>
+                    <a:schemeClr val="accent2">
+                      <a:lumMod val="50000"/>
+                    </a:schemeClr>
+                  </a:solidFill>
+                </a:rPr>
+                <a:t>Step</a:t>
+              </a:r>
+              <a:r>
+                <a:rPr lang="fr-FR" sz="1050" b="1" dirty="0">
+                  <a:solidFill>
+                    <a:schemeClr val="accent2">
+                      <a:lumMod val="50000"/>
+                    </a:schemeClr>
+                  </a:solidFill>
+                </a:rPr>
+                <a:t> 4: Computation of benchmark doses</a:t>
+              </a:r>
+            </a:p>
+          </p:txBody>
+        </p:sp>
+        <p:sp>
+          <p:nvSpPr>
+            <p:cNvPr id="85" name="ZoneTexte 84"/>
+            <p:cNvSpPr txBox="1"/>
+            <p:nvPr/>
+          </p:nvSpPr>
+          <p:spPr>
+            <a:xfrm>
+              <a:off x="173148" y="3883952"/>
+              <a:ext cx="3729038" cy="215444"/>
+            </a:xfrm>
+            <a:prstGeom prst="rect">
+              <a:avLst/>
+            </a:prstGeom>
+            <a:noFill/>
+          </p:spPr>
+          <p:txBody>
+            <a:bodyPr wrap="square" rtlCol="0">
+              <a:spAutoFit/>
+            </a:bodyPr>
+            <a:lstStyle/>
+            <a:p>
+              <a:r>
+                <a:rPr lang="en-US" sz="800" dirty="0" err="1">
+                  <a:latin typeface="Courier New" panose="02070309020205020404" pitchFamily="49" charset="0"/>
+                  <a:cs typeface="Courier New" panose="02070309020205020404" pitchFamily="49" charset="0"/>
+                </a:rPr>
+                <a:t>bmdboot</a:t>
+              </a:r>
+              <a:r>
+                <a:rPr lang="en-US" sz="800" dirty="0">
+                  <a:latin typeface="Courier New" panose="02070309020205020404" pitchFamily="49" charset="0"/>
+                  <a:cs typeface="Courier New" panose="02070309020205020404" pitchFamily="49" charset="0"/>
+                </a:rPr>
+                <a:t>(r, niter = 1000, </a:t>
+              </a:r>
+              <a:r>
+                <a:rPr lang="en-US" sz="800" dirty="0" err="1">
+                  <a:latin typeface="Courier New" panose="02070309020205020404" pitchFamily="49" charset="0"/>
+                  <a:cs typeface="Courier New" panose="02070309020205020404" pitchFamily="49" charset="0"/>
+                </a:rPr>
+                <a:t>conf.level</a:t>
+              </a:r>
+              <a:r>
+                <a:rPr lang="en-US" sz="800" dirty="0">
+                  <a:latin typeface="Courier New" panose="02070309020205020404" pitchFamily="49" charset="0"/>
+                  <a:cs typeface="Courier New" panose="02070309020205020404" pitchFamily="49" charset="0"/>
+                </a:rPr>
+                <a:t> = 0.95)</a:t>
+              </a:r>
+              <a:endParaRPr lang="fr-FR" sz="800" dirty="0">
+                <a:latin typeface="Courier New" panose="02070309020205020404" pitchFamily="49" charset="0"/>
+                <a:cs typeface="Courier New" panose="02070309020205020404" pitchFamily="49" charset="0"/>
+              </a:endParaRPr>
+            </a:p>
+          </p:txBody>
+        </p:sp>
+        <p:sp>
+          <p:nvSpPr>
+            <p:cNvPr id="86" name="ZoneTexte 85"/>
+            <p:cNvSpPr txBox="1"/>
+            <p:nvPr/>
+          </p:nvSpPr>
+          <p:spPr>
+            <a:xfrm>
+              <a:off x="314039" y="3664443"/>
+              <a:ext cx="3447256" cy="253916"/>
+            </a:xfrm>
+            <a:prstGeom prst="rect">
+              <a:avLst/>
+            </a:prstGeom>
+            <a:noFill/>
+          </p:spPr>
+          <p:txBody>
+            <a:bodyPr wrap="square" rtlCol="0">
+              <a:spAutoFit/>
+            </a:bodyPr>
+            <a:lstStyle/>
+            <a:p>
+              <a:r>
+                <a:rPr lang="fr-FR" sz="1050" b="1" dirty="0" err="1">
+                  <a:solidFill>
+                    <a:schemeClr val="accent2">
+                      <a:lumMod val="50000"/>
+                    </a:schemeClr>
+                  </a:solidFill>
+                </a:rPr>
+                <a:t>Step</a:t>
+              </a:r>
+              <a:r>
+                <a:rPr lang="fr-FR" sz="1050" b="1" dirty="0">
+                  <a:solidFill>
+                    <a:schemeClr val="accent2">
+                      <a:lumMod val="50000"/>
+                    </a:schemeClr>
+                  </a:solidFill>
+                </a:rPr>
+                <a:t> 5: </a:t>
+              </a:r>
+              <a:r>
+                <a:rPr lang="fr-FR" sz="1050" b="1" dirty="0" err="1">
+                  <a:solidFill>
+                    <a:schemeClr val="accent2">
+                      <a:lumMod val="50000"/>
+                    </a:schemeClr>
+                  </a:solidFill>
+                </a:rPr>
+                <a:t>Bootstrap</a:t>
+              </a:r>
+              <a:r>
+                <a:rPr lang="fr-FR" sz="1050" b="1" dirty="0">
+                  <a:solidFill>
+                    <a:schemeClr val="accent2">
+                      <a:lumMod val="50000"/>
+                    </a:schemeClr>
+                  </a:solidFill>
+                </a:rPr>
+                <a:t> to </a:t>
+              </a:r>
+              <a:r>
+                <a:rPr lang="fr-FR" sz="1050" b="1" dirty="0" err="1">
+                  <a:solidFill>
+                    <a:schemeClr val="accent2">
+                      <a:lumMod val="50000"/>
+                    </a:schemeClr>
+                  </a:solidFill>
+                </a:rPr>
+                <a:t>compute</a:t>
+              </a:r>
+              <a:r>
+                <a:rPr lang="fr-FR" sz="1050" b="1" dirty="0">
+                  <a:solidFill>
+                    <a:schemeClr val="accent2">
+                      <a:lumMod val="50000"/>
+                    </a:schemeClr>
+                  </a:solidFill>
+                </a:rPr>
+                <a:t> BMD confidence </a:t>
+              </a:r>
+              <a:r>
+                <a:rPr lang="fr-FR" sz="1050" b="1" dirty="0" err="1">
+                  <a:solidFill>
+                    <a:schemeClr val="accent2">
+                      <a:lumMod val="50000"/>
+                    </a:schemeClr>
+                  </a:solidFill>
+                </a:rPr>
+                <a:t>intervals</a:t>
+              </a:r>
+              <a:endParaRPr lang="fr-FR" sz="1050" b="1" dirty="0">
+                <a:solidFill>
+                  <a:schemeClr val="accent2">
+                    <a:lumMod val="50000"/>
+                  </a:schemeClr>
+                </a:solidFill>
+              </a:endParaRPr>
+            </a:p>
+          </p:txBody>
+        </p:sp>
+        <p:sp>
+          <p:nvSpPr>
+            <p:cNvPr id="87" name="ZoneTexte 86"/>
+            <p:cNvSpPr txBox="1"/>
+            <p:nvPr/>
+          </p:nvSpPr>
+          <p:spPr>
+            <a:xfrm>
+              <a:off x="127796" y="1628130"/>
+              <a:ext cx="3987069" cy="707886"/>
+            </a:xfrm>
+            <a:prstGeom prst="rect">
+              <a:avLst/>
+            </a:prstGeom>
+            <a:noFill/>
+          </p:spPr>
+          <p:txBody>
+            <a:bodyPr wrap="square" rtlCol="0">
+              <a:spAutoFit/>
+            </a:bodyPr>
+            <a:lstStyle/>
+            <a:p>
+              <a:r>
+                <a:rPr lang="fr-FR" sz="800" dirty="0" err="1">
+                  <a:latin typeface="Courier New" panose="02070309020205020404" pitchFamily="49" charset="0"/>
+                  <a:cs typeface="Courier New" panose="02070309020205020404" pitchFamily="49" charset="0"/>
+                </a:rPr>
+                <a:t>microarraydata</a:t>
+              </a:r>
+              <a:r>
+                <a:rPr lang="fr-FR" sz="800" dirty="0">
+                  <a:latin typeface="Courier New" panose="02070309020205020404" pitchFamily="49" charset="0"/>
+                  <a:cs typeface="Courier New" panose="02070309020205020404" pitchFamily="49" charset="0"/>
+                </a:rPr>
+                <a:t>(file, </a:t>
+              </a:r>
+            </a:p>
+            <a:p>
+              <a:r>
+                <a:rPr lang="fr-FR" sz="800" dirty="0">
+                  <a:latin typeface="Courier New" panose="02070309020205020404" pitchFamily="49" charset="0"/>
+                  <a:cs typeface="Courier New" panose="02070309020205020404" pitchFamily="49" charset="0"/>
+                </a:rPr>
+                <a:t>   </a:t>
+              </a:r>
+              <a:r>
+                <a:rPr lang="fr-FR" sz="800" dirty="0" err="1">
+                  <a:latin typeface="Courier New" panose="02070309020205020404" pitchFamily="49" charset="0"/>
+                  <a:cs typeface="Courier New" panose="02070309020205020404" pitchFamily="49" charset="0"/>
+                </a:rPr>
+                <a:t>norm.method</a:t>
+              </a:r>
+              <a:r>
+                <a:rPr lang="fr-FR" sz="800" dirty="0">
+                  <a:latin typeface="Courier New" panose="02070309020205020404" pitchFamily="49" charset="0"/>
+                  <a:cs typeface="Courier New" panose="02070309020205020404" pitchFamily="49" charset="0"/>
+                </a:rPr>
+                <a:t> = c("</a:t>
+              </a:r>
+              <a:r>
+                <a:rPr lang="fr-FR" sz="800" dirty="0" err="1">
+                  <a:latin typeface="Courier New" panose="02070309020205020404" pitchFamily="49" charset="0"/>
+                  <a:cs typeface="Courier New" panose="02070309020205020404" pitchFamily="49" charset="0"/>
+                </a:rPr>
+                <a:t>cyclicloess</a:t>
+              </a:r>
+              <a:r>
+                <a:rPr lang="fr-FR" sz="800" dirty="0">
+                  <a:latin typeface="Courier New" panose="02070309020205020404" pitchFamily="49" charset="0"/>
+                  <a:cs typeface="Courier New" panose="02070309020205020404" pitchFamily="49" charset="0"/>
+                </a:rPr>
+                <a:t>", "quantile", "</a:t>
+              </a:r>
+              <a:r>
+                <a:rPr lang="fr-FR" sz="800" dirty="0" err="1">
+                  <a:latin typeface="Courier New" panose="02070309020205020404" pitchFamily="49" charset="0"/>
+                  <a:cs typeface="Courier New" panose="02070309020205020404" pitchFamily="49" charset="0"/>
+                </a:rPr>
+                <a:t>scale</a:t>
+              </a:r>
+              <a:r>
+                <a:rPr lang="fr-FR" sz="800" dirty="0">
+                  <a:latin typeface="Courier New" panose="02070309020205020404" pitchFamily="49" charset="0"/>
+                  <a:cs typeface="Courier New" panose="02070309020205020404" pitchFamily="49" charset="0"/>
+                </a:rPr>
+                <a:t>", "none"))</a:t>
+              </a:r>
+            </a:p>
+            <a:p>
+              <a:r>
+                <a:rPr lang="fr-FR" sz="800" dirty="0" err="1">
+                  <a:latin typeface="Courier New" panose="02070309020205020404" pitchFamily="49" charset="0"/>
+                  <a:cs typeface="Courier New" panose="02070309020205020404" pitchFamily="49" charset="0"/>
+                </a:rPr>
+                <a:t>RNAseqdata</a:t>
+              </a:r>
+              <a:r>
+                <a:rPr lang="fr-FR" sz="800" dirty="0">
+                  <a:latin typeface="Courier New" panose="02070309020205020404" pitchFamily="49" charset="0"/>
+                  <a:cs typeface="Courier New" panose="02070309020205020404" pitchFamily="49" charset="0"/>
+                </a:rPr>
+                <a:t>(file, </a:t>
+              </a:r>
+              <a:r>
+                <a:rPr lang="fr-FR" sz="800" dirty="0" err="1">
+                  <a:latin typeface="Courier New" panose="02070309020205020404" pitchFamily="49" charset="0"/>
+                  <a:cs typeface="Courier New" panose="02070309020205020404" pitchFamily="49" charset="0"/>
+                </a:rPr>
+                <a:t>transfo.method</a:t>
+              </a:r>
+              <a:r>
+                <a:rPr lang="fr-FR" sz="800" dirty="0">
+                  <a:latin typeface="Courier New" panose="02070309020205020404" pitchFamily="49" charset="0"/>
+                  <a:cs typeface="Courier New" panose="02070309020205020404" pitchFamily="49" charset="0"/>
+                </a:rPr>
+                <a:t> = c("</a:t>
+              </a:r>
+              <a:r>
+                <a:rPr lang="fr-FR" sz="800" dirty="0" err="1">
+                  <a:latin typeface="Courier New" panose="02070309020205020404" pitchFamily="49" charset="0"/>
+                  <a:cs typeface="Courier New" panose="02070309020205020404" pitchFamily="49" charset="0"/>
+                </a:rPr>
+                <a:t>rlog</a:t>
+              </a:r>
+              <a:r>
+                <a:rPr lang="fr-FR" sz="800" dirty="0">
+                  <a:latin typeface="Courier New" panose="02070309020205020404" pitchFamily="49" charset="0"/>
+                  <a:cs typeface="Courier New" panose="02070309020205020404" pitchFamily="49" charset="0"/>
+                </a:rPr>
+                <a:t>", "</a:t>
+              </a:r>
+              <a:r>
+                <a:rPr lang="fr-FR" sz="800" dirty="0" err="1">
+                  <a:latin typeface="Courier New" panose="02070309020205020404" pitchFamily="49" charset="0"/>
+                  <a:cs typeface="Courier New" panose="02070309020205020404" pitchFamily="49" charset="0"/>
+                </a:rPr>
+                <a:t>vst</a:t>
+              </a:r>
+              <a:r>
+                <a:rPr lang="fr-FR" sz="800" dirty="0">
+                  <a:latin typeface="Courier New" panose="02070309020205020404" pitchFamily="49" charset="0"/>
+                  <a:cs typeface="Courier New" panose="02070309020205020404" pitchFamily="49" charset="0"/>
+                </a:rPr>
+                <a:t>"))</a:t>
+              </a:r>
+            </a:p>
+            <a:p>
+              <a:r>
+                <a:rPr lang="fr-FR" sz="800" dirty="0" err="1">
+                  <a:latin typeface="Courier New" panose="02070309020205020404" pitchFamily="49" charset="0"/>
+                  <a:cs typeface="Courier New" panose="02070309020205020404" pitchFamily="49" charset="0"/>
+                </a:rPr>
+                <a:t>continuousomicdata</a:t>
+              </a:r>
+              <a:r>
+                <a:rPr lang="fr-FR" sz="800" dirty="0">
+                  <a:latin typeface="Courier New" panose="02070309020205020404" pitchFamily="49" charset="0"/>
+                  <a:cs typeface="Courier New" panose="02070309020205020404" pitchFamily="49" charset="0"/>
+                </a:rPr>
+                <a:t>(file)</a:t>
+              </a:r>
+            </a:p>
+            <a:p>
+              <a:r>
+                <a:rPr lang="fr-FR" sz="800" dirty="0" err="1">
+                  <a:latin typeface="Courier New" panose="02070309020205020404" pitchFamily="49" charset="0"/>
+                  <a:cs typeface="Courier New" panose="02070309020205020404" pitchFamily="49" charset="0"/>
+                </a:rPr>
+                <a:t>continuousanchoringdata</a:t>
+              </a:r>
+              <a:r>
+                <a:rPr lang="fr-FR" sz="800" dirty="0">
+                  <a:latin typeface="Courier New" panose="02070309020205020404" pitchFamily="49" charset="0"/>
+                  <a:cs typeface="Courier New" panose="02070309020205020404" pitchFamily="49" charset="0"/>
+                </a:rPr>
+                <a:t>(file)</a:t>
+              </a:r>
+            </a:p>
+          </p:txBody>
+        </p:sp>
+      </p:grpSp>
+      <p:sp>
+        <p:nvSpPr>
+          <p:cNvPr id="68" name="Rectangle à coins arrondis 67"/>
+          <p:cNvSpPr/>
+          <p:nvPr/>
+        </p:nvSpPr>
+        <p:spPr>
+          <a:xfrm>
+            <a:off x="75367" y="2644226"/>
+            <a:ext cx="3387545" cy="262713"/>
+          </a:xfrm>
+          <a:prstGeom prst="roundRect">
+            <a:avLst/>
+          </a:prstGeom>
+          <a:solidFill>
+            <a:schemeClr val="accent2"/>
+          </a:solidFill>
+          <a:ln>
+            <a:noFill/>
+          </a:ln>
+        </p:spPr>
+        <p:style>
+          <a:lnRef idx="2">
+            <a:schemeClr val="accent1">
+              <a:shade val="50000"/>
+            </a:schemeClr>
+          </a:lnRef>
+          <a:fillRef idx="1">
+            <a:schemeClr val="accent1"/>
+          </a:fillRef>
+          <a:effectRef idx="0">
+            <a:schemeClr val="accent1"/>
+          </a:effectRef>
+          <a:fontRef idx="minor">
+            <a:schemeClr val="lt1"/>
+          </a:fontRef>
+        </p:style>
+        <p:txBody>
+          <a:bodyPr rtlCol="0" anchor="ctr"/>
+          <a:lstStyle/>
+          <a:p>
+            <a:pPr algn="ctr"/>
+            <a:r>
+              <a:rPr lang="fr-FR" sz="1200" b="1" dirty="0">
+                <a:solidFill>
+                  <a:schemeClr val="bg1"/>
+                </a:solidFill>
+              </a:rPr>
+              <a:t>Workflow for </a:t>
+            </a:r>
+            <a:r>
+              <a:rPr lang="fr-FR" sz="1200" b="1" dirty="0" err="1">
+                <a:solidFill>
+                  <a:schemeClr val="bg1"/>
+                </a:solidFill>
+              </a:rPr>
+              <a:t>analysis</a:t>
+            </a:r>
+            <a:r>
+              <a:rPr lang="fr-FR" sz="1200" b="1" dirty="0">
+                <a:solidFill>
+                  <a:schemeClr val="bg1"/>
+                </a:solidFill>
+              </a:rPr>
+              <a:t> of </a:t>
+            </a:r>
+            <a:r>
+              <a:rPr lang="fr-FR" sz="1200" b="1" dirty="0" smtClean="0">
+                <a:solidFill>
+                  <a:schemeClr val="bg1"/>
+                </a:solidFill>
+              </a:rPr>
+              <a:t>data</a:t>
+            </a:r>
+            <a:endParaRPr lang="fr-FR" sz="1200" b="1" dirty="0">
+              <a:solidFill>
+                <a:schemeClr val="bg1"/>
+              </a:solidFill>
+            </a:endParaRPr>
+          </a:p>
+        </p:txBody>
+      </p:sp>
+      <p:sp>
+        <p:nvSpPr>
+          <p:cNvPr id="70" name="ZoneTexte 69"/>
+          <p:cNvSpPr txBox="1"/>
+          <p:nvPr/>
+        </p:nvSpPr>
+        <p:spPr>
+          <a:xfrm>
+            <a:off x="57311" y="2902524"/>
+            <a:ext cx="3849160" cy="215444"/>
+          </a:xfrm>
+          <a:prstGeom prst="rect">
+            <a:avLst/>
+          </a:prstGeom>
+          <a:noFill/>
+        </p:spPr>
+        <p:txBody>
+          <a:bodyPr wrap="square" rtlCol="0">
+            <a:spAutoFit/>
+          </a:bodyPr>
+          <a:lstStyle/>
+          <a:p>
+            <a:r>
+              <a:rPr lang="fr-FR" sz="800" dirty="0" err="1"/>
+              <a:t>Functions</a:t>
+            </a:r>
+            <a:r>
+              <a:rPr lang="fr-FR" sz="800" dirty="0"/>
+              <a:t> </a:t>
+            </a:r>
+            <a:r>
+              <a:rPr lang="fr-FR" sz="800" dirty="0" err="1"/>
+              <a:t>with</a:t>
+            </a:r>
+            <a:r>
+              <a:rPr lang="fr-FR" sz="800" dirty="0"/>
+              <a:t> </a:t>
+            </a:r>
+            <a:r>
+              <a:rPr lang="fr-FR" sz="800" dirty="0" err="1"/>
+              <a:t>their</a:t>
+            </a:r>
+            <a:r>
+              <a:rPr lang="fr-FR" sz="800" dirty="0"/>
+              <a:t> main arguments (</a:t>
+            </a:r>
+            <a:r>
+              <a:rPr lang="fr-FR" sz="800" dirty="0" err="1"/>
+              <a:t>see</a:t>
+            </a:r>
+            <a:r>
+              <a:rPr lang="fr-FR" sz="800" dirty="0"/>
+              <a:t> help pages for a </a:t>
+            </a:r>
+            <a:r>
+              <a:rPr lang="fr-FR" sz="800" dirty="0" err="1"/>
+              <a:t>complete</a:t>
+            </a:r>
+            <a:r>
+              <a:rPr lang="fr-FR" sz="800" dirty="0"/>
+              <a:t> description)</a:t>
+            </a:r>
+          </a:p>
+        </p:txBody>
+      </p:sp>
+      <p:sp>
+        <p:nvSpPr>
+          <p:cNvPr id="26" name="Rectangle à coins arrondis 25"/>
+          <p:cNvSpPr/>
+          <p:nvPr/>
+        </p:nvSpPr>
+        <p:spPr>
+          <a:xfrm>
+            <a:off x="351472" y="6027193"/>
+            <a:ext cx="1584098" cy="784151"/>
+          </a:xfrm>
+          <a:prstGeom prst="roundRect">
+            <a:avLst/>
+          </a:prstGeom>
+          <a:noFill/>
+          <a:ln>
+            <a:solidFill>
+              <a:schemeClr val="accent2"/>
             </a:solidFill>
           </a:ln>
         </p:spPr>

</xml_diff>

<commit_message>
minor syntax or form corrections
</commit_message>
<xml_diff>
--- a/share/techdoc/DRomics_cheat_sheet.pptx
+++ b/share/techdoc/DRomics_cheat_sheet.pptx
@@ -5046,31 +5046,7 @@
               <a:rPr lang="en-US" sz="788" dirty="0">
                 <a:latin typeface="Arial Narrow" panose="020B0606020202030204" pitchFamily="34" charset="0"/>
               </a:rPr>
-              <a:t> with the main workflow results, optionally gathering results obtained at different experimental (</a:t>
-            </a:r>
-            <a:r>
-              <a:rPr lang="en-US" sz="788" dirty="0" err="1">
-                <a:latin typeface="Arial Narrow" panose="020B0606020202030204" pitchFamily="34" charset="0"/>
-              </a:rPr>
-              <a:t>e.g.different</a:t>
-            </a:r>
-            <a:r>
-              <a:rPr lang="en-US" sz="788" dirty="0">
-                <a:latin typeface="Arial Narrow" panose="020B0606020202030204" pitchFamily="34" charset="0"/>
-              </a:rPr>
-              <a:t> </a:t>
-            </a:r>
-            <a:r>
-              <a:rPr lang="en-US" sz="788" dirty="0" err="1">
-                <a:latin typeface="Arial Narrow" panose="020B0606020202030204" pitchFamily="34" charset="0"/>
-              </a:rPr>
-              <a:t>molelcular</a:t>
-            </a:r>
-            <a:r>
-              <a:rPr lang="en-US" sz="788" dirty="0">
-                <a:latin typeface="Arial Narrow" panose="020B0606020202030204" pitchFamily="34" charset="0"/>
-              </a:rPr>
-              <a:t> levels, different times, …) extended with additional columns coding for the biological annotation of items and optionally for the experimental. Some lines of the workflow results can be replicated for items having more than one annotation </a:t>
+              <a:t> with the main workflow results, optionally gathering results obtained at different experimental (different molecular levels, different time points, different pre-exposure histories, …) extended with additional columns coding for the biological annotation of items and optionally for the experimental. Some lines of the workflow results can be replicated for items having more than one annotation </a:t>
             </a:r>
             <a:r>
               <a:rPr lang="fr-FR" sz="788" dirty="0">
@@ -7184,7 +7160,7 @@
         </p:blipFill>
         <p:spPr>
           <a:xfrm>
-            <a:off x="6477728" y="1449818"/>
+            <a:off x="6513050" y="1528591"/>
             <a:ext cx="2492028" cy="1423155"/>
           </a:xfrm>
           <a:prstGeom prst="rect">

</xml_diff>